<commit_message>
Added Reconstruction by Dilation slide
</commit_message>
<xml_diff>
--- a/Images/Presentation/Matt_Slides.pptx
+++ b/Images/Presentation/Matt_Slides.pptx
@@ -7,6 +7,7 @@
   <p:sldIdLst>
     <p:sldId id="257" r:id="rId2"/>
     <p:sldId id="258" r:id="rId3"/>
+    <p:sldId id="259" r:id="rId4"/>
   </p:sldIdLst>
   <p:sldSz cx="12192000" cy="6858000"/>
   <p:notesSz cx="6858000" cy="9144000"/>
@@ -3102,10 +3103,33 @@
                         <m:r>
                           <a:rPr lang="en-US" sz="3600" b="0" i="1" smtClean="0">
                             <a:latin typeface="Cambria Math" panose="02040503050406030204" pitchFamily="18" charset="0"/>
-                            <a:ea typeface="Cambria Math" panose="02040503050406030204" pitchFamily="18" charset="0"/>
                           </a:rPr>
-                          <m:t>⨁</m:t>
+                          <m:t> </m:t>
                         </m:r>
+                        <m:nary>
+                          <m:naryPr>
+                            <m:chr m:val="⨁"/>
+                            <m:subHide m:val="on"/>
+                            <m:supHide m:val="on"/>
+                            <m:ctrlPr>
+                              <a:rPr lang="en-US" sz="3600" b="0" i="1" smtClean="0">
+                                <a:latin typeface="Cambria Math" panose="02040503050406030204" pitchFamily="18" charset="0"/>
+                                <a:ea typeface="Cambria Math" panose="02040503050406030204" pitchFamily="18" charset="0"/>
+                              </a:rPr>
+                            </m:ctrlPr>
+                          </m:naryPr>
+                          <m:sub/>
+                          <m:sup/>
+                          <m:e>
+                            <m:r>
+                              <a:rPr lang="en-US" sz="3600" b="0" i="1" smtClean="0">
+                                <a:latin typeface="Cambria Math" panose="02040503050406030204" pitchFamily="18" charset="0"/>
+                                <a:ea typeface="Cambria Math" panose="02040503050406030204" pitchFamily="18" charset="0"/>
+                              </a:rPr>
+                              <m:t> </m:t>
+                            </m:r>
+                          </m:e>
+                        </m:nary>
                         <m:r>
                           <a:rPr lang="en-US" sz="3600" b="0" i="1" smtClean="0">
                             <a:latin typeface="Cambria Math" panose="02040503050406030204" pitchFamily="18" charset="0"/>
@@ -6214,6 +6238,1896 @@
 </p:sld>
 </file>
 
+<file path=ppt/slides/slide3.xml><?xml version="1.0" encoding="utf-8"?>
+<p:sld xmlns:a="http://schemas.openxmlformats.org/drawingml/2006/main" xmlns:r="http://schemas.openxmlformats.org/officeDocument/2006/relationships" xmlns:p="http://schemas.openxmlformats.org/presentationml/2006/main">
+  <p:cSld>
+    <p:spTree>
+      <p:nvGrpSpPr>
+        <p:cNvPr id="1" name=""/>
+        <p:cNvGrpSpPr/>
+        <p:nvPr/>
+      </p:nvGrpSpPr>
+      <p:grpSpPr>
+        <a:xfrm>
+          <a:off x="0" y="0"/>
+          <a:ext cx="0" cy="0"/>
+          <a:chOff x="0" y="0"/>
+          <a:chExt cx="0" cy="0"/>
+        </a:xfrm>
+      </p:grpSpPr>
+      <mc:AlternateContent xmlns:mc="http://schemas.openxmlformats.org/markup-compatibility/2006">
+        <mc:Choice xmlns:a14="http://schemas.microsoft.com/office/drawing/2010/main" Requires="a14">
+          <p:sp>
+            <p:nvSpPr>
+              <p:cNvPr id="2" name="Title 1"/>
+              <p:cNvSpPr>
+                <a:spLocks noGrp="1"/>
+              </p:cNvSpPr>
+              <p:nvPr>
+                <p:ph type="title"/>
+              </p:nvPr>
+            </p:nvSpPr>
+            <p:spPr/>
+            <p:txBody>
+              <a:bodyPr>
+                <a:normAutofit fontScale="90000"/>
+              </a:bodyPr>
+              <a:lstStyle/>
+              <a:p>
+                <a:r>
+                  <a:rPr lang="en-US" sz="4900" dirty="0" smtClean="0"/>
+                  <a:t>Reconstruction by Dilation</a:t>
+                </a:r>
+                <a:r>
+                  <a:rPr lang="en-US" dirty="0" smtClean="0"/>
+                  <a:t>	</a:t>
+                </a:r>
+                <a14:m>
+                  <m:oMath xmlns:m="http://schemas.openxmlformats.org/officeDocument/2006/math">
+                    <m:sSubSup>
+                      <m:sSubSupPr>
+                        <m:ctrlPr>
+                          <a:rPr lang="en-US" sz="4000" i="1" smtClean="0">
+                            <a:latin typeface="Cambria Math" panose="02040503050406030204" pitchFamily="18" charset="0"/>
+                          </a:rPr>
+                        </m:ctrlPr>
+                      </m:sSubSupPr>
+                      <m:e>
+                        <m:r>
+                          <a:rPr lang="en-US" sz="4000" b="0" i="1" smtClean="0">
+                            <a:latin typeface="Cambria Math" panose="02040503050406030204" pitchFamily="18" charset="0"/>
+                          </a:rPr>
+                          <m:t>𝑅</m:t>
+                        </m:r>
+                      </m:e>
+                      <m:sub>
+                        <m:r>
+                          <a:rPr lang="en-US" sz="4000" b="0" i="1" smtClean="0">
+                            <a:latin typeface="Cambria Math" panose="02040503050406030204" pitchFamily="18" charset="0"/>
+                          </a:rPr>
+                          <m:t>𝐺</m:t>
+                        </m:r>
+                      </m:sub>
+                      <m:sup>
+                        <m:r>
+                          <a:rPr lang="en-US" sz="4000" b="0" i="1" smtClean="0">
+                            <a:latin typeface="Cambria Math" panose="02040503050406030204" pitchFamily="18" charset="0"/>
+                          </a:rPr>
+                          <m:t>𝐷</m:t>
+                        </m:r>
+                      </m:sup>
+                    </m:sSubSup>
+                    <m:d>
+                      <m:dPr>
+                        <m:ctrlPr>
+                          <a:rPr lang="en-US" sz="4000" i="1" smtClean="0">
+                            <a:latin typeface="Cambria Math" panose="02040503050406030204" pitchFamily="18" charset="0"/>
+                          </a:rPr>
+                        </m:ctrlPr>
+                      </m:dPr>
+                      <m:e>
+                        <m:r>
+                          <a:rPr lang="en-US" sz="4000" b="0" i="1" smtClean="0">
+                            <a:latin typeface="Cambria Math" panose="02040503050406030204" pitchFamily="18" charset="0"/>
+                          </a:rPr>
+                          <m:t>𝐹</m:t>
+                        </m:r>
+                      </m:e>
+                    </m:d>
+                    <m:r>
+                      <a:rPr lang="en-US" sz="4000" b="0" i="1" smtClean="0">
+                        <a:latin typeface="Cambria Math" panose="02040503050406030204" pitchFamily="18" charset="0"/>
+                      </a:rPr>
+                      <m:t>=</m:t>
+                    </m:r>
+                    <m:sSubSup>
+                      <m:sSubSupPr>
+                        <m:ctrlPr>
+                          <a:rPr lang="en-US" sz="4000" b="0" i="1" smtClean="0">
+                            <a:latin typeface="Cambria Math" panose="02040503050406030204" pitchFamily="18" charset="0"/>
+                          </a:rPr>
+                        </m:ctrlPr>
+                      </m:sSubSupPr>
+                      <m:e>
+                        <m:r>
+                          <a:rPr lang="en-US" sz="4000" b="0" i="1" smtClean="0">
+                            <a:latin typeface="Cambria Math" panose="02040503050406030204" pitchFamily="18" charset="0"/>
+                          </a:rPr>
+                          <m:t>𝐷</m:t>
+                        </m:r>
+                      </m:e>
+                      <m:sub>
+                        <m:r>
+                          <a:rPr lang="en-US" sz="4000" b="0" i="1" smtClean="0">
+                            <a:latin typeface="Cambria Math" panose="02040503050406030204" pitchFamily="18" charset="0"/>
+                          </a:rPr>
+                          <m:t>𝐺</m:t>
+                        </m:r>
+                      </m:sub>
+                      <m:sup>
+                        <m:d>
+                          <m:dPr>
+                            <m:ctrlPr>
+                              <a:rPr lang="en-US" sz="4000" b="0" i="1" smtClean="0">
+                                <a:latin typeface="Cambria Math" panose="02040503050406030204" pitchFamily="18" charset="0"/>
+                              </a:rPr>
+                            </m:ctrlPr>
+                          </m:dPr>
+                          <m:e>
+                            <m:r>
+                              <a:rPr lang="en-US" sz="4000" b="0" i="1" smtClean="0">
+                                <a:latin typeface="Cambria Math" panose="02040503050406030204" pitchFamily="18" charset="0"/>
+                              </a:rPr>
+                              <m:t>𝑘</m:t>
+                            </m:r>
+                          </m:e>
+                        </m:d>
+                      </m:sup>
+                    </m:sSubSup>
+                    <m:d>
+                      <m:dPr>
+                        <m:ctrlPr>
+                          <a:rPr lang="en-US" sz="4000" b="0" i="1" smtClean="0">
+                            <a:latin typeface="Cambria Math" panose="02040503050406030204" pitchFamily="18" charset="0"/>
+                          </a:rPr>
+                        </m:ctrlPr>
+                      </m:dPr>
+                      <m:e>
+                        <m:r>
+                          <a:rPr lang="en-US" sz="4000" b="0" i="1" smtClean="0">
+                            <a:latin typeface="Cambria Math" panose="02040503050406030204" pitchFamily="18" charset="0"/>
+                          </a:rPr>
+                          <m:t>𝐹</m:t>
+                        </m:r>
+                      </m:e>
+                    </m:d>
+                  </m:oMath>
+                </a14:m>
+                <a:endParaRPr lang="en-US" sz="4000" dirty="0"/>
+              </a:p>
+            </p:txBody>
+          </p:sp>
+        </mc:Choice>
+        <mc:Fallback>
+          <p:sp>
+            <p:nvSpPr>
+              <p:cNvPr id="2" name="Title 1"/>
+              <p:cNvSpPr>
+                <a:spLocks noGrp="1" noRot="1" noChangeAspect="1" noMove="1" noResize="1" noEditPoints="1" noAdjustHandles="1" noChangeArrowheads="1" noChangeShapeType="1" noTextEdit="1"/>
+              </p:cNvSpPr>
+              <p:nvPr>
+                <p:ph type="title"/>
+              </p:nvPr>
+            </p:nvSpPr>
+            <p:spPr>
+              <a:blipFill rotWithShape="0">
+                <a:blip r:embed="rId2"/>
+                <a:stretch>
+                  <a:fillRect l="-2377"/>
+                </a:stretch>
+              </a:blipFill>
+            </p:spPr>
+            <p:txBody>
+              <a:bodyPr/>
+              <a:lstStyle/>
+              <a:p>
+                <a:r>
+                  <a:rPr lang="en-US">
+                    <a:noFill/>
+                  </a:rPr>
+                  <a:t> </a:t>
+                </a:r>
+              </a:p>
+            </p:txBody>
+          </p:sp>
+        </mc:Fallback>
+      </mc:AlternateContent>
+      <p:grpSp>
+        <p:nvGrpSpPr>
+          <p:cNvPr id="25" name="Group 24"/>
+          <p:cNvGrpSpPr/>
+          <p:nvPr/>
+        </p:nvGrpSpPr>
+        <p:grpSpPr>
+          <a:xfrm>
+            <a:off x="3595891" y="1523166"/>
+            <a:ext cx="2169174" cy="2610385"/>
+            <a:chOff x="8691821" y="1526048"/>
+            <a:chExt cx="2169174" cy="2610385"/>
+          </a:xfrm>
+        </p:grpSpPr>
+        <p:pic>
+          <p:nvPicPr>
+            <p:cNvPr id="27" name="Picture 26"/>
+            <p:cNvPicPr>
+              <a:picLocks noChangeAspect="1"/>
+            </p:cNvPicPr>
+            <p:nvPr/>
+          </p:nvPicPr>
+          <p:blipFill>
+            <a:blip r:embed="rId3">
+              <a:extLst>
+                <a:ext uri="{28A0092B-C50C-407E-A947-70E740481C1C}">
+                  <a14:useLocalDpi xmlns:a14="http://schemas.microsoft.com/office/drawing/2010/main" val="0"/>
+                </a:ext>
+              </a:extLst>
+            </a:blip>
+            <a:stretch>
+              <a:fillRect/>
+            </a:stretch>
+          </p:blipFill>
+          <p:spPr>
+            <a:xfrm>
+              <a:off x="8691821" y="1967259"/>
+              <a:ext cx="2169174" cy="2169174"/>
+            </a:xfrm>
+            <a:prstGeom prst="rect">
+              <a:avLst/>
+            </a:prstGeom>
+          </p:spPr>
+        </p:pic>
+        <mc:AlternateContent xmlns:mc="http://schemas.openxmlformats.org/markup-compatibility/2006">
+          <mc:Choice xmlns:a14="http://schemas.microsoft.com/office/drawing/2010/main" Requires="a14">
+            <p:sp>
+              <p:nvSpPr>
+                <p:cNvPr id="29" name="TextBox 28"/>
+                <p:cNvSpPr txBox="1"/>
+                <p:nvPr/>
+              </p:nvSpPr>
+              <p:spPr>
+                <a:xfrm>
+                  <a:off x="8691821" y="1526048"/>
+                  <a:ext cx="2169174" cy="441211"/>
+                </a:xfrm>
+                <a:prstGeom prst="rect">
+                  <a:avLst/>
+                </a:prstGeom>
+                <a:noFill/>
+              </p:spPr>
+              <p:txBody>
+                <a:bodyPr wrap="square" rtlCol="0">
+                  <a:spAutoFit/>
+                </a:bodyPr>
+                <a:lstStyle/>
+                <a:p>
+                  <a14:m>
+                    <m:oMathPara xmlns:m="http://schemas.openxmlformats.org/officeDocument/2006/math">
+                      <m:oMathParaPr>
+                        <m:jc m:val="centerGroup"/>
+                      </m:oMathParaPr>
+                      <m:oMath xmlns:m="http://schemas.openxmlformats.org/officeDocument/2006/math">
+                        <m:sSubSup>
+                          <m:sSubSupPr>
+                            <m:ctrlPr>
+                              <a:rPr lang="en-US" i="1" smtClean="0">
+                                <a:latin typeface="Cambria Math" panose="02040503050406030204" pitchFamily="18" charset="0"/>
+                              </a:rPr>
+                            </m:ctrlPr>
+                          </m:sSubSupPr>
+                          <m:e>
+                            <m:r>
+                              <a:rPr lang="en-US" i="1">
+                                <a:latin typeface="Cambria Math" panose="02040503050406030204" pitchFamily="18" charset="0"/>
+                              </a:rPr>
+                              <m:t>𝐷</m:t>
+                            </m:r>
+                          </m:e>
+                          <m:sub>
+                            <m:r>
+                              <a:rPr lang="en-US" i="1">
+                                <a:latin typeface="Cambria Math" panose="02040503050406030204" pitchFamily="18" charset="0"/>
+                              </a:rPr>
+                              <m:t>𝐺</m:t>
+                            </m:r>
+                          </m:sub>
+                          <m:sup>
+                            <m:r>
+                              <a:rPr lang="en-US" i="1">
+                                <a:latin typeface="Cambria Math" panose="02040503050406030204" pitchFamily="18" charset="0"/>
+                              </a:rPr>
+                              <m:t>(1)</m:t>
+                            </m:r>
+                          </m:sup>
+                        </m:sSubSup>
+                        <m:d>
+                          <m:dPr>
+                            <m:ctrlPr>
+                              <a:rPr lang="en-US" i="1" smtClean="0">
+                                <a:latin typeface="Cambria Math" panose="02040503050406030204" pitchFamily="18" charset="0"/>
+                              </a:rPr>
+                            </m:ctrlPr>
+                          </m:dPr>
+                          <m:e>
+                            <m:r>
+                              <a:rPr lang="en-US" b="0" i="1" smtClean="0">
+                                <a:latin typeface="Cambria Math" panose="02040503050406030204" pitchFamily="18" charset="0"/>
+                              </a:rPr>
+                              <m:t>𝐹</m:t>
+                            </m:r>
+                          </m:e>
+                        </m:d>
+                      </m:oMath>
+                    </m:oMathPara>
+                  </a14:m>
+                  <a:endParaRPr lang="en-US" dirty="0"/>
+                </a:p>
+              </p:txBody>
+            </p:sp>
+          </mc:Choice>
+          <mc:Fallback>
+            <p:sp>
+              <p:nvSpPr>
+                <p:cNvPr id="29" name="TextBox 28"/>
+                <p:cNvSpPr txBox="1">
+                  <a:spLocks noRot="1" noChangeAspect="1" noMove="1" noResize="1" noEditPoints="1" noAdjustHandles="1" noChangeArrowheads="1" noChangeShapeType="1" noTextEdit="1"/>
+                </p:cNvSpPr>
+                <p:nvPr/>
+              </p:nvSpPr>
+              <p:spPr>
+                <a:xfrm>
+                  <a:off x="8691821" y="1526048"/>
+                  <a:ext cx="2169174" cy="441211"/>
+                </a:xfrm>
+                <a:prstGeom prst="rect">
+                  <a:avLst/>
+                </a:prstGeom>
+                <a:blipFill rotWithShape="0">
+                  <a:blip r:embed="rId4"/>
+                  <a:stretch>
+                    <a:fillRect b="-2778"/>
+                  </a:stretch>
+                </a:blipFill>
+              </p:spPr>
+              <p:txBody>
+                <a:bodyPr/>
+                <a:lstStyle/>
+                <a:p>
+                  <a:r>
+                    <a:rPr lang="en-US">
+                      <a:noFill/>
+                    </a:rPr>
+                    <a:t> </a:t>
+                  </a:r>
+                </a:p>
+              </p:txBody>
+            </p:sp>
+          </mc:Fallback>
+        </mc:AlternateContent>
+      </p:grpSp>
+      <p:grpSp>
+        <p:nvGrpSpPr>
+          <p:cNvPr id="51" name="Group 50"/>
+          <p:cNvGrpSpPr/>
+          <p:nvPr/>
+        </p:nvGrpSpPr>
+        <p:grpSpPr>
+          <a:xfrm>
+            <a:off x="838200" y="1597318"/>
+            <a:ext cx="2169174" cy="2536233"/>
+            <a:chOff x="1351051" y="1600200"/>
+            <a:chExt cx="2169174" cy="2536233"/>
+          </a:xfrm>
+        </p:grpSpPr>
+        <p:pic>
+          <p:nvPicPr>
+            <p:cNvPr id="52" name="Picture 51"/>
+            <p:cNvPicPr>
+              <a:picLocks noChangeAspect="1"/>
+            </p:cNvPicPr>
+            <p:nvPr/>
+          </p:nvPicPr>
+          <p:blipFill>
+            <a:blip r:embed="rId5">
+              <a:extLst>
+                <a:ext uri="{28A0092B-C50C-407E-A947-70E740481C1C}">
+                  <a14:useLocalDpi xmlns:a14="http://schemas.microsoft.com/office/drawing/2010/main" val="0"/>
+                </a:ext>
+              </a:extLst>
+            </a:blip>
+            <a:stretch>
+              <a:fillRect/>
+            </a:stretch>
+          </p:blipFill>
+          <p:spPr>
+            <a:xfrm>
+              <a:off x="1351051" y="1967259"/>
+              <a:ext cx="2169174" cy="2169174"/>
+            </a:xfrm>
+            <a:prstGeom prst="rect">
+              <a:avLst/>
+            </a:prstGeom>
+          </p:spPr>
+        </p:pic>
+        <p:sp>
+          <p:nvSpPr>
+            <p:cNvPr id="53" name="TextBox 52"/>
+            <p:cNvSpPr txBox="1"/>
+            <p:nvPr/>
+          </p:nvSpPr>
+          <p:spPr>
+            <a:xfrm>
+              <a:off x="1351051" y="1600200"/>
+              <a:ext cx="2169174" cy="367059"/>
+            </a:xfrm>
+            <a:prstGeom prst="rect">
+              <a:avLst/>
+            </a:prstGeom>
+            <a:noFill/>
+          </p:spPr>
+          <p:txBody>
+            <a:bodyPr wrap="square" rtlCol="0">
+              <a:spAutoFit/>
+            </a:bodyPr>
+            <a:lstStyle/>
+            <a:p>
+              <a:r>
+                <a:rPr lang="en-US" dirty="0" smtClean="0">
+                  <a:latin typeface="Times New Roman" panose="02020603050405020304" pitchFamily="18" charset="0"/>
+                  <a:cs typeface="Times New Roman" panose="02020603050405020304" pitchFamily="18" charset="0"/>
+                </a:rPr>
+                <a:t>Marker - F</a:t>
+              </a:r>
+              <a:endParaRPr lang="en-US" dirty="0">
+                <a:latin typeface="Times New Roman" panose="02020603050405020304" pitchFamily="18" charset="0"/>
+                <a:cs typeface="Times New Roman" panose="02020603050405020304" pitchFamily="18" charset="0"/>
+              </a:endParaRPr>
+            </a:p>
+          </p:txBody>
+        </p:sp>
+      </p:grpSp>
+      <p:grpSp>
+        <p:nvGrpSpPr>
+          <p:cNvPr id="57" name="Group 56"/>
+          <p:cNvGrpSpPr/>
+          <p:nvPr/>
+        </p:nvGrpSpPr>
+        <p:grpSpPr>
+          <a:xfrm>
+            <a:off x="6353582" y="1517373"/>
+            <a:ext cx="2169174" cy="2610385"/>
+            <a:chOff x="8691821" y="1526048"/>
+            <a:chExt cx="2169174" cy="2610385"/>
+          </a:xfrm>
+        </p:grpSpPr>
+        <p:pic>
+          <p:nvPicPr>
+            <p:cNvPr id="58" name="Picture 57"/>
+            <p:cNvPicPr>
+              <a:picLocks noChangeAspect="1"/>
+            </p:cNvPicPr>
+            <p:nvPr/>
+          </p:nvPicPr>
+          <p:blipFill>
+            <a:blip r:embed="rId6">
+              <a:extLst>
+                <a:ext uri="{28A0092B-C50C-407E-A947-70E740481C1C}">
+                  <a14:useLocalDpi xmlns:a14="http://schemas.microsoft.com/office/drawing/2010/main" val="0"/>
+                </a:ext>
+              </a:extLst>
+            </a:blip>
+            <a:stretch>
+              <a:fillRect/>
+            </a:stretch>
+          </p:blipFill>
+          <p:spPr>
+            <a:xfrm>
+              <a:off x="8691821" y="1967259"/>
+              <a:ext cx="2169174" cy="2169174"/>
+            </a:xfrm>
+            <a:prstGeom prst="rect">
+              <a:avLst/>
+            </a:prstGeom>
+          </p:spPr>
+        </p:pic>
+        <mc:AlternateContent xmlns:mc="http://schemas.openxmlformats.org/markup-compatibility/2006">
+          <mc:Choice xmlns:a14="http://schemas.microsoft.com/office/drawing/2010/main" Requires="a14">
+            <p:sp>
+              <p:nvSpPr>
+                <p:cNvPr id="59" name="TextBox 58"/>
+                <p:cNvSpPr txBox="1"/>
+                <p:nvPr/>
+              </p:nvSpPr>
+              <p:spPr>
+                <a:xfrm>
+                  <a:off x="8691821" y="1526048"/>
+                  <a:ext cx="2169174" cy="441211"/>
+                </a:xfrm>
+                <a:prstGeom prst="rect">
+                  <a:avLst/>
+                </a:prstGeom>
+                <a:noFill/>
+              </p:spPr>
+              <p:txBody>
+                <a:bodyPr wrap="square" rtlCol="0">
+                  <a:spAutoFit/>
+                </a:bodyPr>
+                <a:lstStyle/>
+                <a:p>
+                  <a14:m>
+                    <m:oMathPara xmlns:m="http://schemas.openxmlformats.org/officeDocument/2006/math">
+                      <m:oMathParaPr>
+                        <m:jc m:val="centerGroup"/>
+                      </m:oMathParaPr>
+                      <m:oMath xmlns:m="http://schemas.openxmlformats.org/officeDocument/2006/math">
+                        <m:sSubSup>
+                          <m:sSubSupPr>
+                            <m:ctrlPr>
+                              <a:rPr lang="en-US" i="1" smtClean="0">
+                                <a:latin typeface="Cambria Math" panose="02040503050406030204" pitchFamily="18" charset="0"/>
+                              </a:rPr>
+                            </m:ctrlPr>
+                          </m:sSubSupPr>
+                          <m:e>
+                            <m:r>
+                              <a:rPr lang="en-US" i="1">
+                                <a:latin typeface="Cambria Math" panose="02040503050406030204" pitchFamily="18" charset="0"/>
+                              </a:rPr>
+                              <m:t>𝐷</m:t>
+                            </m:r>
+                          </m:e>
+                          <m:sub>
+                            <m:r>
+                              <a:rPr lang="en-US" i="1">
+                                <a:latin typeface="Cambria Math" panose="02040503050406030204" pitchFamily="18" charset="0"/>
+                              </a:rPr>
+                              <m:t>𝐺</m:t>
+                            </m:r>
+                          </m:sub>
+                          <m:sup>
+                            <m:r>
+                              <a:rPr lang="en-US" i="1">
+                                <a:latin typeface="Cambria Math" panose="02040503050406030204" pitchFamily="18" charset="0"/>
+                              </a:rPr>
+                              <m:t>(</m:t>
+                            </m:r>
+                            <m:r>
+                              <a:rPr lang="en-US" b="0" i="1" smtClean="0">
+                                <a:latin typeface="Cambria Math" panose="02040503050406030204" pitchFamily="18" charset="0"/>
+                              </a:rPr>
+                              <m:t>2</m:t>
+                            </m:r>
+                            <m:r>
+                              <a:rPr lang="en-US" i="1">
+                                <a:latin typeface="Cambria Math" panose="02040503050406030204" pitchFamily="18" charset="0"/>
+                              </a:rPr>
+                              <m:t>)</m:t>
+                            </m:r>
+                          </m:sup>
+                        </m:sSubSup>
+                        <m:d>
+                          <m:dPr>
+                            <m:ctrlPr>
+                              <a:rPr lang="en-US" i="1" smtClean="0">
+                                <a:latin typeface="Cambria Math" panose="02040503050406030204" pitchFamily="18" charset="0"/>
+                              </a:rPr>
+                            </m:ctrlPr>
+                          </m:dPr>
+                          <m:e>
+                            <m:r>
+                              <a:rPr lang="en-US" b="0" i="1" smtClean="0">
+                                <a:latin typeface="Cambria Math" panose="02040503050406030204" pitchFamily="18" charset="0"/>
+                              </a:rPr>
+                              <m:t>𝐹</m:t>
+                            </m:r>
+                          </m:e>
+                        </m:d>
+                      </m:oMath>
+                    </m:oMathPara>
+                  </a14:m>
+                  <a:endParaRPr lang="en-US" dirty="0"/>
+                </a:p>
+              </p:txBody>
+            </p:sp>
+          </mc:Choice>
+          <mc:Fallback>
+            <p:sp>
+              <p:nvSpPr>
+                <p:cNvPr id="59" name="TextBox 58"/>
+                <p:cNvSpPr txBox="1">
+                  <a:spLocks noRot="1" noChangeAspect="1" noMove="1" noResize="1" noEditPoints="1" noAdjustHandles="1" noChangeArrowheads="1" noChangeShapeType="1" noTextEdit="1"/>
+                </p:cNvSpPr>
+                <p:nvPr/>
+              </p:nvSpPr>
+              <p:spPr>
+                <a:xfrm>
+                  <a:off x="8691821" y="1526048"/>
+                  <a:ext cx="2169174" cy="441211"/>
+                </a:xfrm>
+                <a:prstGeom prst="rect">
+                  <a:avLst/>
+                </a:prstGeom>
+                <a:blipFill rotWithShape="0">
+                  <a:blip r:embed="rId7"/>
+                  <a:stretch>
+                    <a:fillRect b="-2778"/>
+                  </a:stretch>
+                </a:blipFill>
+              </p:spPr>
+              <p:txBody>
+                <a:bodyPr/>
+                <a:lstStyle/>
+                <a:p>
+                  <a:r>
+                    <a:rPr lang="en-US">
+                      <a:noFill/>
+                    </a:rPr>
+                    <a:t> </a:t>
+                  </a:r>
+                </a:p>
+              </p:txBody>
+            </p:sp>
+          </mc:Fallback>
+        </mc:AlternateContent>
+      </p:grpSp>
+      <p:grpSp>
+        <p:nvGrpSpPr>
+          <p:cNvPr id="60" name="Group 59"/>
+          <p:cNvGrpSpPr/>
+          <p:nvPr/>
+        </p:nvGrpSpPr>
+        <p:grpSpPr>
+          <a:xfrm>
+            <a:off x="9111274" y="1517373"/>
+            <a:ext cx="2169174" cy="2610385"/>
+            <a:chOff x="8691821" y="1526048"/>
+            <a:chExt cx="2169174" cy="2610385"/>
+          </a:xfrm>
+        </p:grpSpPr>
+        <p:pic>
+          <p:nvPicPr>
+            <p:cNvPr id="61" name="Picture 60"/>
+            <p:cNvPicPr>
+              <a:picLocks noChangeAspect="1"/>
+            </p:cNvPicPr>
+            <p:nvPr/>
+          </p:nvPicPr>
+          <p:blipFill>
+            <a:blip r:embed="rId8">
+              <a:extLst>
+                <a:ext uri="{28A0092B-C50C-407E-A947-70E740481C1C}">
+                  <a14:useLocalDpi xmlns:a14="http://schemas.microsoft.com/office/drawing/2010/main" val="0"/>
+                </a:ext>
+              </a:extLst>
+            </a:blip>
+            <a:stretch>
+              <a:fillRect/>
+            </a:stretch>
+          </p:blipFill>
+          <p:spPr>
+            <a:xfrm>
+              <a:off x="8691821" y="1967259"/>
+              <a:ext cx="2169174" cy="2169174"/>
+            </a:xfrm>
+            <a:prstGeom prst="rect">
+              <a:avLst/>
+            </a:prstGeom>
+          </p:spPr>
+        </p:pic>
+        <mc:AlternateContent xmlns:mc="http://schemas.openxmlformats.org/markup-compatibility/2006">
+          <mc:Choice xmlns:a14="http://schemas.microsoft.com/office/drawing/2010/main" Requires="a14">
+            <p:sp>
+              <p:nvSpPr>
+                <p:cNvPr id="62" name="TextBox 61"/>
+                <p:cNvSpPr txBox="1"/>
+                <p:nvPr/>
+              </p:nvSpPr>
+              <p:spPr>
+                <a:xfrm>
+                  <a:off x="8691821" y="1526048"/>
+                  <a:ext cx="2169174" cy="441211"/>
+                </a:xfrm>
+                <a:prstGeom prst="rect">
+                  <a:avLst/>
+                </a:prstGeom>
+                <a:noFill/>
+              </p:spPr>
+              <p:txBody>
+                <a:bodyPr wrap="square" rtlCol="0">
+                  <a:spAutoFit/>
+                </a:bodyPr>
+                <a:lstStyle/>
+                <a:p>
+                  <a14:m>
+                    <m:oMathPara xmlns:m="http://schemas.openxmlformats.org/officeDocument/2006/math">
+                      <m:oMathParaPr>
+                        <m:jc m:val="centerGroup"/>
+                      </m:oMathParaPr>
+                      <m:oMath xmlns:m="http://schemas.openxmlformats.org/officeDocument/2006/math">
+                        <m:sSubSup>
+                          <m:sSubSupPr>
+                            <m:ctrlPr>
+                              <a:rPr lang="en-US" i="1" smtClean="0">
+                                <a:latin typeface="Cambria Math" panose="02040503050406030204" pitchFamily="18" charset="0"/>
+                              </a:rPr>
+                            </m:ctrlPr>
+                          </m:sSubSupPr>
+                          <m:e>
+                            <m:r>
+                              <a:rPr lang="en-US" i="1">
+                                <a:latin typeface="Cambria Math" panose="02040503050406030204" pitchFamily="18" charset="0"/>
+                              </a:rPr>
+                              <m:t>𝐷</m:t>
+                            </m:r>
+                          </m:e>
+                          <m:sub>
+                            <m:r>
+                              <a:rPr lang="en-US" i="1">
+                                <a:latin typeface="Cambria Math" panose="02040503050406030204" pitchFamily="18" charset="0"/>
+                              </a:rPr>
+                              <m:t>𝐺</m:t>
+                            </m:r>
+                          </m:sub>
+                          <m:sup>
+                            <m:r>
+                              <a:rPr lang="en-US" i="1">
+                                <a:latin typeface="Cambria Math" panose="02040503050406030204" pitchFamily="18" charset="0"/>
+                              </a:rPr>
+                              <m:t>(</m:t>
+                            </m:r>
+                            <m:r>
+                              <a:rPr lang="en-US" b="0" i="1" smtClean="0">
+                                <a:latin typeface="Cambria Math" panose="02040503050406030204" pitchFamily="18" charset="0"/>
+                              </a:rPr>
+                              <m:t>3</m:t>
+                            </m:r>
+                            <m:r>
+                              <a:rPr lang="en-US" i="1">
+                                <a:latin typeface="Cambria Math" panose="02040503050406030204" pitchFamily="18" charset="0"/>
+                              </a:rPr>
+                              <m:t>)</m:t>
+                            </m:r>
+                          </m:sup>
+                        </m:sSubSup>
+                        <m:d>
+                          <m:dPr>
+                            <m:ctrlPr>
+                              <a:rPr lang="en-US" i="1" smtClean="0">
+                                <a:latin typeface="Cambria Math" panose="02040503050406030204" pitchFamily="18" charset="0"/>
+                              </a:rPr>
+                            </m:ctrlPr>
+                          </m:dPr>
+                          <m:e>
+                            <m:r>
+                              <a:rPr lang="en-US" b="0" i="1" smtClean="0">
+                                <a:latin typeface="Cambria Math" panose="02040503050406030204" pitchFamily="18" charset="0"/>
+                              </a:rPr>
+                              <m:t>𝐹</m:t>
+                            </m:r>
+                          </m:e>
+                        </m:d>
+                      </m:oMath>
+                    </m:oMathPara>
+                  </a14:m>
+                  <a:endParaRPr lang="en-US" dirty="0"/>
+                </a:p>
+              </p:txBody>
+            </p:sp>
+          </mc:Choice>
+          <mc:Fallback>
+            <p:sp>
+              <p:nvSpPr>
+                <p:cNvPr id="62" name="TextBox 61"/>
+                <p:cNvSpPr txBox="1">
+                  <a:spLocks noRot="1" noChangeAspect="1" noMove="1" noResize="1" noEditPoints="1" noAdjustHandles="1" noChangeArrowheads="1" noChangeShapeType="1" noTextEdit="1"/>
+                </p:cNvSpPr>
+                <p:nvPr/>
+              </p:nvSpPr>
+              <p:spPr>
+                <a:xfrm>
+                  <a:off x="8691821" y="1526048"/>
+                  <a:ext cx="2169174" cy="441211"/>
+                </a:xfrm>
+                <a:prstGeom prst="rect">
+                  <a:avLst/>
+                </a:prstGeom>
+                <a:blipFill rotWithShape="0">
+                  <a:blip r:embed="rId9"/>
+                  <a:stretch>
+                    <a:fillRect b="-2778"/>
+                  </a:stretch>
+                </a:blipFill>
+              </p:spPr>
+              <p:txBody>
+                <a:bodyPr/>
+                <a:lstStyle/>
+                <a:p>
+                  <a:r>
+                    <a:rPr lang="en-US">
+                      <a:noFill/>
+                    </a:rPr>
+                    <a:t> </a:t>
+                  </a:r>
+                </a:p>
+              </p:txBody>
+            </p:sp>
+          </mc:Fallback>
+        </mc:AlternateContent>
+      </p:grpSp>
+      <p:grpSp>
+        <p:nvGrpSpPr>
+          <p:cNvPr id="63" name="Group 62"/>
+          <p:cNvGrpSpPr/>
+          <p:nvPr/>
+        </p:nvGrpSpPr>
+        <p:grpSpPr>
+          <a:xfrm>
+            <a:off x="9111274" y="4120992"/>
+            <a:ext cx="2169174" cy="2610385"/>
+            <a:chOff x="8691821" y="1526048"/>
+            <a:chExt cx="2169174" cy="2610385"/>
+          </a:xfrm>
+        </p:grpSpPr>
+        <p:pic>
+          <p:nvPicPr>
+            <p:cNvPr id="64" name="Picture 63"/>
+            <p:cNvPicPr>
+              <a:picLocks noChangeAspect="1"/>
+            </p:cNvPicPr>
+            <p:nvPr/>
+          </p:nvPicPr>
+          <p:blipFill>
+            <a:blip r:embed="rId10">
+              <a:extLst>
+                <a:ext uri="{28A0092B-C50C-407E-A947-70E740481C1C}">
+                  <a14:useLocalDpi xmlns:a14="http://schemas.microsoft.com/office/drawing/2010/main" val="0"/>
+                </a:ext>
+              </a:extLst>
+            </a:blip>
+            <a:stretch>
+              <a:fillRect/>
+            </a:stretch>
+          </p:blipFill>
+          <p:spPr>
+            <a:xfrm>
+              <a:off x="8691821" y="1967259"/>
+              <a:ext cx="2169174" cy="2169174"/>
+            </a:xfrm>
+            <a:prstGeom prst="rect">
+              <a:avLst/>
+            </a:prstGeom>
+          </p:spPr>
+        </p:pic>
+        <mc:AlternateContent xmlns:mc="http://schemas.openxmlformats.org/markup-compatibility/2006">
+          <mc:Choice xmlns:a14="http://schemas.microsoft.com/office/drawing/2010/main" Requires="a14">
+            <p:sp>
+              <p:nvSpPr>
+                <p:cNvPr id="65" name="TextBox 64"/>
+                <p:cNvSpPr txBox="1"/>
+                <p:nvPr/>
+              </p:nvSpPr>
+              <p:spPr>
+                <a:xfrm>
+                  <a:off x="8691821" y="1526048"/>
+                  <a:ext cx="2169174" cy="441211"/>
+                </a:xfrm>
+                <a:prstGeom prst="rect">
+                  <a:avLst/>
+                </a:prstGeom>
+                <a:noFill/>
+              </p:spPr>
+              <p:txBody>
+                <a:bodyPr wrap="square" rtlCol="0">
+                  <a:spAutoFit/>
+                </a:bodyPr>
+                <a:lstStyle/>
+                <a:p>
+                  <a14:m>
+                    <m:oMathPara xmlns:m="http://schemas.openxmlformats.org/officeDocument/2006/math">
+                      <m:oMathParaPr>
+                        <m:jc m:val="centerGroup"/>
+                      </m:oMathParaPr>
+                      <m:oMath xmlns:m="http://schemas.openxmlformats.org/officeDocument/2006/math">
+                        <m:sSubSup>
+                          <m:sSubSupPr>
+                            <m:ctrlPr>
+                              <a:rPr lang="en-US" i="1" smtClean="0">
+                                <a:latin typeface="Cambria Math" panose="02040503050406030204" pitchFamily="18" charset="0"/>
+                              </a:rPr>
+                            </m:ctrlPr>
+                          </m:sSubSupPr>
+                          <m:e>
+                            <m:r>
+                              <a:rPr lang="en-US" i="1">
+                                <a:latin typeface="Cambria Math" panose="02040503050406030204" pitchFamily="18" charset="0"/>
+                              </a:rPr>
+                              <m:t>𝐷</m:t>
+                            </m:r>
+                          </m:e>
+                          <m:sub>
+                            <m:r>
+                              <a:rPr lang="en-US" i="1">
+                                <a:latin typeface="Cambria Math" panose="02040503050406030204" pitchFamily="18" charset="0"/>
+                              </a:rPr>
+                              <m:t>𝐺</m:t>
+                            </m:r>
+                          </m:sub>
+                          <m:sup>
+                            <m:r>
+                              <a:rPr lang="en-US" i="1">
+                                <a:latin typeface="Cambria Math" panose="02040503050406030204" pitchFamily="18" charset="0"/>
+                              </a:rPr>
+                              <m:t>(</m:t>
+                            </m:r>
+                            <m:r>
+                              <a:rPr lang="en-US" b="0" i="1" smtClean="0">
+                                <a:latin typeface="Cambria Math" panose="02040503050406030204" pitchFamily="18" charset="0"/>
+                              </a:rPr>
+                              <m:t>4</m:t>
+                            </m:r>
+                            <m:r>
+                              <a:rPr lang="en-US" i="1">
+                                <a:latin typeface="Cambria Math" panose="02040503050406030204" pitchFamily="18" charset="0"/>
+                              </a:rPr>
+                              <m:t>)</m:t>
+                            </m:r>
+                          </m:sup>
+                        </m:sSubSup>
+                        <m:d>
+                          <m:dPr>
+                            <m:ctrlPr>
+                              <a:rPr lang="en-US" i="1" smtClean="0">
+                                <a:latin typeface="Cambria Math" panose="02040503050406030204" pitchFamily="18" charset="0"/>
+                              </a:rPr>
+                            </m:ctrlPr>
+                          </m:dPr>
+                          <m:e>
+                            <m:r>
+                              <a:rPr lang="en-US" b="0" i="1" smtClean="0">
+                                <a:latin typeface="Cambria Math" panose="02040503050406030204" pitchFamily="18" charset="0"/>
+                              </a:rPr>
+                              <m:t>𝐹</m:t>
+                            </m:r>
+                          </m:e>
+                        </m:d>
+                      </m:oMath>
+                    </m:oMathPara>
+                  </a14:m>
+                  <a:endParaRPr lang="en-US" dirty="0"/>
+                </a:p>
+              </p:txBody>
+            </p:sp>
+          </mc:Choice>
+          <mc:Fallback>
+            <p:sp>
+              <p:nvSpPr>
+                <p:cNvPr id="65" name="TextBox 64"/>
+                <p:cNvSpPr txBox="1">
+                  <a:spLocks noRot="1" noChangeAspect="1" noMove="1" noResize="1" noEditPoints="1" noAdjustHandles="1" noChangeArrowheads="1" noChangeShapeType="1" noTextEdit="1"/>
+                </p:cNvSpPr>
+                <p:nvPr/>
+              </p:nvSpPr>
+              <p:spPr>
+                <a:xfrm>
+                  <a:off x="8691821" y="1526048"/>
+                  <a:ext cx="2169174" cy="441211"/>
+                </a:xfrm>
+                <a:prstGeom prst="rect">
+                  <a:avLst/>
+                </a:prstGeom>
+                <a:blipFill rotWithShape="0">
+                  <a:blip r:embed="rId11"/>
+                  <a:stretch>
+                    <a:fillRect b="-2778"/>
+                  </a:stretch>
+                </a:blipFill>
+              </p:spPr>
+              <p:txBody>
+                <a:bodyPr/>
+                <a:lstStyle/>
+                <a:p>
+                  <a:r>
+                    <a:rPr lang="en-US">
+                      <a:noFill/>
+                    </a:rPr>
+                    <a:t> </a:t>
+                  </a:r>
+                </a:p>
+              </p:txBody>
+            </p:sp>
+          </mc:Fallback>
+        </mc:AlternateContent>
+      </p:grpSp>
+      <p:grpSp>
+        <p:nvGrpSpPr>
+          <p:cNvPr id="66" name="Group 65"/>
+          <p:cNvGrpSpPr/>
+          <p:nvPr/>
+        </p:nvGrpSpPr>
+        <p:grpSpPr>
+          <a:xfrm>
+            <a:off x="6353582" y="4120992"/>
+            <a:ext cx="2169174" cy="2610385"/>
+            <a:chOff x="8691821" y="1526048"/>
+            <a:chExt cx="2169174" cy="2610385"/>
+          </a:xfrm>
+        </p:grpSpPr>
+        <p:pic>
+          <p:nvPicPr>
+            <p:cNvPr id="67" name="Picture 66"/>
+            <p:cNvPicPr>
+              <a:picLocks noChangeAspect="1"/>
+            </p:cNvPicPr>
+            <p:nvPr/>
+          </p:nvPicPr>
+          <p:blipFill>
+            <a:blip r:embed="rId12">
+              <a:extLst>
+                <a:ext uri="{28A0092B-C50C-407E-A947-70E740481C1C}">
+                  <a14:useLocalDpi xmlns:a14="http://schemas.microsoft.com/office/drawing/2010/main" val="0"/>
+                </a:ext>
+              </a:extLst>
+            </a:blip>
+            <a:stretch>
+              <a:fillRect/>
+            </a:stretch>
+          </p:blipFill>
+          <p:spPr>
+            <a:xfrm>
+              <a:off x="8691821" y="1967259"/>
+              <a:ext cx="2169174" cy="2169174"/>
+            </a:xfrm>
+            <a:prstGeom prst="rect">
+              <a:avLst/>
+            </a:prstGeom>
+          </p:spPr>
+        </p:pic>
+        <mc:AlternateContent xmlns:mc="http://schemas.openxmlformats.org/markup-compatibility/2006">
+          <mc:Choice xmlns:a14="http://schemas.microsoft.com/office/drawing/2010/main" Requires="a14">
+            <p:sp>
+              <p:nvSpPr>
+                <p:cNvPr id="68" name="TextBox 67"/>
+                <p:cNvSpPr txBox="1"/>
+                <p:nvPr/>
+              </p:nvSpPr>
+              <p:spPr>
+                <a:xfrm>
+                  <a:off x="8691821" y="1526048"/>
+                  <a:ext cx="2169174" cy="441211"/>
+                </a:xfrm>
+                <a:prstGeom prst="rect">
+                  <a:avLst/>
+                </a:prstGeom>
+                <a:noFill/>
+              </p:spPr>
+              <p:txBody>
+                <a:bodyPr wrap="square" rtlCol="0">
+                  <a:spAutoFit/>
+                </a:bodyPr>
+                <a:lstStyle/>
+                <a:p>
+                  <a14:m>
+                    <m:oMathPara xmlns:m="http://schemas.openxmlformats.org/officeDocument/2006/math">
+                      <m:oMathParaPr>
+                        <m:jc m:val="centerGroup"/>
+                      </m:oMathParaPr>
+                      <m:oMath xmlns:m="http://schemas.openxmlformats.org/officeDocument/2006/math">
+                        <m:sSubSup>
+                          <m:sSubSupPr>
+                            <m:ctrlPr>
+                              <a:rPr lang="en-US" i="1" smtClean="0">
+                                <a:latin typeface="Cambria Math" panose="02040503050406030204" pitchFamily="18" charset="0"/>
+                              </a:rPr>
+                            </m:ctrlPr>
+                          </m:sSubSupPr>
+                          <m:e>
+                            <m:r>
+                              <a:rPr lang="en-US" i="1">
+                                <a:latin typeface="Cambria Math" panose="02040503050406030204" pitchFamily="18" charset="0"/>
+                              </a:rPr>
+                              <m:t>𝐷</m:t>
+                            </m:r>
+                          </m:e>
+                          <m:sub>
+                            <m:r>
+                              <a:rPr lang="en-US" i="1">
+                                <a:latin typeface="Cambria Math" panose="02040503050406030204" pitchFamily="18" charset="0"/>
+                              </a:rPr>
+                              <m:t>𝐺</m:t>
+                            </m:r>
+                          </m:sub>
+                          <m:sup>
+                            <m:r>
+                              <a:rPr lang="en-US" i="1">
+                                <a:latin typeface="Cambria Math" panose="02040503050406030204" pitchFamily="18" charset="0"/>
+                              </a:rPr>
+                              <m:t>(</m:t>
+                            </m:r>
+                            <m:r>
+                              <a:rPr lang="en-US" b="0" i="1" smtClean="0">
+                                <a:latin typeface="Cambria Math" panose="02040503050406030204" pitchFamily="18" charset="0"/>
+                              </a:rPr>
+                              <m:t>5</m:t>
+                            </m:r>
+                            <m:r>
+                              <a:rPr lang="en-US" i="1">
+                                <a:latin typeface="Cambria Math" panose="02040503050406030204" pitchFamily="18" charset="0"/>
+                              </a:rPr>
+                              <m:t>)</m:t>
+                            </m:r>
+                          </m:sup>
+                        </m:sSubSup>
+                        <m:d>
+                          <m:dPr>
+                            <m:ctrlPr>
+                              <a:rPr lang="en-US" i="1" smtClean="0">
+                                <a:latin typeface="Cambria Math" panose="02040503050406030204" pitchFamily="18" charset="0"/>
+                              </a:rPr>
+                            </m:ctrlPr>
+                          </m:dPr>
+                          <m:e>
+                            <m:r>
+                              <a:rPr lang="en-US" b="0" i="1" smtClean="0">
+                                <a:latin typeface="Cambria Math" panose="02040503050406030204" pitchFamily="18" charset="0"/>
+                              </a:rPr>
+                              <m:t>𝐹</m:t>
+                            </m:r>
+                          </m:e>
+                        </m:d>
+                      </m:oMath>
+                    </m:oMathPara>
+                  </a14:m>
+                  <a:endParaRPr lang="en-US" dirty="0"/>
+                </a:p>
+              </p:txBody>
+            </p:sp>
+          </mc:Choice>
+          <mc:Fallback>
+            <p:sp>
+              <p:nvSpPr>
+                <p:cNvPr id="68" name="TextBox 67"/>
+                <p:cNvSpPr txBox="1">
+                  <a:spLocks noRot="1" noChangeAspect="1" noMove="1" noResize="1" noEditPoints="1" noAdjustHandles="1" noChangeArrowheads="1" noChangeShapeType="1" noTextEdit="1"/>
+                </p:cNvSpPr>
+                <p:nvPr/>
+              </p:nvSpPr>
+              <p:spPr>
+                <a:xfrm>
+                  <a:off x="8691821" y="1526048"/>
+                  <a:ext cx="2169174" cy="441211"/>
+                </a:xfrm>
+                <a:prstGeom prst="rect">
+                  <a:avLst/>
+                </a:prstGeom>
+                <a:blipFill rotWithShape="0">
+                  <a:blip r:embed="rId13"/>
+                  <a:stretch>
+                    <a:fillRect b="-2778"/>
+                  </a:stretch>
+                </a:blipFill>
+              </p:spPr>
+              <p:txBody>
+                <a:bodyPr/>
+                <a:lstStyle/>
+                <a:p>
+                  <a:r>
+                    <a:rPr lang="en-US">
+                      <a:noFill/>
+                    </a:rPr>
+                    <a:t> </a:t>
+                  </a:r>
+                </a:p>
+              </p:txBody>
+            </p:sp>
+          </mc:Fallback>
+        </mc:AlternateContent>
+      </p:grpSp>
+      <p:grpSp>
+        <p:nvGrpSpPr>
+          <p:cNvPr id="17" name="Group 16"/>
+          <p:cNvGrpSpPr/>
+          <p:nvPr/>
+        </p:nvGrpSpPr>
+        <p:grpSpPr>
+          <a:xfrm>
+            <a:off x="3595891" y="4120992"/>
+            <a:ext cx="2169174" cy="2610385"/>
+            <a:chOff x="3595891" y="4120992"/>
+            <a:chExt cx="2169174" cy="2610385"/>
+          </a:xfrm>
+        </p:grpSpPr>
+        <p:pic>
+          <p:nvPicPr>
+            <p:cNvPr id="70" name="Picture 69"/>
+            <p:cNvPicPr>
+              <a:picLocks noChangeAspect="1"/>
+            </p:cNvPicPr>
+            <p:nvPr/>
+          </p:nvPicPr>
+          <p:blipFill>
+            <a:blip r:embed="rId12">
+              <a:extLst>
+                <a:ext uri="{28A0092B-C50C-407E-A947-70E740481C1C}">
+                  <a14:useLocalDpi xmlns:a14="http://schemas.microsoft.com/office/drawing/2010/main" val="0"/>
+                </a:ext>
+              </a:extLst>
+            </a:blip>
+            <a:stretch>
+              <a:fillRect/>
+            </a:stretch>
+          </p:blipFill>
+          <p:spPr>
+            <a:xfrm>
+              <a:off x="3595891" y="4562203"/>
+              <a:ext cx="2169174" cy="2169174"/>
+            </a:xfrm>
+            <a:prstGeom prst="rect">
+              <a:avLst/>
+            </a:prstGeom>
+          </p:spPr>
+        </p:pic>
+        <mc:AlternateContent xmlns:mc="http://schemas.openxmlformats.org/markup-compatibility/2006">
+          <mc:Choice xmlns:a14="http://schemas.microsoft.com/office/drawing/2010/main" Requires="a14">
+            <p:sp>
+              <p:nvSpPr>
+                <p:cNvPr id="71" name="TextBox 70"/>
+                <p:cNvSpPr txBox="1"/>
+                <p:nvPr/>
+              </p:nvSpPr>
+              <p:spPr>
+                <a:xfrm>
+                  <a:off x="3595891" y="4120992"/>
+                  <a:ext cx="2169174" cy="441211"/>
+                </a:xfrm>
+                <a:prstGeom prst="rect">
+                  <a:avLst/>
+                </a:prstGeom>
+                <a:noFill/>
+              </p:spPr>
+              <p:txBody>
+                <a:bodyPr wrap="square" rtlCol="0">
+                  <a:spAutoFit/>
+                </a:bodyPr>
+                <a:lstStyle/>
+                <a:p>
+                  <a14:m>
+                    <m:oMathPara xmlns:m="http://schemas.openxmlformats.org/officeDocument/2006/math">
+                      <m:oMathParaPr>
+                        <m:jc m:val="centerGroup"/>
+                      </m:oMathParaPr>
+                      <m:oMath xmlns:m="http://schemas.openxmlformats.org/officeDocument/2006/math">
+                        <m:sSubSup>
+                          <m:sSubSupPr>
+                            <m:ctrlPr>
+                              <a:rPr lang="en-US" i="1" smtClean="0">
+                                <a:latin typeface="Cambria Math" panose="02040503050406030204" pitchFamily="18" charset="0"/>
+                              </a:rPr>
+                            </m:ctrlPr>
+                          </m:sSubSupPr>
+                          <m:e>
+                            <m:r>
+                              <a:rPr lang="en-US" i="1">
+                                <a:latin typeface="Cambria Math" panose="02040503050406030204" pitchFamily="18" charset="0"/>
+                              </a:rPr>
+                              <m:t>𝐷</m:t>
+                            </m:r>
+                          </m:e>
+                          <m:sub>
+                            <m:r>
+                              <a:rPr lang="en-US" i="1">
+                                <a:latin typeface="Cambria Math" panose="02040503050406030204" pitchFamily="18" charset="0"/>
+                              </a:rPr>
+                              <m:t>𝐺</m:t>
+                            </m:r>
+                          </m:sub>
+                          <m:sup>
+                            <m:r>
+                              <a:rPr lang="en-US" i="1">
+                                <a:latin typeface="Cambria Math" panose="02040503050406030204" pitchFamily="18" charset="0"/>
+                              </a:rPr>
+                              <m:t>(</m:t>
+                            </m:r>
+                            <m:r>
+                              <a:rPr lang="en-US" b="0" i="1" smtClean="0">
+                                <a:latin typeface="Cambria Math" panose="02040503050406030204" pitchFamily="18" charset="0"/>
+                              </a:rPr>
+                              <m:t>6</m:t>
+                            </m:r>
+                            <m:r>
+                              <a:rPr lang="en-US" i="1">
+                                <a:latin typeface="Cambria Math" panose="02040503050406030204" pitchFamily="18" charset="0"/>
+                              </a:rPr>
+                              <m:t>)</m:t>
+                            </m:r>
+                          </m:sup>
+                        </m:sSubSup>
+                        <m:d>
+                          <m:dPr>
+                            <m:ctrlPr>
+                              <a:rPr lang="en-US" i="1" smtClean="0">
+                                <a:latin typeface="Cambria Math" panose="02040503050406030204" pitchFamily="18" charset="0"/>
+                              </a:rPr>
+                            </m:ctrlPr>
+                          </m:dPr>
+                          <m:e>
+                            <m:r>
+                              <a:rPr lang="en-US" b="0" i="1" smtClean="0">
+                                <a:latin typeface="Cambria Math" panose="02040503050406030204" pitchFamily="18" charset="0"/>
+                              </a:rPr>
+                              <m:t>𝐹</m:t>
+                            </m:r>
+                          </m:e>
+                        </m:d>
+                      </m:oMath>
+                    </m:oMathPara>
+                  </a14:m>
+                  <a:endParaRPr lang="en-US" dirty="0"/>
+                </a:p>
+              </p:txBody>
+            </p:sp>
+          </mc:Choice>
+          <mc:Fallback>
+            <p:sp>
+              <p:nvSpPr>
+                <p:cNvPr id="71" name="TextBox 70"/>
+                <p:cNvSpPr txBox="1">
+                  <a:spLocks noRot="1" noChangeAspect="1" noMove="1" noResize="1" noEditPoints="1" noAdjustHandles="1" noChangeArrowheads="1" noChangeShapeType="1" noTextEdit="1"/>
+                </p:cNvSpPr>
+                <p:nvPr/>
+              </p:nvSpPr>
+              <p:spPr>
+                <a:xfrm>
+                  <a:off x="3595891" y="4120992"/>
+                  <a:ext cx="2169174" cy="441211"/>
+                </a:xfrm>
+                <a:prstGeom prst="rect">
+                  <a:avLst/>
+                </a:prstGeom>
+                <a:blipFill rotWithShape="0">
+                  <a:blip r:embed="rId14"/>
+                  <a:stretch>
+                    <a:fillRect b="-2778"/>
+                  </a:stretch>
+                </a:blipFill>
+              </p:spPr>
+              <p:txBody>
+                <a:bodyPr/>
+                <a:lstStyle/>
+                <a:p>
+                  <a:r>
+                    <a:rPr lang="en-US">
+                      <a:noFill/>
+                    </a:rPr>
+                    <a:t> </a:t>
+                  </a:r>
+                </a:p>
+              </p:txBody>
+            </p:sp>
+          </mc:Fallback>
+        </mc:AlternateContent>
+      </p:grpSp>
+      <p:cxnSp>
+        <p:nvCxnSpPr>
+          <p:cNvPr id="12" name="Straight Arrow Connector 11"/>
+          <p:cNvCxnSpPr/>
+          <p:nvPr/>
+        </p:nvCxnSpPr>
+        <p:spPr>
+          <a:xfrm>
+            <a:off x="3069203" y="3052939"/>
+            <a:ext cx="469127" cy="0"/>
+          </a:xfrm>
+          <a:prstGeom prst="straightConnector1">
+            <a:avLst/>
+          </a:prstGeom>
+          <a:ln>
+            <a:tailEnd type="triangle"/>
+          </a:ln>
+        </p:spPr>
+        <p:style>
+          <a:lnRef idx="3">
+            <a:schemeClr val="dk1"/>
+          </a:lnRef>
+          <a:fillRef idx="0">
+            <a:schemeClr val="dk1"/>
+          </a:fillRef>
+          <a:effectRef idx="2">
+            <a:schemeClr val="dk1"/>
+          </a:effectRef>
+          <a:fontRef idx="minor">
+            <a:schemeClr val="tx1"/>
+          </a:fontRef>
+        </p:style>
+      </p:cxnSp>
+      <p:cxnSp>
+        <p:nvCxnSpPr>
+          <p:cNvPr id="72" name="Straight Arrow Connector 71"/>
+          <p:cNvCxnSpPr/>
+          <p:nvPr/>
+        </p:nvCxnSpPr>
+        <p:spPr>
+          <a:xfrm>
+            <a:off x="5821679" y="3052939"/>
+            <a:ext cx="469127" cy="0"/>
+          </a:xfrm>
+          <a:prstGeom prst="straightConnector1">
+            <a:avLst/>
+          </a:prstGeom>
+          <a:ln>
+            <a:tailEnd type="triangle"/>
+          </a:ln>
+        </p:spPr>
+        <p:style>
+          <a:lnRef idx="3">
+            <a:schemeClr val="dk1"/>
+          </a:lnRef>
+          <a:fillRef idx="0">
+            <a:schemeClr val="dk1"/>
+          </a:fillRef>
+          <a:effectRef idx="2">
+            <a:schemeClr val="dk1"/>
+          </a:effectRef>
+          <a:fontRef idx="minor">
+            <a:schemeClr val="tx1"/>
+          </a:fontRef>
+        </p:style>
+      </p:cxnSp>
+      <p:cxnSp>
+        <p:nvCxnSpPr>
+          <p:cNvPr id="73" name="Straight Arrow Connector 72"/>
+          <p:cNvCxnSpPr/>
+          <p:nvPr/>
+        </p:nvCxnSpPr>
+        <p:spPr>
+          <a:xfrm>
+            <a:off x="8579456" y="3052939"/>
+            <a:ext cx="469127" cy="0"/>
+          </a:xfrm>
+          <a:prstGeom prst="straightConnector1">
+            <a:avLst/>
+          </a:prstGeom>
+          <a:ln>
+            <a:tailEnd type="triangle"/>
+          </a:ln>
+        </p:spPr>
+        <p:style>
+          <a:lnRef idx="3">
+            <a:schemeClr val="dk1"/>
+          </a:lnRef>
+          <a:fillRef idx="0">
+            <a:schemeClr val="dk1"/>
+          </a:fillRef>
+          <a:effectRef idx="2">
+            <a:schemeClr val="dk1"/>
+          </a:effectRef>
+          <a:fontRef idx="minor">
+            <a:schemeClr val="tx1"/>
+          </a:fontRef>
+        </p:style>
+      </p:cxnSp>
+      <p:cxnSp>
+        <p:nvCxnSpPr>
+          <p:cNvPr id="74" name="Straight Arrow Connector 73"/>
+          <p:cNvCxnSpPr/>
+          <p:nvPr/>
+        </p:nvCxnSpPr>
+        <p:spPr>
+          <a:xfrm rot="10800000">
+            <a:off x="5821679" y="5646790"/>
+            <a:ext cx="469127" cy="0"/>
+          </a:xfrm>
+          <a:prstGeom prst="straightConnector1">
+            <a:avLst/>
+          </a:prstGeom>
+          <a:ln>
+            <a:tailEnd type="triangle"/>
+          </a:ln>
+        </p:spPr>
+        <p:style>
+          <a:lnRef idx="3">
+            <a:schemeClr val="dk1"/>
+          </a:lnRef>
+          <a:fillRef idx="0">
+            <a:schemeClr val="dk1"/>
+          </a:fillRef>
+          <a:effectRef idx="2">
+            <a:schemeClr val="dk1"/>
+          </a:effectRef>
+          <a:fontRef idx="minor">
+            <a:schemeClr val="tx1"/>
+          </a:fontRef>
+        </p:style>
+      </p:cxnSp>
+      <p:cxnSp>
+        <p:nvCxnSpPr>
+          <p:cNvPr id="75" name="Straight Arrow Connector 74"/>
+          <p:cNvCxnSpPr/>
+          <p:nvPr/>
+        </p:nvCxnSpPr>
+        <p:spPr>
+          <a:xfrm rot="10800000">
+            <a:off x="8579456" y="5646790"/>
+            <a:ext cx="469127" cy="0"/>
+          </a:xfrm>
+          <a:prstGeom prst="straightConnector1">
+            <a:avLst/>
+          </a:prstGeom>
+          <a:ln>
+            <a:tailEnd type="triangle"/>
+          </a:ln>
+        </p:spPr>
+        <p:style>
+          <a:lnRef idx="3">
+            <a:schemeClr val="dk1"/>
+          </a:lnRef>
+          <a:fillRef idx="0">
+            <a:schemeClr val="dk1"/>
+          </a:fillRef>
+          <a:effectRef idx="2">
+            <a:schemeClr val="dk1"/>
+          </a:effectRef>
+          <a:fontRef idx="minor">
+            <a:schemeClr val="tx1"/>
+          </a:fontRef>
+        </p:style>
+      </p:cxnSp>
+      <p:cxnSp>
+        <p:nvCxnSpPr>
+          <p:cNvPr id="77" name="Elbow Connector 76"/>
+          <p:cNvCxnSpPr/>
+          <p:nvPr/>
+        </p:nvCxnSpPr>
+        <p:spPr>
+          <a:xfrm>
+            <a:off x="11343139" y="3043171"/>
+            <a:ext cx="12700" cy="2603619"/>
+          </a:xfrm>
+          <a:prstGeom prst="bentConnector3">
+            <a:avLst>
+              <a:gd name="adj1" fmla="val 2238252"/>
+            </a:avLst>
+          </a:prstGeom>
+          <a:ln>
+            <a:tailEnd type="triangle"/>
+          </a:ln>
+        </p:spPr>
+        <p:style>
+          <a:lnRef idx="3">
+            <a:schemeClr val="dk1"/>
+          </a:lnRef>
+          <a:fillRef idx="0">
+            <a:schemeClr val="dk1"/>
+          </a:fillRef>
+          <a:effectRef idx="2">
+            <a:schemeClr val="dk1"/>
+          </a:effectRef>
+          <a:fontRef idx="minor">
+            <a:schemeClr val="tx1"/>
+          </a:fontRef>
+        </p:style>
+      </p:cxnSp>
+    </p:spTree>
+    <p:extLst>
+      <p:ext uri="{BB962C8B-B14F-4D97-AF65-F5344CB8AC3E}">
+        <p14:creationId xmlns:p14="http://schemas.microsoft.com/office/powerpoint/2010/main" val="2735761947"/>
+      </p:ext>
+    </p:extLst>
+  </p:cSld>
+  <p:clrMapOvr>
+    <a:masterClrMapping/>
+  </p:clrMapOvr>
+  <p:timing>
+    <p:tnLst>
+      <p:par>
+        <p:cTn id="1" dur="indefinite" restart="never" nodeType="tmRoot">
+          <p:childTnLst>
+            <p:seq concurrent="1" nextAc="seek">
+              <p:cTn id="2" dur="indefinite" nodeType="mainSeq">
+                <p:childTnLst>
+                  <p:par>
+                    <p:cTn id="3" fill="hold">
+                      <p:stCondLst>
+                        <p:cond delay="indefinite"/>
+                      </p:stCondLst>
+                      <p:childTnLst>
+                        <p:par>
+                          <p:cTn id="4" fill="hold">
+                            <p:stCondLst>
+                              <p:cond delay="0"/>
+                            </p:stCondLst>
+                            <p:childTnLst>
+                              <p:par>
+                                <p:cTn id="5" presetID="1" presetClass="entr" presetSubtype="0" fill="hold" nodeType="clickEffect">
+                                  <p:stCondLst>
+                                    <p:cond delay="0"/>
+                                  </p:stCondLst>
+                                  <p:childTnLst>
+                                    <p:set>
+                                      <p:cBhvr>
+                                        <p:cTn id="6" dur="1" fill="hold">
+                                          <p:stCondLst>
+                                            <p:cond delay="0"/>
+                                          </p:stCondLst>
+                                        </p:cTn>
+                                        <p:tgtEl>
+                                          <p:spTgt spid="25"/>
+                                        </p:tgtEl>
+                                        <p:attrNameLst>
+                                          <p:attrName>style.visibility</p:attrName>
+                                        </p:attrNameLst>
+                                      </p:cBhvr>
+                                      <p:to>
+                                        <p:strVal val="visible"/>
+                                      </p:to>
+                                    </p:set>
+                                  </p:childTnLst>
+                                </p:cTn>
+                              </p:par>
+                            </p:childTnLst>
+                          </p:cTn>
+                        </p:par>
+                      </p:childTnLst>
+                    </p:cTn>
+                  </p:par>
+                  <p:par>
+                    <p:cTn id="7" fill="hold">
+                      <p:stCondLst>
+                        <p:cond delay="indefinite"/>
+                      </p:stCondLst>
+                      <p:childTnLst>
+                        <p:par>
+                          <p:cTn id="8" fill="hold">
+                            <p:stCondLst>
+                              <p:cond delay="0"/>
+                            </p:stCondLst>
+                            <p:childTnLst>
+                              <p:par>
+                                <p:cTn id="9" presetID="1" presetClass="entr" presetSubtype="0" fill="hold" nodeType="clickEffect">
+                                  <p:stCondLst>
+                                    <p:cond delay="0"/>
+                                  </p:stCondLst>
+                                  <p:childTnLst>
+                                    <p:set>
+                                      <p:cBhvr>
+                                        <p:cTn id="10" dur="1" fill="hold">
+                                          <p:stCondLst>
+                                            <p:cond delay="0"/>
+                                          </p:stCondLst>
+                                        </p:cTn>
+                                        <p:tgtEl>
+                                          <p:spTgt spid="51"/>
+                                        </p:tgtEl>
+                                        <p:attrNameLst>
+                                          <p:attrName>style.visibility</p:attrName>
+                                        </p:attrNameLst>
+                                      </p:cBhvr>
+                                      <p:to>
+                                        <p:strVal val="visible"/>
+                                      </p:to>
+                                    </p:set>
+                                  </p:childTnLst>
+                                </p:cTn>
+                              </p:par>
+                            </p:childTnLst>
+                          </p:cTn>
+                        </p:par>
+                      </p:childTnLst>
+                    </p:cTn>
+                  </p:par>
+                  <p:par>
+                    <p:cTn id="11" fill="hold">
+                      <p:stCondLst>
+                        <p:cond delay="indefinite"/>
+                      </p:stCondLst>
+                      <p:childTnLst>
+                        <p:par>
+                          <p:cTn id="12" fill="hold">
+                            <p:stCondLst>
+                              <p:cond delay="0"/>
+                            </p:stCondLst>
+                            <p:childTnLst>
+                              <p:par>
+                                <p:cTn id="13" presetID="1" presetClass="entr" presetSubtype="0" fill="hold" nodeType="clickEffect">
+                                  <p:stCondLst>
+                                    <p:cond delay="0"/>
+                                  </p:stCondLst>
+                                  <p:childTnLst>
+                                    <p:set>
+                                      <p:cBhvr>
+                                        <p:cTn id="14" dur="1" fill="hold">
+                                          <p:stCondLst>
+                                            <p:cond delay="0"/>
+                                          </p:stCondLst>
+                                        </p:cTn>
+                                        <p:tgtEl>
+                                          <p:spTgt spid="57"/>
+                                        </p:tgtEl>
+                                        <p:attrNameLst>
+                                          <p:attrName>style.visibility</p:attrName>
+                                        </p:attrNameLst>
+                                      </p:cBhvr>
+                                      <p:to>
+                                        <p:strVal val="visible"/>
+                                      </p:to>
+                                    </p:set>
+                                  </p:childTnLst>
+                                </p:cTn>
+                              </p:par>
+                            </p:childTnLst>
+                          </p:cTn>
+                        </p:par>
+                      </p:childTnLst>
+                    </p:cTn>
+                  </p:par>
+                  <p:par>
+                    <p:cTn id="15" fill="hold">
+                      <p:stCondLst>
+                        <p:cond delay="indefinite"/>
+                      </p:stCondLst>
+                      <p:childTnLst>
+                        <p:par>
+                          <p:cTn id="16" fill="hold">
+                            <p:stCondLst>
+                              <p:cond delay="0"/>
+                            </p:stCondLst>
+                            <p:childTnLst>
+                              <p:par>
+                                <p:cTn id="17" presetID="1" presetClass="entr" presetSubtype="0" fill="hold" nodeType="clickEffect">
+                                  <p:stCondLst>
+                                    <p:cond delay="0"/>
+                                  </p:stCondLst>
+                                  <p:childTnLst>
+                                    <p:set>
+                                      <p:cBhvr>
+                                        <p:cTn id="18" dur="1" fill="hold">
+                                          <p:stCondLst>
+                                            <p:cond delay="0"/>
+                                          </p:stCondLst>
+                                        </p:cTn>
+                                        <p:tgtEl>
+                                          <p:spTgt spid="60"/>
+                                        </p:tgtEl>
+                                        <p:attrNameLst>
+                                          <p:attrName>style.visibility</p:attrName>
+                                        </p:attrNameLst>
+                                      </p:cBhvr>
+                                      <p:to>
+                                        <p:strVal val="visible"/>
+                                      </p:to>
+                                    </p:set>
+                                  </p:childTnLst>
+                                </p:cTn>
+                              </p:par>
+                            </p:childTnLst>
+                          </p:cTn>
+                        </p:par>
+                      </p:childTnLst>
+                    </p:cTn>
+                  </p:par>
+                  <p:par>
+                    <p:cTn id="19" fill="hold">
+                      <p:stCondLst>
+                        <p:cond delay="indefinite"/>
+                      </p:stCondLst>
+                      <p:childTnLst>
+                        <p:par>
+                          <p:cTn id="20" fill="hold">
+                            <p:stCondLst>
+                              <p:cond delay="0"/>
+                            </p:stCondLst>
+                            <p:childTnLst>
+                              <p:par>
+                                <p:cTn id="21" presetID="1" presetClass="entr" presetSubtype="0" fill="hold" nodeType="clickEffect">
+                                  <p:stCondLst>
+                                    <p:cond delay="0"/>
+                                  </p:stCondLst>
+                                  <p:childTnLst>
+                                    <p:set>
+                                      <p:cBhvr>
+                                        <p:cTn id="22" dur="1" fill="hold">
+                                          <p:stCondLst>
+                                            <p:cond delay="0"/>
+                                          </p:stCondLst>
+                                        </p:cTn>
+                                        <p:tgtEl>
+                                          <p:spTgt spid="63"/>
+                                        </p:tgtEl>
+                                        <p:attrNameLst>
+                                          <p:attrName>style.visibility</p:attrName>
+                                        </p:attrNameLst>
+                                      </p:cBhvr>
+                                      <p:to>
+                                        <p:strVal val="visible"/>
+                                      </p:to>
+                                    </p:set>
+                                  </p:childTnLst>
+                                </p:cTn>
+                              </p:par>
+                            </p:childTnLst>
+                          </p:cTn>
+                        </p:par>
+                      </p:childTnLst>
+                    </p:cTn>
+                  </p:par>
+                  <p:par>
+                    <p:cTn id="23" fill="hold">
+                      <p:stCondLst>
+                        <p:cond delay="indefinite"/>
+                      </p:stCondLst>
+                      <p:childTnLst>
+                        <p:par>
+                          <p:cTn id="24" fill="hold">
+                            <p:stCondLst>
+                              <p:cond delay="0"/>
+                            </p:stCondLst>
+                            <p:childTnLst>
+                              <p:par>
+                                <p:cTn id="25" presetID="1" presetClass="entr" presetSubtype="0" fill="hold" nodeType="clickEffect">
+                                  <p:stCondLst>
+                                    <p:cond delay="0"/>
+                                  </p:stCondLst>
+                                  <p:childTnLst>
+                                    <p:set>
+                                      <p:cBhvr>
+                                        <p:cTn id="26" dur="1" fill="hold">
+                                          <p:stCondLst>
+                                            <p:cond delay="0"/>
+                                          </p:stCondLst>
+                                        </p:cTn>
+                                        <p:tgtEl>
+                                          <p:spTgt spid="66"/>
+                                        </p:tgtEl>
+                                        <p:attrNameLst>
+                                          <p:attrName>style.visibility</p:attrName>
+                                        </p:attrNameLst>
+                                      </p:cBhvr>
+                                      <p:to>
+                                        <p:strVal val="visible"/>
+                                      </p:to>
+                                    </p:set>
+                                  </p:childTnLst>
+                                </p:cTn>
+                              </p:par>
+                            </p:childTnLst>
+                          </p:cTn>
+                        </p:par>
+                      </p:childTnLst>
+                    </p:cTn>
+                  </p:par>
+                </p:childTnLst>
+              </p:cTn>
+              <p:prevCondLst>
+                <p:cond evt="onPrev" delay="0">
+                  <p:tgtEl>
+                    <p:sldTgt/>
+                  </p:tgtEl>
+                </p:cond>
+              </p:prevCondLst>
+              <p:nextCondLst>
+                <p:cond evt="onNext" delay="0">
+                  <p:tgtEl>
+                    <p:sldTgt/>
+                  </p:tgtEl>
+                </p:cond>
+              </p:nextCondLst>
+            </p:seq>
+          </p:childTnLst>
+        </p:cTn>
+      </p:par>
+    </p:tnLst>
+  </p:timing>
+</p:sld>
+</file>
+
 <file path=ppt/theme/theme1.xml><?xml version="1.0" encoding="utf-8"?>
 <a:theme xmlns:a="http://schemas.openxmlformats.org/drawingml/2006/main" name="Office Theme">
   <a:themeElements>

</xml_diff>

<commit_message>
Added Reconstruction by Erosion
</commit_message>
<xml_diff>
--- a/Images/Presentation/Matt_Slides.pptx
+++ b/Images/Presentation/Matt_Slides.pptx
@@ -8,6 +8,7 @@
     <p:sldId id="257" r:id="rId2"/>
     <p:sldId id="258" r:id="rId3"/>
     <p:sldId id="259" r:id="rId4"/>
+    <p:sldId id="260" r:id="rId5"/>
   </p:sldIdLst>
   <p:sldSz cx="12192000" cy="6858000"/>
   <p:notesSz cx="6858000" cy="9144000"/>
@@ -7859,7 +7860,7 @@
                                           </p:stCondLst>
                                         </p:cTn>
                                         <p:tgtEl>
-                                          <p:spTgt spid="25"/>
+                                          <p:spTgt spid="51"/>
                                         </p:tgtEl>
                                         <p:attrNameLst>
                                           <p:attrName>style.visibility</p:attrName>
@@ -7904,7 +7905,34 @@
                                           </p:stCondLst>
                                         </p:cTn>
                                         <p:tgtEl>
-                                          <p:spTgt spid="51"/>
+                                          <p:spTgt spid="12"/>
+                                        </p:tgtEl>
+                                        <p:attrNameLst>
+                                          <p:attrName>style.visibility</p:attrName>
+                                        </p:attrNameLst>
+                                      </p:cBhvr>
+                                      <p:to>
+                                        <p:strVal val="visible"/>
+                                      </p:to>
+                                    </p:set>
+                                  </p:childTnLst>
+                                </p:cTn>
+                              </p:par>
+                              <p:par>
+                                <p:cTn id="11" presetID="1" presetClass="entr" presetSubtype="0" fill="hold" nodeType="withEffect">
+                                  <p:stCondLst>
+                                    <p:cond delay="0"/>
+                                  </p:stCondLst>
+                                  <p:childTnLst>
+                                    <p:set>
+                                      <p:cBhvr>
+                                        <p:cTn id="12" dur="1" fill="hold">
+                                          <p:stCondLst>
+                                            <p:cond delay="0"/>
+                                          </p:stCondLst>
+                                        </p:cTn>
+                                        <p:tgtEl>
+                                          <p:spTgt spid="25"/>
                                         </p:tgtEl>
                                         <p:attrNameLst>
                                           <p:attrName>style.visibility</p:attrName>
@@ -7924,32 +7952,32 @@
                     </p:cTn>
                   </p:par>
                   <p:par>
-                    <p:cTn id="11" fill="hold">
+                    <p:cTn id="13" fill="hold">
                       <p:stCondLst>
                         <p:cond delay="indefinite"/>
                       </p:stCondLst>
                       <p:childTnLst>
                         <p:par>
-                          <p:cTn id="12" fill="hold">
+                          <p:cTn id="14" fill="hold">
                             <p:stCondLst>
                               <p:cond delay="0"/>
                             </p:stCondLst>
                             <p:childTnLst>
                               <p:par>
-                                <p:cTn id="13" presetID="1" presetClass="entr" presetSubtype="0" fill="hold" nodeType="clickEffect">
+                                <p:cTn id="15" presetID="1" presetClass="entr" presetSubtype="0" fill="hold" nodeType="clickEffect">
                                   <p:stCondLst>
                                     <p:cond delay="0"/>
                                   </p:stCondLst>
                                   <p:childTnLst>
                                     <p:set>
                                       <p:cBhvr>
-                                        <p:cTn id="14" dur="1" fill="hold">
+                                        <p:cTn id="16" dur="1" fill="hold">
                                           <p:stCondLst>
                                             <p:cond delay="0"/>
                                           </p:stCondLst>
                                         </p:cTn>
                                         <p:tgtEl>
-                                          <p:spTgt spid="57"/>
+                                          <p:spTgt spid="72"/>
                                         </p:tgtEl>
                                         <p:attrNameLst>
                                           <p:attrName>style.visibility</p:attrName>
@@ -7962,26 +7990,8 @@
                                   </p:childTnLst>
                                 </p:cTn>
                               </p:par>
-                            </p:childTnLst>
-                          </p:cTn>
-                        </p:par>
-                      </p:childTnLst>
-                    </p:cTn>
-                  </p:par>
-                  <p:par>
-                    <p:cTn id="15" fill="hold">
-                      <p:stCondLst>
-                        <p:cond delay="indefinite"/>
-                      </p:stCondLst>
-                      <p:childTnLst>
-                        <p:par>
-                          <p:cTn id="16" fill="hold">
-                            <p:stCondLst>
-                              <p:cond delay="0"/>
-                            </p:stCondLst>
-                            <p:childTnLst>
                               <p:par>
-                                <p:cTn id="17" presetID="1" presetClass="entr" presetSubtype="0" fill="hold" nodeType="clickEffect">
+                                <p:cTn id="17" presetID="1" presetClass="entr" presetSubtype="0" fill="hold" nodeType="withEffect">
                                   <p:stCondLst>
                                     <p:cond delay="0"/>
                                   </p:stCondLst>
@@ -7994,7 +8004,7 @@
                                           </p:stCondLst>
                                         </p:cTn>
                                         <p:tgtEl>
-                                          <p:spTgt spid="60"/>
+                                          <p:spTgt spid="57"/>
                                         </p:tgtEl>
                                         <p:attrNameLst>
                                           <p:attrName>style.visibility</p:attrName>
@@ -8039,6 +8049,105 @@
                                           </p:stCondLst>
                                         </p:cTn>
                                         <p:tgtEl>
+                                          <p:spTgt spid="73"/>
+                                        </p:tgtEl>
+                                        <p:attrNameLst>
+                                          <p:attrName>style.visibility</p:attrName>
+                                        </p:attrNameLst>
+                                      </p:cBhvr>
+                                      <p:to>
+                                        <p:strVal val="visible"/>
+                                      </p:to>
+                                    </p:set>
+                                  </p:childTnLst>
+                                </p:cTn>
+                              </p:par>
+                              <p:par>
+                                <p:cTn id="23" presetID="1" presetClass="entr" presetSubtype="0" fill="hold" nodeType="withEffect">
+                                  <p:stCondLst>
+                                    <p:cond delay="0"/>
+                                  </p:stCondLst>
+                                  <p:childTnLst>
+                                    <p:set>
+                                      <p:cBhvr>
+                                        <p:cTn id="24" dur="1" fill="hold">
+                                          <p:stCondLst>
+                                            <p:cond delay="0"/>
+                                          </p:stCondLst>
+                                        </p:cTn>
+                                        <p:tgtEl>
+                                          <p:spTgt spid="60"/>
+                                        </p:tgtEl>
+                                        <p:attrNameLst>
+                                          <p:attrName>style.visibility</p:attrName>
+                                        </p:attrNameLst>
+                                      </p:cBhvr>
+                                      <p:to>
+                                        <p:strVal val="visible"/>
+                                      </p:to>
+                                    </p:set>
+                                  </p:childTnLst>
+                                </p:cTn>
+                              </p:par>
+                            </p:childTnLst>
+                          </p:cTn>
+                        </p:par>
+                      </p:childTnLst>
+                    </p:cTn>
+                  </p:par>
+                  <p:par>
+                    <p:cTn id="25" fill="hold">
+                      <p:stCondLst>
+                        <p:cond delay="indefinite"/>
+                      </p:stCondLst>
+                      <p:childTnLst>
+                        <p:par>
+                          <p:cTn id="26" fill="hold">
+                            <p:stCondLst>
+                              <p:cond delay="0"/>
+                            </p:stCondLst>
+                            <p:childTnLst>
+                              <p:par>
+                                <p:cTn id="27" presetID="1" presetClass="entr" presetSubtype="0" fill="hold" nodeType="clickEffect">
+                                  <p:stCondLst>
+                                    <p:cond delay="0"/>
+                                  </p:stCondLst>
+                                  <p:childTnLst>
+                                    <p:set>
+                                      <p:cBhvr>
+                                        <p:cTn id="28" dur="1" fill="hold">
+                                          <p:stCondLst>
+                                            <p:cond delay="0"/>
+                                          </p:stCondLst>
+                                        </p:cTn>
+                                        <p:tgtEl>
+                                          <p:spTgt spid="77"/>
+                                        </p:tgtEl>
+                                        <p:attrNameLst>
+                                          <p:attrName>style.visibility</p:attrName>
+                                        </p:attrNameLst>
+                                      </p:cBhvr>
+                                      <p:to>
+                                        <p:strVal val="visible"/>
+                                      </p:to>
+                                    </p:set>
+                                  </p:childTnLst>
+                                </p:cTn>
+                              </p:par>
+                              <p:par>
+                                <p:cTn id="29" presetID="1" presetClass="entr" presetSubtype="0" fill="hold" nodeType="withEffect">
+                                  <p:stCondLst>
+                                    <p:cond delay="0"/>
+                                  </p:stCondLst>
+                                  <p:childTnLst>
+                                    <p:set>
+                                      <p:cBhvr>
+                                        <p:cTn id="30" dur="1" fill="hold">
+                                          <p:stCondLst>
+                                            <p:cond delay="0"/>
+                                          </p:stCondLst>
+                                        </p:cTn>
+                                        <p:tgtEl>
                                           <p:spTgt spid="63"/>
                                         </p:tgtEl>
                                         <p:attrNameLst>
@@ -8059,32 +8168,1359 @@
                     </p:cTn>
                   </p:par>
                   <p:par>
-                    <p:cTn id="23" fill="hold">
+                    <p:cTn id="31" fill="hold">
                       <p:stCondLst>
                         <p:cond delay="indefinite"/>
                       </p:stCondLst>
                       <p:childTnLst>
                         <p:par>
-                          <p:cTn id="24" fill="hold">
+                          <p:cTn id="32" fill="hold">
                             <p:stCondLst>
                               <p:cond delay="0"/>
                             </p:stCondLst>
                             <p:childTnLst>
                               <p:par>
-                                <p:cTn id="25" presetID="1" presetClass="entr" presetSubtype="0" fill="hold" nodeType="clickEffect">
+                                <p:cTn id="33" presetID="1" presetClass="entr" presetSubtype="0" fill="hold" nodeType="clickEffect">
                                   <p:stCondLst>
                                     <p:cond delay="0"/>
                                   </p:stCondLst>
                                   <p:childTnLst>
                                     <p:set>
                                       <p:cBhvr>
-                                        <p:cTn id="26" dur="1" fill="hold">
+                                        <p:cTn id="34" dur="1" fill="hold">
+                                          <p:stCondLst>
+                                            <p:cond delay="0"/>
+                                          </p:stCondLst>
+                                        </p:cTn>
+                                        <p:tgtEl>
+                                          <p:spTgt spid="75"/>
+                                        </p:tgtEl>
+                                        <p:attrNameLst>
+                                          <p:attrName>style.visibility</p:attrName>
+                                        </p:attrNameLst>
+                                      </p:cBhvr>
+                                      <p:to>
+                                        <p:strVal val="visible"/>
+                                      </p:to>
+                                    </p:set>
+                                  </p:childTnLst>
+                                </p:cTn>
+                              </p:par>
+                              <p:par>
+                                <p:cTn id="35" presetID="1" presetClass="entr" presetSubtype="0" fill="hold" nodeType="withEffect">
+                                  <p:stCondLst>
+                                    <p:cond delay="0"/>
+                                  </p:stCondLst>
+                                  <p:childTnLst>
+                                    <p:set>
+                                      <p:cBhvr>
+                                        <p:cTn id="36" dur="1" fill="hold">
                                           <p:stCondLst>
                                             <p:cond delay="0"/>
                                           </p:stCondLst>
                                         </p:cTn>
                                         <p:tgtEl>
                                           <p:spTgt spid="66"/>
+                                        </p:tgtEl>
+                                        <p:attrNameLst>
+                                          <p:attrName>style.visibility</p:attrName>
+                                        </p:attrNameLst>
+                                      </p:cBhvr>
+                                      <p:to>
+                                        <p:strVal val="visible"/>
+                                      </p:to>
+                                    </p:set>
+                                  </p:childTnLst>
+                                </p:cTn>
+                              </p:par>
+                            </p:childTnLst>
+                          </p:cTn>
+                        </p:par>
+                      </p:childTnLst>
+                    </p:cTn>
+                  </p:par>
+                  <p:par>
+                    <p:cTn id="37" fill="hold">
+                      <p:stCondLst>
+                        <p:cond delay="indefinite"/>
+                      </p:stCondLst>
+                      <p:childTnLst>
+                        <p:par>
+                          <p:cTn id="38" fill="hold">
+                            <p:stCondLst>
+                              <p:cond delay="0"/>
+                            </p:stCondLst>
+                            <p:childTnLst>
+                              <p:par>
+                                <p:cTn id="39" presetID="1" presetClass="entr" presetSubtype="0" fill="hold" nodeType="clickEffect">
+                                  <p:stCondLst>
+                                    <p:cond delay="0"/>
+                                  </p:stCondLst>
+                                  <p:childTnLst>
+                                    <p:set>
+                                      <p:cBhvr>
+                                        <p:cTn id="40" dur="1" fill="hold">
+                                          <p:stCondLst>
+                                            <p:cond delay="0"/>
+                                          </p:stCondLst>
+                                        </p:cTn>
+                                        <p:tgtEl>
+                                          <p:spTgt spid="74"/>
+                                        </p:tgtEl>
+                                        <p:attrNameLst>
+                                          <p:attrName>style.visibility</p:attrName>
+                                        </p:attrNameLst>
+                                      </p:cBhvr>
+                                      <p:to>
+                                        <p:strVal val="visible"/>
+                                      </p:to>
+                                    </p:set>
+                                  </p:childTnLst>
+                                </p:cTn>
+                              </p:par>
+                              <p:par>
+                                <p:cTn id="41" presetID="1" presetClass="entr" presetSubtype="0" fill="hold" nodeType="withEffect">
+                                  <p:stCondLst>
+                                    <p:cond delay="0"/>
+                                  </p:stCondLst>
+                                  <p:childTnLst>
+                                    <p:set>
+                                      <p:cBhvr>
+                                        <p:cTn id="42" dur="1" fill="hold">
+                                          <p:stCondLst>
+                                            <p:cond delay="0"/>
+                                          </p:stCondLst>
+                                        </p:cTn>
+                                        <p:tgtEl>
+                                          <p:spTgt spid="17"/>
+                                        </p:tgtEl>
+                                        <p:attrNameLst>
+                                          <p:attrName>style.visibility</p:attrName>
+                                        </p:attrNameLst>
+                                      </p:cBhvr>
+                                      <p:to>
+                                        <p:strVal val="visible"/>
+                                      </p:to>
+                                    </p:set>
+                                  </p:childTnLst>
+                                </p:cTn>
+                              </p:par>
+                            </p:childTnLst>
+                          </p:cTn>
+                        </p:par>
+                      </p:childTnLst>
+                    </p:cTn>
+                  </p:par>
+                </p:childTnLst>
+              </p:cTn>
+              <p:prevCondLst>
+                <p:cond evt="onPrev" delay="0">
+                  <p:tgtEl>
+                    <p:sldTgt/>
+                  </p:tgtEl>
+                </p:cond>
+              </p:prevCondLst>
+              <p:nextCondLst>
+                <p:cond evt="onNext" delay="0">
+                  <p:tgtEl>
+                    <p:sldTgt/>
+                  </p:tgtEl>
+                </p:cond>
+              </p:nextCondLst>
+            </p:seq>
+          </p:childTnLst>
+        </p:cTn>
+      </p:par>
+    </p:tnLst>
+  </p:timing>
+</p:sld>
+</file>
+
+<file path=ppt/slides/slide4.xml><?xml version="1.0" encoding="utf-8"?>
+<p:sld xmlns:a="http://schemas.openxmlformats.org/drawingml/2006/main" xmlns:r="http://schemas.openxmlformats.org/officeDocument/2006/relationships" xmlns:p="http://schemas.openxmlformats.org/presentationml/2006/main">
+  <p:cSld>
+    <p:spTree>
+      <p:nvGrpSpPr>
+        <p:cNvPr id="1" name=""/>
+        <p:cNvGrpSpPr/>
+        <p:nvPr/>
+      </p:nvGrpSpPr>
+      <p:grpSpPr>
+        <a:xfrm>
+          <a:off x="0" y="0"/>
+          <a:ext cx="0" cy="0"/>
+          <a:chOff x="0" y="0"/>
+          <a:chExt cx="0" cy="0"/>
+        </a:xfrm>
+      </p:grpSpPr>
+      <mc:AlternateContent xmlns:mc="http://schemas.openxmlformats.org/markup-compatibility/2006">
+        <mc:Choice xmlns:a14="http://schemas.microsoft.com/office/drawing/2010/main" Requires="a14">
+          <p:sp>
+            <p:nvSpPr>
+              <p:cNvPr id="2" name="Title 1"/>
+              <p:cNvSpPr>
+                <a:spLocks noGrp="1"/>
+              </p:cNvSpPr>
+              <p:nvPr>
+                <p:ph type="title"/>
+              </p:nvPr>
+            </p:nvSpPr>
+            <p:spPr/>
+            <p:txBody>
+              <a:bodyPr>
+                <a:normAutofit fontScale="90000"/>
+              </a:bodyPr>
+              <a:lstStyle/>
+              <a:p>
+                <a:r>
+                  <a:rPr lang="en-US" sz="4900" dirty="0" smtClean="0"/>
+                  <a:t>Reconstruction by Erosion</a:t>
+                </a:r>
+                <a:r>
+                  <a:rPr lang="en-US" dirty="0" smtClean="0"/>
+                  <a:t>	</a:t>
+                </a:r>
+                <a14:m>
+                  <m:oMath xmlns:m="http://schemas.openxmlformats.org/officeDocument/2006/math">
+                    <m:sSubSup>
+                      <m:sSubSupPr>
+                        <m:ctrlPr>
+                          <a:rPr lang="en-US" sz="4000" i="1" smtClean="0">
+                            <a:latin typeface="Cambria Math" panose="02040503050406030204" pitchFamily="18" charset="0"/>
+                          </a:rPr>
+                        </m:ctrlPr>
+                      </m:sSubSupPr>
+                      <m:e>
+                        <m:r>
+                          <a:rPr lang="en-US" sz="4000" b="0" i="1" smtClean="0">
+                            <a:latin typeface="Cambria Math" panose="02040503050406030204" pitchFamily="18" charset="0"/>
+                          </a:rPr>
+                          <m:t>𝑅</m:t>
+                        </m:r>
+                      </m:e>
+                      <m:sub>
+                        <m:r>
+                          <a:rPr lang="en-US" sz="4000" b="0" i="1" smtClean="0">
+                            <a:latin typeface="Cambria Math" panose="02040503050406030204" pitchFamily="18" charset="0"/>
+                          </a:rPr>
+                          <m:t>𝐺</m:t>
+                        </m:r>
+                      </m:sub>
+                      <m:sup>
+                        <m:r>
+                          <a:rPr lang="en-US" sz="4000" b="0" i="1" smtClean="0">
+                            <a:latin typeface="Cambria Math" panose="02040503050406030204" pitchFamily="18" charset="0"/>
+                          </a:rPr>
+                          <m:t>𝐸</m:t>
+                        </m:r>
+                      </m:sup>
+                    </m:sSubSup>
+                    <m:d>
+                      <m:dPr>
+                        <m:ctrlPr>
+                          <a:rPr lang="en-US" sz="4000" i="1" smtClean="0">
+                            <a:latin typeface="Cambria Math" panose="02040503050406030204" pitchFamily="18" charset="0"/>
+                          </a:rPr>
+                        </m:ctrlPr>
+                      </m:dPr>
+                      <m:e>
+                        <m:r>
+                          <a:rPr lang="en-US" sz="4000" b="0" i="1" smtClean="0">
+                            <a:latin typeface="Cambria Math" panose="02040503050406030204" pitchFamily="18" charset="0"/>
+                          </a:rPr>
+                          <m:t>𝐹</m:t>
+                        </m:r>
+                      </m:e>
+                    </m:d>
+                    <m:r>
+                      <a:rPr lang="en-US" sz="4000" b="0" i="1" smtClean="0">
+                        <a:latin typeface="Cambria Math" panose="02040503050406030204" pitchFamily="18" charset="0"/>
+                      </a:rPr>
+                      <m:t>=</m:t>
+                    </m:r>
+                    <m:sSubSup>
+                      <m:sSubSupPr>
+                        <m:ctrlPr>
+                          <a:rPr lang="en-US" sz="4000" b="0" i="1" smtClean="0">
+                            <a:latin typeface="Cambria Math" panose="02040503050406030204" pitchFamily="18" charset="0"/>
+                          </a:rPr>
+                        </m:ctrlPr>
+                      </m:sSubSupPr>
+                      <m:e>
+                        <m:r>
+                          <a:rPr lang="en-US" sz="4000" b="0" i="1" smtClean="0">
+                            <a:latin typeface="Cambria Math" panose="02040503050406030204" pitchFamily="18" charset="0"/>
+                          </a:rPr>
+                          <m:t>𝐸</m:t>
+                        </m:r>
+                      </m:e>
+                      <m:sub>
+                        <m:r>
+                          <a:rPr lang="en-US" sz="4000" b="0" i="1" smtClean="0">
+                            <a:latin typeface="Cambria Math" panose="02040503050406030204" pitchFamily="18" charset="0"/>
+                          </a:rPr>
+                          <m:t>𝐺</m:t>
+                        </m:r>
+                      </m:sub>
+                      <m:sup>
+                        <m:d>
+                          <m:dPr>
+                            <m:ctrlPr>
+                              <a:rPr lang="en-US" sz="4000" b="0" i="1" smtClean="0">
+                                <a:latin typeface="Cambria Math" panose="02040503050406030204" pitchFamily="18" charset="0"/>
+                              </a:rPr>
+                            </m:ctrlPr>
+                          </m:dPr>
+                          <m:e>
+                            <m:r>
+                              <a:rPr lang="en-US" sz="4000" b="0" i="1" smtClean="0">
+                                <a:latin typeface="Cambria Math" panose="02040503050406030204" pitchFamily="18" charset="0"/>
+                              </a:rPr>
+                              <m:t>𝑘</m:t>
+                            </m:r>
+                          </m:e>
+                        </m:d>
+                      </m:sup>
+                    </m:sSubSup>
+                    <m:d>
+                      <m:dPr>
+                        <m:ctrlPr>
+                          <a:rPr lang="en-US" sz="4000" b="0" i="1" smtClean="0">
+                            <a:latin typeface="Cambria Math" panose="02040503050406030204" pitchFamily="18" charset="0"/>
+                          </a:rPr>
+                        </m:ctrlPr>
+                      </m:dPr>
+                      <m:e>
+                        <m:r>
+                          <a:rPr lang="en-US" sz="4000" b="0" i="1" smtClean="0">
+                            <a:latin typeface="Cambria Math" panose="02040503050406030204" pitchFamily="18" charset="0"/>
+                          </a:rPr>
+                          <m:t>𝐹</m:t>
+                        </m:r>
+                      </m:e>
+                    </m:d>
+                  </m:oMath>
+                </a14:m>
+                <a:endParaRPr lang="en-US" sz="4000" dirty="0"/>
+              </a:p>
+            </p:txBody>
+          </p:sp>
+        </mc:Choice>
+        <mc:Fallback>
+          <p:sp>
+            <p:nvSpPr>
+              <p:cNvPr id="2" name="Title 1"/>
+              <p:cNvSpPr>
+                <a:spLocks noGrp="1" noRot="1" noChangeAspect="1" noMove="1" noResize="1" noEditPoints="1" noAdjustHandles="1" noChangeArrowheads="1" noChangeShapeType="1" noTextEdit="1"/>
+              </p:cNvSpPr>
+              <p:nvPr>
+                <p:ph type="title"/>
+              </p:nvPr>
+            </p:nvSpPr>
+            <p:spPr>
+              <a:blipFill rotWithShape="0">
+                <a:blip r:embed="rId2"/>
+                <a:stretch>
+                  <a:fillRect l="-2377"/>
+                </a:stretch>
+              </a:blipFill>
+            </p:spPr>
+            <p:txBody>
+              <a:bodyPr/>
+              <a:lstStyle/>
+              <a:p>
+                <a:r>
+                  <a:rPr lang="en-US">
+                    <a:noFill/>
+                  </a:rPr>
+                  <a:t> </a:t>
+                </a:r>
+              </a:p>
+            </p:txBody>
+          </p:sp>
+        </mc:Fallback>
+      </mc:AlternateContent>
+      <p:grpSp>
+        <p:nvGrpSpPr>
+          <p:cNvPr id="25" name="Group 24"/>
+          <p:cNvGrpSpPr/>
+          <p:nvPr/>
+        </p:nvGrpSpPr>
+        <p:grpSpPr>
+          <a:xfrm>
+            <a:off x="3595891" y="2164610"/>
+            <a:ext cx="2169174" cy="2610385"/>
+            <a:chOff x="8691821" y="1526048"/>
+            <a:chExt cx="2169174" cy="2610385"/>
+          </a:xfrm>
+        </p:grpSpPr>
+        <p:pic>
+          <p:nvPicPr>
+            <p:cNvPr id="27" name="Picture 26"/>
+            <p:cNvPicPr>
+              <a:picLocks noChangeAspect="1"/>
+            </p:cNvPicPr>
+            <p:nvPr/>
+          </p:nvPicPr>
+          <p:blipFill>
+            <a:blip r:embed="rId3">
+              <a:extLst>
+                <a:ext uri="{28A0092B-C50C-407E-A947-70E740481C1C}">
+                  <a14:useLocalDpi xmlns:a14="http://schemas.microsoft.com/office/drawing/2010/main" val="0"/>
+                </a:ext>
+              </a:extLst>
+            </a:blip>
+            <a:stretch>
+              <a:fillRect/>
+            </a:stretch>
+          </p:blipFill>
+          <p:spPr>
+            <a:xfrm>
+              <a:off x="8691821" y="1967259"/>
+              <a:ext cx="2169174" cy="2169174"/>
+            </a:xfrm>
+            <a:prstGeom prst="rect">
+              <a:avLst/>
+            </a:prstGeom>
+          </p:spPr>
+        </p:pic>
+        <mc:AlternateContent xmlns:mc="http://schemas.openxmlformats.org/markup-compatibility/2006">
+          <mc:Choice xmlns:a14="http://schemas.microsoft.com/office/drawing/2010/main" Requires="a14">
+            <p:sp>
+              <p:nvSpPr>
+                <p:cNvPr id="29" name="TextBox 28"/>
+                <p:cNvSpPr txBox="1"/>
+                <p:nvPr/>
+              </p:nvSpPr>
+              <p:spPr>
+                <a:xfrm>
+                  <a:off x="8691821" y="1526048"/>
+                  <a:ext cx="2169174" cy="441211"/>
+                </a:xfrm>
+                <a:prstGeom prst="rect">
+                  <a:avLst/>
+                </a:prstGeom>
+                <a:noFill/>
+              </p:spPr>
+              <p:txBody>
+                <a:bodyPr wrap="square" rtlCol="0">
+                  <a:spAutoFit/>
+                </a:bodyPr>
+                <a:lstStyle/>
+                <a:p>
+                  <a14:m>
+                    <m:oMathPara xmlns:m="http://schemas.openxmlformats.org/officeDocument/2006/math">
+                      <m:oMathParaPr>
+                        <m:jc m:val="centerGroup"/>
+                      </m:oMathParaPr>
+                      <m:oMath xmlns:m="http://schemas.openxmlformats.org/officeDocument/2006/math">
+                        <m:sSubSup>
+                          <m:sSubSupPr>
+                            <m:ctrlPr>
+                              <a:rPr lang="en-US" i="1" smtClean="0">
+                                <a:latin typeface="Cambria Math" panose="02040503050406030204" pitchFamily="18" charset="0"/>
+                              </a:rPr>
+                            </m:ctrlPr>
+                          </m:sSubSupPr>
+                          <m:e>
+                            <m:r>
+                              <a:rPr lang="en-US" b="0" i="1" smtClean="0">
+                                <a:latin typeface="Cambria Math" panose="02040503050406030204" pitchFamily="18" charset="0"/>
+                              </a:rPr>
+                              <m:t>𝐸</m:t>
+                            </m:r>
+                          </m:e>
+                          <m:sub>
+                            <m:r>
+                              <a:rPr lang="en-US" i="1">
+                                <a:latin typeface="Cambria Math" panose="02040503050406030204" pitchFamily="18" charset="0"/>
+                              </a:rPr>
+                              <m:t>𝐺</m:t>
+                            </m:r>
+                          </m:sub>
+                          <m:sup>
+                            <m:r>
+                              <a:rPr lang="en-US" i="1">
+                                <a:latin typeface="Cambria Math" panose="02040503050406030204" pitchFamily="18" charset="0"/>
+                              </a:rPr>
+                              <m:t>(1)</m:t>
+                            </m:r>
+                          </m:sup>
+                        </m:sSubSup>
+                        <m:d>
+                          <m:dPr>
+                            <m:ctrlPr>
+                              <a:rPr lang="en-US" i="1" smtClean="0">
+                                <a:latin typeface="Cambria Math" panose="02040503050406030204" pitchFamily="18" charset="0"/>
+                              </a:rPr>
+                            </m:ctrlPr>
+                          </m:dPr>
+                          <m:e>
+                            <m:r>
+                              <a:rPr lang="en-US" b="0" i="1" smtClean="0">
+                                <a:latin typeface="Cambria Math" panose="02040503050406030204" pitchFamily="18" charset="0"/>
+                              </a:rPr>
+                              <m:t>𝐹</m:t>
+                            </m:r>
+                          </m:e>
+                        </m:d>
+                      </m:oMath>
+                    </m:oMathPara>
+                  </a14:m>
+                  <a:endParaRPr lang="en-US" dirty="0"/>
+                </a:p>
+              </p:txBody>
+            </p:sp>
+          </mc:Choice>
+          <mc:Fallback>
+            <p:sp>
+              <p:nvSpPr>
+                <p:cNvPr id="29" name="TextBox 28"/>
+                <p:cNvSpPr txBox="1">
+                  <a:spLocks noRot="1" noChangeAspect="1" noMove="1" noResize="1" noEditPoints="1" noAdjustHandles="1" noChangeArrowheads="1" noChangeShapeType="1" noTextEdit="1"/>
+                </p:cNvSpPr>
+                <p:nvPr/>
+              </p:nvSpPr>
+              <p:spPr>
+                <a:xfrm>
+                  <a:off x="8691821" y="1526048"/>
+                  <a:ext cx="2169174" cy="441211"/>
+                </a:xfrm>
+                <a:prstGeom prst="rect">
+                  <a:avLst/>
+                </a:prstGeom>
+                <a:blipFill rotWithShape="0">
+                  <a:blip r:embed="rId4"/>
+                  <a:stretch>
+                    <a:fillRect b="-2778"/>
+                  </a:stretch>
+                </a:blipFill>
+              </p:spPr>
+              <p:txBody>
+                <a:bodyPr/>
+                <a:lstStyle/>
+                <a:p>
+                  <a:r>
+                    <a:rPr lang="en-US">
+                      <a:noFill/>
+                    </a:rPr>
+                    <a:t> </a:t>
+                  </a:r>
+                </a:p>
+              </p:txBody>
+            </p:sp>
+          </mc:Fallback>
+        </mc:AlternateContent>
+      </p:grpSp>
+      <p:grpSp>
+        <p:nvGrpSpPr>
+          <p:cNvPr id="51" name="Group 50"/>
+          <p:cNvGrpSpPr/>
+          <p:nvPr/>
+        </p:nvGrpSpPr>
+        <p:grpSpPr>
+          <a:xfrm>
+            <a:off x="838200" y="2238762"/>
+            <a:ext cx="2169174" cy="2536233"/>
+            <a:chOff x="1351051" y="1600200"/>
+            <a:chExt cx="2169174" cy="2536233"/>
+          </a:xfrm>
+        </p:grpSpPr>
+        <p:pic>
+          <p:nvPicPr>
+            <p:cNvPr id="52" name="Picture 51"/>
+            <p:cNvPicPr>
+              <a:picLocks noChangeAspect="1"/>
+            </p:cNvPicPr>
+            <p:nvPr/>
+          </p:nvPicPr>
+          <p:blipFill>
+            <a:blip r:embed="rId5">
+              <a:extLst>
+                <a:ext uri="{28A0092B-C50C-407E-A947-70E740481C1C}">
+                  <a14:useLocalDpi xmlns:a14="http://schemas.microsoft.com/office/drawing/2010/main" val="0"/>
+                </a:ext>
+              </a:extLst>
+            </a:blip>
+            <a:stretch>
+              <a:fillRect/>
+            </a:stretch>
+          </p:blipFill>
+          <p:spPr>
+            <a:xfrm>
+              <a:off x="1351051" y="1967259"/>
+              <a:ext cx="2169174" cy="2169174"/>
+            </a:xfrm>
+            <a:prstGeom prst="rect">
+              <a:avLst/>
+            </a:prstGeom>
+          </p:spPr>
+        </p:pic>
+        <p:sp>
+          <p:nvSpPr>
+            <p:cNvPr id="53" name="TextBox 52"/>
+            <p:cNvSpPr txBox="1"/>
+            <p:nvPr/>
+          </p:nvSpPr>
+          <p:spPr>
+            <a:xfrm>
+              <a:off x="1351051" y="1600200"/>
+              <a:ext cx="2169174" cy="367059"/>
+            </a:xfrm>
+            <a:prstGeom prst="rect">
+              <a:avLst/>
+            </a:prstGeom>
+            <a:noFill/>
+          </p:spPr>
+          <p:txBody>
+            <a:bodyPr wrap="square" rtlCol="0">
+              <a:spAutoFit/>
+            </a:bodyPr>
+            <a:lstStyle/>
+            <a:p>
+              <a:r>
+                <a:rPr lang="en-US" dirty="0" smtClean="0">
+                  <a:latin typeface="Times New Roman" panose="02020603050405020304" pitchFamily="18" charset="0"/>
+                  <a:cs typeface="Times New Roman" panose="02020603050405020304" pitchFamily="18" charset="0"/>
+                </a:rPr>
+                <a:t>Marker - F</a:t>
+              </a:r>
+              <a:endParaRPr lang="en-US" dirty="0">
+                <a:latin typeface="Times New Roman" panose="02020603050405020304" pitchFamily="18" charset="0"/>
+                <a:cs typeface="Times New Roman" panose="02020603050405020304" pitchFamily="18" charset="0"/>
+              </a:endParaRPr>
+            </a:p>
+          </p:txBody>
+        </p:sp>
+      </p:grpSp>
+      <p:grpSp>
+        <p:nvGrpSpPr>
+          <p:cNvPr id="57" name="Group 56"/>
+          <p:cNvGrpSpPr/>
+          <p:nvPr/>
+        </p:nvGrpSpPr>
+        <p:grpSpPr>
+          <a:xfrm>
+            <a:off x="6353582" y="2158817"/>
+            <a:ext cx="2169174" cy="2610385"/>
+            <a:chOff x="8691821" y="1526048"/>
+            <a:chExt cx="2169174" cy="2610385"/>
+          </a:xfrm>
+        </p:grpSpPr>
+        <p:pic>
+          <p:nvPicPr>
+            <p:cNvPr id="58" name="Picture 57"/>
+            <p:cNvPicPr>
+              <a:picLocks noChangeAspect="1"/>
+            </p:cNvPicPr>
+            <p:nvPr/>
+          </p:nvPicPr>
+          <p:blipFill>
+            <a:blip r:embed="rId6">
+              <a:extLst>
+                <a:ext uri="{28A0092B-C50C-407E-A947-70E740481C1C}">
+                  <a14:useLocalDpi xmlns:a14="http://schemas.microsoft.com/office/drawing/2010/main" val="0"/>
+                </a:ext>
+              </a:extLst>
+            </a:blip>
+            <a:stretch>
+              <a:fillRect/>
+            </a:stretch>
+          </p:blipFill>
+          <p:spPr>
+            <a:xfrm>
+              <a:off x="8691821" y="1967259"/>
+              <a:ext cx="2169174" cy="2169174"/>
+            </a:xfrm>
+            <a:prstGeom prst="rect">
+              <a:avLst/>
+            </a:prstGeom>
+          </p:spPr>
+        </p:pic>
+        <mc:AlternateContent xmlns:mc="http://schemas.openxmlformats.org/markup-compatibility/2006">
+          <mc:Choice xmlns:a14="http://schemas.microsoft.com/office/drawing/2010/main" Requires="a14">
+            <p:sp>
+              <p:nvSpPr>
+                <p:cNvPr id="59" name="TextBox 58"/>
+                <p:cNvSpPr txBox="1"/>
+                <p:nvPr/>
+              </p:nvSpPr>
+              <p:spPr>
+                <a:xfrm>
+                  <a:off x="8691821" y="1526048"/>
+                  <a:ext cx="2169174" cy="441211"/>
+                </a:xfrm>
+                <a:prstGeom prst="rect">
+                  <a:avLst/>
+                </a:prstGeom>
+                <a:noFill/>
+              </p:spPr>
+              <p:txBody>
+                <a:bodyPr wrap="square" rtlCol="0">
+                  <a:spAutoFit/>
+                </a:bodyPr>
+                <a:lstStyle/>
+                <a:p>
+                  <a14:m>
+                    <m:oMathPara xmlns:m="http://schemas.openxmlformats.org/officeDocument/2006/math">
+                      <m:oMathParaPr>
+                        <m:jc m:val="centerGroup"/>
+                      </m:oMathParaPr>
+                      <m:oMath xmlns:m="http://schemas.openxmlformats.org/officeDocument/2006/math">
+                        <m:sSubSup>
+                          <m:sSubSupPr>
+                            <m:ctrlPr>
+                              <a:rPr lang="en-US" i="1" smtClean="0">
+                                <a:latin typeface="Cambria Math" panose="02040503050406030204" pitchFamily="18" charset="0"/>
+                              </a:rPr>
+                            </m:ctrlPr>
+                          </m:sSubSupPr>
+                          <m:e>
+                            <m:r>
+                              <a:rPr lang="en-US" b="0" i="1" smtClean="0">
+                                <a:latin typeface="Cambria Math" panose="02040503050406030204" pitchFamily="18" charset="0"/>
+                              </a:rPr>
+                              <m:t>𝐸</m:t>
+                            </m:r>
+                          </m:e>
+                          <m:sub>
+                            <m:r>
+                              <a:rPr lang="en-US" i="1">
+                                <a:latin typeface="Cambria Math" panose="02040503050406030204" pitchFamily="18" charset="0"/>
+                              </a:rPr>
+                              <m:t>𝐺</m:t>
+                            </m:r>
+                          </m:sub>
+                          <m:sup>
+                            <m:r>
+                              <a:rPr lang="en-US" i="1">
+                                <a:latin typeface="Cambria Math" panose="02040503050406030204" pitchFamily="18" charset="0"/>
+                              </a:rPr>
+                              <m:t>(</m:t>
+                            </m:r>
+                            <m:r>
+                              <a:rPr lang="en-US" b="0" i="1" smtClean="0">
+                                <a:latin typeface="Cambria Math" panose="02040503050406030204" pitchFamily="18" charset="0"/>
+                              </a:rPr>
+                              <m:t>2</m:t>
+                            </m:r>
+                            <m:r>
+                              <a:rPr lang="en-US" i="1">
+                                <a:latin typeface="Cambria Math" panose="02040503050406030204" pitchFamily="18" charset="0"/>
+                              </a:rPr>
+                              <m:t>)</m:t>
+                            </m:r>
+                          </m:sup>
+                        </m:sSubSup>
+                        <m:d>
+                          <m:dPr>
+                            <m:ctrlPr>
+                              <a:rPr lang="en-US" i="1" smtClean="0">
+                                <a:latin typeface="Cambria Math" panose="02040503050406030204" pitchFamily="18" charset="0"/>
+                              </a:rPr>
+                            </m:ctrlPr>
+                          </m:dPr>
+                          <m:e>
+                            <m:r>
+                              <a:rPr lang="en-US" b="0" i="1" smtClean="0">
+                                <a:latin typeface="Cambria Math" panose="02040503050406030204" pitchFamily="18" charset="0"/>
+                              </a:rPr>
+                              <m:t>𝐹</m:t>
+                            </m:r>
+                          </m:e>
+                        </m:d>
+                      </m:oMath>
+                    </m:oMathPara>
+                  </a14:m>
+                  <a:endParaRPr lang="en-US" dirty="0"/>
+                </a:p>
+              </p:txBody>
+            </p:sp>
+          </mc:Choice>
+          <mc:Fallback>
+            <p:sp>
+              <p:nvSpPr>
+                <p:cNvPr id="59" name="TextBox 58"/>
+                <p:cNvSpPr txBox="1">
+                  <a:spLocks noRot="1" noChangeAspect="1" noMove="1" noResize="1" noEditPoints="1" noAdjustHandles="1" noChangeArrowheads="1" noChangeShapeType="1" noTextEdit="1"/>
+                </p:cNvSpPr>
+                <p:nvPr/>
+              </p:nvSpPr>
+              <p:spPr>
+                <a:xfrm>
+                  <a:off x="8691821" y="1526048"/>
+                  <a:ext cx="2169174" cy="441211"/>
+                </a:xfrm>
+                <a:prstGeom prst="rect">
+                  <a:avLst/>
+                </a:prstGeom>
+                <a:blipFill rotWithShape="0">
+                  <a:blip r:embed="rId7"/>
+                  <a:stretch>
+                    <a:fillRect b="-1370"/>
+                  </a:stretch>
+                </a:blipFill>
+              </p:spPr>
+              <p:txBody>
+                <a:bodyPr/>
+                <a:lstStyle/>
+                <a:p>
+                  <a:r>
+                    <a:rPr lang="en-US">
+                      <a:noFill/>
+                    </a:rPr>
+                    <a:t> </a:t>
+                  </a:r>
+                </a:p>
+              </p:txBody>
+            </p:sp>
+          </mc:Fallback>
+        </mc:AlternateContent>
+      </p:grpSp>
+      <p:grpSp>
+        <p:nvGrpSpPr>
+          <p:cNvPr id="60" name="Group 59"/>
+          <p:cNvGrpSpPr/>
+          <p:nvPr/>
+        </p:nvGrpSpPr>
+        <p:grpSpPr>
+          <a:xfrm>
+            <a:off x="9111274" y="2158817"/>
+            <a:ext cx="2169174" cy="2610385"/>
+            <a:chOff x="8691821" y="1526048"/>
+            <a:chExt cx="2169174" cy="2610385"/>
+          </a:xfrm>
+        </p:grpSpPr>
+        <p:pic>
+          <p:nvPicPr>
+            <p:cNvPr id="61" name="Picture 60"/>
+            <p:cNvPicPr>
+              <a:picLocks noChangeAspect="1"/>
+            </p:cNvPicPr>
+            <p:nvPr/>
+          </p:nvPicPr>
+          <p:blipFill>
+            <a:blip r:embed="rId6">
+              <a:extLst>
+                <a:ext uri="{28A0092B-C50C-407E-A947-70E740481C1C}">
+                  <a14:useLocalDpi xmlns:a14="http://schemas.microsoft.com/office/drawing/2010/main" val="0"/>
+                </a:ext>
+              </a:extLst>
+            </a:blip>
+            <a:stretch>
+              <a:fillRect/>
+            </a:stretch>
+          </p:blipFill>
+          <p:spPr>
+            <a:xfrm>
+              <a:off x="8691821" y="1967259"/>
+              <a:ext cx="2169174" cy="2169174"/>
+            </a:xfrm>
+            <a:prstGeom prst="rect">
+              <a:avLst/>
+            </a:prstGeom>
+          </p:spPr>
+        </p:pic>
+        <mc:AlternateContent xmlns:mc="http://schemas.openxmlformats.org/markup-compatibility/2006">
+          <mc:Choice xmlns:a14="http://schemas.microsoft.com/office/drawing/2010/main" Requires="a14">
+            <p:sp>
+              <p:nvSpPr>
+                <p:cNvPr id="62" name="TextBox 61"/>
+                <p:cNvSpPr txBox="1"/>
+                <p:nvPr/>
+              </p:nvSpPr>
+              <p:spPr>
+                <a:xfrm>
+                  <a:off x="8691821" y="1526048"/>
+                  <a:ext cx="2169174" cy="441211"/>
+                </a:xfrm>
+                <a:prstGeom prst="rect">
+                  <a:avLst/>
+                </a:prstGeom>
+                <a:noFill/>
+              </p:spPr>
+              <p:txBody>
+                <a:bodyPr wrap="square" rtlCol="0">
+                  <a:spAutoFit/>
+                </a:bodyPr>
+                <a:lstStyle/>
+                <a:p>
+                  <a14:m>
+                    <m:oMathPara xmlns:m="http://schemas.openxmlformats.org/officeDocument/2006/math">
+                      <m:oMathParaPr>
+                        <m:jc m:val="centerGroup"/>
+                      </m:oMathParaPr>
+                      <m:oMath xmlns:m="http://schemas.openxmlformats.org/officeDocument/2006/math">
+                        <m:sSubSup>
+                          <m:sSubSupPr>
+                            <m:ctrlPr>
+                              <a:rPr lang="en-US" i="1" smtClean="0">
+                                <a:latin typeface="Cambria Math" panose="02040503050406030204" pitchFamily="18" charset="0"/>
+                              </a:rPr>
+                            </m:ctrlPr>
+                          </m:sSubSupPr>
+                          <m:e>
+                            <m:r>
+                              <a:rPr lang="en-US" b="0" i="1" smtClean="0">
+                                <a:latin typeface="Cambria Math" panose="02040503050406030204" pitchFamily="18" charset="0"/>
+                              </a:rPr>
+                              <m:t>𝐸</m:t>
+                            </m:r>
+                          </m:e>
+                          <m:sub>
+                            <m:r>
+                              <a:rPr lang="en-US" i="1">
+                                <a:latin typeface="Cambria Math" panose="02040503050406030204" pitchFamily="18" charset="0"/>
+                              </a:rPr>
+                              <m:t>𝐺</m:t>
+                            </m:r>
+                          </m:sub>
+                          <m:sup>
+                            <m:r>
+                              <a:rPr lang="en-US" i="1">
+                                <a:latin typeface="Cambria Math" panose="02040503050406030204" pitchFamily="18" charset="0"/>
+                              </a:rPr>
+                              <m:t>(</m:t>
+                            </m:r>
+                            <m:r>
+                              <a:rPr lang="en-US" b="0" i="1" smtClean="0">
+                                <a:latin typeface="Cambria Math" panose="02040503050406030204" pitchFamily="18" charset="0"/>
+                              </a:rPr>
+                              <m:t>3</m:t>
+                            </m:r>
+                            <m:r>
+                              <a:rPr lang="en-US" i="1">
+                                <a:latin typeface="Cambria Math" panose="02040503050406030204" pitchFamily="18" charset="0"/>
+                              </a:rPr>
+                              <m:t>)</m:t>
+                            </m:r>
+                          </m:sup>
+                        </m:sSubSup>
+                        <m:d>
+                          <m:dPr>
+                            <m:ctrlPr>
+                              <a:rPr lang="en-US" i="1" smtClean="0">
+                                <a:latin typeface="Cambria Math" panose="02040503050406030204" pitchFamily="18" charset="0"/>
+                              </a:rPr>
+                            </m:ctrlPr>
+                          </m:dPr>
+                          <m:e>
+                            <m:r>
+                              <a:rPr lang="en-US" b="0" i="1" smtClean="0">
+                                <a:latin typeface="Cambria Math" panose="02040503050406030204" pitchFamily="18" charset="0"/>
+                              </a:rPr>
+                              <m:t>𝐹</m:t>
+                            </m:r>
+                          </m:e>
+                        </m:d>
+                      </m:oMath>
+                    </m:oMathPara>
+                  </a14:m>
+                  <a:endParaRPr lang="en-US" dirty="0"/>
+                </a:p>
+              </p:txBody>
+            </p:sp>
+          </mc:Choice>
+          <mc:Fallback>
+            <p:sp>
+              <p:nvSpPr>
+                <p:cNvPr id="62" name="TextBox 61"/>
+                <p:cNvSpPr txBox="1">
+                  <a:spLocks noRot="1" noChangeAspect="1" noMove="1" noResize="1" noEditPoints="1" noAdjustHandles="1" noChangeArrowheads="1" noChangeShapeType="1" noTextEdit="1"/>
+                </p:cNvSpPr>
+                <p:nvPr/>
+              </p:nvSpPr>
+              <p:spPr>
+                <a:xfrm>
+                  <a:off x="8691821" y="1526048"/>
+                  <a:ext cx="2169174" cy="441211"/>
+                </a:xfrm>
+                <a:prstGeom prst="rect">
+                  <a:avLst/>
+                </a:prstGeom>
+                <a:blipFill rotWithShape="0">
+                  <a:blip r:embed="rId8"/>
+                  <a:stretch>
+                    <a:fillRect b="-1370"/>
+                  </a:stretch>
+                </a:blipFill>
+              </p:spPr>
+              <p:txBody>
+                <a:bodyPr/>
+                <a:lstStyle/>
+                <a:p>
+                  <a:r>
+                    <a:rPr lang="en-US">
+                      <a:noFill/>
+                    </a:rPr>
+                    <a:t> </a:t>
+                  </a:r>
+                </a:p>
+              </p:txBody>
+            </p:sp>
+          </mc:Fallback>
+        </mc:AlternateContent>
+      </p:grpSp>
+      <p:cxnSp>
+        <p:nvCxnSpPr>
+          <p:cNvPr id="12" name="Straight Arrow Connector 11"/>
+          <p:cNvCxnSpPr/>
+          <p:nvPr/>
+        </p:nvCxnSpPr>
+        <p:spPr>
+          <a:xfrm>
+            <a:off x="3069203" y="3694383"/>
+            <a:ext cx="469127" cy="0"/>
+          </a:xfrm>
+          <a:prstGeom prst="straightConnector1">
+            <a:avLst/>
+          </a:prstGeom>
+          <a:ln>
+            <a:tailEnd type="triangle"/>
+          </a:ln>
+        </p:spPr>
+        <p:style>
+          <a:lnRef idx="3">
+            <a:schemeClr val="dk1"/>
+          </a:lnRef>
+          <a:fillRef idx="0">
+            <a:schemeClr val="dk1"/>
+          </a:fillRef>
+          <a:effectRef idx="2">
+            <a:schemeClr val="dk1"/>
+          </a:effectRef>
+          <a:fontRef idx="minor">
+            <a:schemeClr val="tx1"/>
+          </a:fontRef>
+        </p:style>
+      </p:cxnSp>
+      <p:cxnSp>
+        <p:nvCxnSpPr>
+          <p:cNvPr id="72" name="Straight Arrow Connector 71"/>
+          <p:cNvCxnSpPr/>
+          <p:nvPr/>
+        </p:nvCxnSpPr>
+        <p:spPr>
+          <a:xfrm>
+            <a:off x="5821679" y="3694383"/>
+            <a:ext cx="469127" cy="0"/>
+          </a:xfrm>
+          <a:prstGeom prst="straightConnector1">
+            <a:avLst/>
+          </a:prstGeom>
+          <a:ln>
+            <a:tailEnd type="triangle"/>
+          </a:ln>
+        </p:spPr>
+        <p:style>
+          <a:lnRef idx="3">
+            <a:schemeClr val="dk1"/>
+          </a:lnRef>
+          <a:fillRef idx="0">
+            <a:schemeClr val="dk1"/>
+          </a:fillRef>
+          <a:effectRef idx="2">
+            <a:schemeClr val="dk1"/>
+          </a:effectRef>
+          <a:fontRef idx="minor">
+            <a:schemeClr val="tx1"/>
+          </a:fontRef>
+        </p:style>
+      </p:cxnSp>
+      <p:cxnSp>
+        <p:nvCxnSpPr>
+          <p:cNvPr id="73" name="Straight Arrow Connector 72"/>
+          <p:cNvCxnSpPr/>
+          <p:nvPr/>
+        </p:nvCxnSpPr>
+        <p:spPr>
+          <a:xfrm>
+            <a:off x="8579456" y="3694383"/>
+            <a:ext cx="469127" cy="0"/>
+          </a:xfrm>
+          <a:prstGeom prst="straightConnector1">
+            <a:avLst/>
+          </a:prstGeom>
+          <a:ln>
+            <a:tailEnd type="triangle"/>
+          </a:ln>
+        </p:spPr>
+        <p:style>
+          <a:lnRef idx="3">
+            <a:schemeClr val="dk1"/>
+          </a:lnRef>
+          <a:fillRef idx="0">
+            <a:schemeClr val="dk1"/>
+          </a:fillRef>
+          <a:effectRef idx="2">
+            <a:schemeClr val="dk1"/>
+          </a:effectRef>
+          <a:fontRef idx="minor">
+            <a:schemeClr val="tx1"/>
+          </a:fontRef>
+        </p:style>
+      </p:cxnSp>
+    </p:spTree>
+    <p:extLst>
+      <p:ext uri="{BB962C8B-B14F-4D97-AF65-F5344CB8AC3E}">
+        <p14:creationId xmlns:p14="http://schemas.microsoft.com/office/powerpoint/2010/main" val="4184850362"/>
+      </p:ext>
+    </p:extLst>
+  </p:cSld>
+  <p:clrMapOvr>
+    <a:masterClrMapping/>
+  </p:clrMapOvr>
+  <p:timing>
+    <p:tnLst>
+      <p:par>
+        <p:cTn id="1" dur="indefinite" restart="never" nodeType="tmRoot">
+          <p:childTnLst>
+            <p:seq concurrent="1" nextAc="seek">
+              <p:cTn id="2" dur="indefinite" nodeType="mainSeq">
+                <p:childTnLst>
+                  <p:par>
+                    <p:cTn id="3" fill="hold">
+                      <p:stCondLst>
+                        <p:cond delay="indefinite"/>
+                      </p:stCondLst>
+                      <p:childTnLst>
+                        <p:par>
+                          <p:cTn id="4" fill="hold">
+                            <p:stCondLst>
+                              <p:cond delay="0"/>
+                            </p:stCondLst>
+                            <p:childTnLst>
+                              <p:par>
+                                <p:cTn id="5" presetID="1" presetClass="entr" presetSubtype="0" fill="hold" nodeType="clickEffect">
+                                  <p:stCondLst>
+                                    <p:cond delay="0"/>
+                                  </p:stCondLst>
+                                  <p:childTnLst>
+                                    <p:set>
+                                      <p:cBhvr>
+                                        <p:cTn id="6" dur="1" fill="hold">
+                                          <p:stCondLst>
+                                            <p:cond delay="0"/>
+                                          </p:stCondLst>
+                                        </p:cTn>
+                                        <p:tgtEl>
+                                          <p:spTgt spid="51"/>
+                                        </p:tgtEl>
+                                        <p:attrNameLst>
+                                          <p:attrName>style.visibility</p:attrName>
+                                        </p:attrNameLst>
+                                      </p:cBhvr>
+                                      <p:to>
+                                        <p:strVal val="visible"/>
+                                      </p:to>
+                                    </p:set>
+                                  </p:childTnLst>
+                                </p:cTn>
+                              </p:par>
+                            </p:childTnLst>
+                          </p:cTn>
+                        </p:par>
+                      </p:childTnLst>
+                    </p:cTn>
+                  </p:par>
+                  <p:par>
+                    <p:cTn id="7" fill="hold">
+                      <p:stCondLst>
+                        <p:cond delay="indefinite"/>
+                      </p:stCondLst>
+                      <p:childTnLst>
+                        <p:par>
+                          <p:cTn id="8" fill="hold">
+                            <p:stCondLst>
+                              <p:cond delay="0"/>
+                            </p:stCondLst>
+                            <p:childTnLst>
+                              <p:par>
+                                <p:cTn id="9" presetID="1" presetClass="entr" presetSubtype="0" fill="hold" nodeType="clickEffect">
+                                  <p:stCondLst>
+                                    <p:cond delay="0"/>
+                                  </p:stCondLst>
+                                  <p:childTnLst>
+                                    <p:set>
+                                      <p:cBhvr>
+                                        <p:cTn id="10" dur="1" fill="hold">
+                                          <p:stCondLst>
+                                            <p:cond delay="0"/>
+                                          </p:stCondLst>
+                                        </p:cTn>
+                                        <p:tgtEl>
+                                          <p:spTgt spid="12"/>
+                                        </p:tgtEl>
+                                        <p:attrNameLst>
+                                          <p:attrName>style.visibility</p:attrName>
+                                        </p:attrNameLst>
+                                      </p:cBhvr>
+                                      <p:to>
+                                        <p:strVal val="visible"/>
+                                      </p:to>
+                                    </p:set>
+                                  </p:childTnLst>
+                                </p:cTn>
+                              </p:par>
+                              <p:par>
+                                <p:cTn id="11" presetID="1" presetClass="entr" presetSubtype="0" fill="hold" nodeType="withEffect">
+                                  <p:stCondLst>
+                                    <p:cond delay="0"/>
+                                  </p:stCondLst>
+                                  <p:childTnLst>
+                                    <p:set>
+                                      <p:cBhvr>
+                                        <p:cTn id="12" dur="1" fill="hold">
+                                          <p:stCondLst>
+                                            <p:cond delay="0"/>
+                                          </p:stCondLst>
+                                        </p:cTn>
+                                        <p:tgtEl>
+                                          <p:spTgt spid="25"/>
+                                        </p:tgtEl>
+                                        <p:attrNameLst>
+                                          <p:attrName>style.visibility</p:attrName>
+                                        </p:attrNameLst>
+                                      </p:cBhvr>
+                                      <p:to>
+                                        <p:strVal val="visible"/>
+                                      </p:to>
+                                    </p:set>
+                                  </p:childTnLst>
+                                </p:cTn>
+                              </p:par>
+                            </p:childTnLst>
+                          </p:cTn>
+                        </p:par>
+                      </p:childTnLst>
+                    </p:cTn>
+                  </p:par>
+                  <p:par>
+                    <p:cTn id="13" fill="hold">
+                      <p:stCondLst>
+                        <p:cond delay="indefinite"/>
+                      </p:stCondLst>
+                      <p:childTnLst>
+                        <p:par>
+                          <p:cTn id="14" fill="hold">
+                            <p:stCondLst>
+                              <p:cond delay="0"/>
+                            </p:stCondLst>
+                            <p:childTnLst>
+                              <p:par>
+                                <p:cTn id="15" presetID="1" presetClass="entr" presetSubtype="0" fill="hold" nodeType="clickEffect">
+                                  <p:stCondLst>
+                                    <p:cond delay="0"/>
+                                  </p:stCondLst>
+                                  <p:childTnLst>
+                                    <p:set>
+                                      <p:cBhvr>
+                                        <p:cTn id="16" dur="1" fill="hold">
+                                          <p:stCondLst>
+                                            <p:cond delay="0"/>
+                                          </p:stCondLst>
+                                        </p:cTn>
+                                        <p:tgtEl>
+                                          <p:spTgt spid="72"/>
+                                        </p:tgtEl>
+                                        <p:attrNameLst>
+                                          <p:attrName>style.visibility</p:attrName>
+                                        </p:attrNameLst>
+                                      </p:cBhvr>
+                                      <p:to>
+                                        <p:strVal val="visible"/>
+                                      </p:to>
+                                    </p:set>
+                                  </p:childTnLst>
+                                </p:cTn>
+                              </p:par>
+                              <p:par>
+                                <p:cTn id="17" presetID="1" presetClass="entr" presetSubtype="0" fill="hold" nodeType="withEffect">
+                                  <p:stCondLst>
+                                    <p:cond delay="0"/>
+                                  </p:stCondLst>
+                                  <p:childTnLst>
+                                    <p:set>
+                                      <p:cBhvr>
+                                        <p:cTn id="18" dur="1" fill="hold">
+                                          <p:stCondLst>
+                                            <p:cond delay="0"/>
+                                          </p:stCondLst>
+                                        </p:cTn>
+                                        <p:tgtEl>
+                                          <p:spTgt spid="57"/>
+                                        </p:tgtEl>
+                                        <p:attrNameLst>
+                                          <p:attrName>style.visibility</p:attrName>
+                                        </p:attrNameLst>
+                                      </p:cBhvr>
+                                      <p:to>
+                                        <p:strVal val="visible"/>
+                                      </p:to>
+                                    </p:set>
+                                  </p:childTnLst>
+                                </p:cTn>
+                              </p:par>
+                            </p:childTnLst>
+                          </p:cTn>
+                        </p:par>
+                      </p:childTnLst>
+                    </p:cTn>
+                  </p:par>
+                  <p:par>
+                    <p:cTn id="19" fill="hold">
+                      <p:stCondLst>
+                        <p:cond delay="indefinite"/>
+                      </p:stCondLst>
+                      <p:childTnLst>
+                        <p:par>
+                          <p:cTn id="20" fill="hold">
+                            <p:stCondLst>
+                              <p:cond delay="0"/>
+                            </p:stCondLst>
+                            <p:childTnLst>
+                              <p:par>
+                                <p:cTn id="21" presetID="1" presetClass="entr" presetSubtype="0" fill="hold" nodeType="clickEffect">
+                                  <p:stCondLst>
+                                    <p:cond delay="0"/>
+                                  </p:stCondLst>
+                                  <p:childTnLst>
+                                    <p:set>
+                                      <p:cBhvr>
+                                        <p:cTn id="22" dur="1" fill="hold">
+                                          <p:stCondLst>
+                                            <p:cond delay="0"/>
+                                          </p:stCondLst>
+                                        </p:cTn>
+                                        <p:tgtEl>
+                                          <p:spTgt spid="73"/>
+                                        </p:tgtEl>
+                                        <p:attrNameLst>
+                                          <p:attrName>style.visibility</p:attrName>
+                                        </p:attrNameLst>
+                                      </p:cBhvr>
+                                      <p:to>
+                                        <p:strVal val="visible"/>
+                                      </p:to>
+                                    </p:set>
+                                  </p:childTnLst>
+                                </p:cTn>
+                              </p:par>
+                              <p:par>
+                                <p:cTn id="23" presetID="1" presetClass="entr" presetSubtype="0" fill="hold" nodeType="withEffect">
+                                  <p:stCondLst>
+                                    <p:cond delay="0"/>
+                                  </p:stCondLst>
+                                  <p:childTnLst>
+                                    <p:set>
+                                      <p:cBhvr>
+                                        <p:cTn id="24" dur="1" fill="hold">
+                                          <p:stCondLst>
+                                            <p:cond delay="0"/>
+                                          </p:stCondLst>
+                                        </p:cTn>
+                                        <p:tgtEl>
+                                          <p:spTgt spid="60"/>
                                         </p:tgtEl>
                                         <p:attrNameLst>
                                           <p:attrName>style.visibility</p:attrName>

</xml_diff>

<commit_message>
Added Opening by Reconstruction
</commit_message>
<xml_diff>
--- a/Images/Presentation/Matt_Slides.pptx
+++ b/Images/Presentation/Matt_Slides.pptx
@@ -6,9 +6,11 @@
   </p:sldMasterIdLst>
   <p:sldIdLst>
     <p:sldId id="257" r:id="rId2"/>
-    <p:sldId id="258" r:id="rId3"/>
-    <p:sldId id="259" r:id="rId4"/>
+    <p:sldId id="259" r:id="rId3"/>
+    <p:sldId id="258" r:id="rId4"/>
     <p:sldId id="260" r:id="rId5"/>
+    <p:sldId id="261" r:id="rId6"/>
+    <p:sldId id="262" r:id="rId7"/>
   </p:sldIdLst>
   <p:sldSz cx="12192000" cy="6858000"/>
   <p:notesSz cx="6858000" cy="9144000"/>
@@ -4657,1620 +4659,6 @@
             <p:spPr/>
             <p:txBody>
               <a:bodyPr>
-                <a:normAutofit/>
-              </a:bodyPr>
-              <a:lstStyle/>
-              <a:p>
-                <a:r>
-                  <a:rPr lang="en-US" dirty="0" smtClean="0"/>
-                  <a:t>Geodesic Erosion		</a:t>
-                </a:r>
-                <a14:m>
-                  <m:oMath xmlns:m="http://schemas.openxmlformats.org/officeDocument/2006/math">
-                    <m:sSubSup>
-                      <m:sSubSupPr>
-                        <m:ctrlPr>
-                          <a:rPr lang="en-US" sz="3600" i="1" smtClean="0">
-                            <a:latin typeface="Cambria Math" panose="02040503050406030204" pitchFamily="18" charset="0"/>
-                          </a:rPr>
-                        </m:ctrlPr>
-                      </m:sSubSupPr>
-                      <m:e>
-                        <m:r>
-                          <a:rPr lang="en-US" sz="3600" b="0" i="1" smtClean="0">
-                            <a:latin typeface="Cambria Math" panose="02040503050406030204" pitchFamily="18" charset="0"/>
-                          </a:rPr>
-                          <m:t>𝐸</m:t>
-                        </m:r>
-                      </m:e>
-                      <m:sub>
-                        <m:r>
-                          <a:rPr lang="en-US" sz="3600" i="1">
-                            <a:latin typeface="Cambria Math" panose="02040503050406030204" pitchFamily="18" charset="0"/>
-                          </a:rPr>
-                          <m:t>𝐺</m:t>
-                        </m:r>
-                      </m:sub>
-                      <m:sup>
-                        <m:r>
-                          <a:rPr lang="en-US" sz="3600" i="1">
-                            <a:latin typeface="Cambria Math" panose="02040503050406030204" pitchFamily="18" charset="0"/>
-                          </a:rPr>
-                          <m:t>(1)</m:t>
-                        </m:r>
-                      </m:sup>
-                    </m:sSubSup>
-                    <m:d>
-                      <m:dPr>
-                        <m:ctrlPr>
-                          <a:rPr lang="en-US" sz="3600" i="1" smtClean="0">
-                            <a:latin typeface="Cambria Math" panose="02040503050406030204" pitchFamily="18" charset="0"/>
-                          </a:rPr>
-                        </m:ctrlPr>
-                      </m:dPr>
-                      <m:e>
-                        <m:r>
-                          <a:rPr lang="en-US" sz="3600" b="0" i="1" smtClean="0">
-                            <a:latin typeface="Cambria Math" panose="02040503050406030204" pitchFamily="18" charset="0"/>
-                          </a:rPr>
-                          <m:t>𝐹</m:t>
-                        </m:r>
-                      </m:e>
-                    </m:d>
-                    <m:r>
-                      <a:rPr lang="en-US" sz="3600" b="0" i="1" smtClean="0">
-                        <a:latin typeface="Cambria Math" panose="02040503050406030204" pitchFamily="18" charset="0"/>
-                      </a:rPr>
-                      <m:t>=</m:t>
-                    </m:r>
-                    <m:d>
-                      <m:dPr>
-                        <m:ctrlPr>
-                          <a:rPr lang="en-US" sz="3600" b="0" i="1" smtClean="0">
-                            <a:latin typeface="Cambria Math" panose="02040503050406030204" pitchFamily="18" charset="0"/>
-                          </a:rPr>
-                        </m:ctrlPr>
-                      </m:dPr>
-                      <m:e>
-                        <m:r>
-                          <a:rPr lang="en-US" sz="3600" b="0" i="1" smtClean="0">
-                            <a:latin typeface="Cambria Math" panose="02040503050406030204" pitchFamily="18" charset="0"/>
-                          </a:rPr>
-                          <m:t>𝐹</m:t>
-                        </m:r>
-                        <m:r>
-                          <a:rPr lang="en-US" sz="3600" b="0" i="1" smtClean="0">
-                            <a:latin typeface="Cambria Math" panose="02040503050406030204" pitchFamily="18" charset="0"/>
-                            <a:ea typeface="Cambria Math" panose="02040503050406030204" pitchFamily="18" charset="0"/>
-                          </a:rPr>
-                          <m:t>⊖</m:t>
-                        </m:r>
-                        <m:r>
-                          <a:rPr lang="en-US" sz="3600" b="0" i="1" smtClean="0">
-                            <a:latin typeface="Cambria Math" panose="02040503050406030204" pitchFamily="18" charset="0"/>
-                            <a:ea typeface="Cambria Math" panose="02040503050406030204" pitchFamily="18" charset="0"/>
-                          </a:rPr>
-                          <m:t>𝐵</m:t>
-                        </m:r>
-                      </m:e>
-                    </m:d>
-                    <m:r>
-                      <a:rPr lang="en-US" sz="3600" b="0" i="1" smtClean="0">
-                        <a:latin typeface="Cambria Math" panose="02040503050406030204" pitchFamily="18" charset="0"/>
-                        <a:ea typeface="Cambria Math" panose="02040503050406030204" pitchFamily="18" charset="0"/>
-                      </a:rPr>
-                      <m:t>∪</m:t>
-                    </m:r>
-                    <m:r>
-                      <a:rPr lang="en-US" sz="3600" b="0" i="1" smtClean="0">
-                        <a:latin typeface="Cambria Math" panose="02040503050406030204" pitchFamily="18" charset="0"/>
-                        <a:ea typeface="Cambria Math" panose="02040503050406030204" pitchFamily="18" charset="0"/>
-                      </a:rPr>
-                      <m:t>𝐺</m:t>
-                    </m:r>
-                  </m:oMath>
-                </a14:m>
-                <a:endParaRPr lang="en-US" sz="3600" dirty="0"/>
-              </a:p>
-            </p:txBody>
-          </p:sp>
-        </mc:Choice>
-        <mc:Fallback>
-          <p:sp>
-            <p:nvSpPr>
-              <p:cNvPr id="2" name="Title 1"/>
-              <p:cNvSpPr>
-                <a:spLocks noGrp="1" noRot="1" noChangeAspect="1" noMove="1" noResize="1" noEditPoints="1" noAdjustHandles="1" noChangeArrowheads="1" noChangeShapeType="1" noTextEdit="1"/>
-              </p:cNvSpPr>
-              <p:nvPr>
-                <p:ph type="title"/>
-              </p:nvPr>
-            </p:nvSpPr>
-            <p:spPr>
-              <a:blipFill rotWithShape="0">
-                <a:blip r:embed="rId2"/>
-                <a:stretch>
-                  <a:fillRect l="-2377"/>
-                </a:stretch>
-              </a:blipFill>
-            </p:spPr>
-            <p:txBody>
-              <a:bodyPr/>
-              <a:lstStyle/>
-              <a:p>
-                <a:r>
-                  <a:rPr lang="en-US">
-                    <a:noFill/>
-                  </a:rPr>
-                  <a:t> </a:t>
-                </a:r>
-              </a:p>
-            </p:txBody>
-          </p:sp>
-        </mc:Fallback>
-      </mc:AlternateContent>
-      <p:pic>
-        <p:nvPicPr>
-          <p:cNvPr id="4" name="Picture 3"/>
-          <p:cNvPicPr>
-            <a:picLocks noChangeAspect="1"/>
-          </p:cNvPicPr>
-          <p:nvPr/>
-        </p:nvPicPr>
-        <p:blipFill>
-          <a:blip r:embed="rId3">
-            <a:extLst>
-              <a:ext uri="{28A0092B-C50C-407E-A947-70E740481C1C}">
-                <a14:useLocalDpi xmlns:a14="http://schemas.microsoft.com/office/drawing/2010/main" val="0"/>
-              </a:ext>
-            </a:extLst>
-          </a:blip>
-          <a:stretch>
-            <a:fillRect/>
-          </a:stretch>
-        </p:blipFill>
-        <p:spPr>
-          <a:xfrm>
-            <a:off x="5021436" y="1967259"/>
-            <a:ext cx="2169174" cy="2169174"/>
-          </a:xfrm>
-          <a:prstGeom prst="rect">
-            <a:avLst/>
-          </a:prstGeom>
-        </p:spPr>
-      </p:pic>
-      <mc:AlternateContent xmlns:mc="http://schemas.openxmlformats.org/markup-compatibility/2006">
-        <mc:Choice xmlns:a14="http://schemas.microsoft.com/office/drawing/2010/main" Requires="a14">
-          <p:sp>
-            <p:nvSpPr>
-              <p:cNvPr id="8" name="Content Placeholder 2"/>
-              <p:cNvSpPr txBox="1">
-                <a:spLocks/>
-              </p:cNvSpPr>
-              <p:nvPr/>
-            </p:nvSpPr>
-            <p:spPr>
-              <a:xfrm>
-                <a:off x="7518390" y="5732373"/>
-                <a:ext cx="4341254" cy="739417"/>
-              </a:xfrm>
-              <a:prstGeom prst="rect">
-                <a:avLst/>
-              </a:prstGeom>
-            </p:spPr>
-            <p:txBody>
-              <a:bodyPr vert="horz" lIns="91440" tIns="45720" rIns="91440" bIns="45720" rtlCol="0">
-                <a:normAutofit fontScale="92500"/>
-              </a:bodyPr>
-              <a:lstStyle>
-                <a:lvl1pPr marL="228600" indent="-228600" algn="l" defTabSz="914400" rtl="0" eaLnBrk="1" latinLnBrk="0" hangingPunct="1">
-                  <a:lnSpc>
-                    <a:spcPct val="90000"/>
-                  </a:lnSpc>
-                  <a:spcBef>
-                    <a:spcPts val="1000"/>
-                  </a:spcBef>
-                  <a:buFont typeface="Arial" panose="020B0604020202020204" pitchFamily="34" charset="0"/>
-                  <a:buChar char="•"/>
-                  <a:defRPr sz="2800" kern="1200">
-                    <a:solidFill>
-                      <a:schemeClr val="tx1"/>
-                    </a:solidFill>
-                    <a:latin typeface="+mn-lt"/>
-                    <a:ea typeface="+mn-ea"/>
-                    <a:cs typeface="+mn-cs"/>
-                  </a:defRPr>
-                </a:lvl1pPr>
-                <a:lvl2pPr marL="685800" indent="-228600" algn="l" defTabSz="914400" rtl="0" eaLnBrk="1" latinLnBrk="0" hangingPunct="1">
-                  <a:lnSpc>
-                    <a:spcPct val="90000"/>
-                  </a:lnSpc>
-                  <a:spcBef>
-                    <a:spcPts val="500"/>
-                  </a:spcBef>
-                  <a:buFont typeface="Arial" panose="020B0604020202020204" pitchFamily="34" charset="0"/>
-                  <a:buChar char="•"/>
-                  <a:defRPr sz="2400" kern="1200">
-                    <a:solidFill>
-                      <a:schemeClr val="tx1"/>
-                    </a:solidFill>
-                    <a:latin typeface="+mn-lt"/>
-                    <a:ea typeface="+mn-ea"/>
-                    <a:cs typeface="+mn-cs"/>
-                  </a:defRPr>
-                </a:lvl2pPr>
-                <a:lvl3pPr marL="1143000" indent="-228600" algn="l" defTabSz="914400" rtl="0" eaLnBrk="1" latinLnBrk="0" hangingPunct="1">
-                  <a:lnSpc>
-                    <a:spcPct val="90000"/>
-                  </a:lnSpc>
-                  <a:spcBef>
-                    <a:spcPts val="500"/>
-                  </a:spcBef>
-                  <a:buFont typeface="Arial" panose="020B0604020202020204" pitchFamily="34" charset="0"/>
-                  <a:buChar char="•"/>
-                  <a:defRPr sz="2000" kern="1200">
-                    <a:solidFill>
-                      <a:schemeClr val="tx1"/>
-                    </a:solidFill>
-                    <a:latin typeface="+mn-lt"/>
-                    <a:ea typeface="+mn-ea"/>
-                    <a:cs typeface="+mn-cs"/>
-                  </a:defRPr>
-                </a:lvl3pPr>
-                <a:lvl4pPr marL="1600200" indent="-228600" algn="l" defTabSz="914400" rtl="0" eaLnBrk="1" latinLnBrk="0" hangingPunct="1">
-                  <a:lnSpc>
-                    <a:spcPct val="90000"/>
-                  </a:lnSpc>
-                  <a:spcBef>
-                    <a:spcPts val="500"/>
-                  </a:spcBef>
-                  <a:buFont typeface="Arial" panose="020B0604020202020204" pitchFamily="34" charset="0"/>
-                  <a:buChar char="•"/>
-                  <a:defRPr sz="1800" kern="1200">
-                    <a:solidFill>
-                      <a:schemeClr val="tx1"/>
-                    </a:solidFill>
-                    <a:latin typeface="+mn-lt"/>
-                    <a:ea typeface="+mn-ea"/>
-                    <a:cs typeface="+mn-cs"/>
-                  </a:defRPr>
-                </a:lvl4pPr>
-                <a:lvl5pPr marL="2057400" indent="-228600" algn="l" defTabSz="914400" rtl="0" eaLnBrk="1" latinLnBrk="0" hangingPunct="1">
-                  <a:lnSpc>
-                    <a:spcPct val="90000"/>
-                  </a:lnSpc>
-                  <a:spcBef>
-                    <a:spcPts val="500"/>
-                  </a:spcBef>
-                  <a:buFont typeface="Arial" panose="020B0604020202020204" pitchFamily="34" charset="0"/>
-                  <a:buChar char="•"/>
-                  <a:defRPr sz="1800" kern="1200">
-                    <a:solidFill>
-                      <a:schemeClr val="tx1"/>
-                    </a:solidFill>
-                    <a:latin typeface="+mn-lt"/>
-                    <a:ea typeface="+mn-ea"/>
-                    <a:cs typeface="+mn-cs"/>
-                  </a:defRPr>
-                </a:lvl5pPr>
-                <a:lvl6pPr marL="2514600" indent="-228600" algn="l" defTabSz="914400" rtl="0" eaLnBrk="1" latinLnBrk="0" hangingPunct="1">
-                  <a:lnSpc>
-                    <a:spcPct val="90000"/>
-                  </a:lnSpc>
-                  <a:spcBef>
-                    <a:spcPts val="500"/>
-                  </a:spcBef>
-                  <a:buFont typeface="Arial" panose="020B0604020202020204" pitchFamily="34" charset="0"/>
-                  <a:buChar char="•"/>
-                  <a:defRPr sz="1800" kern="1200">
-                    <a:solidFill>
-                      <a:schemeClr val="tx1"/>
-                    </a:solidFill>
-                    <a:latin typeface="+mn-lt"/>
-                    <a:ea typeface="+mn-ea"/>
-                    <a:cs typeface="+mn-cs"/>
-                  </a:defRPr>
-                </a:lvl6pPr>
-                <a:lvl7pPr marL="2971800" indent="-228600" algn="l" defTabSz="914400" rtl="0" eaLnBrk="1" latinLnBrk="0" hangingPunct="1">
-                  <a:lnSpc>
-                    <a:spcPct val="90000"/>
-                  </a:lnSpc>
-                  <a:spcBef>
-                    <a:spcPts val="500"/>
-                  </a:spcBef>
-                  <a:buFont typeface="Arial" panose="020B0604020202020204" pitchFamily="34" charset="0"/>
-                  <a:buChar char="•"/>
-                  <a:defRPr sz="1800" kern="1200">
-                    <a:solidFill>
-                      <a:schemeClr val="tx1"/>
-                    </a:solidFill>
-                    <a:latin typeface="+mn-lt"/>
-                    <a:ea typeface="+mn-ea"/>
-                    <a:cs typeface="+mn-cs"/>
-                  </a:defRPr>
-                </a:lvl7pPr>
-                <a:lvl8pPr marL="3429000" indent="-228600" algn="l" defTabSz="914400" rtl="0" eaLnBrk="1" latinLnBrk="0" hangingPunct="1">
-                  <a:lnSpc>
-                    <a:spcPct val="90000"/>
-                  </a:lnSpc>
-                  <a:spcBef>
-                    <a:spcPts val="500"/>
-                  </a:spcBef>
-                  <a:buFont typeface="Arial" panose="020B0604020202020204" pitchFamily="34" charset="0"/>
-                  <a:buChar char="•"/>
-                  <a:defRPr sz="1800" kern="1200">
-                    <a:solidFill>
-                      <a:schemeClr val="tx1"/>
-                    </a:solidFill>
-                    <a:latin typeface="+mn-lt"/>
-                    <a:ea typeface="+mn-ea"/>
-                    <a:cs typeface="+mn-cs"/>
-                  </a:defRPr>
-                </a:lvl8pPr>
-                <a:lvl9pPr marL="3886200" indent="-228600" algn="l" defTabSz="914400" rtl="0" eaLnBrk="1" latinLnBrk="0" hangingPunct="1">
-                  <a:lnSpc>
-                    <a:spcPct val="90000"/>
-                  </a:lnSpc>
-                  <a:spcBef>
-                    <a:spcPts val="500"/>
-                  </a:spcBef>
-                  <a:buFont typeface="Arial" panose="020B0604020202020204" pitchFamily="34" charset="0"/>
-                  <a:buChar char="•"/>
-                  <a:defRPr sz="1800" kern="1200">
-                    <a:solidFill>
-                      <a:schemeClr val="tx1"/>
-                    </a:solidFill>
-                    <a:latin typeface="+mn-lt"/>
-                    <a:ea typeface="+mn-ea"/>
-                    <a:cs typeface="+mn-cs"/>
-                  </a:defRPr>
-                </a:lvl9pPr>
-              </a:lstStyle>
-              <a:p>
-                <a:pPr marL="0" indent="0">
-                  <a:buFont typeface="Arial" panose="020B0604020202020204" pitchFamily="34" charset="0"/>
-                  <a:buNone/>
-                </a:pPr>
-                <a14:m>
-                  <m:oMathPara xmlns:m="http://schemas.openxmlformats.org/officeDocument/2006/math">
-                    <m:oMathParaPr>
-                      <m:jc m:val="centerGroup"/>
-                    </m:oMathParaPr>
-                    <m:oMath xmlns:m="http://schemas.openxmlformats.org/officeDocument/2006/math">
-                      <m:sSubSup>
-                        <m:sSubSupPr>
-                          <m:ctrlPr>
-                            <a:rPr lang="en-US" sz="3000" i="1" smtClean="0">
-                              <a:latin typeface="Cambria Math" panose="02040503050406030204" pitchFamily="18" charset="0"/>
-                            </a:rPr>
-                          </m:ctrlPr>
-                        </m:sSubSupPr>
-                        <m:e>
-                          <m:r>
-                            <a:rPr lang="en-US" sz="3000" b="0" i="1" smtClean="0">
-                              <a:latin typeface="Cambria Math" panose="02040503050406030204" pitchFamily="18" charset="0"/>
-                            </a:rPr>
-                            <m:t>𝐸</m:t>
-                          </m:r>
-                        </m:e>
-                        <m:sub>
-                          <m:r>
-                            <a:rPr lang="en-US" sz="3000" i="1">
-                              <a:latin typeface="Cambria Math" panose="02040503050406030204" pitchFamily="18" charset="0"/>
-                            </a:rPr>
-                            <m:t>𝐺</m:t>
-                          </m:r>
-                        </m:sub>
-                        <m:sup>
-                          <m:r>
-                            <a:rPr lang="en-US" sz="3000" i="1">
-                              <a:latin typeface="Cambria Math" panose="02040503050406030204" pitchFamily="18" charset="0"/>
-                            </a:rPr>
-                            <m:t>(</m:t>
-                          </m:r>
-                          <m:r>
-                            <a:rPr lang="en-US" sz="3000" i="1">
-                              <a:latin typeface="Cambria Math" panose="02040503050406030204" pitchFamily="18" charset="0"/>
-                            </a:rPr>
-                            <m:t>𝑛</m:t>
-                          </m:r>
-                          <m:r>
-                            <a:rPr lang="en-US" sz="3000" i="1">
-                              <a:latin typeface="Cambria Math" panose="02040503050406030204" pitchFamily="18" charset="0"/>
-                            </a:rPr>
-                            <m:t>)</m:t>
-                          </m:r>
-                        </m:sup>
-                      </m:sSubSup>
-                      <m:d>
-                        <m:dPr>
-                          <m:ctrlPr>
-                            <a:rPr lang="en-US" sz="3000" i="1">
-                              <a:latin typeface="Cambria Math" panose="02040503050406030204" pitchFamily="18" charset="0"/>
-                            </a:rPr>
-                          </m:ctrlPr>
-                        </m:dPr>
-                        <m:e>
-                          <m:r>
-                            <a:rPr lang="en-US" sz="3000" i="1">
-                              <a:latin typeface="Cambria Math" panose="02040503050406030204" pitchFamily="18" charset="0"/>
-                            </a:rPr>
-                            <m:t>𝐹</m:t>
-                          </m:r>
-                        </m:e>
-                      </m:d>
-                      <m:r>
-                        <a:rPr lang="en-US" sz="3000" i="1">
-                          <a:latin typeface="Cambria Math" panose="02040503050406030204" pitchFamily="18" charset="0"/>
-                        </a:rPr>
-                        <m:t>=</m:t>
-                      </m:r>
-                      <m:sSubSup>
-                        <m:sSubSupPr>
-                          <m:ctrlPr>
-                            <a:rPr lang="en-US" sz="3000" i="1">
-                              <a:latin typeface="Cambria Math" panose="02040503050406030204" pitchFamily="18" charset="0"/>
-                            </a:rPr>
-                          </m:ctrlPr>
-                        </m:sSubSupPr>
-                        <m:e>
-                          <m:r>
-                            <a:rPr lang="en-US" sz="3000" b="0" i="1" smtClean="0">
-                              <a:latin typeface="Cambria Math" panose="02040503050406030204" pitchFamily="18" charset="0"/>
-                            </a:rPr>
-                            <m:t>𝐸</m:t>
-                          </m:r>
-                        </m:e>
-                        <m:sub>
-                          <m:r>
-                            <a:rPr lang="en-US" sz="3000" i="1">
-                              <a:latin typeface="Cambria Math" panose="02040503050406030204" pitchFamily="18" charset="0"/>
-                            </a:rPr>
-                            <m:t>𝐺</m:t>
-                          </m:r>
-                        </m:sub>
-                        <m:sup>
-                          <m:r>
-                            <a:rPr lang="en-US" sz="3000" i="1">
-                              <a:latin typeface="Cambria Math" panose="02040503050406030204" pitchFamily="18" charset="0"/>
-                            </a:rPr>
-                            <m:t>(1)</m:t>
-                          </m:r>
-                        </m:sup>
-                      </m:sSubSup>
-                      <m:d>
-                        <m:dPr>
-                          <m:begChr m:val="["/>
-                          <m:endChr m:val="]"/>
-                          <m:ctrlPr>
-                            <a:rPr lang="en-US" sz="3000" i="1">
-                              <a:latin typeface="Cambria Math" panose="02040503050406030204" pitchFamily="18" charset="0"/>
-                            </a:rPr>
-                          </m:ctrlPr>
-                        </m:dPr>
-                        <m:e>
-                          <m:sSubSup>
-                            <m:sSubSupPr>
-                              <m:ctrlPr>
-                                <a:rPr lang="en-US" sz="3000" i="1">
-                                  <a:latin typeface="Cambria Math" panose="02040503050406030204" pitchFamily="18" charset="0"/>
-                                </a:rPr>
-                              </m:ctrlPr>
-                            </m:sSubSupPr>
-                            <m:e>
-                              <m:r>
-                                <a:rPr lang="en-US" sz="3000" b="0" i="1" smtClean="0">
-                                  <a:latin typeface="Cambria Math" panose="02040503050406030204" pitchFamily="18" charset="0"/>
-                                </a:rPr>
-                                <m:t>𝐸</m:t>
-                              </m:r>
-                            </m:e>
-                            <m:sub>
-                              <m:r>
-                                <a:rPr lang="en-US" sz="3000" i="1">
-                                  <a:latin typeface="Cambria Math" panose="02040503050406030204" pitchFamily="18" charset="0"/>
-                                </a:rPr>
-                                <m:t>𝐺</m:t>
-                              </m:r>
-                            </m:sub>
-                            <m:sup>
-                              <m:r>
-                                <a:rPr lang="en-US" sz="3000" i="1">
-                                  <a:latin typeface="Cambria Math" panose="02040503050406030204" pitchFamily="18" charset="0"/>
-                                </a:rPr>
-                                <m:t>(</m:t>
-                              </m:r>
-                              <m:r>
-                                <a:rPr lang="en-US" sz="3000" i="1">
-                                  <a:latin typeface="Cambria Math" panose="02040503050406030204" pitchFamily="18" charset="0"/>
-                                </a:rPr>
-                                <m:t>𝑛</m:t>
-                              </m:r>
-                              <m:r>
-                                <a:rPr lang="en-US" sz="3000" i="1">
-                                  <a:latin typeface="Cambria Math" panose="02040503050406030204" pitchFamily="18" charset="0"/>
-                                </a:rPr>
-                                <m:t>−1)</m:t>
-                              </m:r>
-                            </m:sup>
-                          </m:sSubSup>
-                          <m:d>
-                            <m:dPr>
-                              <m:ctrlPr>
-                                <a:rPr lang="en-US" sz="3000" i="1">
-                                  <a:latin typeface="Cambria Math" panose="02040503050406030204" pitchFamily="18" charset="0"/>
-                                </a:rPr>
-                              </m:ctrlPr>
-                            </m:dPr>
-                            <m:e>
-                              <m:r>
-                                <a:rPr lang="en-US" sz="3000" i="1">
-                                  <a:latin typeface="Cambria Math" panose="02040503050406030204" pitchFamily="18" charset="0"/>
-                                </a:rPr>
-                                <m:t>𝐹</m:t>
-                              </m:r>
-                            </m:e>
-                          </m:d>
-                        </m:e>
-                      </m:d>
-                    </m:oMath>
-                  </m:oMathPara>
-                </a14:m>
-                <a:endParaRPr lang="en-US" dirty="0"/>
-              </a:p>
-            </p:txBody>
-          </p:sp>
-        </mc:Choice>
-        <mc:Fallback>
-          <p:sp>
-            <p:nvSpPr>
-              <p:cNvPr id="8" name="Content Placeholder 2"/>
-              <p:cNvSpPr txBox="1">
-                <a:spLocks noRot="1" noChangeAspect="1" noMove="1" noResize="1" noEditPoints="1" noAdjustHandles="1" noChangeArrowheads="1" noChangeShapeType="1" noTextEdit="1"/>
-              </p:cNvSpPr>
-              <p:nvPr/>
-            </p:nvSpPr>
-            <p:spPr>
-              <a:xfrm>
-                <a:off x="7518390" y="5732373"/>
-                <a:ext cx="4341254" cy="739417"/>
-              </a:xfrm>
-              <a:prstGeom prst="rect">
-                <a:avLst/>
-              </a:prstGeom>
-              <a:blipFill rotWithShape="0">
-                <a:blip r:embed="rId4"/>
-                <a:stretch>
-                  <a:fillRect/>
-                </a:stretch>
-              </a:blipFill>
-            </p:spPr>
-            <p:txBody>
-              <a:bodyPr/>
-              <a:lstStyle/>
-              <a:p>
-                <a:r>
-                  <a:rPr lang="en-US">
-                    <a:noFill/>
-                  </a:rPr>
-                  <a:t> </a:t>
-                </a:r>
-              </a:p>
-            </p:txBody>
-          </p:sp>
-        </mc:Fallback>
-      </mc:AlternateContent>
-      <p:grpSp>
-        <p:nvGrpSpPr>
-          <p:cNvPr id="31" name="Group 30"/>
-          <p:cNvGrpSpPr/>
-          <p:nvPr/>
-        </p:nvGrpSpPr>
-        <p:grpSpPr>
-          <a:xfrm>
-            <a:off x="1351051" y="1600200"/>
-            <a:ext cx="2169174" cy="2536233"/>
-            <a:chOff x="1351051" y="1600200"/>
-            <a:chExt cx="2169174" cy="2536233"/>
-          </a:xfrm>
-        </p:grpSpPr>
-        <p:pic>
-          <p:nvPicPr>
-            <p:cNvPr id="5" name="Picture 4"/>
-            <p:cNvPicPr>
-              <a:picLocks noChangeAspect="1"/>
-            </p:cNvPicPr>
-            <p:nvPr/>
-          </p:nvPicPr>
-          <p:blipFill>
-            <a:blip r:embed="rId5">
-              <a:extLst>
-                <a:ext uri="{28A0092B-C50C-407E-A947-70E740481C1C}">
-                  <a14:useLocalDpi xmlns:a14="http://schemas.microsoft.com/office/drawing/2010/main" val="0"/>
-                </a:ext>
-              </a:extLst>
-            </a:blip>
-            <a:stretch>
-              <a:fillRect/>
-            </a:stretch>
-          </p:blipFill>
-          <p:spPr>
-            <a:xfrm>
-              <a:off x="1351051" y="1967259"/>
-              <a:ext cx="2169174" cy="2169174"/>
-            </a:xfrm>
-            <a:prstGeom prst="rect">
-              <a:avLst/>
-            </a:prstGeom>
-          </p:spPr>
-        </p:pic>
-        <p:sp>
-          <p:nvSpPr>
-            <p:cNvPr id="18" name="TextBox 17"/>
-            <p:cNvSpPr txBox="1"/>
-            <p:nvPr/>
-          </p:nvSpPr>
-          <p:spPr>
-            <a:xfrm>
-              <a:off x="1351051" y="1600200"/>
-              <a:ext cx="2169174" cy="367059"/>
-            </a:xfrm>
-            <a:prstGeom prst="rect">
-              <a:avLst/>
-            </a:prstGeom>
-            <a:noFill/>
-          </p:spPr>
-          <p:txBody>
-            <a:bodyPr wrap="square" rtlCol="0">
-              <a:spAutoFit/>
-            </a:bodyPr>
-            <a:lstStyle/>
-            <a:p>
-              <a:r>
-                <a:rPr lang="en-US" dirty="0" smtClean="0">
-                  <a:latin typeface="Times New Roman" panose="02020603050405020304" pitchFamily="18" charset="0"/>
-                  <a:cs typeface="Times New Roman" panose="02020603050405020304" pitchFamily="18" charset="0"/>
-                </a:rPr>
-                <a:t>Marker - F</a:t>
-              </a:r>
-              <a:endParaRPr lang="en-US" dirty="0">
-                <a:latin typeface="Times New Roman" panose="02020603050405020304" pitchFamily="18" charset="0"/>
-                <a:cs typeface="Times New Roman" panose="02020603050405020304" pitchFamily="18" charset="0"/>
-              </a:endParaRPr>
-            </a:p>
-          </p:txBody>
-        </p:sp>
-      </p:grpSp>
-      <p:grpSp>
-        <p:nvGrpSpPr>
-          <p:cNvPr id="32" name="Group 31"/>
-          <p:cNvGrpSpPr/>
-          <p:nvPr/>
-        </p:nvGrpSpPr>
-        <p:grpSpPr>
-          <a:xfrm>
-            <a:off x="1351051" y="4302616"/>
-            <a:ext cx="2169174" cy="2518886"/>
-            <a:chOff x="1351051" y="4302616"/>
-            <a:chExt cx="2169174" cy="2518886"/>
-          </a:xfrm>
-        </p:grpSpPr>
-        <p:pic>
-          <p:nvPicPr>
-            <p:cNvPr id="7" name="Picture 6"/>
-            <p:cNvPicPr>
-              <a:picLocks noChangeAspect="1"/>
-            </p:cNvPicPr>
-            <p:nvPr/>
-          </p:nvPicPr>
-          <p:blipFill>
-            <a:blip r:embed="rId6">
-              <a:extLst>
-                <a:ext uri="{28A0092B-C50C-407E-A947-70E740481C1C}">
-                  <a14:useLocalDpi xmlns:a14="http://schemas.microsoft.com/office/drawing/2010/main" val="0"/>
-                </a:ext>
-              </a:extLst>
-            </a:blip>
-            <a:stretch>
-              <a:fillRect/>
-            </a:stretch>
-          </p:blipFill>
-          <p:spPr>
-            <a:xfrm>
-              <a:off x="1351051" y="4302616"/>
-              <a:ext cx="2169174" cy="2169174"/>
-            </a:xfrm>
-            <a:prstGeom prst="rect">
-              <a:avLst/>
-            </a:prstGeom>
-          </p:spPr>
-        </p:pic>
-        <p:sp>
-          <p:nvSpPr>
-            <p:cNvPr id="20" name="TextBox 19"/>
-            <p:cNvSpPr txBox="1"/>
-            <p:nvPr/>
-          </p:nvSpPr>
-          <p:spPr>
-            <a:xfrm>
-              <a:off x="1351051" y="6454443"/>
-              <a:ext cx="2169174" cy="367059"/>
-            </a:xfrm>
-            <a:prstGeom prst="rect">
-              <a:avLst/>
-            </a:prstGeom>
-            <a:noFill/>
-          </p:spPr>
-          <p:txBody>
-            <a:bodyPr wrap="square" rtlCol="0">
-              <a:spAutoFit/>
-            </a:bodyPr>
-            <a:lstStyle/>
-            <a:p>
-              <a:r>
-                <a:rPr lang="en-US" dirty="0" smtClean="0">
-                  <a:latin typeface="Times New Roman" panose="02020603050405020304" pitchFamily="18" charset="0"/>
-                  <a:cs typeface="Times New Roman" panose="02020603050405020304" pitchFamily="18" charset="0"/>
-                </a:rPr>
-                <a:t>Mask - G</a:t>
-              </a:r>
-              <a:endParaRPr lang="en-US" dirty="0">
-                <a:latin typeface="Times New Roman" panose="02020603050405020304" pitchFamily="18" charset="0"/>
-                <a:cs typeface="Times New Roman" panose="02020603050405020304" pitchFamily="18" charset="0"/>
-              </a:endParaRPr>
-            </a:p>
-          </p:txBody>
-        </p:sp>
-      </p:grpSp>
-      <p:grpSp>
-        <p:nvGrpSpPr>
-          <p:cNvPr id="22" name="Group 21"/>
-          <p:cNvGrpSpPr/>
-          <p:nvPr/>
-        </p:nvGrpSpPr>
-        <p:grpSpPr>
-          <a:xfrm>
-            <a:off x="3520225" y="2682514"/>
-            <a:ext cx="1501211" cy="369332"/>
-            <a:chOff x="3520225" y="2682514"/>
-            <a:chExt cx="1501211" cy="369332"/>
-          </a:xfrm>
-        </p:grpSpPr>
-        <p:cxnSp>
-          <p:nvCxnSpPr>
-            <p:cNvPr id="15" name="Straight Arrow Connector 14"/>
-            <p:cNvCxnSpPr/>
-            <p:nvPr/>
-          </p:nvCxnSpPr>
-          <p:spPr>
-            <a:xfrm>
-              <a:off x="3633157" y="3051846"/>
-              <a:ext cx="1275348" cy="0"/>
-            </a:xfrm>
-            <a:prstGeom prst="straightConnector1">
-              <a:avLst/>
-            </a:prstGeom>
-            <a:ln>
-              <a:tailEnd type="triangle"/>
-            </a:ln>
-          </p:spPr>
-          <p:style>
-            <a:lnRef idx="3">
-              <a:schemeClr val="dk1"/>
-            </a:lnRef>
-            <a:fillRef idx="0">
-              <a:schemeClr val="dk1"/>
-            </a:fillRef>
-            <a:effectRef idx="2">
-              <a:schemeClr val="dk1"/>
-            </a:effectRef>
-            <a:fontRef idx="minor">
-              <a:schemeClr val="tx1"/>
-            </a:fontRef>
-          </p:style>
-        </p:cxnSp>
-        <p:sp>
-          <p:nvSpPr>
-            <p:cNvPr id="21" name="Rectangle 20"/>
-            <p:cNvSpPr/>
-            <p:nvPr/>
-          </p:nvSpPr>
-          <p:spPr>
-            <a:xfrm>
-              <a:off x="3520225" y="2682514"/>
-              <a:ext cx="1501211" cy="369332"/>
-            </a:xfrm>
-            <a:prstGeom prst="rect">
-              <a:avLst/>
-            </a:prstGeom>
-          </p:spPr>
-          <p:txBody>
-            <a:bodyPr wrap="square">
-              <a:spAutoFit/>
-            </a:bodyPr>
-            <a:lstStyle/>
-            <a:p>
-              <a:pPr algn="ctr"/>
-              <a:r>
-                <a:rPr lang="en-US" dirty="0" smtClean="0">
-                  <a:latin typeface="Times New Roman" panose="02020603050405020304" pitchFamily="18" charset="0"/>
-                  <a:cs typeface="Times New Roman" panose="02020603050405020304" pitchFamily="18" charset="0"/>
-                </a:rPr>
-                <a:t>Erode</a:t>
-              </a:r>
-              <a:endParaRPr lang="en-US" dirty="0">
-                <a:latin typeface="Times New Roman" panose="02020603050405020304" pitchFamily="18" charset="0"/>
-                <a:cs typeface="Times New Roman" panose="02020603050405020304" pitchFamily="18" charset="0"/>
-              </a:endParaRPr>
-            </a:p>
-          </p:txBody>
-        </p:sp>
-      </p:grpSp>
-      <p:grpSp>
-        <p:nvGrpSpPr>
-          <p:cNvPr id="44" name="Group 43"/>
-          <p:cNvGrpSpPr/>
-          <p:nvPr/>
-        </p:nvGrpSpPr>
-        <p:grpSpPr>
-          <a:xfrm>
-            <a:off x="8691821" y="1967259"/>
-            <a:ext cx="2169174" cy="2610385"/>
-            <a:chOff x="8691821" y="1967259"/>
-            <a:chExt cx="2169174" cy="2610385"/>
-          </a:xfrm>
-        </p:grpSpPr>
-        <p:pic>
-          <p:nvPicPr>
-            <p:cNvPr id="6" name="Picture 5"/>
-            <p:cNvPicPr>
-              <a:picLocks noChangeAspect="1"/>
-            </p:cNvPicPr>
-            <p:nvPr/>
-          </p:nvPicPr>
-          <p:blipFill>
-            <a:blip r:embed="rId7">
-              <a:extLst>
-                <a:ext uri="{28A0092B-C50C-407E-A947-70E740481C1C}">
-                  <a14:useLocalDpi xmlns:a14="http://schemas.microsoft.com/office/drawing/2010/main" val="0"/>
-                </a:ext>
-              </a:extLst>
-            </a:blip>
-            <a:stretch>
-              <a:fillRect/>
-            </a:stretch>
-          </p:blipFill>
-          <p:spPr>
-            <a:xfrm>
-              <a:off x="8691821" y="1967259"/>
-              <a:ext cx="2169174" cy="2169174"/>
-            </a:xfrm>
-            <a:prstGeom prst="rect">
-              <a:avLst/>
-            </a:prstGeom>
-          </p:spPr>
-        </p:pic>
-        <mc:AlternateContent xmlns:mc="http://schemas.openxmlformats.org/markup-compatibility/2006">
-          <mc:Choice xmlns:a14="http://schemas.microsoft.com/office/drawing/2010/main" Requires="a14">
-            <p:sp>
-              <p:nvSpPr>
-                <p:cNvPr id="33" name="TextBox 32"/>
-                <p:cNvSpPr txBox="1"/>
-                <p:nvPr/>
-              </p:nvSpPr>
-              <p:spPr>
-                <a:xfrm>
-                  <a:off x="8691821" y="4136433"/>
-                  <a:ext cx="2169174" cy="441211"/>
-                </a:xfrm>
-                <a:prstGeom prst="rect">
-                  <a:avLst/>
-                </a:prstGeom>
-                <a:noFill/>
-              </p:spPr>
-              <p:txBody>
-                <a:bodyPr wrap="square" rtlCol="0">
-                  <a:spAutoFit/>
-                </a:bodyPr>
-                <a:lstStyle/>
-                <a:p>
-                  <a14:m>
-                    <m:oMathPara xmlns:m="http://schemas.openxmlformats.org/officeDocument/2006/math">
-                      <m:oMathParaPr>
-                        <m:jc m:val="centerGroup"/>
-                      </m:oMathParaPr>
-                      <m:oMath xmlns:m="http://schemas.openxmlformats.org/officeDocument/2006/math">
-                        <m:sSubSup>
-                          <m:sSubSupPr>
-                            <m:ctrlPr>
-                              <a:rPr lang="en-US" i="1" smtClean="0">
-                                <a:latin typeface="Cambria Math" panose="02040503050406030204" pitchFamily="18" charset="0"/>
-                              </a:rPr>
-                            </m:ctrlPr>
-                          </m:sSubSupPr>
-                          <m:e>
-                            <m:r>
-                              <a:rPr lang="en-US" b="0" i="1" smtClean="0">
-                                <a:latin typeface="Cambria Math" panose="02040503050406030204" pitchFamily="18" charset="0"/>
-                              </a:rPr>
-                              <m:t>𝐸</m:t>
-                            </m:r>
-                          </m:e>
-                          <m:sub>
-                            <m:r>
-                              <a:rPr lang="en-US" i="1">
-                                <a:latin typeface="Cambria Math" panose="02040503050406030204" pitchFamily="18" charset="0"/>
-                              </a:rPr>
-                              <m:t>𝐺</m:t>
-                            </m:r>
-                          </m:sub>
-                          <m:sup>
-                            <m:r>
-                              <a:rPr lang="en-US" i="1">
-                                <a:latin typeface="Cambria Math" panose="02040503050406030204" pitchFamily="18" charset="0"/>
-                              </a:rPr>
-                              <m:t>(1)</m:t>
-                            </m:r>
-                          </m:sup>
-                        </m:sSubSup>
-                        <m:d>
-                          <m:dPr>
-                            <m:ctrlPr>
-                              <a:rPr lang="en-US" i="1" smtClean="0">
-                                <a:latin typeface="Cambria Math" panose="02040503050406030204" pitchFamily="18" charset="0"/>
-                              </a:rPr>
-                            </m:ctrlPr>
-                          </m:dPr>
-                          <m:e>
-                            <m:r>
-                              <a:rPr lang="en-US" b="0" i="1" smtClean="0">
-                                <a:latin typeface="Cambria Math" panose="02040503050406030204" pitchFamily="18" charset="0"/>
-                              </a:rPr>
-                              <m:t>𝐹</m:t>
-                            </m:r>
-                          </m:e>
-                        </m:d>
-                      </m:oMath>
-                    </m:oMathPara>
-                  </a14:m>
-                  <a:endParaRPr lang="en-US" dirty="0"/>
-                </a:p>
-              </p:txBody>
-            </p:sp>
-          </mc:Choice>
-          <mc:Fallback>
-            <p:sp>
-              <p:nvSpPr>
-                <p:cNvPr id="33" name="TextBox 32"/>
-                <p:cNvSpPr txBox="1">
-                  <a:spLocks noRot="1" noChangeAspect="1" noMove="1" noResize="1" noEditPoints="1" noAdjustHandles="1" noChangeArrowheads="1" noChangeShapeType="1" noTextEdit="1"/>
-                </p:cNvSpPr>
-                <p:nvPr/>
-              </p:nvSpPr>
-              <p:spPr>
-                <a:xfrm>
-                  <a:off x="8691821" y="4136433"/>
-                  <a:ext cx="2169174" cy="441211"/>
-                </a:xfrm>
-                <a:prstGeom prst="rect">
-                  <a:avLst/>
-                </a:prstGeom>
-                <a:blipFill rotWithShape="0">
-                  <a:blip r:embed="rId8"/>
-                  <a:stretch>
-                    <a:fillRect b="-2778"/>
-                  </a:stretch>
-                </a:blipFill>
-              </p:spPr>
-              <p:txBody>
-                <a:bodyPr/>
-                <a:lstStyle/>
-                <a:p>
-                  <a:r>
-                    <a:rPr lang="en-US">
-                      <a:noFill/>
-                    </a:rPr>
-                    <a:t> </a:t>
-                  </a:r>
-                </a:p>
-              </p:txBody>
-            </p:sp>
-          </mc:Fallback>
-        </mc:AlternateContent>
-      </p:grpSp>
-      <p:grpSp>
-        <p:nvGrpSpPr>
-          <p:cNvPr id="48" name="Group 47"/>
-          <p:cNvGrpSpPr/>
-          <p:nvPr/>
-        </p:nvGrpSpPr>
-        <p:grpSpPr>
-          <a:xfrm>
-            <a:off x="3633157" y="2867180"/>
-            <a:ext cx="4505388" cy="2515482"/>
-            <a:chOff x="3633157" y="2867180"/>
-            <a:chExt cx="4505388" cy="2515482"/>
-          </a:xfrm>
-        </p:grpSpPr>
-        <p:cxnSp>
-          <p:nvCxnSpPr>
-            <p:cNvPr id="23" name="Straight Arrow Connector 22"/>
-            <p:cNvCxnSpPr/>
-            <p:nvPr/>
-          </p:nvCxnSpPr>
-          <p:spPr>
-            <a:xfrm>
-              <a:off x="7241306" y="3051846"/>
-              <a:ext cx="451884" cy="0"/>
-            </a:xfrm>
-            <a:prstGeom prst="straightConnector1">
-              <a:avLst/>
-            </a:prstGeom>
-            <a:ln>
-              <a:tailEnd type="triangle"/>
-            </a:ln>
-          </p:spPr>
-          <p:style>
-            <a:lnRef idx="3">
-              <a:schemeClr val="dk1"/>
-            </a:lnRef>
-            <a:fillRef idx="0">
-              <a:schemeClr val="dk1"/>
-            </a:fillRef>
-            <a:effectRef idx="2">
-              <a:schemeClr val="dk1"/>
-            </a:effectRef>
-            <a:fontRef idx="minor">
-              <a:schemeClr val="tx1"/>
-            </a:fontRef>
-          </p:style>
-        </p:cxnSp>
-        <mc:AlternateContent xmlns:mc="http://schemas.openxmlformats.org/markup-compatibility/2006">
-          <mc:Choice xmlns:a14="http://schemas.microsoft.com/office/drawing/2010/main" Requires="a14">
-            <p:sp>
-              <p:nvSpPr>
-                <p:cNvPr id="26" name="Rectangle 25"/>
-                <p:cNvSpPr/>
-                <p:nvPr/>
-              </p:nvSpPr>
-              <p:spPr>
-                <a:xfrm>
-                  <a:off x="7743886" y="2867180"/>
-                  <a:ext cx="394659" cy="369332"/>
-                </a:xfrm>
-                <a:prstGeom prst="rect">
-                  <a:avLst/>
-                </a:prstGeom>
-                <a:ln>
-                  <a:solidFill>
-                    <a:schemeClr val="tx1"/>
-                  </a:solidFill>
-                </a:ln>
-              </p:spPr>
-              <p:txBody>
-                <a:bodyPr wrap="none">
-                  <a:spAutoFit/>
-                </a:bodyPr>
-                <a:lstStyle/>
-                <a:p>
-                  <a14:m>
-                    <m:oMathPara xmlns:m="http://schemas.openxmlformats.org/officeDocument/2006/math">
-                      <m:oMathParaPr>
-                        <m:jc m:val="centerGroup"/>
-                      </m:oMathParaPr>
-                      <m:oMath xmlns:m="http://schemas.openxmlformats.org/officeDocument/2006/math">
-                        <m:r>
-                          <a:rPr lang="en-US" b="0" i="1" smtClean="0">
-                            <a:latin typeface="Cambria Math" panose="02040503050406030204" pitchFamily="18" charset="0"/>
-                            <a:ea typeface="Cambria Math" panose="02040503050406030204" pitchFamily="18" charset="0"/>
-                          </a:rPr>
-                          <m:t>∪</m:t>
-                        </m:r>
-                      </m:oMath>
-                    </m:oMathPara>
-                  </a14:m>
-                  <a:endParaRPr lang="en-US" dirty="0"/>
-                </a:p>
-              </p:txBody>
-            </p:sp>
-          </mc:Choice>
-          <mc:Fallback>
-            <p:sp>
-              <p:nvSpPr>
-                <p:cNvPr id="26" name="Rectangle 25"/>
-                <p:cNvSpPr>
-                  <a:spLocks noRot="1" noChangeAspect="1" noMove="1" noResize="1" noEditPoints="1" noAdjustHandles="1" noChangeArrowheads="1" noChangeShapeType="1" noTextEdit="1"/>
-                </p:cNvSpPr>
-                <p:nvPr/>
-              </p:nvSpPr>
-              <p:spPr>
-                <a:xfrm>
-                  <a:off x="7743886" y="2867180"/>
-                  <a:ext cx="394659" cy="369332"/>
-                </a:xfrm>
-                <a:prstGeom prst="rect">
-                  <a:avLst/>
-                </a:prstGeom>
-                <a:blipFill rotWithShape="0">
-                  <a:blip r:embed="rId9"/>
-                  <a:stretch>
-                    <a:fillRect/>
-                  </a:stretch>
-                </a:blipFill>
-                <a:ln>
-                  <a:solidFill>
-                    <a:schemeClr val="tx1"/>
-                  </a:solidFill>
-                </a:ln>
-              </p:spPr>
-              <p:txBody>
-                <a:bodyPr/>
-                <a:lstStyle/>
-                <a:p>
-                  <a:r>
-                    <a:rPr lang="en-US">
-                      <a:noFill/>
-                    </a:rPr>
-                    <a:t> </a:t>
-                  </a:r>
-                </a:p>
-              </p:txBody>
-            </p:sp>
-          </mc:Fallback>
-        </mc:AlternateContent>
-        <p:cxnSp>
-          <p:nvCxnSpPr>
-            <p:cNvPr id="28" name="Elbow Connector 27"/>
-            <p:cNvCxnSpPr/>
-            <p:nvPr/>
-          </p:nvCxnSpPr>
-          <p:spPr>
-            <a:xfrm flipV="1">
-              <a:off x="3633157" y="3295650"/>
-              <a:ext cx="4310693" cy="2087012"/>
-            </a:xfrm>
-            <a:prstGeom prst="bentConnector3">
-              <a:avLst>
-                <a:gd name="adj1" fmla="val 100084"/>
-              </a:avLst>
-            </a:prstGeom>
-            <a:ln>
-              <a:tailEnd type="triangle"/>
-            </a:ln>
-          </p:spPr>
-          <p:style>
-            <a:lnRef idx="3">
-              <a:schemeClr val="dk1"/>
-            </a:lnRef>
-            <a:fillRef idx="0">
-              <a:schemeClr val="dk1"/>
-            </a:fillRef>
-            <a:effectRef idx="2">
-              <a:schemeClr val="dk1"/>
-            </a:effectRef>
-            <a:fontRef idx="minor">
-              <a:schemeClr val="tx1"/>
-            </a:fontRef>
-          </p:style>
-        </p:cxnSp>
-      </p:grpSp>
-      <p:cxnSp>
-        <p:nvCxnSpPr>
-          <p:cNvPr id="40" name="Straight Arrow Connector 39"/>
-          <p:cNvCxnSpPr/>
-          <p:nvPr/>
-        </p:nvCxnSpPr>
-        <p:spPr>
-          <a:xfrm>
-            <a:off x="8189241" y="3051846"/>
-            <a:ext cx="451884" cy="0"/>
-          </a:xfrm>
-          <a:prstGeom prst="straightConnector1">
-            <a:avLst/>
-          </a:prstGeom>
-          <a:ln>
-            <a:tailEnd type="triangle"/>
-          </a:ln>
-        </p:spPr>
-        <p:style>
-          <a:lnRef idx="3">
-            <a:schemeClr val="dk1"/>
-          </a:lnRef>
-          <a:fillRef idx="0">
-            <a:schemeClr val="dk1"/>
-          </a:fillRef>
-          <a:effectRef idx="2">
-            <a:schemeClr val="dk1"/>
-          </a:effectRef>
-          <a:fontRef idx="minor">
-            <a:schemeClr val="tx1"/>
-          </a:fontRef>
-        </p:style>
-      </p:cxnSp>
-    </p:spTree>
-    <p:extLst>
-      <p:ext uri="{BB962C8B-B14F-4D97-AF65-F5344CB8AC3E}">
-        <p14:creationId xmlns:p14="http://schemas.microsoft.com/office/powerpoint/2010/main" val="611084718"/>
-      </p:ext>
-    </p:extLst>
-  </p:cSld>
-  <p:clrMapOvr>
-    <a:masterClrMapping/>
-  </p:clrMapOvr>
-  <p:timing>
-    <p:tnLst>
-      <p:par>
-        <p:cTn id="1" dur="indefinite" restart="never" nodeType="tmRoot">
-          <p:childTnLst>
-            <p:seq concurrent="1" nextAc="seek">
-              <p:cTn id="2" dur="indefinite" nodeType="mainSeq">
-                <p:childTnLst>
-                  <p:par>
-                    <p:cTn id="3" fill="hold">
-                      <p:stCondLst>
-                        <p:cond delay="indefinite"/>
-                      </p:stCondLst>
-                      <p:childTnLst>
-                        <p:par>
-                          <p:cTn id="4" fill="hold">
-                            <p:stCondLst>
-                              <p:cond delay="0"/>
-                            </p:stCondLst>
-                            <p:childTnLst>
-                              <p:par>
-                                <p:cTn id="5" presetID="1" presetClass="entr" presetSubtype="0" fill="hold" nodeType="clickEffect">
-                                  <p:stCondLst>
-                                    <p:cond delay="0"/>
-                                  </p:stCondLst>
-                                  <p:childTnLst>
-                                    <p:set>
-                                      <p:cBhvr>
-                                        <p:cTn id="6" dur="1" fill="hold">
-                                          <p:stCondLst>
-                                            <p:cond delay="0"/>
-                                          </p:stCondLst>
-                                        </p:cTn>
-                                        <p:tgtEl>
-                                          <p:spTgt spid="31"/>
-                                        </p:tgtEl>
-                                        <p:attrNameLst>
-                                          <p:attrName>style.visibility</p:attrName>
-                                        </p:attrNameLst>
-                                      </p:cBhvr>
-                                      <p:to>
-                                        <p:strVal val="visible"/>
-                                      </p:to>
-                                    </p:set>
-                                  </p:childTnLst>
-                                </p:cTn>
-                              </p:par>
-                              <p:par>
-                                <p:cTn id="7" presetID="1" presetClass="entr" presetSubtype="0" fill="hold" nodeType="withEffect">
-                                  <p:stCondLst>
-                                    <p:cond delay="0"/>
-                                  </p:stCondLst>
-                                  <p:childTnLst>
-                                    <p:set>
-                                      <p:cBhvr>
-                                        <p:cTn id="8" dur="1" fill="hold">
-                                          <p:stCondLst>
-                                            <p:cond delay="0"/>
-                                          </p:stCondLst>
-                                        </p:cTn>
-                                        <p:tgtEl>
-                                          <p:spTgt spid="32"/>
-                                        </p:tgtEl>
-                                        <p:attrNameLst>
-                                          <p:attrName>style.visibility</p:attrName>
-                                        </p:attrNameLst>
-                                      </p:cBhvr>
-                                      <p:to>
-                                        <p:strVal val="visible"/>
-                                      </p:to>
-                                    </p:set>
-                                  </p:childTnLst>
-                                </p:cTn>
-                              </p:par>
-                            </p:childTnLst>
-                          </p:cTn>
-                        </p:par>
-                      </p:childTnLst>
-                    </p:cTn>
-                  </p:par>
-                  <p:par>
-                    <p:cTn id="9" fill="hold">
-                      <p:stCondLst>
-                        <p:cond delay="indefinite"/>
-                      </p:stCondLst>
-                      <p:childTnLst>
-                        <p:par>
-                          <p:cTn id="10" fill="hold">
-                            <p:stCondLst>
-                              <p:cond delay="0"/>
-                            </p:stCondLst>
-                            <p:childTnLst>
-                              <p:par>
-                                <p:cTn id="11" presetID="1" presetClass="entr" presetSubtype="0" fill="hold" nodeType="clickEffect">
-                                  <p:stCondLst>
-                                    <p:cond delay="0"/>
-                                  </p:stCondLst>
-                                  <p:childTnLst>
-                                    <p:set>
-                                      <p:cBhvr>
-                                        <p:cTn id="12" dur="1" fill="hold">
-                                          <p:stCondLst>
-                                            <p:cond delay="0"/>
-                                          </p:stCondLst>
-                                        </p:cTn>
-                                        <p:tgtEl>
-                                          <p:spTgt spid="22"/>
-                                        </p:tgtEl>
-                                        <p:attrNameLst>
-                                          <p:attrName>style.visibility</p:attrName>
-                                        </p:attrNameLst>
-                                      </p:cBhvr>
-                                      <p:to>
-                                        <p:strVal val="visible"/>
-                                      </p:to>
-                                    </p:set>
-                                  </p:childTnLst>
-                                </p:cTn>
-                              </p:par>
-                              <p:par>
-                                <p:cTn id="13" presetID="1" presetClass="entr" presetSubtype="0" fill="hold" nodeType="withEffect">
-                                  <p:stCondLst>
-                                    <p:cond delay="0"/>
-                                  </p:stCondLst>
-                                  <p:childTnLst>
-                                    <p:set>
-                                      <p:cBhvr>
-                                        <p:cTn id="14" dur="1" fill="hold">
-                                          <p:stCondLst>
-                                            <p:cond delay="0"/>
-                                          </p:stCondLst>
-                                        </p:cTn>
-                                        <p:tgtEl>
-                                          <p:spTgt spid="4"/>
-                                        </p:tgtEl>
-                                        <p:attrNameLst>
-                                          <p:attrName>style.visibility</p:attrName>
-                                        </p:attrNameLst>
-                                      </p:cBhvr>
-                                      <p:to>
-                                        <p:strVal val="visible"/>
-                                      </p:to>
-                                    </p:set>
-                                  </p:childTnLst>
-                                </p:cTn>
-                              </p:par>
-                            </p:childTnLst>
-                          </p:cTn>
-                        </p:par>
-                      </p:childTnLst>
-                    </p:cTn>
-                  </p:par>
-                  <p:par>
-                    <p:cTn id="15" fill="hold">
-                      <p:stCondLst>
-                        <p:cond delay="indefinite"/>
-                      </p:stCondLst>
-                      <p:childTnLst>
-                        <p:par>
-                          <p:cTn id="16" fill="hold">
-                            <p:stCondLst>
-                              <p:cond delay="0"/>
-                            </p:stCondLst>
-                            <p:childTnLst>
-                              <p:par>
-                                <p:cTn id="17" presetID="1" presetClass="entr" presetSubtype="0" fill="hold" nodeType="clickEffect">
-                                  <p:stCondLst>
-                                    <p:cond delay="0"/>
-                                  </p:stCondLst>
-                                  <p:childTnLst>
-                                    <p:set>
-                                      <p:cBhvr>
-                                        <p:cTn id="18" dur="1" fill="hold">
-                                          <p:stCondLst>
-                                            <p:cond delay="0"/>
-                                          </p:stCondLst>
-                                        </p:cTn>
-                                        <p:tgtEl>
-                                          <p:spTgt spid="48"/>
-                                        </p:tgtEl>
-                                        <p:attrNameLst>
-                                          <p:attrName>style.visibility</p:attrName>
-                                        </p:attrNameLst>
-                                      </p:cBhvr>
-                                      <p:to>
-                                        <p:strVal val="visible"/>
-                                      </p:to>
-                                    </p:set>
-                                  </p:childTnLst>
-                                </p:cTn>
-                              </p:par>
-                            </p:childTnLst>
-                          </p:cTn>
-                        </p:par>
-                      </p:childTnLst>
-                    </p:cTn>
-                  </p:par>
-                  <p:par>
-                    <p:cTn id="19" fill="hold">
-                      <p:stCondLst>
-                        <p:cond delay="indefinite"/>
-                      </p:stCondLst>
-                      <p:childTnLst>
-                        <p:par>
-                          <p:cTn id="20" fill="hold">
-                            <p:stCondLst>
-                              <p:cond delay="0"/>
-                            </p:stCondLst>
-                            <p:childTnLst>
-                              <p:par>
-                                <p:cTn id="21" presetID="1" presetClass="entr" presetSubtype="0" fill="hold" nodeType="clickEffect">
-                                  <p:stCondLst>
-                                    <p:cond delay="0"/>
-                                  </p:stCondLst>
-                                  <p:childTnLst>
-                                    <p:set>
-                                      <p:cBhvr>
-                                        <p:cTn id="22" dur="1" fill="hold">
-                                          <p:stCondLst>
-                                            <p:cond delay="0"/>
-                                          </p:stCondLst>
-                                        </p:cTn>
-                                        <p:tgtEl>
-                                          <p:spTgt spid="44"/>
-                                        </p:tgtEl>
-                                        <p:attrNameLst>
-                                          <p:attrName>style.visibility</p:attrName>
-                                        </p:attrNameLst>
-                                      </p:cBhvr>
-                                      <p:to>
-                                        <p:strVal val="visible"/>
-                                      </p:to>
-                                    </p:set>
-                                  </p:childTnLst>
-                                </p:cTn>
-                              </p:par>
-                              <p:par>
-                                <p:cTn id="23" presetID="1" presetClass="entr" presetSubtype="0" fill="hold" nodeType="withEffect">
-                                  <p:stCondLst>
-                                    <p:cond delay="0"/>
-                                  </p:stCondLst>
-                                  <p:childTnLst>
-                                    <p:set>
-                                      <p:cBhvr>
-                                        <p:cTn id="24" dur="1" fill="hold">
-                                          <p:stCondLst>
-                                            <p:cond delay="0"/>
-                                          </p:stCondLst>
-                                        </p:cTn>
-                                        <p:tgtEl>
-                                          <p:spTgt spid="40"/>
-                                        </p:tgtEl>
-                                        <p:attrNameLst>
-                                          <p:attrName>style.visibility</p:attrName>
-                                        </p:attrNameLst>
-                                      </p:cBhvr>
-                                      <p:to>
-                                        <p:strVal val="visible"/>
-                                      </p:to>
-                                    </p:set>
-                                  </p:childTnLst>
-                                </p:cTn>
-                              </p:par>
-                            </p:childTnLst>
-                          </p:cTn>
-                        </p:par>
-                      </p:childTnLst>
-                    </p:cTn>
-                  </p:par>
-                  <p:par>
-                    <p:cTn id="25" fill="hold">
-                      <p:stCondLst>
-                        <p:cond delay="indefinite"/>
-                      </p:stCondLst>
-                      <p:childTnLst>
-                        <p:par>
-                          <p:cTn id="26" fill="hold">
-                            <p:stCondLst>
-                              <p:cond delay="0"/>
-                            </p:stCondLst>
-                            <p:childTnLst>
-                              <p:par>
-                                <p:cTn id="27" presetID="1" presetClass="entr" presetSubtype="0" fill="hold" grpId="0" nodeType="clickEffect">
-                                  <p:stCondLst>
-                                    <p:cond delay="0"/>
-                                  </p:stCondLst>
-                                  <p:childTnLst>
-                                    <p:set>
-                                      <p:cBhvr>
-                                        <p:cTn id="28" dur="1" fill="hold">
-                                          <p:stCondLst>
-                                            <p:cond delay="0"/>
-                                          </p:stCondLst>
-                                        </p:cTn>
-                                        <p:tgtEl>
-                                          <p:spTgt spid="8"/>
-                                        </p:tgtEl>
-                                        <p:attrNameLst>
-                                          <p:attrName>style.visibility</p:attrName>
-                                        </p:attrNameLst>
-                                      </p:cBhvr>
-                                      <p:to>
-                                        <p:strVal val="visible"/>
-                                      </p:to>
-                                    </p:set>
-                                  </p:childTnLst>
-                                </p:cTn>
-                              </p:par>
-                            </p:childTnLst>
-                          </p:cTn>
-                        </p:par>
-                      </p:childTnLst>
-                    </p:cTn>
-                  </p:par>
-                </p:childTnLst>
-              </p:cTn>
-              <p:prevCondLst>
-                <p:cond evt="onPrev" delay="0">
-                  <p:tgtEl>
-                    <p:sldTgt/>
-                  </p:tgtEl>
-                </p:cond>
-              </p:prevCondLst>
-              <p:nextCondLst>
-                <p:cond evt="onNext" delay="0">
-                  <p:tgtEl>
-                    <p:sldTgt/>
-                  </p:tgtEl>
-                </p:cond>
-              </p:nextCondLst>
-            </p:seq>
-          </p:childTnLst>
-        </p:cTn>
-      </p:par>
-    </p:tnLst>
-    <p:bldLst>
-      <p:bldP spid="8" grpId="0"/>
-    </p:bldLst>
-  </p:timing>
-</p:sld>
-</file>
-
-<file path=ppt/slides/slide3.xml><?xml version="1.0" encoding="utf-8"?>
-<p:sld xmlns:a="http://schemas.openxmlformats.org/drawingml/2006/main" xmlns:r="http://schemas.openxmlformats.org/officeDocument/2006/relationships" xmlns:p="http://schemas.openxmlformats.org/presentationml/2006/main">
-  <p:cSld>
-    <p:spTree>
-      <p:nvGrpSpPr>
-        <p:cNvPr id="1" name=""/>
-        <p:cNvGrpSpPr/>
-        <p:nvPr/>
-      </p:nvGrpSpPr>
-      <p:grpSpPr>
-        <a:xfrm>
-          <a:off x="0" y="0"/>
-          <a:ext cx="0" cy="0"/>
-          <a:chOff x="0" y="0"/>
-          <a:chExt cx="0" cy="0"/>
-        </a:xfrm>
-      </p:grpSpPr>
-      <mc:AlternateContent xmlns:mc="http://schemas.openxmlformats.org/markup-compatibility/2006">
-        <mc:Choice xmlns:a14="http://schemas.microsoft.com/office/drawing/2010/main" Requires="a14">
-          <p:sp>
-            <p:nvSpPr>
-              <p:cNvPr id="2" name="Title 1"/>
-              <p:cNvSpPr>
-                <a:spLocks noGrp="1"/>
-              </p:cNvSpPr>
-              <p:nvPr>
-                <p:ph type="title"/>
-              </p:nvPr>
-            </p:nvSpPr>
-            <p:spPr/>
-            <p:txBody>
-              <a:bodyPr>
                 <a:normAutofit fontScale="90000"/>
               </a:bodyPr>
               <a:lstStyle/>
@@ -8336,6 +6724,1620 @@
 </p:sld>
 </file>
 
+<file path=ppt/slides/slide3.xml><?xml version="1.0" encoding="utf-8"?>
+<p:sld xmlns:a="http://schemas.openxmlformats.org/drawingml/2006/main" xmlns:r="http://schemas.openxmlformats.org/officeDocument/2006/relationships" xmlns:p="http://schemas.openxmlformats.org/presentationml/2006/main">
+  <p:cSld>
+    <p:spTree>
+      <p:nvGrpSpPr>
+        <p:cNvPr id="1" name=""/>
+        <p:cNvGrpSpPr/>
+        <p:nvPr/>
+      </p:nvGrpSpPr>
+      <p:grpSpPr>
+        <a:xfrm>
+          <a:off x="0" y="0"/>
+          <a:ext cx="0" cy="0"/>
+          <a:chOff x="0" y="0"/>
+          <a:chExt cx="0" cy="0"/>
+        </a:xfrm>
+      </p:grpSpPr>
+      <mc:AlternateContent xmlns:mc="http://schemas.openxmlformats.org/markup-compatibility/2006">
+        <mc:Choice xmlns:a14="http://schemas.microsoft.com/office/drawing/2010/main" Requires="a14">
+          <p:sp>
+            <p:nvSpPr>
+              <p:cNvPr id="2" name="Title 1"/>
+              <p:cNvSpPr>
+                <a:spLocks noGrp="1"/>
+              </p:cNvSpPr>
+              <p:nvPr>
+                <p:ph type="title"/>
+              </p:nvPr>
+            </p:nvSpPr>
+            <p:spPr/>
+            <p:txBody>
+              <a:bodyPr>
+                <a:normAutofit/>
+              </a:bodyPr>
+              <a:lstStyle/>
+              <a:p>
+                <a:r>
+                  <a:rPr lang="en-US" dirty="0" smtClean="0"/>
+                  <a:t>Geodesic Erosion		</a:t>
+                </a:r>
+                <a14:m>
+                  <m:oMath xmlns:m="http://schemas.openxmlformats.org/officeDocument/2006/math">
+                    <m:sSubSup>
+                      <m:sSubSupPr>
+                        <m:ctrlPr>
+                          <a:rPr lang="en-US" sz="3600" i="1" smtClean="0">
+                            <a:latin typeface="Cambria Math" panose="02040503050406030204" pitchFamily="18" charset="0"/>
+                          </a:rPr>
+                        </m:ctrlPr>
+                      </m:sSubSupPr>
+                      <m:e>
+                        <m:r>
+                          <a:rPr lang="en-US" sz="3600" b="0" i="1" smtClean="0">
+                            <a:latin typeface="Cambria Math" panose="02040503050406030204" pitchFamily="18" charset="0"/>
+                          </a:rPr>
+                          <m:t>𝐸</m:t>
+                        </m:r>
+                      </m:e>
+                      <m:sub>
+                        <m:r>
+                          <a:rPr lang="en-US" sz="3600" i="1">
+                            <a:latin typeface="Cambria Math" panose="02040503050406030204" pitchFamily="18" charset="0"/>
+                          </a:rPr>
+                          <m:t>𝐺</m:t>
+                        </m:r>
+                      </m:sub>
+                      <m:sup>
+                        <m:r>
+                          <a:rPr lang="en-US" sz="3600" i="1">
+                            <a:latin typeface="Cambria Math" panose="02040503050406030204" pitchFamily="18" charset="0"/>
+                          </a:rPr>
+                          <m:t>(1)</m:t>
+                        </m:r>
+                      </m:sup>
+                    </m:sSubSup>
+                    <m:d>
+                      <m:dPr>
+                        <m:ctrlPr>
+                          <a:rPr lang="en-US" sz="3600" i="1" smtClean="0">
+                            <a:latin typeface="Cambria Math" panose="02040503050406030204" pitchFamily="18" charset="0"/>
+                          </a:rPr>
+                        </m:ctrlPr>
+                      </m:dPr>
+                      <m:e>
+                        <m:r>
+                          <a:rPr lang="en-US" sz="3600" b="0" i="1" smtClean="0">
+                            <a:latin typeface="Cambria Math" panose="02040503050406030204" pitchFamily="18" charset="0"/>
+                          </a:rPr>
+                          <m:t>𝐹</m:t>
+                        </m:r>
+                      </m:e>
+                    </m:d>
+                    <m:r>
+                      <a:rPr lang="en-US" sz="3600" b="0" i="1" smtClean="0">
+                        <a:latin typeface="Cambria Math" panose="02040503050406030204" pitchFamily="18" charset="0"/>
+                      </a:rPr>
+                      <m:t>=</m:t>
+                    </m:r>
+                    <m:d>
+                      <m:dPr>
+                        <m:ctrlPr>
+                          <a:rPr lang="en-US" sz="3600" b="0" i="1" smtClean="0">
+                            <a:latin typeface="Cambria Math" panose="02040503050406030204" pitchFamily="18" charset="0"/>
+                          </a:rPr>
+                        </m:ctrlPr>
+                      </m:dPr>
+                      <m:e>
+                        <m:r>
+                          <a:rPr lang="en-US" sz="3600" b="0" i="1" smtClean="0">
+                            <a:latin typeface="Cambria Math" panose="02040503050406030204" pitchFamily="18" charset="0"/>
+                          </a:rPr>
+                          <m:t>𝐹</m:t>
+                        </m:r>
+                        <m:r>
+                          <a:rPr lang="en-US" sz="3600" b="0" i="1" smtClean="0">
+                            <a:latin typeface="Cambria Math" panose="02040503050406030204" pitchFamily="18" charset="0"/>
+                            <a:ea typeface="Cambria Math" panose="02040503050406030204" pitchFamily="18" charset="0"/>
+                          </a:rPr>
+                          <m:t>⊖</m:t>
+                        </m:r>
+                        <m:r>
+                          <a:rPr lang="en-US" sz="3600" b="0" i="1" smtClean="0">
+                            <a:latin typeface="Cambria Math" panose="02040503050406030204" pitchFamily="18" charset="0"/>
+                            <a:ea typeface="Cambria Math" panose="02040503050406030204" pitchFamily="18" charset="0"/>
+                          </a:rPr>
+                          <m:t>𝐵</m:t>
+                        </m:r>
+                      </m:e>
+                    </m:d>
+                    <m:r>
+                      <a:rPr lang="en-US" sz="3600" b="0" i="1" smtClean="0">
+                        <a:latin typeface="Cambria Math" panose="02040503050406030204" pitchFamily="18" charset="0"/>
+                        <a:ea typeface="Cambria Math" panose="02040503050406030204" pitchFamily="18" charset="0"/>
+                      </a:rPr>
+                      <m:t>∪</m:t>
+                    </m:r>
+                    <m:r>
+                      <a:rPr lang="en-US" sz="3600" b="0" i="1" smtClean="0">
+                        <a:latin typeface="Cambria Math" panose="02040503050406030204" pitchFamily="18" charset="0"/>
+                        <a:ea typeface="Cambria Math" panose="02040503050406030204" pitchFamily="18" charset="0"/>
+                      </a:rPr>
+                      <m:t>𝐺</m:t>
+                    </m:r>
+                  </m:oMath>
+                </a14:m>
+                <a:endParaRPr lang="en-US" sz="3600" dirty="0"/>
+              </a:p>
+            </p:txBody>
+          </p:sp>
+        </mc:Choice>
+        <mc:Fallback>
+          <p:sp>
+            <p:nvSpPr>
+              <p:cNvPr id="2" name="Title 1"/>
+              <p:cNvSpPr>
+                <a:spLocks noGrp="1" noRot="1" noChangeAspect="1" noMove="1" noResize="1" noEditPoints="1" noAdjustHandles="1" noChangeArrowheads="1" noChangeShapeType="1" noTextEdit="1"/>
+              </p:cNvSpPr>
+              <p:nvPr>
+                <p:ph type="title"/>
+              </p:nvPr>
+            </p:nvSpPr>
+            <p:spPr>
+              <a:blipFill rotWithShape="0">
+                <a:blip r:embed="rId2"/>
+                <a:stretch>
+                  <a:fillRect l="-2377"/>
+                </a:stretch>
+              </a:blipFill>
+            </p:spPr>
+            <p:txBody>
+              <a:bodyPr/>
+              <a:lstStyle/>
+              <a:p>
+                <a:r>
+                  <a:rPr lang="en-US">
+                    <a:noFill/>
+                  </a:rPr>
+                  <a:t> </a:t>
+                </a:r>
+              </a:p>
+            </p:txBody>
+          </p:sp>
+        </mc:Fallback>
+      </mc:AlternateContent>
+      <p:pic>
+        <p:nvPicPr>
+          <p:cNvPr id="4" name="Picture 3"/>
+          <p:cNvPicPr>
+            <a:picLocks noChangeAspect="1"/>
+          </p:cNvPicPr>
+          <p:nvPr/>
+        </p:nvPicPr>
+        <p:blipFill>
+          <a:blip r:embed="rId3">
+            <a:extLst>
+              <a:ext uri="{28A0092B-C50C-407E-A947-70E740481C1C}">
+                <a14:useLocalDpi xmlns:a14="http://schemas.microsoft.com/office/drawing/2010/main" val="0"/>
+              </a:ext>
+            </a:extLst>
+          </a:blip>
+          <a:stretch>
+            <a:fillRect/>
+          </a:stretch>
+        </p:blipFill>
+        <p:spPr>
+          <a:xfrm>
+            <a:off x="5021436" y="1967259"/>
+            <a:ext cx="2169174" cy="2169174"/>
+          </a:xfrm>
+          <a:prstGeom prst="rect">
+            <a:avLst/>
+          </a:prstGeom>
+        </p:spPr>
+      </p:pic>
+      <mc:AlternateContent xmlns:mc="http://schemas.openxmlformats.org/markup-compatibility/2006">
+        <mc:Choice xmlns:a14="http://schemas.microsoft.com/office/drawing/2010/main" Requires="a14">
+          <p:sp>
+            <p:nvSpPr>
+              <p:cNvPr id="8" name="Content Placeholder 2"/>
+              <p:cNvSpPr txBox="1">
+                <a:spLocks/>
+              </p:cNvSpPr>
+              <p:nvPr/>
+            </p:nvSpPr>
+            <p:spPr>
+              <a:xfrm>
+                <a:off x="7518390" y="5732373"/>
+                <a:ext cx="4341254" cy="739417"/>
+              </a:xfrm>
+              <a:prstGeom prst="rect">
+                <a:avLst/>
+              </a:prstGeom>
+            </p:spPr>
+            <p:txBody>
+              <a:bodyPr vert="horz" lIns="91440" tIns="45720" rIns="91440" bIns="45720" rtlCol="0">
+                <a:normAutofit fontScale="92500"/>
+              </a:bodyPr>
+              <a:lstStyle>
+                <a:lvl1pPr marL="228600" indent="-228600" algn="l" defTabSz="914400" rtl="0" eaLnBrk="1" latinLnBrk="0" hangingPunct="1">
+                  <a:lnSpc>
+                    <a:spcPct val="90000"/>
+                  </a:lnSpc>
+                  <a:spcBef>
+                    <a:spcPts val="1000"/>
+                  </a:spcBef>
+                  <a:buFont typeface="Arial" panose="020B0604020202020204" pitchFamily="34" charset="0"/>
+                  <a:buChar char="•"/>
+                  <a:defRPr sz="2800" kern="1200">
+                    <a:solidFill>
+                      <a:schemeClr val="tx1"/>
+                    </a:solidFill>
+                    <a:latin typeface="+mn-lt"/>
+                    <a:ea typeface="+mn-ea"/>
+                    <a:cs typeface="+mn-cs"/>
+                  </a:defRPr>
+                </a:lvl1pPr>
+                <a:lvl2pPr marL="685800" indent="-228600" algn="l" defTabSz="914400" rtl="0" eaLnBrk="1" latinLnBrk="0" hangingPunct="1">
+                  <a:lnSpc>
+                    <a:spcPct val="90000"/>
+                  </a:lnSpc>
+                  <a:spcBef>
+                    <a:spcPts val="500"/>
+                  </a:spcBef>
+                  <a:buFont typeface="Arial" panose="020B0604020202020204" pitchFamily="34" charset="0"/>
+                  <a:buChar char="•"/>
+                  <a:defRPr sz="2400" kern="1200">
+                    <a:solidFill>
+                      <a:schemeClr val="tx1"/>
+                    </a:solidFill>
+                    <a:latin typeface="+mn-lt"/>
+                    <a:ea typeface="+mn-ea"/>
+                    <a:cs typeface="+mn-cs"/>
+                  </a:defRPr>
+                </a:lvl2pPr>
+                <a:lvl3pPr marL="1143000" indent="-228600" algn="l" defTabSz="914400" rtl="0" eaLnBrk="1" latinLnBrk="0" hangingPunct="1">
+                  <a:lnSpc>
+                    <a:spcPct val="90000"/>
+                  </a:lnSpc>
+                  <a:spcBef>
+                    <a:spcPts val="500"/>
+                  </a:spcBef>
+                  <a:buFont typeface="Arial" panose="020B0604020202020204" pitchFamily="34" charset="0"/>
+                  <a:buChar char="•"/>
+                  <a:defRPr sz="2000" kern="1200">
+                    <a:solidFill>
+                      <a:schemeClr val="tx1"/>
+                    </a:solidFill>
+                    <a:latin typeface="+mn-lt"/>
+                    <a:ea typeface="+mn-ea"/>
+                    <a:cs typeface="+mn-cs"/>
+                  </a:defRPr>
+                </a:lvl3pPr>
+                <a:lvl4pPr marL="1600200" indent="-228600" algn="l" defTabSz="914400" rtl="0" eaLnBrk="1" latinLnBrk="0" hangingPunct="1">
+                  <a:lnSpc>
+                    <a:spcPct val="90000"/>
+                  </a:lnSpc>
+                  <a:spcBef>
+                    <a:spcPts val="500"/>
+                  </a:spcBef>
+                  <a:buFont typeface="Arial" panose="020B0604020202020204" pitchFamily="34" charset="0"/>
+                  <a:buChar char="•"/>
+                  <a:defRPr sz="1800" kern="1200">
+                    <a:solidFill>
+                      <a:schemeClr val="tx1"/>
+                    </a:solidFill>
+                    <a:latin typeface="+mn-lt"/>
+                    <a:ea typeface="+mn-ea"/>
+                    <a:cs typeface="+mn-cs"/>
+                  </a:defRPr>
+                </a:lvl4pPr>
+                <a:lvl5pPr marL="2057400" indent="-228600" algn="l" defTabSz="914400" rtl="0" eaLnBrk="1" latinLnBrk="0" hangingPunct="1">
+                  <a:lnSpc>
+                    <a:spcPct val="90000"/>
+                  </a:lnSpc>
+                  <a:spcBef>
+                    <a:spcPts val="500"/>
+                  </a:spcBef>
+                  <a:buFont typeface="Arial" panose="020B0604020202020204" pitchFamily="34" charset="0"/>
+                  <a:buChar char="•"/>
+                  <a:defRPr sz="1800" kern="1200">
+                    <a:solidFill>
+                      <a:schemeClr val="tx1"/>
+                    </a:solidFill>
+                    <a:latin typeface="+mn-lt"/>
+                    <a:ea typeface="+mn-ea"/>
+                    <a:cs typeface="+mn-cs"/>
+                  </a:defRPr>
+                </a:lvl5pPr>
+                <a:lvl6pPr marL="2514600" indent="-228600" algn="l" defTabSz="914400" rtl="0" eaLnBrk="1" latinLnBrk="0" hangingPunct="1">
+                  <a:lnSpc>
+                    <a:spcPct val="90000"/>
+                  </a:lnSpc>
+                  <a:spcBef>
+                    <a:spcPts val="500"/>
+                  </a:spcBef>
+                  <a:buFont typeface="Arial" panose="020B0604020202020204" pitchFamily="34" charset="0"/>
+                  <a:buChar char="•"/>
+                  <a:defRPr sz="1800" kern="1200">
+                    <a:solidFill>
+                      <a:schemeClr val="tx1"/>
+                    </a:solidFill>
+                    <a:latin typeface="+mn-lt"/>
+                    <a:ea typeface="+mn-ea"/>
+                    <a:cs typeface="+mn-cs"/>
+                  </a:defRPr>
+                </a:lvl6pPr>
+                <a:lvl7pPr marL="2971800" indent="-228600" algn="l" defTabSz="914400" rtl="0" eaLnBrk="1" latinLnBrk="0" hangingPunct="1">
+                  <a:lnSpc>
+                    <a:spcPct val="90000"/>
+                  </a:lnSpc>
+                  <a:spcBef>
+                    <a:spcPts val="500"/>
+                  </a:spcBef>
+                  <a:buFont typeface="Arial" panose="020B0604020202020204" pitchFamily="34" charset="0"/>
+                  <a:buChar char="•"/>
+                  <a:defRPr sz="1800" kern="1200">
+                    <a:solidFill>
+                      <a:schemeClr val="tx1"/>
+                    </a:solidFill>
+                    <a:latin typeface="+mn-lt"/>
+                    <a:ea typeface="+mn-ea"/>
+                    <a:cs typeface="+mn-cs"/>
+                  </a:defRPr>
+                </a:lvl7pPr>
+                <a:lvl8pPr marL="3429000" indent="-228600" algn="l" defTabSz="914400" rtl="0" eaLnBrk="1" latinLnBrk="0" hangingPunct="1">
+                  <a:lnSpc>
+                    <a:spcPct val="90000"/>
+                  </a:lnSpc>
+                  <a:spcBef>
+                    <a:spcPts val="500"/>
+                  </a:spcBef>
+                  <a:buFont typeface="Arial" panose="020B0604020202020204" pitchFamily="34" charset="0"/>
+                  <a:buChar char="•"/>
+                  <a:defRPr sz="1800" kern="1200">
+                    <a:solidFill>
+                      <a:schemeClr val="tx1"/>
+                    </a:solidFill>
+                    <a:latin typeface="+mn-lt"/>
+                    <a:ea typeface="+mn-ea"/>
+                    <a:cs typeface="+mn-cs"/>
+                  </a:defRPr>
+                </a:lvl8pPr>
+                <a:lvl9pPr marL="3886200" indent="-228600" algn="l" defTabSz="914400" rtl="0" eaLnBrk="1" latinLnBrk="0" hangingPunct="1">
+                  <a:lnSpc>
+                    <a:spcPct val="90000"/>
+                  </a:lnSpc>
+                  <a:spcBef>
+                    <a:spcPts val="500"/>
+                  </a:spcBef>
+                  <a:buFont typeface="Arial" panose="020B0604020202020204" pitchFamily="34" charset="0"/>
+                  <a:buChar char="•"/>
+                  <a:defRPr sz="1800" kern="1200">
+                    <a:solidFill>
+                      <a:schemeClr val="tx1"/>
+                    </a:solidFill>
+                    <a:latin typeface="+mn-lt"/>
+                    <a:ea typeface="+mn-ea"/>
+                    <a:cs typeface="+mn-cs"/>
+                  </a:defRPr>
+                </a:lvl9pPr>
+              </a:lstStyle>
+              <a:p>
+                <a:pPr marL="0" indent="0">
+                  <a:buFont typeface="Arial" panose="020B0604020202020204" pitchFamily="34" charset="0"/>
+                  <a:buNone/>
+                </a:pPr>
+                <a14:m>
+                  <m:oMathPara xmlns:m="http://schemas.openxmlformats.org/officeDocument/2006/math">
+                    <m:oMathParaPr>
+                      <m:jc m:val="centerGroup"/>
+                    </m:oMathParaPr>
+                    <m:oMath xmlns:m="http://schemas.openxmlformats.org/officeDocument/2006/math">
+                      <m:sSubSup>
+                        <m:sSubSupPr>
+                          <m:ctrlPr>
+                            <a:rPr lang="en-US" sz="3000" i="1" smtClean="0">
+                              <a:latin typeface="Cambria Math" panose="02040503050406030204" pitchFamily="18" charset="0"/>
+                            </a:rPr>
+                          </m:ctrlPr>
+                        </m:sSubSupPr>
+                        <m:e>
+                          <m:r>
+                            <a:rPr lang="en-US" sz="3000" b="0" i="1" smtClean="0">
+                              <a:latin typeface="Cambria Math" panose="02040503050406030204" pitchFamily="18" charset="0"/>
+                            </a:rPr>
+                            <m:t>𝐸</m:t>
+                          </m:r>
+                        </m:e>
+                        <m:sub>
+                          <m:r>
+                            <a:rPr lang="en-US" sz="3000" i="1">
+                              <a:latin typeface="Cambria Math" panose="02040503050406030204" pitchFamily="18" charset="0"/>
+                            </a:rPr>
+                            <m:t>𝐺</m:t>
+                          </m:r>
+                        </m:sub>
+                        <m:sup>
+                          <m:r>
+                            <a:rPr lang="en-US" sz="3000" i="1">
+                              <a:latin typeface="Cambria Math" panose="02040503050406030204" pitchFamily="18" charset="0"/>
+                            </a:rPr>
+                            <m:t>(</m:t>
+                          </m:r>
+                          <m:r>
+                            <a:rPr lang="en-US" sz="3000" i="1">
+                              <a:latin typeface="Cambria Math" panose="02040503050406030204" pitchFamily="18" charset="0"/>
+                            </a:rPr>
+                            <m:t>𝑛</m:t>
+                          </m:r>
+                          <m:r>
+                            <a:rPr lang="en-US" sz="3000" i="1">
+                              <a:latin typeface="Cambria Math" panose="02040503050406030204" pitchFamily="18" charset="0"/>
+                            </a:rPr>
+                            <m:t>)</m:t>
+                          </m:r>
+                        </m:sup>
+                      </m:sSubSup>
+                      <m:d>
+                        <m:dPr>
+                          <m:ctrlPr>
+                            <a:rPr lang="en-US" sz="3000" i="1">
+                              <a:latin typeface="Cambria Math" panose="02040503050406030204" pitchFamily="18" charset="0"/>
+                            </a:rPr>
+                          </m:ctrlPr>
+                        </m:dPr>
+                        <m:e>
+                          <m:r>
+                            <a:rPr lang="en-US" sz="3000" i="1">
+                              <a:latin typeface="Cambria Math" panose="02040503050406030204" pitchFamily="18" charset="0"/>
+                            </a:rPr>
+                            <m:t>𝐹</m:t>
+                          </m:r>
+                        </m:e>
+                      </m:d>
+                      <m:r>
+                        <a:rPr lang="en-US" sz="3000" i="1">
+                          <a:latin typeface="Cambria Math" panose="02040503050406030204" pitchFamily="18" charset="0"/>
+                        </a:rPr>
+                        <m:t>=</m:t>
+                      </m:r>
+                      <m:sSubSup>
+                        <m:sSubSupPr>
+                          <m:ctrlPr>
+                            <a:rPr lang="en-US" sz="3000" i="1">
+                              <a:latin typeface="Cambria Math" panose="02040503050406030204" pitchFamily="18" charset="0"/>
+                            </a:rPr>
+                          </m:ctrlPr>
+                        </m:sSubSupPr>
+                        <m:e>
+                          <m:r>
+                            <a:rPr lang="en-US" sz="3000" b="0" i="1" smtClean="0">
+                              <a:latin typeface="Cambria Math" panose="02040503050406030204" pitchFamily="18" charset="0"/>
+                            </a:rPr>
+                            <m:t>𝐸</m:t>
+                          </m:r>
+                        </m:e>
+                        <m:sub>
+                          <m:r>
+                            <a:rPr lang="en-US" sz="3000" i="1">
+                              <a:latin typeface="Cambria Math" panose="02040503050406030204" pitchFamily="18" charset="0"/>
+                            </a:rPr>
+                            <m:t>𝐺</m:t>
+                          </m:r>
+                        </m:sub>
+                        <m:sup>
+                          <m:r>
+                            <a:rPr lang="en-US" sz="3000" i="1">
+                              <a:latin typeface="Cambria Math" panose="02040503050406030204" pitchFamily="18" charset="0"/>
+                            </a:rPr>
+                            <m:t>(1)</m:t>
+                          </m:r>
+                        </m:sup>
+                      </m:sSubSup>
+                      <m:d>
+                        <m:dPr>
+                          <m:begChr m:val="["/>
+                          <m:endChr m:val="]"/>
+                          <m:ctrlPr>
+                            <a:rPr lang="en-US" sz="3000" i="1">
+                              <a:latin typeface="Cambria Math" panose="02040503050406030204" pitchFamily="18" charset="0"/>
+                            </a:rPr>
+                          </m:ctrlPr>
+                        </m:dPr>
+                        <m:e>
+                          <m:sSubSup>
+                            <m:sSubSupPr>
+                              <m:ctrlPr>
+                                <a:rPr lang="en-US" sz="3000" i="1">
+                                  <a:latin typeface="Cambria Math" panose="02040503050406030204" pitchFamily="18" charset="0"/>
+                                </a:rPr>
+                              </m:ctrlPr>
+                            </m:sSubSupPr>
+                            <m:e>
+                              <m:r>
+                                <a:rPr lang="en-US" sz="3000" b="0" i="1" smtClean="0">
+                                  <a:latin typeface="Cambria Math" panose="02040503050406030204" pitchFamily="18" charset="0"/>
+                                </a:rPr>
+                                <m:t>𝐸</m:t>
+                              </m:r>
+                            </m:e>
+                            <m:sub>
+                              <m:r>
+                                <a:rPr lang="en-US" sz="3000" i="1">
+                                  <a:latin typeface="Cambria Math" panose="02040503050406030204" pitchFamily="18" charset="0"/>
+                                </a:rPr>
+                                <m:t>𝐺</m:t>
+                              </m:r>
+                            </m:sub>
+                            <m:sup>
+                              <m:r>
+                                <a:rPr lang="en-US" sz="3000" i="1">
+                                  <a:latin typeface="Cambria Math" panose="02040503050406030204" pitchFamily="18" charset="0"/>
+                                </a:rPr>
+                                <m:t>(</m:t>
+                              </m:r>
+                              <m:r>
+                                <a:rPr lang="en-US" sz="3000" i="1">
+                                  <a:latin typeface="Cambria Math" panose="02040503050406030204" pitchFamily="18" charset="0"/>
+                                </a:rPr>
+                                <m:t>𝑛</m:t>
+                              </m:r>
+                              <m:r>
+                                <a:rPr lang="en-US" sz="3000" i="1">
+                                  <a:latin typeface="Cambria Math" panose="02040503050406030204" pitchFamily="18" charset="0"/>
+                                </a:rPr>
+                                <m:t>−1)</m:t>
+                              </m:r>
+                            </m:sup>
+                          </m:sSubSup>
+                          <m:d>
+                            <m:dPr>
+                              <m:ctrlPr>
+                                <a:rPr lang="en-US" sz="3000" i="1">
+                                  <a:latin typeface="Cambria Math" panose="02040503050406030204" pitchFamily="18" charset="0"/>
+                                </a:rPr>
+                              </m:ctrlPr>
+                            </m:dPr>
+                            <m:e>
+                              <m:r>
+                                <a:rPr lang="en-US" sz="3000" i="1">
+                                  <a:latin typeface="Cambria Math" panose="02040503050406030204" pitchFamily="18" charset="0"/>
+                                </a:rPr>
+                                <m:t>𝐹</m:t>
+                              </m:r>
+                            </m:e>
+                          </m:d>
+                        </m:e>
+                      </m:d>
+                    </m:oMath>
+                  </m:oMathPara>
+                </a14:m>
+                <a:endParaRPr lang="en-US" dirty="0"/>
+              </a:p>
+            </p:txBody>
+          </p:sp>
+        </mc:Choice>
+        <mc:Fallback>
+          <p:sp>
+            <p:nvSpPr>
+              <p:cNvPr id="8" name="Content Placeholder 2"/>
+              <p:cNvSpPr txBox="1">
+                <a:spLocks noRot="1" noChangeAspect="1" noMove="1" noResize="1" noEditPoints="1" noAdjustHandles="1" noChangeArrowheads="1" noChangeShapeType="1" noTextEdit="1"/>
+              </p:cNvSpPr>
+              <p:nvPr/>
+            </p:nvSpPr>
+            <p:spPr>
+              <a:xfrm>
+                <a:off x="7518390" y="5732373"/>
+                <a:ext cx="4341254" cy="739417"/>
+              </a:xfrm>
+              <a:prstGeom prst="rect">
+                <a:avLst/>
+              </a:prstGeom>
+              <a:blipFill rotWithShape="0">
+                <a:blip r:embed="rId4"/>
+                <a:stretch>
+                  <a:fillRect/>
+                </a:stretch>
+              </a:blipFill>
+            </p:spPr>
+            <p:txBody>
+              <a:bodyPr/>
+              <a:lstStyle/>
+              <a:p>
+                <a:r>
+                  <a:rPr lang="en-US">
+                    <a:noFill/>
+                  </a:rPr>
+                  <a:t> </a:t>
+                </a:r>
+              </a:p>
+            </p:txBody>
+          </p:sp>
+        </mc:Fallback>
+      </mc:AlternateContent>
+      <p:grpSp>
+        <p:nvGrpSpPr>
+          <p:cNvPr id="31" name="Group 30"/>
+          <p:cNvGrpSpPr/>
+          <p:nvPr/>
+        </p:nvGrpSpPr>
+        <p:grpSpPr>
+          <a:xfrm>
+            <a:off x="1351051" y="1600200"/>
+            <a:ext cx="2169174" cy="2536233"/>
+            <a:chOff x="1351051" y="1600200"/>
+            <a:chExt cx="2169174" cy="2536233"/>
+          </a:xfrm>
+        </p:grpSpPr>
+        <p:pic>
+          <p:nvPicPr>
+            <p:cNvPr id="5" name="Picture 4"/>
+            <p:cNvPicPr>
+              <a:picLocks noChangeAspect="1"/>
+            </p:cNvPicPr>
+            <p:nvPr/>
+          </p:nvPicPr>
+          <p:blipFill>
+            <a:blip r:embed="rId5">
+              <a:extLst>
+                <a:ext uri="{28A0092B-C50C-407E-A947-70E740481C1C}">
+                  <a14:useLocalDpi xmlns:a14="http://schemas.microsoft.com/office/drawing/2010/main" val="0"/>
+                </a:ext>
+              </a:extLst>
+            </a:blip>
+            <a:stretch>
+              <a:fillRect/>
+            </a:stretch>
+          </p:blipFill>
+          <p:spPr>
+            <a:xfrm>
+              <a:off x="1351051" y="1967259"/>
+              <a:ext cx="2169174" cy="2169174"/>
+            </a:xfrm>
+            <a:prstGeom prst="rect">
+              <a:avLst/>
+            </a:prstGeom>
+          </p:spPr>
+        </p:pic>
+        <p:sp>
+          <p:nvSpPr>
+            <p:cNvPr id="18" name="TextBox 17"/>
+            <p:cNvSpPr txBox="1"/>
+            <p:nvPr/>
+          </p:nvSpPr>
+          <p:spPr>
+            <a:xfrm>
+              <a:off x="1351051" y="1600200"/>
+              <a:ext cx="2169174" cy="367059"/>
+            </a:xfrm>
+            <a:prstGeom prst="rect">
+              <a:avLst/>
+            </a:prstGeom>
+            <a:noFill/>
+          </p:spPr>
+          <p:txBody>
+            <a:bodyPr wrap="square" rtlCol="0">
+              <a:spAutoFit/>
+            </a:bodyPr>
+            <a:lstStyle/>
+            <a:p>
+              <a:r>
+                <a:rPr lang="en-US" dirty="0" smtClean="0">
+                  <a:latin typeface="Times New Roman" panose="02020603050405020304" pitchFamily="18" charset="0"/>
+                  <a:cs typeface="Times New Roman" panose="02020603050405020304" pitchFamily="18" charset="0"/>
+                </a:rPr>
+                <a:t>Marker - F</a:t>
+              </a:r>
+              <a:endParaRPr lang="en-US" dirty="0">
+                <a:latin typeface="Times New Roman" panose="02020603050405020304" pitchFamily="18" charset="0"/>
+                <a:cs typeface="Times New Roman" panose="02020603050405020304" pitchFamily="18" charset="0"/>
+              </a:endParaRPr>
+            </a:p>
+          </p:txBody>
+        </p:sp>
+      </p:grpSp>
+      <p:grpSp>
+        <p:nvGrpSpPr>
+          <p:cNvPr id="32" name="Group 31"/>
+          <p:cNvGrpSpPr/>
+          <p:nvPr/>
+        </p:nvGrpSpPr>
+        <p:grpSpPr>
+          <a:xfrm>
+            <a:off x="1351051" y="4302616"/>
+            <a:ext cx="2169174" cy="2518886"/>
+            <a:chOff x="1351051" y="4302616"/>
+            <a:chExt cx="2169174" cy="2518886"/>
+          </a:xfrm>
+        </p:grpSpPr>
+        <p:pic>
+          <p:nvPicPr>
+            <p:cNvPr id="7" name="Picture 6"/>
+            <p:cNvPicPr>
+              <a:picLocks noChangeAspect="1"/>
+            </p:cNvPicPr>
+            <p:nvPr/>
+          </p:nvPicPr>
+          <p:blipFill>
+            <a:blip r:embed="rId6">
+              <a:extLst>
+                <a:ext uri="{28A0092B-C50C-407E-A947-70E740481C1C}">
+                  <a14:useLocalDpi xmlns:a14="http://schemas.microsoft.com/office/drawing/2010/main" val="0"/>
+                </a:ext>
+              </a:extLst>
+            </a:blip>
+            <a:stretch>
+              <a:fillRect/>
+            </a:stretch>
+          </p:blipFill>
+          <p:spPr>
+            <a:xfrm>
+              <a:off x="1351051" y="4302616"/>
+              <a:ext cx="2169174" cy="2169174"/>
+            </a:xfrm>
+            <a:prstGeom prst="rect">
+              <a:avLst/>
+            </a:prstGeom>
+          </p:spPr>
+        </p:pic>
+        <p:sp>
+          <p:nvSpPr>
+            <p:cNvPr id="20" name="TextBox 19"/>
+            <p:cNvSpPr txBox="1"/>
+            <p:nvPr/>
+          </p:nvSpPr>
+          <p:spPr>
+            <a:xfrm>
+              <a:off x="1351051" y="6454443"/>
+              <a:ext cx="2169174" cy="367059"/>
+            </a:xfrm>
+            <a:prstGeom prst="rect">
+              <a:avLst/>
+            </a:prstGeom>
+            <a:noFill/>
+          </p:spPr>
+          <p:txBody>
+            <a:bodyPr wrap="square" rtlCol="0">
+              <a:spAutoFit/>
+            </a:bodyPr>
+            <a:lstStyle/>
+            <a:p>
+              <a:r>
+                <a:rPr lang="en-US" dirty="0" smtClean="0">
+                  <a:latin typeface="Times New Roman" panose="02020603050405020304" pitchFamily="18" charset="0"/>
+                  <a:cs typeface="Times New Roman" panose="02020603050405020304" pitchFamily="18" charset="0"/>
+                </a:rPr>
+                <a:t>Mask - G</a:t>
+              </a:r>
+              <a:endParaRPr lang="en-US" dirty="0">
+                <a:latin typeface="Times New Roman" panose="02020603050405020304" pitchFamily="18" charset="0"/>
+                <a:cs typeface="Times New Roman" panose="02020603050405020304" pitchFamily="18" charset="0"/>
+              </a:endParaRPr>
+            </a:p>
+          </p:txBody>
+        </p:sp>
+      </p:grpSp>
+      <p:grpSp>
+        <p:nvGrpSpPr>
+          <p:cNvPr id="22" name="Group 21"/>
+          <p:cNvGrpSpPr/>
+          <p:nvPr/>
+        </p:nvGrpSpPr>
+        <p:grpSpPr>
+          <a:xfrm>
+            <a:off x="3520225" y="2682514"/>
+            <a:ext cx="1501211" cy="369332"/>
+            <a:chOff x="3520225" y="2682514"/>
+            <a:chExt cx="1501211" cy="369332"/>
+          </a:xfrm>
+        </p:grpSpPr>
+        <p:cxnSp>
+          <p:nvCxnSpPr>
+            <p:cNvPr id="15" name="Straight Arrow Connector 14"/>
+            <p:cNvCxnSpPr/>
+            <p:nvPr/>
+          </p:nvCxnSpPr>
+          <p:spPr>
+            <a:xfrm>
+              <a:off x="3633157" y="3051846"/>
+              <a:ext cx="1275348" cy="0"/>
+            </a:xfrm>
+            <a:prstGeom prst="straightConnector1">
+              <a:avLst/>
+            </a:prstGeom>
+            <a:ln>
+              <a:tailEnd type="triangle"/>
+            </a:ln>
+          </p:spPr>
+          <p:style>
+            <a:lnRef idx="3">
+              <a:schemeClr val="dk1"/>
+            </a:lnRef>
+            <a:fillRef idx="0">
+              <a:schemeClr val="dk1"/>
+            </a:fillRef>
+            <a:effectRef idx="2">
+              <a:schemeClr val="dk1"/>
+            </a:effectRef>
+            <a:fontRef idx="minor">
+              <a:schemeClr val="tx1"/>
+            </a:fontRef>
+          </p:style>
+        </p:cxnSp>
+        <p:sp>
+          <p:nvSpPr>
+            <p:cNvPr id="21" name="Rectangle 20"/>
+            <p:cNvSpPr/>
+            <p:nvPr/>
+          </p:nvSpPr>
+          <p:spPr>
+            <a:xfrm>
+              <a:off x="3520225" y="2682514"/>
+              <a:ext cx="1501211" cy="369332"/>
+            </a:xfrm>
+            <a:prstGeom prst="rect">
+              <a:avLst/>
+            </a:prstGeom>
+          </p:spPr>
+          <p:txBody>
+            <a:bodyPr wrap="square">
+              <a:spAutoFit/>
+            </a:bodyPr>
+            <a:lstStyle/>
+            <a:p>
+              <a:pPr algn="ctr"/>
+              <a:r>
+                <a:rPr lang="en-US" dirty="0" smtClean="0">
+                  <a:latin typeface="Times New Roman" panose="02020603050405020304" pitchFamily="18" charset="0"/>
+                  <a:cs typeface="Times New Roman" panose="02020603050405020304" pitchFamily="18" charset="0"/>
+                </a:rPr>
+                <a:t>Erode</a:t>
+              </a:r>
+              <a:endParaRPr lang="en-US" dirty="0">
+                <a:latin typeface="Times New Roman" panose="02020603050405020304" pitchFamily="18" charset="0"/>
+                <a:cs typeface="Times New Roman" panose="02020603050405020304" pitchFamily="18" charset="0"/>
+              </a:endParaRPr>
+            </a:p>
+          </p:txBody>
+        </p:sp>
+      </p:grpSp>
+      <p:grpSp>
+        <p:nvGrpSpPr>
+          <p:cNvPr id="44" name="Group 43"/>
+          <p:cNvGrpSpPr/>
+          <p:nvPr/>
+        </p:nvGrpSpPr>
+        <p:grpSpPr>
+          <a:xfrm>
+            <a:off x="8691821" y="1967259"/>
+            <a:ext cx="2169174" cy="2610385"/>
+            <a:chOff x="8691821" y="1967259"/>
+            <a:chExt cx="2169174" cy="2610385"/>
+          </a:xfrm>
+        </p:grpSpPr>
+        <p:pic>
+          <p:nvPicPr>
+            <p:cNvPr id="6" name="Picture 5"/>
+            <p:cNvPicPr>
+              <a:picLocks noChangeAspect="1"/>
+            </p:cNvPicPr>
+            <p:nvPr/>
+          </p:nvPicPr>
+          <p:blipFill>
+            <a:blip r:embed="rId7">
+              <a:extLst>
+                <a:ext uri="{28A0092B-C50C-407E-A947-70E740481C1C}">
+                  <a14:useLocalDpi xmlns:a14="http://schemas.microsoft.com/office/drawing/2010/main" val="0"/>
+                </a:ext>
+              </a:extLst>
+            </a:blip>
+            <a:stretch>
+              <a:fillRect/>
+            </a:stretch>
+          </p:blipFill>
+          <p:spPr>
+            <a:xfrm>
+              <a:off x="8691821" y="1967259"/>
+              <a:ext cx="2169174" cy="2169174"/>
+            </a:xfrm>
+            <a:prstGeom prst="rect">
+              <a:avLst/>
+            </a:prstGeom>
+          </p:spPr>
+        </p:pic>
+        <mc:AlternateContent xmlns:mc="http://schemas.openxmlformats.org/markup-compatibility/2006">
+          <mc:Choice xmlns:a14="http://schemas.microsoft.com/office/drawing/2010/main" Requires="a14">
+            <p:sp>
+              <p:nvSpPr>
+                <p:cNvPr id="33" name="TextBox 32"/>
+                <p:cNvSpPr txBox="1"/>
+                <p:nvPr/>
+              </p:nvSpPr>
+              <p:spPr>
+                <a:xfrm>
+                  <a:off x="8691821" y="4136433"/>
+                  <a:ext cx="2169174" cy="441211"/>
+                </a:xfrm>
+                <a:prstGeom prst="rect">
+                  <a:avLst/>
+                </a:prstGeom>
+                <a:noFill/>
+              </p:spPr>
+              <p:txBody>
+                <a:bodyPr wrap="square" rtlCol="0">
+                  <a:spAutoFit/>
+                </a:bodyPr>
+                <a:lstStyle/>
+                <a:p>
+                  <a14:m>
+                    <m:oMathPara xmlns:m="http://schemas.openxmlformats.org/officeDocument/2006/math">
+                      <m:oMathParaPr>
+                        <m:jc m:val="centerGroup"/>
+                      </m:oMathParaPr>
+                      <m:oMath xmlns:m="http://schemas.openxmlformats.org/officeDocument/2006/math">
+                        <m:sSubSup>
+                          <m:sSubSupPr>
+                            <m:ctrlPr>
+                              <a:rPr lang="en-US" i="1" smtClean="0">
+                                <a:latin typeface="Cambria Math" panose="02040503050406030204" pitchFamily="18" charset="0"/>
+                              </a:rPr>
+                            </m:ctrlPr>
+                          </m:sSubSupPr>
+                          <m:e>
+                            <m:r>
+                              <a:rPr lang="en-US" b="0" i="1" smtClean="0">
+                                <a:latin typeface="Cambria Math" panose="02040503050406030204" pitchFamily="18" charset="0"/>
+                              </a:rPr>
+                              <m:t>𝐸</m:t>
+                            </m:r>
+                          </m:e>
+                          <m:sub>
+                            <m:r>
+                              <a:rPr lang="en-US" i="1">
+                                <a:latin typeface="Cambria Math" panose="02040503050406030204" pitchFamily="18" charset="0"/>
+                              </a:rPr>
+                              <m:t>𝐺</m:t>
+                            </m:r>
+                          </m:sub>
+                          <m:sup>
+                            <m:r>
+                              <a:rPr lang="en-US" i="1">
+                                <a:latin typeface="Cambria Math" panose="02040503050406030204" pitchFamily="18" charset="0"/>
+                              </a:rPr>
+                              <m:t>(1)</m:t>
+                            </m:r>
+                          </m:sup>
+                        </m:sSubSup>
+                        <m:d>
+                          <m:dPr>
+                            <m:ctrlPr>
+                              <a:rPr lang="en-US" i="1" smtClean="0">
+                                <a:latin typeface="Cambria Math" panose="02040503050406030204" pitchFamily="18" charset="0"/>
+                              </a:rPr>
+                            </m:ctrlPr>
+                          </m:dPr>
+                          <m:e>
+                            <m:r>
+                              <a:rPr lang="en-US" b="0" i="1" smtClean="0">
+                                <a:latin typeface="Cambria Math" panose="02040503050406030204" pitchFamily="18" charset="0"/>
+                              </a:rPr>
+                              <m:t>𝐹</m:t>
+                            </m:r>
+                          </m:e>
+                        </m:d>
+                      </m:oMath>
+                    </m:oMathPara>
+                  </a14:m>
+                  <a:endParaRPr lang="en-US" dirty="0"/>
+                </a:p>
+              </p:txBody>
+            </p:sp>
+          </mc:Choice>
+          <mc:Fallback>
+            <p:sp>
+              <p:nvSpPr>
+                <p:cNvPr id="33" name="TextBox 32"/>
+                <p:cNvSpPr txBox="1">
+                  <a:spLocks noRot="1" noChangeAspect="1" noMove="1" noResize="1" noEditPoints="1" noAdjustHandles="1" noChangeArrowheads="1" noChangeShapeType="1" noTextEdit="1"/>
+                </p:cNvSpPr>
+                <p:nvPr/>
+              </p:nvSpPr>
+              <p:spPr>
+                <a:xfrm>
+                  <a:off x="8691821" y="4136433"/>
+                  <a:ext cx="2169174" cy="441211"/>
+                </a:xfrm>
+                <a:prstGeom prst="rect">
+                  <a:avLst/>
+                </a:prstGeom>
+                <a:blipFill rotWithShape="0">
+                  <a:blip r:embed="rId8"/>
+                  <a:stretch>
+                    <a:fillRect b="-2778"/>
+                  </a:stretch>
+                </a:blipFill>
+              </p:spPr>
+              <p:txBody>
+                <a:bodyPr/>
+                <a:lstStyle/>
+                <a:p>
+                  <a:r>
+                    <a:rPr lang="en-US">
+                      <a:noFill/>
+                    </a:rPr>
+                    <a:t> </a:t>
+                  </a:r>
+                </a:p>
+              </p:txBody>
+            </p:sp>
+          </mc:Fallback>
+        </mc:AlternateContent>
+      </p:grpSp>
+      <p:grpSp>
+        <p:nvGrpSpPr>
+          <p:cNvPr id="48" name="Group 47"/>
+          <p:cNvGrpSpPr/>
+          <p:nvPr/>
+        </p:nvGrpSpPr>
+        <p:grpSpPr>
+          <a:xfrm>
+            <a:off x="3633157" y="2867180"/>
+            <a:ext cx="4505388" cy="2515482"/>
+            <a:chOff x="3633157" y="2867180"/>
+            <a:chExt cx="4505388" cy="2515482"/>
+          </a:xfrm>
+        </p:grpSpPr>
+        <p:cxnSp>
+          <p:nvCxnSpPr>
+            <p:cNvPr id="23" name="Straight Arrow Connector 22"/>
+            <p:cNvCxnSpPr/>
+            <p:nvPr/>
+          </p:nvCxnSpPr>
+          <p:spPr>
+            <a:xfrm>
+              <a:off x="7241306" y="3051846"/>
+              <a:ext cx="451884" cy="0"/>
+            </a:xfrm>
+            <a:prstGeom prst="straightConnector1">
+              <a:avLst/>
+            </a:prstGeom>
+            <a:ln>
+              <a:tailEnd type="triangle"/>
+            </a:ln>
+          </p:spPr>
+          <p:style>
+            <a:lnRef idx="3">
+              <a:schemeClr val="dk1"/>
+            </a:lnRef>
+            <a:fillRef idx="0">
+              <a:schemeClr val="dk1"/>
+            </a:fillRef>
+            <a:effectRef idx="2">
+              <a:schemeClr val="dk1"/>
+            </a:effectRef>
+            <a:fontRef idx="minor">
+              <a:schemeClr val="tx1"/>
+            </a:fontRef>
+          </p:style>
+        </p:cxnSp>
+        <mc:AlternateContent xmlns:mc="http://schemas.openxmlformats.org/markup-compatibility/2006">
+          <mc:Choice xmlns:a14="http://schemas.microsoft.com/office/drawing/2010/main" Requires="a14">
+            <p:sp>
+              <p:nvSpPr>
+                <p:cNvPr id="26" name="Rectangle 25"/>
+                <p:cNvSpPr/>
+                <p:nvPr/>
+              </p:nvSpPr>
+              <p:spPr>
+                <a:xfrm>
+                  <a:off x="7743886" y="2867180"/>
+                  <a:ext cx="394659" cy="369332"/>
+                </a:xfrm>
+                <a:prstGeom prst="rect">
+                  <a:avLst/>
+                </a:prstGeom>
+                <a:ln>
+                  <a:solidFill>
+                    <a:schemeClr val="tx1"/>
+                  </a:solidFill>
+                </a:ln>
+              </p:spPr>
+              <p:txBody>
+                <a:bodyPr wrap="none">
+                  <a:spAutoFit/>
+                </a:bodyPr>
+                <a:lstStyle/>
+                <a:p>
+                  <a14:m>
+                    <m:oMathPara xmlns:m="http://schemas.openxmlformats.org/officeDocument/2006/math">
+                      <m:oMathParaPr>
+                        <m:jc m:val="centerGroup"/>
+                      </m:oMathParaPr>
+                      <m:oMath xmlns:m="http://schemas.openxmlformats.org/officeDocument/2006/math">
+                        <m:r>
+                          <a:rPr lang="en-US" b="0" i="1" smtClean="0">
+                            <a:latin typeface="Cambria Math" panose="02040503050406030204" pitchFamily="18" charset="0"/>
+                            <a:ea typeface="Cambria Math" panose="02040503050406030204" pitchFamily="18" charset="0"/>
+                          </a:rPr>
+                          <m:t>∪</m:t>
+                        </m:r>
+                      </m:oMath>
+                    </m:oMathPara>
+                  </a14:m>
+                  <a:endParaRPr lang="en-US" dirty="0"/>
+                </a:p>
+              </p:txBody>
+            </p:sp>
+          </mc:Choice>
+          <mc:Fallback>
+            <p:sp>
+              <p:nvSpPr>
+                <p:cNvPr id="26" name="Rectangle 25"/>
+                <p:cNvSpPr>
+                  <a:spLocks noRot="1" noChangeAspect="1" noMove="1" noResize="1" noEditPoints="1" noAdjustHandles="1" noChangeArrowheads="1" noChangeShapeType="1" noTextEdit="1"/>
+                </p:cNvSpPr>
+                <p:nvPr/>
+              </p:nvSpPr>
+              <p:spPr>
+                <a:xfrm>
+                  <a:off x="7743886" y="2867180"/>
+                  <a:ext cx="394659" cy="369332"/>
+                </a:xfrm>
+                <a:prstGeom prst="rect">
+                  <a:avLst/>
+                </a:prstGeom>
+                <a:blipFill rotWithShape="0">
+                  <a:blip r:embed="rId9"/>
+                  <a:stretch>
+                    <a:fillRect/>
+                  </a:stretch>
+                </a:blipFill>
+                <a:ln>
+                  <a:solidFill>
+                    <a:schemeClr val="tx1"/>
+                  </a:solidFill>
+                </a:ln>
+              </p:spPr>
+              <p:txBody>
+                <a:bodyPr/>
+                <a:lstStyle/>
+                <a:p>
+                  <a:r>
+                    <a:rPr lang="en-US">
+                      <a:noFill/>
+                    </a:rPr>
+                    <a:t> </a:t>
+                  </a:r>
+                </a:p>
+              </p:txBody>
+            </p:sp>
+          </mc:Fallback>
+        </mc:AlternateContent>
+        <p:cxnSp>
+          <p:nvCxnSpPr>
+            <p:cNvPr id="28" name="Elbow Connector 27"/>
+            <p:cNvCxnSpPr/>
+            <p:nvPr/>
+          </p:nvCxnSpPr>
+          <p:spPr>
+            <a:xfrm flipV="1">
+              <a:off x="3633157" y="3295650"/>
+              <a:ext cx="4310693" cy="2087012"/>
+            </a:xfrm>
+            <a:prstGeom prst="bentConnector3">
+              <a:avLst>
+                <a:gd name="adj1" fmla="val 100084"/>
+              </a:avLst>
+            </a:prstGeom>
+            <a:ln>
+              <a:tailEnd type="triangle"/>
+            </a:ln>
+          </p:spPr>
+          <p:style>
+            <a:lnRef idx="3">
+              <a:schemeClr val="dk1"/>
+            </a:lnRef>
+            <a:fillRef idx="0">
+              <a:schemeClr val="dk1"/>
+            </a:fillRef>
+            <a:effectRef idx="2">
+              <a:schemeClr val="dk1"/>
+            </a:effectRef>
+            <a:fontRef idx="minor">
+              <a:schemeClr val="tx1"/>
+            </a:fontRef>
+          </p:style>
+        </p:cxnSp>
+      </p:grpSp>
+      <p:cxnSp>
+        <p:nvCxnSpPr>
+          <p:cNvPr id="40" name="Straight Arrow Connector 39"/>
+          <p:cNvCxnSpPr/>
+          <p:nvPr/>
+        </p:nvCxnSpPr>
+        <p:spPr>
+          <a:xfrm>
+            <a:off x="8189241" y="3051846"/>
+            <a:ext cx="451884" cy="0"/>
+          </a:xfrm>
+          <a:prstGeom prst="straightConnector1">
+            <a:avLst/>
+          </a:prstGeom>
+          <a:ln>
+            <a:tailEnd type="triangle"/>
+          </a:ln>
+        </p:spPr>
+        <p:style>
+          <a:lnRef idx="3">
+            <a:schemeClr val="dk1"/>
+          </a:lnRef>
+          <a:fillRef idx="0">
+            <a:schemeClr val="dk1"/>
+          </a:fillRef>
+          <a:effectRef idx="2">
+            <a:schemeClr val="dk1"/>
+          </a:effectRef>
+          <a:fontRef idx="minor">
+            <a:schemeClr val="tx1"/>
+          </a:fontRef>
+        </p:style>
+      </p:cxnSp>
+    </p:spTree>
+    <p:extLst>
+      <p:ext uri="{BB962C8B-B14F-4D97-AF65-F5344CB8AC3E}">
+        <p14:creationId xmlns:p14="http://schemas.microsoft.com/office/powerpoint/2010/main" val="611084718"/>
+      </p:ext>
+    </p:extLst>
+  </p:cSld>
+  <p:clrMapOvr>
+    <a:masterClrMapping/>
+  </p:clrMapOvr>
+  <p:timing>
+    <p:tnLst>
+      <p:par>
+        <p:cTn id="1" dur="indefinite" restart="never" nodeType="tmRoot">
+          <p:childTnLst>
+            <p:seq concurrent="1" nextAc="seek">
+              <p:cTn id="2" dur="indefinite" nodeType="mainSeq">
+                <p:childTnLst>
+                  <p:par>
+                    <p:cTn id="3" fill="hold">
+                      <p:stCondLst>
+                        <p:cond delay="indefinite"/>
+                      </p:stCondLst>
+                      <p:childTnLst>
+                        <p:par>
+                          <p:cTn id="4" fill="hold">
+                            <p:stCondLst>
+                              <p:cond delay="0"/>
+                            </p:stCondLst>
+                            <p:childTnLst>
+                              <p:par>
+                                <p:cTn id="5" presetID="1" presetClass="entr" presetSubtype="0" fill="hold" nodeType="clickEffect">
+                                  <p:stCondLst>
+                                    <p:cond delay="0"/>
+                                  </p:stCondLst>
+                                  <p:childTnLst>
+                                    <p:set>
+                                      <p:cBhvr>
+                                        <p:cTn id="6" dur="1" fill="hold">
+                                          <p:stCondLst>
+                                            <p:cond delay="0"/>
+                                          </p:stCondLst>
+                                        </p:cTn>
+                                        <p:tgtEl>
+                                          <p:spTgt spid="31"/>
+                                        </p:tgtEl>
+                                        <p:attrNameLst>
+                                          <p:attrName>style.visibility</p:attrName>
+                                        </p:attrNameLst>
+                                      </p:cBhvr>
+                                      <p:to>
+                                        <p:strVal val="visible"/>
+                                      </p:to>
+                                    </p:set>
+                                  </p:childTnLst>
+                                </p:cTn>
+                              </p:par>
+                              <p:par>
+                                <p:cTn id="7" presetID="1" presetClass="entr" presetSubtype="0" fill="hold" nodeType="withEffect">
+                                  <p:stCondLst>
+                                    <p:cond delay="0"/>
+                                  </p:stCondLst>
+                                  <p:childTnLst>
+                                    <p:set>
+                                      <p:cBhvr>
+                                        <p:cTn id="8" dur="1" fill="hold">
+                                          <p:stCondLst>
+                                            <p:cond delay="0"/>
+                                          </p:stCondLst>
+                                        </p:cTn>
+                                        <p:tgtEl>
+                                          <p:spTgt spid="32"/>
+                                        </p:tgtEl>
+                                        <p:attrNameLst>
+                                          <p:attrName>style.visibility</p:attrName>
+                                        </p:attrNameLst>
+                                      </p:cBhvr>
+                                      <p:to>
+                                        <p:strVal val="visible"/>
+                                      </p:to>
+                                    </p:set>
+                                  </p:childTnLst>
+                                </p:cTn>
+                              </p:par>
+                            </p:childTnLst>
+                          </p:cTn>
+                        </p:par>
+                      </p:childTnLst>
+                    </p:cTn>
+                  </p:par>
+                  <p:par>
+                    <p:cTn id="9" fill="hold">
+                      <p:stCondLst>
+                        <p:cond delay="indefinite"/>
+                      </p:stCondLst>
+                      <p:childTnLst>
+                        <p:par>
+                          <p:cTn id="10" fill="hold">
+                            <p:stCondLst>
+                              <p:cond delay="0"/>
+                            </p:stCondLst>
+                            <p:childTnLst>
+                              <p:par>
+                                <p:cTn id="11" presetID="1" presetClass="entr" presetSubtype="0" fill="hold" nodeType="clickEffect">
+                                  <p:stCondLst>
+                                    <p:cond delay="0"/>
+                                  </p:stCondLst>
+                                  <p:childTnLst>
+                                    <p:set>
+                                      <p:cBhvr>
+                                        <p:cTn id="12" dur="1" fill="hold">
+                                          <p:stCondLst>
+                                            <p:cond delay="0"/>
+                                          </p:stCondLst>
+                                        </p:cTn>
+                                        <p:tgtEl>
+                                          <p:spTgt spid="22"/>
+                                        </p:tgtEl>
+                                        <p:attrNameLst>
+                                          <p:attrName>style.visibility</p:attrName>
+                                        </p:attrNameLst>
+                                      </p:cBhvr>
+                                      <p:to>
+                                        <p:strVal val="visible"/>
+                                      </p:to>
+                                    </p:set>
+                                  </p:childTnLst>
+                                </p:cTn>
+                              </p:par>
+                              <p:par>
+                                <p:cTn id="13" presetID="1" presetClass="entr" presetSubtype="0" fill="hold" nodeType="withEffect">
+                                  <p:stCondLst>
+                                    <p:cond delay="0"/>
+                                  </p:stCondLst>
+                                  <p:childTnLst>
+                                    <p:set>
+                                      <p:cBhvr>
+                                        <p:cTn id="14" dur="1" fill="hold">
+                                          <p:stCondLst>
+                                            <p:cond delay="0"/>
+                                          </p:stCondLst>
+                                        </p:cTn>
+                                        <p:tgtEl>
+                                          <p:spTgt spid="4"/>
+                                        </p:tgtEl>
+                                        <p:attrNameLst>
+                                          <p:attrName>style.visibility</p:attrName>
+                                        </p:attrNameLst>
+                                      </p:cBhvr>
+                                      <p:to>
+                                        <p:strVal val="visible"/>
+                                      </p:to>
+                                    </p:set>
+                                  </p:childTnLst>
+                                </p:cTn>
+                              </p:par>
+                            </p:childTnLst>
+                          </p:cTn>
+                        </p:par>
+                      </p:childTnLst>
+                    </p:cTn>
+                  </p:par>
+                  <p:par>
+                    <p:cTn id="15" fill="hold">
+                      <p:stCondLst>
+                        <p:cond delay="indefinite"/>
+                      </p:stCondLst>
+                      <p:childTnLst>
+                        <p:par>
+                          <p:cTn id="16" fill="hold">
+                            <p:stCondLst>
+                              <p:cond delay="0"/>
+                            </p:stCondLst>
+                            <p:childTnLst>
+                              <p:par>
+                                <p:cTn id="17" presetID="1" presetClass="entr" presetSubtype="0" fill="hold" nodeType="clickEffect">
+                                  <p:stCondLst>
+                                    <p:cond delay="0"/>
+                                  </p:stCondLst>
+                                  <p:childTnLst>
+                                    <p:set>
+                                      <p:cBhvr>
+                                        <p:cTn id="18" dur="1" fill="hold">
+                                          <p:stCondLst>
+                                            <p:cond delay="0"/>
+                                          </p:stCondLst>
+                                        </p:cTn>
+                                        <p:tgtEl>
+                                          <p:spTgt spid="48"/>
+                                        </p:tgtEl>
+                                        <p:attrNameLst>
+                                          <p:attrName>style.visibility</p:attrName>
+                                        </p:attrNameLst>
+                                      </p:cBhvr>
+                                      <p:to>
+                                        <p:strVal val="visible"/>
+                                      </p:to>
+                                    </p:set>
+                                  </p:childTnLst>
+                                </p:cTn>
+                              </p:par>
+                            </p:childTnLst>
+                          </p:cTn>
+                        </p:par>
+                      </p:childTnLst>
+                    </p:cTn>
+                  </p:par>
+                  <p:par>
+                    <p:cTn id="19" fill="hold">
+                      <p:stCondLst>
+                        <p:cond delay="indefinite"/>
+                      </p:stCondLst>
+                      <p:childTnLst>
+                        <p:par>
+                          <p:cTn id="20" fill="hold">
+                            <p:stCondLst>
+                              <p:cond delay="0"/>
+                            </p:stCondLst>
+                            <p:childTnLst>
+                              <p:par>
+                                <p:cTn id="21" presetID="1" presetClass="entr" presetSubtype="0" fill="hold" nodeType="clickEffect">
+                                  <p:stCondLst>
+                                    <p:cond delay="0"/>
+                                  </p:stCondLst>
+                                  <p:childTnLst>
+                                    <p:set>
+                                      <p:cBhvr>
+                                        <p:cTn id="22" dur="1" fill="hold">
+                                          <p:stCondLst>
+                                            <p:cond delay="0"/>
+                                          </p:stCondLst>
+                                        </p:cTn>
+                                        <p:tgtEl>
+                                          <p:spTgt spid="44"/>
+                                        </p:tgtEl>
+                                        <p:attrNameLst>
+                                          <p:attrName>style.visibility</p:attrName>
+                                        </p:attrNameLst>
+                                      </p:cBhvr>
+                                      <p:to>
+                                        <p:strVal val="visible"/>
+                                      </p:to>
+                                    </p:set>
+                                  </p:childTnLst>
+                                </p:cTn>
+                              </p:par>
+                              <p:par>
+                                <p:cTn id="23" presetID="1" presetClass="entr" presetSubtype="0" fill="hold" nodeType="withEffect">
+                                  <p:stCondLst>
+                                    <p:cond delay="0"/>
+                                  </p:stCondLst>
+                                  <p:childTnLst>
+                                    <p:set>
+                                      <p:cBhvr>
+                                        <p:cTn id="24" dur="1" fill="hold">
+                                          <p:stCondLst>
+                                            <p:cond delay="0"/>
+                                          </p:stCondLst>
+                                        </p:cTn>
+                                        <p:tgtEl>
+                                          <p:spTgt spid="40"/>
+                                        </p:tgtEl>
+                                        <p:attrNameLst>
+                                          <p:attrName>style.visibility</p:attrName>
+                                        </p:attrNameLst>
+                                      </p:cBhvr>
+                                      <p:to>
+                                        <p:strVal val="visible"/>
+                                      </p:to>
+                                    </p:set>
+                                  </p:childTnLst>
+                                </p:cTn>
+                              </p:par>
+                            </p:childTnLst>
+                          </p:cTn>
+                        </p:par>
+                      </p:childTnLst>
+                    </p:cTn>
+                  </p:par>
+                  <p:par>
+                    <p:cTn id="25" fill="hold">
+                      <p:stCondLst>
+                        <p:cond delay="indefinite"/>
+                      </p:stCondLst>
+                      <p:childTnLst>
+                        <p:par>
+                          <p:cTn id="26" fill="hold">
+                            <p:stCondLst>
+                              <p:cond delay="0"/>
+                            </p:stCondLst>
+                            <p:childTnLst>
+                              <p:par>
+                                <p:cTn id="27" presetID="1" presetClass="entr" presetSubtype="0" fill="hold" grpId="0" nodeType="clickEffect">
+                                  <p:stCondLst>
+                                    <p:cond delay="0"/>
+                                  </p:stCondLst>
+                                  <p:childTnLst>
+                                    <p:set>
+                                      <p:cBhvr>
+                                        <p:cTn id="28" dur="1" fill="hold">
+                                          <p:stCondLst>
+                                            <p:cond delay="0"/>
+                                          </p:stCondLst>
+                                        </p:cTn>
+                                        <p:tgtEl>
+                                          <p:spTgt spid="8"/>
+                                        </p:tgtEl>
+                                        <p:attrNameLst>
+                                          <p:attrName>style.visibility</p:attrName>
+                                        </p:attrNameLst>
+                                      </p:cBhvr>
+                                      <p:to>
+                                        <p:strVal val="visible"/>
+                                      </p:to>
+                                    </p:set>
+                                  </p:childTnLst>
+                                </p:cTn>
+                              </p:par>
+                            </p:childTnLst>
+                          </p:cTn>
+                        </p:par>
+                      </p:childTnLst>
+                    </p:cTn>
+                  </p:par>
+                </p:childTnLst>
+              </p:cTn>
+              <p:prevCondLst>
+                <p:cond evt="onPrev" delay="0">
+                  <p:tgtEl>
+                    <p:sldTgt/>
+                  </p:tgtEl>
+                </p:cond>
+              </p:prevCondLst>
+              <p:nextCondLst>
+                <p:cond evt="onNext" delay="0">
+                  <p:tgtEl>
+                    <p:sldTgt/>
+                  </p:tgtEl>
+                </p:cond>
+              </p:nextCondLst>
+            </p:seq>
+          </p:childTnLst>
+        </p:cTn>
+      </p:par>
+    </p:tnLst>
+    <p:bldLst>
+      <p:bldP spid="8" grpId="0"/>
+    </p:bldLst>
+  </p:timing>
+</p:sld>
+</file>
+
 <file path=ppt/slides/slide4.xml><?xml version="1.0" encoding="utf-8"?>
 <p:sld xmlns:a="http://schemas.openxmlformats.org/drawingml/2006/main" xmlns:r="http://schemas.openxmlformats.org/officeDocument/2006/relationships" xmlns:p="http://schemas.openxmlformats.org/presentationml/2006/main">
   <p:cSld>
@@ -9564,6 +9566,880 @@
 </p:sld>
 </file>
 
+<file path=ppt/slides/slide5.xml><?xml version="1.0" encoding="utf-8"?>
+<p:sld xmlns:a="http://schemas.openxmlformats.org/drawingml/2006/main" xmlns:r="http://schemas.openxmlformats.org/officeDocument/2006/relationships" xmlns:p="http://schemas.openxmlformats.org/presentationml/2006/main">
+  <p:cSld>
+    <p:spTree>
+      <p:nvGrpSpPr>
+        <p:cNvPr id="1" name=""/>
+        <p:cNvGrpSpPr/>
+        <p:nvPr/>
+      </p:nvGrpSpPr>
+      <p:grpSpPr>
+        <a:xfrm>
+          <a:off x="0" y="0"/>
+          <a:ext cx="0" cy="0"/>
+          <a:chOff x="0" y="0"/>
+          <a:chExt cx="0" cy="0"/>
+        </a:xfrm>
+      </p:grpSpPr>
+      <p:sp>
+        <p:nvSpPr>
+          <p:cNvPr id="2" name="Title 1"/>
+          <p:cNvSpPr>
+            <a:spLocks noGrp="1"/>
+          </p:cNvSpPr>
+          <p:nvPr>
+            <p:ph type="title"/>
+          </p:nvPr>
+        </p:nvSpPr>
+        <p:spPr/>
+        <p:txBody>
+          <a:bodyPr>
+            <a:normAutofit/>
+          </a:bodyPr>
+          <a:lstStyle/>
+          <a:p>
+            <a:r>
+              <a:rPr lang="en-US" dirty="0" smtClean="0"/>
+              <a:t>Opening by Reconstruction	</a:t>
+            </a:r>
+            <a:endParaRPr lang="en-US" dirty="0"/>
+          </a:p>
+        </p:txBody>
+      </p:sp>
+      <mc:AlternateContent xmlns:mc="http://schemas.openxmlformats.org/markup-compatibility/2006">
+        <mc:Choice xmlns:a14="http://schemas.microsoft.com/office/drawing/2010/main" Requires="a14">
+          <p:sp>
+            <p:nvSpPr>
+              <p:cNvPr id="3" name="Content Placeholder 2"/>
+              <p:cNvSpPr>
+                <a:spLocks noGrp="1"/>
+              </p:cNvSpPr>
+              <p:nvPr>
+                <p:ph idx="1"/>
+              </p:nvPr>
+            </p:nvSpPr>
+            <p:spPr/>
+            <p:txBody>
+              <a:bodyPr/>
+              <a:lstStyle/>
+              <a:p>
+                <a:pPr marL="0" indent="0">
+                  <a:buNone/>
+                </a:pPr>
+                <a14:m>
+                  <m:oMathPara xmlns:m="http://schemas.openxmlformats.org/officeDocument/2006/math">
+                    <m:oMathParaPr>
+                      <m:jc m:val="centerGroup"/>
+                    </m:oMathParaPr>
+                    <m:oMath xmlns:m="http://schemas.openxmlformats.org/officeDocument/2006/math">
+                      <m:sSubSup>
+                        <m:sSubSupPr>
+                          <m:ctrlPr>
+                            <a:rPr lang="en-US" i="1" smtClean="0">
+                              <a:latin typeface="Cambria Math" panose="02040503050406030204" pitchFamily="18" charset="0"/>
+                            </a:rPr>
+                          </m:ctrlPr>
+                        </m:sSubSupPr>
+                        <m:e>
+                          <m:r>
+                            <a:rPr lang="en-US" b="0" i="1" smtClean="0">
+                              <a:latin typeface="Cambria Math" panose="02040503050406030204" pitchFamily="18" charset="0"/>
+                            </a:rPr>
+                            <m:t>𝑂</m:t>
+                          </m:r>
+                        </m:e>
+                        <m:sub>
+                          <m:r>
+                            <a:rPr lang="en-US" b="0" i="1" smtClean="0">
+                              <a:latin typeface="Cambria Math" panose="02040503050406030204" pitchFamily="18" charset="0"/>
+                            </a:rPr>
+                            <m:t>𝑅</m:t>
+                          </m:r>
+                        </m:sub>
+                        <m:sup>
+                          <m:r>
+                            <a:rPr lang="en-US" b="0" i="1" smtClean="0">
+                              <a:latin typeface="Cambria Math" panose="02040503050406030204" pitchFamily="18" charset="0"/>
+                            </a:rPr>
+                            <m:t>(</m:t>
+                          </m:r>
+                          <m:r>
+                            <a:rPr lang="en-US" b="0" i="1" smtClean="0">
+                              <a:latin typeface="Cambria Math" panose="02040503050406030204" pitchFamily="18" charset="0"/>
+                            </a:rPr>
+                            <m:t>𝑛</m:t>
+                          </m:r>
+                          <m:r>
+                            <a:rPr lang="en-US" b="0" i="1" smtClean="0">
+                              <a:latin typeface="Cambria Math" panose="02040503050406030204" pitchFamily="18" charset="0"/>
+                            </a:rPr>
+                            <m:t>)</m:t>
+                          </m:r>
+                        </m:sup>
+                      </m:sSubSup>
+                      <m:d>
+                        <m:dPr>
+                          <m:ctrlPr>
+                            <a:rPr lang="en-US" i="1" smtClean="0">
+                              <a:latin typeface="Cambria Math" panose="02040503050406030204" pitchFamily="18" charset="0"/>
+                            </a:rPr>
+                          </m:ctrlPr>
+                        </m:dPr>
+                        <m:e>
+                          <m:r>
+                            <a:rPr lang="en-US" b="0" i="1" smtClean="0">
+                              <a:latin typeface="Cambria Math" panose="02040503050406030204" pitchFamily="18" charset="0"/>
+                            </a:rPr>
+                            <m:t>𝐹</m:t>
+                          </m:r>
+                        </m:e>
+                      </m:d>
+                      <m:r>
+                        <a:rPr lang="en-US" b="0" i="1" smtClean="0">
+                          <a:latin typeface="Cambria Math" panose="02040503050406030204" pitchFamily="18" charset="0"/>
+                        </a:rPr>
+                        <m:t>=</m:t>
+                      </m:r>
+                      <m:sSubSup>
+                        <m:sSubSupPr>
+                          <m:ctrlPr>
+                            <a:rPr lang="en-US" b="0" i="1" smtClean="0">
+                              <a:latin typeface="Cambria Math" panose="02040503050406030204" pitchFamily="18" charset="0"/>
+                            </a:rPr>
+                          </m:ctrlPr>
+                        </m:sSubSupPr>
+                        <m:e>
+                          <m:r>
+                            <a:rPr lang="en-US" b="0" i="1" smtClean="0">
+                              <a:latin typeface="Cambria Math" panose="02040503050406030204" pitchFamily="18" charset="0"/>
+                            </a:rPr>
+                            <m:t>𝑅</m:t>
+                          </m:r>
+                        </m:e>
+                        <m:sub>
+                          <m:r>
+                            <a:rPr lang="en-US" b="0" i="1" smtClean="0">
+                              <a:latin typeface="Cambria Math" panose="02040503050406030204" pitchFamily="18" charset="0"/>
+                            </a:rPr>
+                            <m:t>𝐹</m:t>
+                          </m:r>
+                        </m:sub>
+                        <m:sup>
+                          <m:r>
+                            <a:rPr lang="en-US" b="0" i="1" smtClean="0">
+                              <a:latin typeface="Cambria Math" panose="02040503050406030204" pitchFamily="18" charset="0"/>
+                            </a:rPr>
+                            <m:t>𝐷</m:t>
+                          </m:r>
+                        </m:sup>
+                      </m:sSubSup>
+                      <m:d>
+                        <m:dPr>
+                          <m:begChr m:val="["/>
+                          <m:endChr m:val="]"/>
+                          <m:ctrlPr>
+                            <a:rPr lang="en-US" b="0" i="1" smtClean="0">
+                              <a:latin typeface="Cambria Math" panose="02040503050406030204" pitchFamily="18" charset="0"/>
+                            </a:rPr>
+                          </m:ctrlPr>
+                        </m:dPr>
+                        <m:e>
+                          <m:d>
+                            <m:dPr>
+                              <m:ctrlPr>
+                                <a:rPr lang="en-US" b="0" i="1" smtClean="0">
+                                  <a:latin typeface="Cambria Math" panose="02040503050406030204" pitchFamily="18" charset="0"/>
+                                </a:rPr>
+                              </m:ctrlPr>
+                            </m:dPr>
+                            <m:e>
+                              <m:r>
+                                <a:rPr lang="en-US" b="0" i="1" smtClean="0">
+                                  <a:latin typeface="Cambria Math" panose="02040503050406030204" pitchFamily="18" charset="0"/>
+                                </a:rPr>
+                                <m:t>𝐹</m:t>
+                              </m:r>
+                              <m:r>
+                                <a:rPr lang="en-US" b="0" i="1" smtClean="0">
+                                  <a:latin typeface="Cambria Math" panose="02040503050406030204" pitchFamily="18" charset="0"/>
+                                  <a:ea typeface="Cambria Math" panose="02040503050406030204" pitchFamily="18" charset="0"/>
+                                </a:rPr>
+                                <m:t>⊖</m:t>
+                              </m:r>
+                              <m:r>
+                                <a:rPr lang="en-US" b="0" i="1" smtClean="0">
+                                  <a:latin typeface="Cambria Math" panose="02040503050406030204" pitchFamily="18" charset="0"/>
+                                  <a:ea typeface="Cambria Math" panose="02040503050406030204" pitchFamily="18" charset="0"/>
+                                </a:rPr>
+                                <m:t>𝑛𝐵</m:t>
+                              </m:r>
+                            </m:e>
+                          </m:d>
+                        </m:e>
+                      </m:d>
+                    </m:oMath>
+                  </m:oMathPara>
+                </a14:m>
+                <a:endParaRPr lang="en-US" b="0" dirty="0" smtClean="0">
+                  <a:ea typeface="Cambria Math" panose="02040503050406030204" pitchFamily="18" charset="0"/>
+                </a:endParaRPr>
+              </a:p>
+              <a:p>
+                <a:pPr marL="0" indent="0">
+                  <a:buNone/>
+                </a:pPr>
+                <a:endParaRPr lang="en-US" dirty="0" smtClean="0"/>
+              </a:p>
+              <a:p>
+                <a:r>
+                  <a:rPr lang="en-US" dirty="0" smtClean="0"/>
+                  <a:t>Multiple erosions followed by Reconstruction by Dilation</a:t>
+                </a:r>
+              </a:p>
+              <a:p>
+                <a:endParaRPr lang="en-US" dirty="0"/>
+              </a:p>
+              <a:p>
+                <a:r>
+                  <a:rPr lang="en-US" dirty="0" smtClean="0"/>
+                  <a:t>Perfectly restores non-eroded parts of the image</a:t>
+                </a:r>
+              </a:p>
+            </p:txBody>
+          </p:sp>
+        </mc:Choice>
+        <mc:Fallback>
+          <p:sp>
+            <p:nvSpPr>
+              <p:cNvPr id="3" name="Content Placeholder 2"/>
+              <p:cNvSpPr>
+                <a:spLocks noGrp="1" noRot="1" noChangeAspect="1" noMove="1" noResize="1" noEditPoints="1" noAdjustHandles="1" noChangeArrowheads="1" noChangeShapeType="1" noTextEdit="1"/>
+              </p:cNvSpPr>
+              <p:nvPr>
+                <p:ph idx="1"/>
+              </p:nvPr>
+            </p:nvSpPr>
+            <p:spPr>
+              <a:blipFill rotWithShape="0">
+                <a:blip r:embed="rId2"/>
+                <a:stretch>
+                  <a:fillRect l="-1043"/>
+                </a:stretch>
+              </a:blipFill>
+            </p:spPr>
+            <p:txBody>
+              <a:bodyPr/>
+              <a:lstStyle/>
+              <a:p>
+                <a:r>
+                  <a:rPr lang="en-US">
+                    <a:noFill/>
+                  </a:rPr>
+                  <a:t> </a:t>
+                </a:r>
+              </a:p>
+            </p:txBody>
+          </p:sp>
+        </mc:Fallback>
+      </mc:AlternateContent>
+    </p:spTree>
+    <p:extLst>
+      <p:ext uri="{BB962C8B-B14F-4D97-AF65-F5344CB8AC3E}">
+        <p14:creationId xmlns:p14="http://schemas.microsoft.com/office/powerpoint/2010/main" val="426718043"/>
+      </p:ext>
+    </p:extLst>
+  </p:cSld>
+  <p:clrMapOvr>
+    <a:masterClrMapping/>
+  </p:clrMapOvr>
+  <p:timing>
+    <p:tnLst>
+      <p:par>
+        <p:cTn id="1" dur="indefinite" restart="never" nodeType="tmRoot"/>
+      </p:par>
+    </p:tnLst>
+  </p:timing>
+</p:sld>
+</file>
+
+<file path=ppt/slides/slide6.xml><?xml version="1.0" encoding="utf-8"?>
+<p:sld xmlns:a="http://schemas.openxmlformats.org/drawingml/2006/main" xmlns:r="http://schemas.openxmlformats.org/officeDocument/2006/relationships" xmlns:p="http://schemas.openxmlformats.org/presentationml/2006/main">
+  <p:cSld>
+    <p:spTree>
+      <p:nvGrpSpPr>
+        <p:cNvPr id="1" name=""/>
+        <p:cNvGrpSpPr/>
+        <p:nvPr/>
+      </p:nvGrpSpPr>
+      <p:grpSpPr>
+        <a:xfrm>
+          <a:off x="0" y="0"/>
+          <a:ext cx="0" cy="0"/>
+          <a:chOff x="0" y="0"/>
+          <a:chExt cx="0" cy="0"/>
+        </a:xfrm>
+      </p:grpSpPr>
+      <p:pic>
+        <p:nvPicPr>
+          <p:cNvPr id="2" name="Picture 1"/>
+          <p:cNvPicPr>
+            <a:picLocks noChangeAspect="1"/>
+          </p:cNvPicPr>
+          <p:nvPr/>
+        </p:nvPicPr>
+        <p:blipFill>
+          <a:blip r:embed="rId2">
+            <a:extLst>
+              <a:ext uri="{28A0092B-C50C-407E-A947-70E740481C1C}">
+                <a14:useLocalDpi xmlns:a14="http://schemas.microsoft.com/office/drawing/2010/main" val="0"/>
+              </a:ext>
+            </a:extLst>
+          </a:blip>
+          <a:stretch>
+            <a:fillRect/>
+          </a:stretch>
+        </p:blipFill>
+        <p:spPr>
+          <a:xfrm>
+            <a:off x="1480104" y="337504"/>
+            <a:ext cx="3914286" cy="2961905"/>
+          </a:xfrm>
+          <a:prstGeom prst="rect">
+            <a:avLst/>
+          </a:prstGeom>
+        </p:spPr>
+      </p:pic>
+      <p:pic>
+        <p:nvPicPr>
+          <p:cNvPr id="3" name="Picture 2"/>
+          <p:cNvPicPr>
+            <a:picLocks noChangeAspect="1"/>
+          </p:cNvPicPr>
+          <p:nvPr/>
+        </p:nvPicPr>
+        <p:blipFill>
+          <a:blip r:embed="rId3">
+            <a:extLst>
+              <a:ext uri="{28A0092B-C50C-407E-A947-70E740481C1C}">
+                <a14:useLocalDpi xmlns:a14="http://schemas.microsoft.com/office/drawing/2010/main" val="0"/>
+              </a:ext>
+            </a:extLst>
+          </a:blip>
+          <a:stretch>
+            <a:fillRect/>
+          </a:stretch>
+        </p:blipFill>
+        <p:spPr>
+          <a:xfrm>
+            <a:off x="6797612" y="337504"/>
+            <a:ext cx="3914286" cy="2961905"/>
+          </a:xfrm>
+          <a:prstGeom prst="rect">
+            <a:avLst/>
+          </a:prstGeom>
+        </p:spPr>
+      </p:pic>
+      <p:grpSp>
+        <p:nvGrpSpPr>
+          <p:cNvPr id="15" name="Group 14"/>
+          <p:cNvGrpSpPr/>
+          <p:nvPr/>
+        </p:nvGrpSpPr>
+        <p:grpSpPr>
+          <a:xfrm>
+            <a:off x="599233" y="3668741"/>
+            <a:ext cx="5394390" cy="2961905"/>
+            <a:chOff x="0" y="3668741"/>
+            <a:chExt cx="5394390" cy="2961905"/>
+          </a:xfrm>
+        </p:grpSpPr>
+        <p:pic>
+          <p:nvPicPr>
+            <p:cNvPr id="5" name="Picture 4"/>
+            <p:cNvPicPr>
+              <a:picLocks noChangeAspect="1"/>
+            </p:cNvPicPr>
+            <p:nvPr/>
+          </p:nvPicPr>
+          <p:blipFill>
+            <a:blip r:embed="rId4">
+              <a:extLst>
+                <a:ext uri="{28A0092B-C50C-407E-A947-70E740481C1C}">
+                  <a14:useLocalDpi xmlns:a14="http://schemas.microsoft.com/office/drawing/2010/main" val="0"/>
+                </a:ext>
+              </a:extLst>
+            </a:blip>
+            <a:stretch>
+              <a:fillRect/>
+            </a:stretch>
+          </p:blipFill>
+          <p:spPr>
+            <a:xfrm>
+              <a:off x="1480104" y="3668741"/>
+              <a:ext cx="3914286" cy="2961905"/>
+            </a:xfrm>
+            <a:prstGeom prst="rect">
+              <a:avLst/>
+            </a:prstGeom>
+          </p:spPr>
+        </p:pic>
+        <p:sp>
+          <p:nvSpPr>
+            <p:cNvPr id="13" name="TextBox 12"/>
+            <p:cNvSpPr txBox="1"/>
+            <p:nvPr/>
+          </p:nvSpPr>
+          <p:spPr>
+            <a:xfrm>
+              <a:off x="0" y="4624084"/>
+              <a:ext cx="1480104" cy="646331"/>
+            </a:xfrm>
+            <a:prstGeom prst="rect">
+              <a:avLst/>
+            </a:prstGeom>
+            <a:noFill/>
+          </p:spPr>
+          <p:txBody>
+            <a:bodyPr wrap="square" rtlCol="0" anchor="ctr">
+              <a:spAutoFit/>
+            </a:bodyPr>
+            <a:lstStyle/>
+            <a:p>
+              <a:pPr algn="ctr"/>
+              <a:r>
+                <a:rPr lang="en-US" dirty="0" smtClean="0"/>
+                <a:t>Standard Opening</a:t>
+              </a:r>
+              <a:endParaRPr lang="en-US" dirty="0"/>
+            </a:p>
+          </p:txBody>
+        </p:sp>
+      </p:grpSp>
+      <p:grpSp>
+        <p:nvGrpSpPr>
+          <p:cNvPr id="16" name="Group 15"/>
+          <p:cNvGrpSpPr/>
+          <p:nvPr/>
+        </p:nvGrpSpPr>
+        <p:grpSpPr>
+          <a:xfrm>
+            <a:off x="6096000" y="3668740"/>
+            <a:ext cx="5572836" cy="2961905"/>
+            <a:chOff x="6797612" y="3668741"/>
+            <a:chExt cx="5572836" cy="2961905"/>
+          </a:xfrm>
+        </p:grpSpPr>
+        <p:pic>
+          <p:nvPicPr>
+            <p:cNvPr id="4" name="Picture 3"/>
+            <p:cNvPicPr>
+              <a:picLocks noChangeAspect="1"/>
+            </p:cNvPicPr>
+            <p:nvPr/>
+          </p:nvPicPr>
+          <p:blipFill>
+            <a:blip r:embed="rId5">
+              <a:extLst>
+                <a:ext uri="{28A0092B-C50C-407E-A947-70E740481C1C}">
+                  <a14:useLocalDpi xmlns:a14="http://schemas.microsoft.com/office/drawing/2010/main" val="0"/>
+                </a:ext>
+              </a:extLst>
+            </a:blip>
+            <a:stretch>
+              <a:fillRect/>
+            </a:stretch>
+          </p:blipFill>
+          <p:spPr>
+            <a:xfrm>
+              <a:off x="6797612" y="3668741"/>
+              <a:ext cx="3914286" cy="2961905"/>
+            </a:xfrm>
+            <a:prstGeom prst="rect">
+              <a:avLst/>
+            </a:prstGeom>
+          </p:spPr>
+        </p:pic>
+        <p:sp>
+          <p:nvSpPr>
+            <p:cNvPr id="14" name="TextBox 13"/>
+            <p:cNvSpPr txBox="1"/>
+            <p:nvPr/>
+          </p:nvSpPr>
+          <p:spPr>
+            <a:xfrm>
+              <a:off x="10711898" y="4503362"/>
+              <a:ext cx="1658550" cy="646331"/>
+            </a:xfrm>
+            <a:prstGeom prst="rect">
+              <a:avLst/>
+            </a:prstGeom>
+            <a:noFill/>
+          </p:spPr>
+          <p:txBody>
+            <a:bodyPr wrap="square" rtlCol="0" anchor="ctr">
+              <a:spAutoFit/>
+            </a:bodyPr>
+            <a:lstStyle/>
+            <a:p>
+              <a:pPr algn="ctr"/>
+              <a:r>
+                <a:rPr lang="en-US" dirty="0" smtClean="0"/>
+                <a:t>Opening by</a:t>
+              </a:r>
+            </a:p>
+            <a:p>
+              <a:pPr algn="ctr"/>
+              <a:r>
+                <a:rPr lang="en-US" dirty="0" smtClean="0"/>
+                <a:t>Reconstruction</a:t>
+              </a:r>
+              <a:endParaRPr lang="en-US" dirty="0"/>
+            </a:p>
+          </p:txBody>
+        </p:sp>
+      </p:grpSp>
+      <p:grpSp>
+        <p:nvGrpSpPr>
+          <p:cNvPr id="18" name="Group 17"/>
+          <p:cNvGrpSpPr/>
+          <p:nvPr/>
+        </p:nvGrpSpPr>
+        <p:grpSpPr>
+          <a:xfrm>
+            <a:off x="5345395" y="1449124"/>
+            <a:ext cx="1517115" cy="738663"/>
+            <a:chOff x="5345395" y="1449124"/>
+            <a:chExt cx="1517115" cy="738663"/>
+          </a:xfrm>
+        </p:grpSpPr>
+        <p:grpSp>
+          <p:nvGrpSpPr>
+            <p:cNvPr id="9" name="Group 8"/>
+            <p:cNvGrpSpPr/>
+            <p:nvPr/>
+          </p:nvGrpSpPr>
+          <p:grpSpPr>
+            <a:xfrm>
+              <a:off x="5345395" y="1449124"/>
+              <a:ext cx="1501211" cy="369332"/>
+              <a:chOff x="3520225" y="2682514"/>
+              <a:chExt cx="1501211" cy="369332"/>
+            </a:xfrm>
+          </p:grpSpPr>
+          <p:cxnSp>
+            <p:nvCxnSpPr>
+              <p:cNvPr id="10" name="Straight Arrow Connector 9"/>
+              <p:cNvCxnSpPr/>
+              <p:nvPr/>
+            </p:nvCxnSpPr>
+            <p:spPr>
+              <a:xfrm>
+                <a:off x="3633157" y="3051846"/>
+                <a:ext cx="1275348" cy="0"/>
+              </a:xfrm>
+              <a:prstGeom prst="straightConnector1">
+                <a:avLst/>
+              </a:prstGeom>
+              <a:ln>
+                <a:tailEnd type="triangle"/>
+              </a:ln>
+            </p:spPr>
+            <p:style>
+              <a:lnRef idx="3">
+                <a:schemeClr val="dk1"/>
+              </a:lnRef>
+              <a:fillRef idx="0">
+                <a:schemeClr val="dk1"/>
+              </a:fillRef>
+              <a:effectRef idx="2">
+                <a:schemeClr val="dk1"/>
+              </a:effectRef>
+              <a:fontRef idx="minor">
+                <a:schemeClr val="tx1"/>
+              </a:fontRef>
+            </p:style>
+          </p:cxnSp>
+          <p:sp>
+            <p:nvSpPr>
+              <p:cNvPr id="11" name="Rectangle 10"/>
+              <p:cNvSpPr/>
+              <p:nvPr/>
+            </p:nvSpPr>
+            <p:spPr>
+              <a:xfrm>
+                <a:off x="3520225" y="2682514"/>
+                <a:ext cx="1501211" cy="369332"/>
+              </a:xfrm>
+              <a:prstGeom prst="rect">
+                <a:avLst/>
+              </a:prstGeom>
+            </p:spPr>
+            <p:txBody>
+              <a:bodyPr wrap="square">
+                <a:spAutoFit/>
+              </a:bodyPr>
+              <a:lstStyle/>
+              <a:p>
+                <a:pPr algn="ctr"/>
+                <a:r>
+                  <a:rPr lang="en-US" dirty="0" smtClean="0">
+                    <a:latin typeface="Times New Roman" panose="02020603050405020304" pitchFamily="18" charset="0"/>
+                    <a:cs typeface="Times New Roman" panose="02020603050405020304" pitchFamily="18" charset="0"/>
+                  </a:rPr>
+                  <a:t>Erode</a:t>
+                </a:r>
+                <a:endParaRPr lang="en-US" dirty="0">
+                  <a:latin typeface="Times New Roman" panose="02020603050405020304" pitchFamily="18" charset="0"/>
+                  <a:cs typeface="Times New Roman" panose="02020603050405020304" pitchFamily="18" charset="0"/>
+                </a:endParaRPr>
+              </a:p>
+            </p:txBody>
+          </p:sp>
+        </p:grpSp>
+        <p:sp>
+          <p:nvSpPr>
+            <p:cNvPr id="17" name="Rectangle 16"/>
+            <p:cNvSpPr/>
+            <p:nvPr/>
+          </p:nvSpPr>
+          <p:spPr>
+            <a:xfrm>
+              <a:off x="5361299" y="1818455"/>
+              <a:ext cx="1501211" cy="369332"/>
+            </a:xfrm>
+            <a:prstGeom prst="rect">
+              <a:avLst/>
+            </a:prstGeom>
+          </p:spPr>
+          <p:txBody>
+            <a:bodyPr wrap="square">
+              <a:spAutoFit/>
+            </a:bodyPr>
+            <a:lstStyle/>
+            <a:p>
+              <a:pPr algn="ctr"/>
+              <a:r>
+                <a:rPr lang="en-US" dirty="0" smtClean="0">
+                  <a:latin typeface="Times New Roman" panose="02020603050405020304" pitchFamily="18" charset="0"/>
+                  <a:cs typeface="Times New Roman" panose="02020603050405020304" pitchFamily="18" charset="0"/>
+                </a:rPr>
+                <a:t>1x15 SE</a:t>
+              </a:r>
+              <a:endParaRPr lang="en-US" dirty="0">
+                <a:latin typeface="Times New Roman" panose="02020603050405020304" pitchFamily="18" charset="0"/>
+                <a:cs typeface="Times New Roman" panose="02020603050405020304" pitchFamily="18" charset="0"/>
+              </a:endParaRPr>
+            </a:p>
+          </p:txBody>
+        </p:sp>
+      </p:grpSp>
+    </p:spTree>
+    <p:extLst>
+      <p:ext uri="{BB962C8B-B14F-4D97-AF65-F5344CB8AC3E}">
+        <p14:creationId xmlns:p14="http://schemas.microsoft.com/office/powerpoint/2010/main" val="184435666"/>
+      </p:ext>
+    </p:extLst>
+  </p:cSld>
+  <p:clrMapOvr>
+    <a:masterClrMapping/>
+  </p:clrMapOvr>
+  <p:timing>
+    <p:tnLst>
+      <p:par>
+        <p:cTn id="1" dur="indefinite" restart="never" nodeType="tmRoot">
+          <p:childTnLst>
+            <p:seq concurrent="1" nextAc="seek">
+              <p:cTn id="2" dur="indefinite" nodeType="mainSeq">
+                <p:childTnLst>
+                  <p:par>
+                    <p:cTn id="3" fill="hold">
+                      <p:stCondLst>
+                        <p:cond delay="indefinite"/>
+                      </p:stCondLst>
+                      <p:childTnLst>
+                        <p:par>
+                          <p:cTn id="4" fill="hold">
+                            <p:stCondLst>
+                              <p:cond delay="0"/>
+                            </p:stCondLst>
+                            <p:childTnLst>
+                              <p:par>
+                                <p:cTn id="5" presetID="1" presetClass="entr" presetSubtype="0" fill="hold" nodeType="clickEffect">
+                                  <p:stCondLst>
+                                    <p:cond delay="0"/>
+                                  </p:stCondLst>
+                                  <p:childTnLst>
+                                    <p:set>
+                                      <p:cBhvr>
+                                        <p:cTn id="6" dur="1" fill="hold">
+                                          <p:stCondLst>
+                                            <p:cond delay="0"/>
+                                          </p:stCondLst>
+                                        </p:cTn>
+                                        <p:tgtEl>
+                                          <p:spTgt spid="18"/>
+                                        </p:tgtEl>
+                                        <p:attrNameLst>
+                                          <p:attrName>style.visibility</p:attrName>
+                                        </p:attrNameLst>
+                                      </p:cBhvr>
+                                      <p:to>
+                                        <p:strVal val="visible"/>
+                                      </p:to>
+                                    </p:set>
+                                  </p:childTnLst>
+                                </p:cTn>
+                              </p:par>
+                              <p:par>
+                                <p:cTn id="7" presetID="1" presetClass="entr" presetSubtype="0" fill="hold" nodeType="withEffect">
+                                  <p:stCondLst>
+                                    <p:cond delay="0"/>
+                                  </p:stCondLst>
+                                  <p:childTnLst>
+                                    <p:set>
+                                      <p:cBhvr>
+                                        <p:cTn id="8" dur="1" fill="hold">
+                                          <p:stCondLst>
+                                            <p:cond delay="0"/>
+                                          </p:stCondLst>
+                                        </p:cTn>
+                                        <p:tgtEl>
+                                          <p:spTgt spid="3"/>
+                                        </p:tgtEl>
+                                        <p:attrNameLst>
+                                          <p:attrName>style.visibility</p:attrName>
+                                        </p:attrNameLst>
+                                      </p:cBhvr>
+                                      <p:to>
+                                        <p:strVal val="visible"/>
+                                      </p:to>
+                                    </p:set>
+                                  </p:childTnLst>
+                                </p:cTn>
+                              </p:par>
+                            </p:childTnLst>
+                          </p:cTn>
+                        </p:par>
+                      </p:childTnLst>
+                    </p:cTn>
+                  </p:par>
+                  <p:par>
+                    <p:cTn id="9" fill="hold">
+                      <p:stCondLst>
+                        <p:cond delay="indefinite"/>
+                      </p:stCondLst>
+                      <p:childTnLst>
+                        <p:par>
+                          <p:cTn id="10" fill="hold">
+                            <p:stCondLst>
+                              <p:cond delay="0"/>
+                            </p:stCondLst>
+                            <p:childTnLst>
+                              <p:par>
+                                <p:cTn id="11" presetID="1" presetClass="entr" presetSubtype="0" fill="hold" nodeType="clickEffect">
+                                  <p:stCondLst>
+                                    <p:cond delay="0"/>
+                                  </p:stCondLst>
+                                  <p:childTnLst>
+                                    <p:set>
+                                      <p:cBhvr>
+                                        <p:cTn id="12" dur="1" fill="hold">
+                                          <p:stCondLst>
+                                            <p:cond delay="0"/>
+                                          </p:stCondLst>
+                                        </p:cTn>
+                                        <p:tgtEl>
+                                          <p:spTgt spid="15"/>
+                                        </p:tgtEl>
+                                        <p:attrNameLst>
+                                          <p:attrName>style.visibility</p:attrName>
+                                        </p:attrNameLst>
+                                      </p:cBhvr>
+                                      <p:to>
+                                        <p:strVal val="visible"/>
+                                      </p:to>
+                                    </p:set>
+                                  </p:childTnLst>
+                                </p:cTn>
+                              </p:par>
+                            </p:childTnLst>
+                          </p:cTn>
+                        </p:par>
+                      </p:childTnLst>
+                    </p:cTn>
+                  </p:par>
+                  <p:par>
+                    <p:cTn id="13" fill="hold">
+                      <p:stCondLst>
+                        <p:cond delay="indefinite"/>
+                      </p:stCondLst>
+                      <p:childTnLst>
+                        <p:par>
+                          <p:cTn id="14" fill="hold">
+                            <p:stCondLst>
+                              <p:cond delay="0"/>
+                            </p:stCondLst>
+                            <p:childTnLst>
+                              <p:par>
+                                <p:cTn id="15" presetID="1" presetClass="entr" presetSubtype="0" fill="hold" nodeType="clickEffect">
+                                  <p:stCondLst>
+                                    <p:cond delay="0"/>
+                                  </p:stCondLst>
+                                  <p:childTnLst>
+                                    <p:set>
+                                      <p:cBhvr>
+                                        <p:cTn id="16" dur="1" fill="hold">
+                                          <p:stCondLst>
+                                            <p:cond delay="0"/>
+                                          </p:stCondLst>
+                                        </p:cTn>
+                                        <p:tgtEl>
+                                          <p:spTgt spid="16"/>
+                                        </p:tgtEl>
+                                        <p:attrNameLst>
+                                          <p:attrName>style.visibility</p:attrName>
+                                        </p:attrNameLst>
+                                      </p:cBhvr>
+                                      <p:to>
+                                        <p:strVal val="visible"/>
+                                      </p:to>
+                                    </p:set>
+                                  </p:childTnLst>
+                                </p:cTn>
+                              </p:par>
+                            </p:childTnLst>
+                          </p:cTn>
+                        </p:par>
+                      </p:childTnLst>
+                    </p:cTn>
+                  </p:par>
+                </p:childTnLst>
+              </p:cTn>
+              <p:prevCondLst>
+                <p:cond evt="onPrev" delay="0">
+                  <p:tgtEl>
+                    <p:sldTgt/>
+                  </p:tgtEl>
+                </p:cond>
+              </p:prevCondLst>
+              <p:nextCondLst>
+                <p:cond evt="onNext" delay="0">
+                  <p:tgtEl>
+                    <p:sldTgt/>
+                  </p:tgtEl>
+                </p:cond>
+              </p:nextCondLst>
+            </p:seq>
+          </p:childTnLst>
+        </p:cTn>
+      </p:par>
+    </p:tnLst>
+  </p:timing>
+</p:sld>
+</file>
+
 <file path=ppt/theme/theme1.xml><?xml version="1.0" encoding="utf-8"?>
 <a:theme xmlns:a="http://schemas.openxmlformats.org/drawingml/2006/main" name="Office Theme">
   <a:themeElements>

</xml_diff>

<commit_message>
Added Hole Filling slides
</commit_message>
<xml_diff>
--- a/Images/Presentation/Matt_Slides.pptx
+++ b/Images/Presentation/Matt_Slides.pptx
@@ -11,6 +11,8 @@
     <p:sldId id="260" r:id="rId5"/>
     <p:sldId id="261" r:id="rId6"/>
     <p:sldId id="262" r:id="rId7"/>
+    <p:sldId id="263" r:id="rId8"/>
+    <p:sldId id="264" r:id="rId9"/>
   </p:sldIdLst>
   <p:sldSz cx="12192000" cy="6858000"/>
   <p:notesSz cx="6858000" cy="9144000"/>
@@ -9637,14 +9639,14 @@
                       <m:sSubSup>
                         <m:sSubSupPr>
                           <m:ctrlPr>
-                            <a:rPr lang="en-US" i="1" smtClean="0">
+                            <a:rPr lang="en-US" sz="3600" i="1" smtClean="0">
                               <a:latin typeface="Cambria Math" panose="02040503050406030204" pitchFamily="18" charset="0"/>
                             </a:rPr>
                           </m:ctrlPr>
                         </m:sSubSupPr>
                         <m:e>
                           <m:r>
-                            <a:rPr lang="en-US" b="0" i="1" smtClean="0">
+                            <a:rPr lang="en-US" sz="3600" b="0" i="1" smtClean="0">
                               <a:latin typeface="Cambria Math" panose="02040503050406030204" pitchFamily="18" charset="0"/>
                             </a:rPr>
                             <m:t>𝑂</m:t>
@@ -9652,7 +9654,7 @@
                         </m:e>
                         <m:sub>
                           <m:r>
-                            <a:rPr lang="en-US" b="0" i="1" smtClean="0">
+                            <a:rPr lang="en-US" sz="3600" b="0" i="1" smtClean="0">
                               <a:latin typeface="Cambria Math" panose="02040503050406030204" pitchFamily="18" charset="0"/>
                             </a:rPr>
                             <m:t>𝑅</m:t>
@@ -9660,19 +9662,19 @@
                         </m:sub>
                         <m:sup>
                           <m:r>
-                            <a:rPr lang="en-US" b="0" i="1" smtClean="0">
+                            <a:rPr lang="en-US" sz="3600" b="0" i="1" smtClean="0">
                               <a:latin typeface="Cambria Math" panose="02040503050406030204" pitchFamily="18" charset="0"/>
                             </a:rPr>
                             <m:t>(</m:t>
                           </m:r>
                           <m:r>
-                            <a:rPr lang="en-US" b="0" i="1" smtClean="0">
+                            <a:rPr lang="en-US" sz="3600" b="0" i="1" smtClean="0">
                               <a:latin typeface="Cambria Math" panose="02040503050406030204" pitchFamily="18" charset="0"/>
                             </a:rPr>
                             <m:t>𝑛</m:t>
                           </m:r>
                           <m:r>
-                            <a:rPr lang="en-US" b="0" i="1" smtClean="0">
+                            <a:rPr lang="en-US" sz="3600" b="0" i="1" smtClean="0">
                               <a:latin typeface="Cambria Math" panose="02040503050406030204" pitchFamily="18" charset="0"/>
                             </a:rPr>
                             <m:t>)</m:t>
@@ -9682,14 +9684,14 @@
                       <m:d>
                         <m:dPr>
                           <m:ctrlPr>
-                            <a:rPr lang="en-US" i="1" smtClean="0">
+                            <a:rPr lang="en-US" sz="3600" i="1" smtClean="0">
                               <a:latin typeface="Cambria Math" panose="02040503050406030204" pitchFamily="18" charset="0"/>
                             </a:rPr>
                           </m:ctrlPr>
                         </m:dPr>
                         <m:e>
                           <m:r>
-                            <a:rPr lang="en-US" b="0" i="1" smtClean="0">
+                            <a:rPr lang="en-US" sz="3600" b="0" i="1" smtClean="0">
                               <a:latin typeface="Cambria Math" panose="02040503050406030204" pitchFamily="18" charset="0"/>
                             </a:rPr>
                             <m:t>𝐹</m:t>
@@ -9697,7 +9699,7 @@
                         </m:e>
                       </m:d>
                       <m:r>
-                        <a:rPr lang="en-US" b="0" i="1" smtClean="0">
+                        <a:rPr lang="en-US" sz="3600" b="0" i="1" smtClean="0">
                           <a:latin typeface="Cambria Math" panose="02040503050406030204" pitchFamily="18" charset="0"/>
                         </a:rPr>
                         <m:t>=</m:t>
@@ -9705,14 +9707,14 @@
                       <m:sSubSup>
                         <m:sSubSupPr>
                           <m:ctrlPr>
-                            <a:rPr lang="en-US" b="0" i="1" smtClean="0">
+                            <a:rPr lang="en-US" sz="3600" b="0" i="1" smtClean="0">
                               <a:latin typeface="Cambria Math" panose="02040503050406030204" pitchFamily="18" charset="0"/>
                             </a:rPr>
                           </m:ctrlPr>
                         </m:sSubSupPr>
                         <m:e>
                           <m:r>
-                            <a:rPr lang="en-US" b="0" i="1" smtClean="0">
+                            <a:rPr lang="en-US" sz="3600" b="0" i="1" smtClean="0">
                               <a:latin typeface="Cambria Math" panose="02040503050406030204" pitchFamily="18" charset="0"/>
                             </a:rPr>
                             <m:t>𝑅</m:t>
@@ -9720,7 +9722,7 @@
                         </m:e>
                         <m:sub>
                           <m:r>
-                            <a:rPr lang="en-US" b="0" i="1" smtClean="0">
+                            <a:rPr lang="en-US" sz="3600" b="0" i="1" smtClean="0">
                               <a:latin typeface="Cambria Math" panose="02040503050406030204" pitchFamily="18" charset="0"/>
                             </a:rPr>
                             <m:t>𝐹</m:t>
@@ -9728,7 +9730,7 @@
                         </m:sub>
                         <m:sup>
                           <m:r>
-                            <a:rPr lang="en-US" b="0" i="1" smtClean="0">
+                            <a:rPr lang="en-US" sz="3600" b="0" i="1" smtClean="0">
                               <a:latin typeface="Cambria Math" panose="02040503050406030204" pitchFamily="18" charset="0"/>
                             </a:rPr>
                             <m:t>𝐷</m:t>
@@ -9740,7 +9742,7 @@
                           <m:begChr m:val="["/>
                           <m:endChr m:val="]"/>
                           <m:ctrlPr>
-                            <a:rPr lang="en-US" b="0" i="1" smtClean="0">
+                            <a:rPr lang="en-US" sz="3600" b="0" i="1" smtClean="0">
                               <a:latin typeface="Cambria Math" panose="02040503050406030204" pitchFamily="18" charset="0"/>
                             </a:rPr>
                           </m:ctrlPr>
@@ -9749,27 +9751,27 @@
                           <m:d>
                             <m:dPr>
                               <m:ctrlPr>
-                                <a:rPr lang="en-US" b="0" i="1" smtClean="0">
+                                <a:rPr lang="en-US" sz="3600" b="0" i="1" smtClean="0">
                                   <a:latin typeface="Cambria Math" panose="02040503050406030204" pitchFamily="18" charset="0"/>
                                 </a:rPr>
                               </m:ctrlPr>
                             </m:dPr>
                             <m:e>
                               <m:r>
-                                <a:rPr lang="en-US" b="0" i="1" smtClean="0">
+                                <a:rPr lang="en-US" sz="3600" b="0" i="1" smtClean="0">
                                   <a:latin typeface="Cambria Math" panose="02040503050406030204" pitchFamily="18" charset="0"/>
                                 </a:rPr>
                                 <m:t>𝐹</m:t>
                               </m:r>
                               <m:r>
-                                <a:rPr lang="en-US" b="0" i="1" smtClean="0">
+                                <a:rPr lang="en-US" sz="3600" b="0" i="1" smtClean="0">
                                   <a:latin typeface="Cambria Math" panose="02040503050406030204" pitchFamily="18" charset="0"/>
                                   <a:ea typeface="Cambria Math" panose="02040503050406030204" pitchFamily="18" charset="0"/>
                                 </a:rPr>
                                 <m:t>⊖</m:t>
                               </m:r>
                               <m:r>
-                                <a:rPr lang="en-US" b="0" i="1" smtClean="0">
+                                <a:rPr lang="en-US" sz="3600" b="0" i="1" smtClean="0">
                                   <a:latin typeface="Cambria Math" panose="02040503050406030204" pitchFamily="18" charset="0"/>
                                   <a:ea typeface="Cambria Math" panose="02040503050406030204" pitchFamily="18" charset="0"/>
                                 </a:rPr>
@@ -10009,10 +10011,16 @@
             <a:p>
               <a:pPr algn="ctr"/>
               <a:r>
-                <a:rPr lang="en-US" dirty="0" smtClean="0"/>
+                <a:rPr lang="en-US" dirty="0" smtClean="0">
+                  <a:latin typeface="Times New Roman" panose="02020603050405020304" pitchFamily="18" charset="0"/>
+                  <a:cs typeface="Times New Roman" panose="02020603050405020304" pitchFamily="18" charset="0"/>
+                </a:rPr>
                 <a:t>Standard Opening</a:t>
               </a:r>
-              <a:endParaRPr lang="en-US" dirty="0"/>
+              <a:endParaRPr lang="en-US" dirty="0">
+                <a:latin typeface="Times New Roman" panose="02020603050405020304" pitchFamily="18" charset="0"/>
+                <a:cs typeface="Times New Roman" panose="02020603050405020304" pitchFamily="18" charset="0"/>
+              </a:endParaRPr>
             </a:p>
           </p:txBody>
         </p:sp>
@@ -10085,17 +10093,26 @@
             <a:p>
               <a:pPr algn="ctr"/>
               <a:r>
-                <a:rPr lang="en-US" dirty="0" smtClean="0"/>
+                <a:rPr lang="en-US" dirty="0" smtClean="0">
+                  <a:latin typeface="Times New Roman" panose="02020603050405020304" pitchFamily="18" charset="0"/>
+                  <a:cs typeface="Times New Roman" panose="02020603050405020304" pitchFamily="18" charset="0"/>
+                </a:rPr>
                 <a:t>Opening by</a:t>
               </a:r>
             </a:p>
             <a:p>
               <a:pPr algn="ctr"/>
               <a:r>
-                <a:rPr lang="en-US" dirty="0" smtClean="0"/>
+                <a:rPr lang="en-US" dirty="0" smtClean="0">
+                  <a:latin typeface="Times New Roman" panose="02020603050405020304" pitchFamily="18" charset="0"/>
+                  <a:cs typeface="Times New Roman" panose="02020603050405020304" pitchFamily="18" charset="0"/>
+                </a:rPr>
                 <a:t>Reconstruction</a:t>
               </a:r>
-              <a:endParaRPr lang="en-US" dirty="0"/>
+              <a:endParaRPr lang="en-US" dirty="0">
+                <a:latin typeface="Times New Roman" panose="02020603050405020304" pitchFamily="18" charset="0"/>
+                <a:cs typeface="Times New Roman" panose="02020603050405020304" pitchFamily="18" charset="0"/>
+              </a:endParaRPr>
             </a:p>
           </p:txBody>
         </p:sp>
@@ -10440,6 +10457,1631 @@
 </p:sld>
 </file>
 
+<file path=ppt/slides/slide7.xml><?xml version="1.0" encoding="utf-8"?>
+<p:sld xmlns:a="http://schemas.openxmlformats.org/drawingml/2006/main" xmlns:r="http://schemas.openxmlformats.org/officeDocument/2006/relationships" xmlns:p="http://schemas.openxmlformats.org/presentationml/2006/main">
+  <p:cSld>
+    <p:spTree>
+      <p:nvGrpSpPr>
+        <p:cNvPr id="1" name=""/>
+        <p:cNvGrpSpPr/>
+        <p:nvPr/>
+      </p:nvGrpSpPr>
+      <p:grpSpPr>
+        <a:xfrm>
+          <a:off x="0" y="0"/>
+          <a:ext cx="0" cy="0"/>
+          <a:chOff x="0" y="0"/>
+          <a:chExt cx="0" cy="0"/>
+        </a:xfrm>
+      </p:grpSpPr>
+      <p:sp>
+        <p:nvSpPr>
+          <p:cNvPr id="2" name="Title 1"/>
+          <p:cNvSpPr>
+            <a:spLocks noGrp="1"/>
+          </p:cNvSpPr>
+          <p:nvPr>
+            <p:ph type="title"/>
+          </p:nvPr>
+        </p:nvSpPr>
+        <p:spPr/>
+        <p:txBody>
+          <a:bodyPr/>
+          <a:lstStyle/>
+          <a:p>
+            <a:r>
+              <a:rPr lang="en-US" dirty="0" smtClean="0"/>
+              <a:t>Filling Holes</a:t>
+            </a:r>
+            <a:endParaRPr lang="en-US" dirty="0"/>
+          </a:p>
+        </p:txBody>
+      </p:sp>
+      <mc:AlternateContent xmlns:mc="http://schemas.openxmlformats.org/markup-compatibility/2006">
+        <mc:Choice xmlns:a14="http://schemas.microsoft.com/office/drawing/2010/main" Requires="a14">
+          <p:sp>
+            <p:nvSpPr>
+              <p:cNvPr id="24" name="Content Placeholder 23"/>
+              <p:cNvSpPr>
+                <a:spLocks noGrp="1"/>
+              </p:cNvSpPr>
+              <p:nvPr>
+                <p:ph idx="1"/>
+              </p:nvPr>
+            </p:nvSpPr>
+            <p:spPr/>
+            <p:txBody>
+              <a:bodyPr/>
+              <a:lstStyle/>
+              <a:p>
+                <a:pPr>
+                  <a:spcAft>
+                    <a:spcPts val="600"/>
+                  </a:spcAft>
+                </a:pPr>
+                <a:r>
+                  <a:rPr lang="en-US" dirty="0" smtClean="0"/>
+                  <a:t>Let </a:t>
+                </a:r>
+                <a:r>
+                  <a:rPr lang="en-US" i="1" dirty="0" smtClean="0"/>
+                  <a:t>I </a:t>
+                </a:r>
+                <a:r>
+                  <a:rPr lang="en-US" dirty="0" smtClean="0"/>
+                  <a:t>be an image with a hole in it. Then</a:t>
+                </a:r>
+              </a:p>
+              <a:p>
+                <a:pPr marL="0" indent="0">
+                  <a:buNone/>
+                </a:pPr>
+                <a14:m>
+                  <m:oMathPara xmlns:m="http://schemas.openxmlformats.org/officeDocument/2006/math">
+                    <m:oMathParaPr>
+                      <m:jc m:val="centerGroup"/>
+                    </m:oMathParaPr>
+                    <m:oMath xmlns:m="http://schemas.openxmlformats.org/officeDocument/2006/math">
+                      <m:r>
+                        <a:rPr lang="en-US" b="0" i="1" smtClean="0">
+                          <a:latin typeface="Cambria Math" panose="02040503050406030204" pitchFamily="18" charset="0"/>
+                        </a:rPr>
+                        <m:t>𝐹</m:t>
+                      </m:r>
+                      <m:d>
+                        <m:dPr>
+                          <m:ctrlPr>
+                            <a:rPr lang="en-US" b="0" i="1" smtClean="0">
+                              <a:latin typeface="Cambria Math" panose="02040503050406030204" pitchFamily="18" charset="0"/>
+                            </a:rPr>
+                          </m:ctrlPr>
+                        </m:dPr>
+                        <m:e>
+                          <m:r>
+                            <a:rPr lang="en-US" b="0" i="1" smtClean="0">
+                              <a:latin typeface="Cambria Math" panose="02040503050406030204" pitchFamily="18" charset="0"/>
+                            </a:rPr>
+                            <m:t>𝑥</m:t>
+                          </m:r>
+                          <m:r>
+                            <a:rPr lang="en-US" b="0" i="1" smtClean="0">
+                              <a:latin typeface="Cambria Math" panose="02040503050406030204" pitchFamily="18" charset="0"/>
+                            </a:rPr>
+                            <m:t>,</m:t>
+                          </m:r>
+                          <m:r>
+                            <a:rPr lang="en-US" b="0" i="1" smtClean="0">
+                              <a:latin typeface="Cambria Math" panose="02040503050406030204" pitchFamily="18" charset="0"/>
+                            </a:rPr>
+                            <m:t>𝑦</m:t>
+                          </m:r>
+                        </m:e>
+                      </m:d>
+                      <m:r>
+                        <a:rPr lang="en-US" b="0" i="1" smtClean="0">
+                          <a:latin typeface="Cambria Math" panose="02040503050406030204" pitchFamily="18" charset="0"/>
+                        </a:rPr>
+                        <m:t>=</m:t>
+                      </m:r>
+                      <m:d>
+                        <m:dPr>
+                          <m:begChr m:val="{"/>
+                          <m:endChr m:val=""/>
+                          <m:ctrlPr>
+                            <a:rPr lang="en-US" b="0" i="1" smtClean="0">
+                              <a:latin typeface="Cambria Math" panose="02040503050406030204" pitchFamily="18" charset="0"/>
+                            </a:rPr>
+                          </m:ctrlPr>
+                        </m:dPr>
+                        <m:e>
+                          <m:eqArr>
+                            <m:eqArrPr>
+                              <m:ctrlPr>
+                                <a:rPr lang="en-US" b="0" i="1" smtClean="0">
+                                  <a:latin typeface="Cambria Math" panose="02040503050406030204" pitchFamily="18" charset="0"/>
+                                </a:rPr>
+                              </m:ctrlPr>
+                            </m:eqArrPr>
+                            <m:e>
+                              <m:r>
+                                <a:rPr lang="en-US" b="0" i="1" smtClean="0">
+                                  <a:latin typeface="Cambria Math" panose="02040503050406030204" pitchFamily="18" charset="0"/>
+                                </a:rPr>
+                                <m:t>1−</m:t>
+                              </m:r>
+                              <m:r>
+                                <a:rPr lang="en-US" b="0" i="1" smtClean="0">
+                                  <a:latin typeface="Cambria Math" panose="02040503050406030204" pitchFamily="18" charset="0"/>
+                                </a:rPr>
+                                <m:t>𝐼</m:t>
+                              </m:r>
+                              <m:d>
+                                <m:dPr>
+                                  <m:ctrlPr>
+                                    <a:rPr lang="en-US" b="0" i="1" smtClean="0">
+                                      <a:latin typeface="Cambria Math" panose="02040503050406030204" pitchFamily="18" charset="0"/>
+                                    </a:rPr>
+                                  </m:ctrlPr>
+                                </m:dPr>
+                                <m:e>
+                                  <m:r>
+                                    <a:rPr lang="en-US" b="0" i="1" smtClean="0">
+                                      <a:latin typeface="Cambria Math" panose="02040503050406030204" pitchFamily="18" charset="0"/>
+                                    </a:rPr>
+                                    <m:t>𝑥</m:t>
+                                  </m:r>
+                                  <m:r>
+                                    <a:rPr lang="en-US" b="0" i="1" smtClean="0">
+                                      <a:latin typeface="Cambria Math" panose="02040503050406030204" pitchFamily="18" charset="0"/>
+                                    </a:rPr>
+                                    <m:t>,</m:t>
+                                  </m:r>
+                                  <m:r>
+                                    <a:rPr lang="en-US" b="0" i="1" smtClean="0">
+                                      <a:latin typeface="Cambria Math" panose="02040503050406030204" pitchFamily="18" charset="0"/>
+                                    </a:rPr>
+                                    <m:t>𝑦</m:t>
+                                  </m:r>
+                                </m:e>
+                              </m:d>
+                              <m:r>
+                                <a:rPr lang="en-US" b="0" i="1" smtClean="0">
+                                  <a:latin typeface="Cambria Math" panose="02040503050406030204" pitchFamily="18" charset="0"/>
+                                </a:rPr>
+                                <m:t> </m:t>
+                              </m:r>
+                              <m:r>
+                                <m:rPr>
+                                  <m:nor/>
+                                </m:rPr>
+                                <a:rPr lang="en-US" b="0" i="0" smtClean="0">
+                                  <a:latin typeface="Cambria Math" panose="02040503050406030204" pitchFamily="18" charset="0"/>
+                                </a:rPr>
+                                <m:t>      </m:t>
+                              </m:r>
+                              <m:r>
+                                <m:rPr>
+                                  <m:nor/>
+                                </m:rPr>
+                                <a:rPr lang="en-US" b="0" i="0" smtClean="0">
+                                  <a:latin typeface="Cambria Math" panose="02040503050406030204" pitchFamily="18" charset="0"/>
+                                </a:rPr>
+                                <m:t>if</m:t>
+                              </m:r>
+                              <m:r>
+                                <m:rPr>
+                                  <m:nor/>
+                                </m:rPr>
+                                <a:rPr lang="en-US" b="0" i="0" smtClean="0">
+                                  <a:latin typeface="Cambria Math" panose="02040503050406030204" pitchFamily="18" charset="0"/>
+                                </a:rPr>
+                                <m:t> </m:t>
+                              </m:r>
+                              <m:r>
+                                <m:rPr>
+                                  <m:nor/>
+                                </m:rPr>
+                                <a:rPr lang="en-US" b="0" i="0" smtClean="0">
+                                  <a:latin typeface="Cambria Math" panose="02040503050406030204" pitchFamily="18" charset="0"/>
+                                </a:rPr>
+                                <m:t>on</m:t>
+                              </m:r>
+                              <m:r>
+                                <m:rPr>
+                                  <m:nor/>
+                                </m:rPr>
+                                <a:rPr lang="en-US" b="0" i="0" smtClean="0">
+                                  <a:latin typeface="Cambria Math" panose="02040503050406030204" pitchFamily="18" charset="0"/>
+                                </a:rPr>
+                                <m:t> </m:t>
+                              </m:r>
+                              <m:r>
+                                <m:rPr>
+                                  <m:nor/>
+                                </m:rPr>
+                                <a:rPr lang="en-US" b="0" i="0" smtClean="0">
+                                  <a:latin typeface="Cambria Math" panose="02040503050406030204" pitchFamily="18" charset="0"/>
+                                </a:rPr>
+                                <m:t>border</m:t>
+                              </m:r>
+                            </m:e>
+                            <m:e>
+                              <m:r>
+                                <a:rPr lang="en-US" b="0" i="1" smtClean="0">
+                                  <a:latin typeface="Cambria Math" panose="02040503050406030204" pitchFamily="18" charset="0"/>
+                                </a:rPr>
+                                <m:t>0                         </m:t>
+                              </m:r>
+                              <m:r>
+                                <m:rPr>
+                                  <m:nor/>
+                                </m:rPr>
+                                <a:rPr lang="en-US" b="0" i="0" smtClean="0">
+                                  <a:latin typeface="Cambria Math" panose="02040503050406030204" pitchFamily="18" charset="0"/>
+                                </a:rPr>
+                                <m:t>otherwise</m:t>
+                              </m:r>
+                              <m:r>
+                                <m:rPr>
+                                  <m:nor/>
+                                </m:rPr>
+                                <a:rPr lang="en-US" b="0" i="0" smtClean="0">
+                                  <a:latin typeface="Cambria Math" panose="02040503050406030204" pitchFamily="18" charset="0"/>
+                                </a:rPr>
+                                <m:t>   </m:t>
+                              </m:r>
+                            </m:e>
+                          </m:eqArr>
+                        </m:e>
+                      </m:d>
+                    </m:oMath>
+                  </m:oMathPara>
+                </a14:m>
+                <a:endParaRPr lang="en-US" b="0" i="1" dirty="0" smtClean="0">
+                  <a:latin typeface="Cambria Math" panose="02040503050406030204" pitchFamily="18" charset="0"/>
+                </a:endParaRPr>
+              </a:p>
+              <a:p>
+                <a:r>
+                  <a:rPr lang="en-US" b="0" dirty="0" smtClean="0"/>
+                  <a:t>The result image with the hole filled will be </a:t>
+                </a:r>
+                <a14:m>
+                  <m:oMath xmlns:m="http://schemas.openxmlformats.org/officeDocument/2006/math">
+                    <m:r>
+                      <a:rPr lang="en-US" b="0" i="1" smtClean="0">
+                        <a:latin typeface="Cambria Math" panose="02040503050406030204" pitchFamily="18" charset="0"/>
+                      </a:rPr>
+                      <m:t>𝐻</m:t>
+                    </m:r>
+                    <m:r>
+                      <a:rPr lang="en-US" b="0" i="1" smtClean="0">
+                        <a:latin typeface="Cambria Math" panose="02040503050406030204" pitchFamily="18" charset="0"/>
+                      </a:rPr>
+                      <m:t>=</m:t>
+                    </m:r>
+                    <m:sSup>
+                      <m:sSupPr>
+                        <m:ctrlPr>
+                          <a:rPr lang="en-US" b="0" i="1" smtClean="0">
+                            <a:latin typeface="Cambria Math" panose="02040503050406030204" pitchFamily="18" charset="0"/>
+                          </a:rPr>
+                        </m:ctrlPr>
+                      </m:sSupPr>
+                      <m:e>
+                        <m:d>
+                          <m:dPr>
+                            <m:begChr m:val="["/>
+                            <m:endChr m:val="]"/>
+                            <m:ctrlPr>
+                              <a:rPr lang="en-US" b="0" i="1" smtClean="0">
+                                <a:latin typeface="Cambria Math" panose="02040503050406030204" pitchFamily="18" charset="0"/>
+                              </a:rPr>
+                            </m:ctrlPr>
+                          </m:dPr>
+                          <m:e>
+                            <m:sSubSup>
+                              <m:sSubSupPr>
+                                <m:ctrlPr>
+                                  <a:rPr lang="en-US" b="0" i="1" smtClean="0">
+                                    <a:latin typeface="Cambria Math" panose="02040503050406030204" pitchFamily="18" charset="0"/>
+                                  </a:rPr>
+                                </m:ctrlPr>
+                              </m:sSubSupPr>
+                              <m:e>
+                                <m:r>
+                                  <a:rPr lang="en-US" b="0" i="1" smtClean="0">
+                                    <a:latin typeface="Cambria Math" panose="02040503050406030204" pitchFamily="18" charset="0"/>
+                                  </a:rPr>
+                                  <m:t>𝑅</m:t>
+                                </m:r>
+                              </m:e>
+                              <m:sub>
+                                <m:sSup>
+                                  <m:sSupPr>
+                                    <m:ctrlPr>
+                                      <a:rPr lang="en-US" b="0" i="1" smtClean="0">
+                                        <a:latin typeface="Cambria Math" panose="02040503050406030204" pitchFamily="18" charset="0"/>
+                                      </a:rPr>
+                                    </m:ctrlPr>
+                                  </m:sSupPr>
+                                  <m:e>
+                                    <m:r>
+                                      <a:rPr lang="en-US" b="0" i="1" smtClean="0">
+                                        <a:latin typeface="Cambria Math" panose="02040503050406030204" pitchFamily="18" charset="0"/>
+                                      </a:rPr>
+                                      <m:t>𝐼</m:t>
+                                    </m:r>
+                                  </m:e>
+                                  <m:sup>
+                                    <m:r>
+                                      <a:rPr lang="en-US" b="0" i="1" smtClean="0">
+                                        <a:latin typeface="Cambria Math" panose="02040503050406030204" pitchFamily="18" charset="0"/>
+                                      </a:rPr>
+                                      <m:t>𝑐</m:t>
+                                    </m:r>
+                                  </m:sup>
+                                </m:sSup>
+                              </m:sub>
+                              <m:sup>
+                                <m:r>
+                                  <a:rPr lang="en-US" b="0" i="1" smtClean="0">
+                                    <a:latin typeface="Cambria Math" panose="02040503050406030204" pitchFamily="18" charset="0"/>
+                                  </a:rPr>
+                                  <m:t>𝐷</m:t>
+                                </m:r>
+                              </m:sup>
+                            </m:sSubSup>
+                            <m:d>
+                              <m:dPr>
+                                <m:ctrlPr>
+                                  <a:rPr lang="en-US" b="0" i="1" smtClean="0">
+                                    <a:latin typeface="Cambria Math" panose="02040503050406030204" pitchFamily="18" charset="0"/>
+                                  </a:rPr>
+                                </m:ctrlPr>
+                              </m:dPr>
+                              <m:e>
+                                <m:r>
+                                  <a:rPr lang="en-US" b="0" i="1" smtClean="0">
+                                    <a:latin typeface="Cambria Math" panose="02040503050406030204" pitchFamily="18" charset="0"/>
+                                  </a:rPr>
+                                  <m:t>𝐹</m:t>
+                                </m:r>
+                              </m:e>
+                            </m:d>
+                          </m:e>
+                        </m:d>
+                      </m:e>
+                      <m:sup>
+                        <m:r>
+                          <a:rPr lang="en-US" b="0" i="1" smtClean="0">
+                            <a:latin typeface="Cambria Math" panose="02040503050406030204" pitchFamily="18" charset="0"/>
+                          </a:rPr>
+                          <m:t>𝑐</m:t>
+                        </m:r>
+                      </m:sup>
+                    </m:sSup>
+                  </m:oMath>
+                </a14:m>
+                <a:endParaRPr lang="en-US" dirty="0"/>
+              </a:p>
+            </p:txBody>
+          </p:sp>
+        </mc:Choice>
+        <mc:Fallback>
+          <p:sp>
+            <p:nvSpPr>
+              <p:cNvPr id="24" name="Content Placeholder 23"/>
+              <p:cNvSpPr>
+                <a:spLocks noGrp="1" noRot="1" noChangeAspect="1" noMove="1" noResize="1" noEditPoints="1" noAdjustHandles="1" noChangeArrowheads="1" noChangeShapeType="1" noTextEdit="1"/>
+              </p:cNvSpPr>
+              <p:nvPr>
+                <p:ph idx="1"/>
+              </p:nvPr>
+            </p:nvSpPr>
+            <p:spPr>
+              <a:blipFill rotWithShape="0">
+                <a:blip r:embed="rId2"/>
+                <a:stretch>
+                  <a:fillRect l="-1043" t="-2381"/>
+                </a:stretch>
+              </a:blipFill>
+            </p:spPr>
+            <p:txBody>
+              <a:bodyPr/>
+              <a:lstStyle/>
+              <a:p>
+                <a:r>
+                  <a:rPr lang="en-US">
+                    <a:noFill/>
+                  </a:rPr>
+                  <a:t> </a:t>
+                </a:r>
+              </a:p>
+            </p:txBody>
+          </p:sp>
+        </mc:Fallback>
+      </mc:AlternateContent>
+      <p:grpSp>
+        <p:nvGrpSpPr>
+          <p:cNvPr id="28" name="Group 27"/>
+          <p:cNvGrpSpPr/>
+          <p:nvPr/>
+        </p:nvGrpSpPr>
+        <p:grpSpPr>
+          <a:xfrm>
+            <a:off x="865306" y="4126801"/>
+            <a:ext cx="1400033" cy="2488681"/>
+            <a:chOff x="837590" y="4126801"/>
+            <a:chExt cx="1400033" cy="2488681"/>
+          </a:xfrm>
+        </p:grpSpPr>
+        <p:pic>
+          <p:nvPicPr>
+            <p:cNvPr id="18" name="Picture 17"/>
+            <p:cNvPicPr>
+              <a:picLocks noChangeAspect="1"/>
+            </p:cNvPicPr>
+            <p:nvPr/>
+          </p:nvPicPr>
+          <p:blipFill>
+            <a:blip r:embed="rId3">
+              <a:extLst>
+                <a:ext uri="{28A0092B-C50C-407E-A947-70E740481C1C}">
+                  <a14:useLocalDpi xmlns:a14="http://schemas.microsoft.com/office/drawing/2010/main" val="0"/>
+                </a:ext>
+              </a:extLst>
+            </a:blip>
+            <a:stretch>
+              <a:fillRect/>
+            </a:stretch>
+          </p:blipFill>
+          <p:spPr>
+            <a:xfrm>
+              <a:off x="838199" y="4126801"/>
+              <a:ext cx="1398816" cy="2098224"/>
+            </a:xfrm>
+            <a:prstGeom prst="rect">
+              <a:avLst/>
+            </a:prstGeom>
+            <a:ln>
+              <a:solidFill>
+                <a:schemeClr val="tx1"/>
+              </a:solidFill>
+            </a:ln>
+          </p:spPr>
+        </p:pic>
+        <mc:AlternateContent xmlns:mc="http://schemas.openxmlformats.org/markup-compatibility/2006">
+          <mc:Choice xmlns:a14="http://schemas.microsoft.com/office/drawing/2010/main" Requires="a14">
+            <p:sp>
+              <p:nvSpPr>
+                <p:cNvPr id="25" name="TextBox 24"/>
+                <p:cNvSpPr txBox="1"/>
+                <p:nvPr/>
+              </p:nvSpPr>
+              <p:spPr>
+                <a:xfrm>
+                  <a:off x="837590" y="6246150"/>
+                  <a:ext cx="1400033" cy="369332"/>
+                </a:xfrm>
+                <a:prstGeom prst="rect">
+                  <a:avLst/>
+                </a:prstGeom>
+                <a:noFill/>
+              </p:spPr>
+              <p:txBody>
+                <a:bodyPr wrap="square" rtlCol="0">
+                  <a:spAutoFit/>
+                </a:bodyPr>
+                <a:lstStyle/>
+                <a:p>
+                  <a:pPr algn="ctr"/>
+                  <a14:m>
+                    <m:oMathPara xmlns:m="http://schemas.openxmlformats.org/officeDocument/2006/math">
+                      <m:oMathParaPr>
+                        <m:jc m:val="centerGroup"/>
+                      </m:oMathParaPr>
+                      <m:oMath xmlns:m="http://schemas.openxmlformats.org/officeDocument/2006/math">
+                        <m:r>
+                          <a:rPr lang="en-US" i="1" smtClean="0">
+                            <a:latin typeface="Cambria Math" panose="02040503050406030204" pitchFamily="18" charset="0"/>
+                          </a:rPr>
+                          <m:t>𝐼</m:t>
+                        </m:r>
+                      </m:oMath>
+                    </m:oMathPara>
+                  </a14:m>
+                  <a:endParaRPr lang="en-US" i="1" dirty="0"/>
+                </a:p>
+              </p:txBody>
+            </p:sp>
+          </mc:Choice>
+          <mc:Fallback>
+            <p:sp>
+              <p:nvSpPr>
+                <p:cNvPr id="25" name="TextBox 24"/>
+                <p:cNvSpPr txBox="1">
+                  <a:spLocks noRot="1" noChangeAspect="1" noMove="1" noResize="1" noEditPoints="1" noAdjustHandles="1" noChangeArrowheads="1" noChangeShapeType="1" noTextEdit="1"/>
+                </p:cNvSpPr>
+                <p:nvPr/>
+              </p:nvSpPr>
+              <p:spPr>
+                <a:xfrm>
+                  <a:off x="837590" y="6246150"/>
+                  <a:ext cx="1400033" cy="369332"/>
+                </a:xfrm>
+                <a:prstGeom prst="rect">
+                  <a:avLst/>
+                </a:prstGeom>
+                <a:blipFill rotWithShape="0">
+                  <a:blip r:embed="rId4"/>
+                  <a:stretch>
+                    <a:fillRect/>
+                  </a:stretch>
+                </a:blipFill>
+              </p:spPr>
+              <p:txBody>
+                <a:bodyPr/>
+                <a:lstStyle/>
+                <a:p>
+                  <a:r>
+                    <a:rPr lang="en-US">
+                      <a:noFill/>
+                    </a:rPr>
+                    <a:t> </a:t>
+                  </a:r>
+                </a:p>
+              </p:txBody>
+            </p:sp>
+          </mc:Fallback>
+        </mc:AlternateContent>
+      </p:grpSp>
+      <p:grpSp>
+        <p:nvGrpSpPr>
+          <p:cNvPr id="38" name="Group 37"/>
+          <p:cNvGrpSpPr/>
+          <p:nvPr/>
+        </p:nvGrpSpPr>
+        <p:grpSpPr>
+          <a:xfrm>
+            <a:off x="9926662" y="4126801"/>
+            <a:ext cx="1400033" cy="2488681"/>
+            <a:chOff x="837590" y="4126801"/>
+            <a:chExt cx="1400033" cy="2488681"/>
+          </a:xfrm>
+        </p:grpSpPr>
+        <p:pic>
+          <p:nvPicPr>
+            <p:cNvPr id="39" name="Picture 38"/>
+            <p:cNvPicPr>
+              <a:picLocks noChangeAspect="1"/>
+            </p:cNvPicPr>
+            <p:nvPr/>
+          </p:nvPicPr>
+          <p:blipFill>
+            <a:blip r:embed="rId5">
+              <a:extLst>
+                <a:ext uri="{28A0092B-C50C-407E-A947-70E740481C1C}">
+                  <a14:useLocalDpi xmlns:a14="http://schemas.microsoft.com/office/drawing/2010/main" val="0"/>
+                </a:ext>
+              </a:extLst>
+            </a:blip>
+            <a:stretch>
+              <a:fillRect/>
+            </a:stretch>
+          </p:blipFill>
+          <p:spPr>
+            <a:xfrm>
+              <a:off x="838199" y="4126801"/>
+              <a:ext cx="1398816" cy="2098224"/>
+            </a:xfrm>
+            <a:prstGeom prst="rect">
+              <a:avLst/>
+            </a:prstGeom>
+            <a:ln>
+              <a:solidFill>
+                <a:schemeClr val="tx1"/>
+              </a:solidFill>
+            </a:ln>
+          </p:spPr>
+        </p:pic>
+        <mc:AlternateContent xmlns:mc="http://schemas.openxmlformats.org/markup-compatibility/2006">
+          <mc:Choice xmlns:a14="http://schemas.microsoft.com/office/drawing/2010/main" Requires="a14">
+            <p:sp>
+              <p:nvSpPr>
+                <p:cNvPr id="40" name="TextBox 39"/>
+                <p:cNvSpPr txBox="1"/>
+                <p:nvPr/>
+              </p:nvSpPr>
+              <p:spPr>
+                <a:xfrm>
+                  <a:off x="837590" y="6246150"/>
+                  <a:ext cx="1400033" cy="369332"/>
+                </a:xfrm>
+                <a:prstGeom prst="rect">
+                  <a:avLst/>
+                </a:prstGeom>
+                <a:noFill/>
+              </p:spPr>
+              <p:txBody>
+                <a:bodyPr wrap="square" rtlCol="0">
+                  <a:spAutoFit/>
+                </a:bodyPr>
+                <a:lstStyle/>
+                <a:p>
+                  <a:pPr algn="ctr"/>
+                  <a14:m>
+                    <m:oMathPara xmlns:m="http://schemas.openxmlformats.org/officeDocument/2006/math">
+                      <m:oMathParaPr>
+                        <m:jc m:val="centerGroup"/>
+                      </m:oMathParaPr>
+                      <m:oMath xmlns:m="http://schemas.openxmlformats.org/officeDocument/2006/math">
+                        <m:r>
+                          <a:rPr lang="en-US" i="1" smtClean="0">
+                            <a:latin typeface="Cambria Math" panose="02040503050406030204" pitchFamily="18" charset="0"/>
+                          </a:rPr>
+                          <m:t>𝐻</m:t>
+                        </m:r>
+                      </m:oMath>
+                    </m:oMathPara>
+                  </a14:m>
+                  <a:endParaRPr lang="en-US" i="1" dirty="0"/>
+                </a:p>
+              </p:txBody>
+            </p:sp>
+          </mc:Choice>
+          <mc:Fallback>
+            <p:sp>
+              <p:nvSpPr>
+                <p:cNvPr id="40" name="TextBox 39"/>
+                <p:cNvSpPr txBox="1">
+                  <a:spLocks noRot="1" noChangeAspect="1" noMove="1" noResize="1" noEditPoints="1" noAdjustHandles="1" noChangeArrowheads="1" noChangeShapeType="1" noTextEdit="1"/>
+                </p:cNvSpPr>
+                <p:nvPr/>
+              </p:nvSpPr>
+              <p:spPr>
+                <a:xfrm>
+                  <a:off x="837590" y="6246150"/>
+                  <a:ext cx="1400033" cy="369332"/>
+                </a:xfrm>
+                <a:prstGeom prst="rect">
+                  <a:avLst/>
+                </a:prstGeom>
+                <a:blipFill rotWithShape="0">
+                  <a:blip r:embed="rId6"/>
+                  <a:stretch>
+                    <a:fillRect/>
+                  </a:stretch>
+                </a:blipFill>
+              </p:spPr>
+              <p:txBody>
+                <a:bodyPr/>
+                <a:lstStyle/>
+                <a:p>
+                  <a:r>
+                    <a:rPr lang="en-US">
+                      <a:noFill/>
+                    </a:rPr>
+                    <a:t> </a:t>
+                  </a:r>
+                </a:p>
+              </p:txBody>
+            </p:sp>
+          </mc:Fallback>
+        </mc:AlternateContent>
+      </p:grpSp>
+      <p:grpSp>
+        <p:nvGrpSpPr>
+          <p:cNvPr id="41" name="Group 40"/>
+          <p:cNvGrpSpPr/>
+          <p:nvPr/>
+        </p:nvGrpSpPr>
+        <p:grpSpPr>
+          <a:xfrm>
+            <a:off x="3130645" y="4127517"/>
+            <a:ext cx="1400033" cy="2488681"/>
+            <a:chOff x="837590" y="4126801"/>
+            <a:chExt cx="1400033" cy="2488681"/>
+          </a:xfrm>
+        </p:grpSpPr>
+        <p:pic>
+          <p:nvPicPr>
+            <p:cNvPr id="42" name="Picture 41"/>
+            <p:cNvPicPr>
+              <a:picLocks noChangeAspect="1"/>
+            </p:cNvPicPr>
+            <p:nvPr/>
+          </p:nvPicPr>
+          <p:blipFill>
+            <a:blip r:embed="rId7">
+              <a:extLst>
+                <a:ext uri="{28A0092B-C50C-407E-A947-70E740481C1C}">
+                  <a14:useLocalDpi xmlns:a14="http://schemas.microsoft.com/office/drawing/2010/main" val="0"/>
+                </a:ext>
+              </a:extLst>
+            </a:blip>
+            <a:stretch>
+              <a:fillRect/>
+            </a:stretch>
+          </p:blipFill>
+          <p:spPr>
+            <a:xfrm>
+              <a:off x="838199" y="4126801"/>
+              <a:ext cx="1398816" cy="2098224"/>
+            </a:xfrm>
+            <a:prstGeom prst="rect">
+              <a:avLst/>
+            </a:prstGeom>
+            <a:ln>
+              <a:solidFill>
+                <a:schemeClr val="tx1"/>
+              </a:solidFill>
+            </a:ln>
+          </p:spPr>
+        </p:pic>
+        <mc:AlternateContent xmlns:mc="http://schemas.openxmlformats.org/markup-compatibility/2006">
+          <mc:Choice xmlns:a14="http://schemas.microsoft.com/office/drawing/2010/main" Requires="a14">
+            <p:sp>
+              <p:nvSpPr>
+                <p:cNvPr id="43" name="TextBox 42"/>
+                <p:cNvSpPr txBox="1"/>
+                <p:nvPr/>
+              </p:nvSpPr>
+              <p:spPr>
+                <a:xfrm>
+                  <a:off x="837590" y="6246150"/>
+                  <a:ext cx="1400033" cy="369332"/>
+                </a:xfrm>
+                <a:prstGeom prst="rect">
+                  <a:avLst/>
+                </a:prstGeom>
+                <a:noFill/>
+              </p:spPr>
+              <p:txBody>
+                <a:bodyPr wrap="square" rtlCol="0">
+                  <a:spAutoFit/>
+                </a:bodyPr>
+                <a:lstStyle/>
+                <a:p>
+                  <a:pPr algn="ctr"/>
+                  <a14:m>
+                    <m:oMathPara xmlns:m="http://schemas.openxmlformats.org/officeDocument/2006/math">
+                      <m:oMathParaPr>
+                        <m:jc m:val="centerGroup"/>
+                      </m:oMathParaPr>
+                      <m:oMath xmlns:m="http://schemas.openxmlformats.org/officeDocument/2006/math">
+                        <m:sSup>
+                          <m:sSupPr>
+                            <m:ctrlPr>
+                              <a:rPr lang="en-US" i="1" smtClean="0">
+                                <a:latin typeface="Cambria Math" panose="02040503050406030204" pitchFamily="18" charset="0"/>
+                              </a:rPr>
+                            </m:ctrlPr>
+                          </m:sSupPr>
+                          <m:e>
+                            <m:r>
+                              <a:rPr lang="en-US" b="0" i="1" smtClean="0">
+                                <a:latin typeface="Cambria Math" panose="02040503050406030204" pitchFamily="18" charset="0"/>
+                              </a:rPr>
+                              <m:t>𝐼</m:t>
+                            </m:r>
+                          </m:e>
+                          <m:sup>
+                            <m:r>
+                              <a:rPr lang="en-US" b="0" i="1" smtClean="0">
+                                <a:latin typeface="Cambria Math" panose="02040503050406030204" pitchFamily="18" charset="0"/>
+                              </a:rPr>
+                              <m:t>𝑐</m:t>
+                            </m:r>
+                          </m:sup>
+                        </m:sSup>
+                      </m:oMath>
+                    </m:oMathPara>
+                  </a14:m>
+                  <a:endParaRPr lang="en-US" i="1" dirty="0"/>
+                </a:p>
+              </p:txBody>
+            </p:sp>
+          </mc:Choice>
+          <mc:Fallback>
+            <p:sp>
+              <p:nvSpPr>
+                <p:cNvPr id="43" name="TextBox 42"/>
+                <p:cNvSpPr txBox="1">
+                  <a:spLocks noRot="1" noChangeAspect="1" noMove="1" noResize="1" noEditPoints="1" noAdjustHandles="1" noChangeArrowheads="1" noChangeShapeType="1" noTextEdit="1"/>
+                </p:cNvSpPr>
+                <p:nvPr/>
+              </p:nvSpPr>
+              <p:spPr>
+                <a:xfrm>
+                  <a:off x="837590" y="6246150"/>
+                  <a:ext cx="1400033" cy="369332"/>
+                </a:xfrm>
+                <a:prstGeom prst="rect">
+                  <a:avLst/>
+                </a:prstGeom>
+                <a:blipFill rotWithShape="0">
+                  <a:blip r:embed="rId8"/>
+                  <a:stretch>
+                    <a:fillRect/>
+                  </a:stretch>
+                </a:blipFill>
+              </p:spPr>
+              <p:txBody>
+                <a:bodyPr/>
+                <a:lstStyle/>
+                <a:p>
+                  <a:r>
+                    <a:rPr lang="en-US">
+                      <a:noFill/>
+                    </a:rPr>
+                    <a:t> </a:t>
+                  </a:r>
+                </a:p>
+              </p:txBody>
+            </p:sp>
+          </mc:Fallback>
+        </mc:AlternateContent>
+      </p:grpSp>
+      <p:grpSp>
+        <p:nvGrpSpPr>
+          <p:cNvPr id="44" name="Group 43"/>
+          <p:cNvGrpSpPr/>
+          <p:nvPr/>
+        </p:nvGrpSpPr>
+        <p:grpSpPr>
+          <a:xfrm>
+            <a:off x="5395984" y="4126801"/>
+            <a:ext cx="1400033" cy="2488681"/>
+            <a:chOff x="837590" y="4126801"/>
+            <a:chExt cx="1400033" cy="2488681"/>
+          </a:xfrm>
+        </p:grpSpPr>
+        <p:pic>
+          <p:nvPicPr>
+            <p:cNvPr id="45" name="Picture 44"/>
+            <p:cNvPicPr>
+              <a:picLocks noChangeAspect="1"/>
+            </p:cNvPicPr>
+            <p:nvPr/>
+          </p:nvPicPr>
+          <p:blipFill>
+            <a:blip r:embed="rId9">
+              <a:extLst>
+                <a:ext uri="{28A0092B-C50C-407E-A947-70E740481C1C}">
+                  <a14:useLocalDpi xmlns:a14="http://schemas.microsoft.com/office/drawing/2010/main" val="0"/>
+                </a:ext>
+              </a:extLst>
+            </a:blip>
+            <a:stretch>
+              <a:fillRect/>
+            </a:stretch>
+          </p:blipFill>
+          <p:spPr>
+            <a:xfrm>
+              <a:off x="838199" y="4126801"/>
+              <a:ext cx="1398816" cy="2098224"/>
+            </a:xfrm>
+            <a:prstGeom prst="rect">
+              <a:avLst/>
+            </a:prstGeom>
+            <a:ln>
+              <a:solidFill>
+                <a:schemeClr val="tx1"/>
+              </a:solidFill>
+            </a:ln>
+          </p:spPr>
+        </p:pic>
+        <mc:AlternateContent xmlns:mc="http://schemas.openxmlformats.org/markup-compatibility/2006">
+          <mc:Choice xmlns:a14="http://schemas.microsoft.com/office/drawing/2010/main" Requires="a14">
+            <p:sp>
+              <p:nvSpPr>
+                <p:cNvPr id="46" name="TextBox 45"/>
+                <p:cNvSpPr txBox="1"/>
+                <p:nvPr/>
+              </p:nvSpPr>
+              <p:spPr>
+                <a:xfrm>
+                  <a:off x="837590" y="6246150"/>
+                  <a:ext cx="1400033" cy="369332"/>
+                </a:xfrm>
+                <a:prstGeom prst="rect">
+                  <a:avLst/>
+                </a:prstGeom>
+                <a:noFill/>
+              </p:spPr>
+              <p:txBody>
+                <a:bodyPr wrap="square" rtlCol="0">
+                  <a:spAutoFit/>
+                </a:bodyPr>
+                <a:lstStyle/>
+                <a:p>
+                  <a:pPr algn="ctr"/>
+                  <a14:m>
+                    <m:oMathPara xmlns:m="http://schemas.openxmlformats.org/officeDocument/2006/math">
+                      <m:oMathParaPr>
+                        <m:jc m:val="centerGroup"/>
+                      </m:oMathParaPr>
+                      <m:oMath xmlns:m="http://schemas.openxmlformats.org/officeDocument/2006/math">
+                        <m:r>
+                          <a:rPr lang="en-US" i="1" smtClean="0">
+                            <a:latin typeface="Cambria Math" panose="02040503050406030204" pitchFamily="18" charset="0"/>
+                          </a:rPr>
+                          <m:t>𝐹</m:t>
+                        </m:r>
+                      </m:oMath>
+                    </m:oMathPara>
+                  </a14:m>
+                  <a:endParaRPr lang="en-US" i="1" dirty="0"/>
+                </a:p>
+              </p:txBody>
+            </p:sp>
+          </mc:Choice>
+          <mc:Fallback>
+            <p:sp>
+              <p:nvSpPr>
+                <p:cNvPr id="46" name="TextBox 45"/>
+                <p:cNvSpPr txBox="1">
+                  <a:spLocks noRot="1" noChangeAspect="1" noMove="1" noResize="1" noEditPoints="1" noAdjustHandles="1" noChangeArrowheads="1" noChangeShapeType="1" noTextEdit="1"/>
+                </p:cNvSpPr>
+                <p:nvPr/>
+              </p:nvSpPr>
+              <p:spPr>
+                <a:xfrm>
+                  <a:off x="837590" y="6246150"/>
+                  <a:ext cx="1400033" cy="369332"/>
+                </a:xfrm>
+                <a:prstGeom prst="rect">
+                  <a:avLst/>
+                </a:prstGeom>
+                <a:blipFill rotWithShape="0">
+                  <a:blip r:embed="rId10"/>
+                  <a:stretch>
+                    <a:fillRect/>
+                  </a:stretch>
+                </a:blipFill>
+              </p:spPr>
+              <p:txBody>
+                <a:bodyPr/>
+                <a:lstStyle/>
+                <a:p>
+                  <a:r>
+                    <a:rPr lang="en-US">
+                      <a:noFill/>
+                    </a:rPr>
+                    <a:t> </a:t>
+                  </a:r>
+                </a:p>
+              </p:txBody>
+            </p:sp>
+          </mc:Fallback>
+        </mc:AlternateContent>
+      </p:grpSp>
+      <p:grpSp>
+        <p:nvGrpSpPr>
+          <p:cNvPr id="47" name="Group 46"/>
+          <p:cNvGrpSpPr/>
+          <p:nvPr/>
+        </p:nvGrpSpPr>
+        <p:grpSpPr>
+          <a:xfrm>
+            <a:off x="7661323" y="4140090"/>
+            <a:ext cx="1400033" cy="2488681"/>
+            <a:chOff x="837590" y="4126801"/>
+            <a:chExt cx="1400033" cy="2488681"/>
+          </a:xfrm>
+        </p:grpSpPr>
+        <p:pic>
+          <p:nvPicPr>
+            <p:cNvPr id="48" name="Picture 47"/>
+            <p:cNvPicPr>
+              <a:picLocks noChangeAspect="1"/>
+            </p:cNvPicPr>
+            <p:nvPr/>
+          </p:nvPicPr>
+          <p:blipFill>
+            <a:blip r:embed="rId11">
+              <a:extLst>
+                <a:ext uri="{28A0092B-C50C-407E-A947-70E740481C1C}">
+                  <a14:useLocalDpi xmlns:a14="http://schemas.microsoft.com/office/drawing/2010/main" val="0"/>
+                </a:ext>
+              </a:extLst>
+            </a:blip>
+            <a:stretch>
+              <a:fillRect/>
+            </a:stretch>
+          </p:blipFill>
+          <p:spPr>
+            <a:xfrm>
+              <a:off x="838199" y="4126801"/>
+              <a:ext cx="1398816" cy="2098224"/>
+            </a:xfrm>
+            <a:prstGeom prst="rect">
+              <a:avLst/>
+            </a:prstGeom>
+            <a:ln>
+              <a:solidFill>
+                <a:schemeClr val="tx1"/>
+              </a:solidFill>
+            </a:ln>
+          </p:spPr>
+        </p:pic>
+        <mc:AlternateContent xmlns:mc="http://schemas.openxmlformats.org/markup-compatibility/2006">
+          <mc:Choice xmlns:a14="http://schemas.microsoft.com/office/drawing/2010/main" Requires="a14">
+            <p:sp>
+              <p:nvSpPr>
+                <p:cNvPr id="49" name="TextBox 48"/>
+                <p:cNvSpPr txBox="1"/>
+                <p:nvPr/>
+              </p:nvSpPr>
+              <p:spPr>
+                <a:xfrm>
+                  <a:off x="837590" y="6246150"/>
+                  <a:ext cx="1400033" cy="369332"/>
+                </a:xfrm>
+                <a:prstGeom prst="rect">
+                  <a:avLst/>
+                </a:prstGeom>
+                <a:noFill/>
+              </p:spPr>
+              <p:txBody>
+                <a:bodyPr wrap="square" rtlCol="0">
+                  <a:spAutoFit/>
+                </a:bodyPr>
+                <a:lstStyle/>
+                <a:p>
+                  <a:pPr algn="ctr"/>
+                  <a14:m>
+                    <m:oMathPara xmlns:m="http://schemas.openxmlformats.org/officeDocument/2006/math">
+                      <m:oMathParaPr>
+                        <m:jc m:val="centerGroup"/>
+                      </m:oMathParaPr>
+                      <m:oMath xmlns:m="http://schemas.openxmlformats.org/officeDocument/2006/math">
+                        <m:r>
+                          <a:rPr lang="en-US" i="1" smtClean="0">
+                            <a:latin typeface="Cambria Math" panose="02040503050406030204" pitchFamily="18" charset="0"/>
+                          </a:rPr>
+                          <m:t>𝐹</m:t>
+                        </m:r>
+                        <m:r>
+                          <a:rPr lang="en-US" i="1" smtClean="0">
+                            <a:latin typeface="Cambria Math" panose="02040503050406030204" pitchFamily="18" charset="0"/>
+                            <a:ea typeface="Cambria Math" panose="02040503050406030204" pitchFamily="18" charset="0"/>
+                          </a:rPr>
+                          <m:t>⨁</m:t>
+                        </m:r>
+                        <m:r>
+                          <a:rPr lang="en-US" b="0" i="1" smtClean="0">
+                            <a:latin typeface="Cambria Math" panose="02040503050406030204" pitchFamily="18" charset="0"/>
+                            <a:ea typeface="Cambria Math" panose="02040503050406030204" pitchFamily="18" charset="0"/>
+                          </a:rPr>
+                          <m:t>𝐵</m:t>
+                        </m:r>
+                        <m:r>
+                          <a:rPr lang="en-US" b="0" i="1" smtClean="0">
+                            <a:latin typeface="Cambria Math" panose="02040503050406030204" pitchFamily="18" charset="0"/>
+                            <a:ea typeface="Cambria Math" panose="02040503050406030204" pitchFamily="18" charset="0"/>
+                          </a:rPr>
+                          <m:t>∩</m:t>
+                        </m:r>
+                        <m:sSup>
+                          <m:sSupPr>
+                            <m:ctrlPr>
+                              <a:rPr lang="en-US" i="1" smtClean="0">
+                                <a:latin typeface="Cambria Math" panose="02040503050406030204" pitchFamily="18" charset="0"/>
+                              </a:rPr>
+                            </m:ctrlPr>
+                          </m:sSupPr>
+                          <m:e>
+                            <m:r>
+                              <a:rPr lang="en-US" b="0" i="1" smtClean="0">
+                                <a:latin typeface="Cambria Math" panose="02040503050406030204" pitchFamily="18" charset="0"/>
+                              </a:rPr>
+                              <m:t>𝐼</m:t>
+                            </m:r>
+                          </m:e>
+                          <m:sup>
+                            <m:r>
+                              <a:rPr lang="en-US" b="0" i="1" smtClean="0">
+                                <a:latin typeface="Cambria Math" panose="02040503050406030204" pitchFamily="18" charset="0"/>
+                              </a:rPr>
+                              <m:t>𝑐</m:t>
+                            </m:r>
+                          </m:sup>
+                        </m:sSup>
+                      </m:oMath>
+                    </m:oMathPara>
+                  </a14:m>
+                  <a:endParaRPr lang="en-US" i="1" dirty="0"/>
+                </a:p>
+              </p:txBody>
+            </p:sp>
+          </mc:Choice>
+          <mc:Fallback>
+            <p:sp>
+              <p:nvSpPr>
+                <p:cNvPr id="49" name="TextBox 48"/>
+                <p:cNvSpPr txBox="1">
+                  <a:spLocks noRot="1" noChangeAspect="1" noMove="1" noResize="1" noEditPoints="1" noAdjustHandles="1" noChangeArrowheads="1" noChangeShapeType="1" noTextEdit="1"/>
+                </p:cNvSpPr>
+                <p:nvPr/>
+              </p:nvSpPr>
+              <p:spPr>
+                <a:xfrm>
+                  <a:off x="837590" y="6246150"/>
+                  <a:ext cx="1400033" cy="369332"/>
+                </a:xfrm>
+                <a:prstGeom prst="rect">
+                  <a:avLst/>
+                </a:prstGeom>
+                <a:blipFill rotWithShape="0">
+                  <a:blip r:embed="rId12"/>
+                  <a:stretch>
+                    <a:fillRect b="-1667"/>
+                  </a:stretch>
+                </a:blipFill>
+              </p:spPr>
+              <p:txBody>
+                <a:bodyPr/>
+                <a:lstStyle/>
+                <a:p>
+                  <a:r>
+                    <a:rPr lang="en-US">
+                      <a:noFill/>
+                    </a:rPr>
+                    <a:t> </a:t>
+                  </a:r>
+                </a:p>
+              </p:txBody>
+            </p:sp>
+          </mc:Fallback>
+        </mc:AlternateContent>
+      </p:grpSp>
+    </p:spTree>
+    <p:extLst>
+      <p:ext uri="{BB962C8B-B14F-4D97-AF65-F5344CB8AC3E}">
+        <p14:creationId xmlns:p14="http://schemas.microsoft.com/office/powerpoint/2010/main" val="4258058050"/>
+      </p:ext>
+    </p:extLst>
+  </p:cSld>
+  <p:clrMapOvr>
+    <a:masterClrMapping/>
+  </p:clrMapOvr>
+  <p:timing>
+    <p:tnLst>
+      <p:par>
+        <p:cTn id="1" dur="indefinite" restart="never" nodeType="tmRoot">
+          <p:childTnLst>
+            <p:seq concurrent="1" nextAc="seek">
+              <p:cTn id="2" dur="indefinite" nodeType="mainSeq">
+                <p:childTnLst>
+                  <p:par>
+                    <p:cTn id="3" fill="hold">
+                      <p:stCondLst>
+                        <p:cond delay="indefinite"/>
+                      </p:stCondLst>
+                      <p:childTnLst>
+                        <p:par>
+                          <p:cTn id="4" fill="hold">
+                            <p:stCondLst>
+                              <p:cond delay="0"/>
+                            </p:stCondLst>
+                            <p:childTnLst>
+                              <p:par>
+                                <p:cTn id="5" presetID="1" presetClass="entr" presetSubtype="0" fill="hold" nodeType="clickEffect">
+                                  <p:stCondLst>
+                                    <p:cond delay="0"/>
+                                  </p:stCondLst>
+                                  <p:childTnLst>
+                                    <p:set>
+                                      <p:cBhvr>
+                                        <p:cTn id="6" dur="1" fill="hold">
+                                          <p:stCondLst>
+                                            <p:cond delay="0"/>
+                                          </p:stCondLst>
+                                        </p:cTn>
+                                        <p:tgtEl>
+                                          <p:spTgt spid="24">
+                                            <p:txEl>
+                                              <p:pRg st="2" end="2"/>
+                                            </p:txEl>
+                                          </p:spTgt>
+                                        </p:tgtEl>
+                                        <p:attrNameLst>
+                                          <p:attrName>style.visibility</p:attrName>
+                                        </p:attrNameLst>
+                                      </p:cBhvr>
+                                      <p:to>
+                                        <p:strVal val="visible"/>
+                                      </p:to>
+                                    </p:set>
+                                  </p:childTnLst>
+                                </p:cTn>
+                              </p:par>
+                            </p:childTnLst>
+                          </p:cTn>
+                        </p:par>
+                      </p:childTnLst>
+                    </p:cTn>
+                  </p:par>
+                  <p:par>
+                    <p:cTn id="7" fill="hold">
+                      <p:stCondLst>
+                        <p:cond delay="indefinite"/>
+                      </p:stCondLst>
+                      <p:childTnLst>
+                        <p:par>
+                          <p:cTn id="8" fill="hold">
+                            <p:stCondLst>
+                              <p:cond delay="0"/>
+                            </p:stCondLst>
+                            <p:childTnLst>
+                              <p:par>
+                                <p:cTn id="9" presetID="1" presetClass="entr" presetSubtype="0" fill="hold" nodeType="clickEffect">
+                                  <p:stCondLst>
+                                    <p:cond delay="0"/>
+                                  </p:stCondLst>
+                                  <p:childTnLst>
+                                    <p:set>
+                                      <p:cBhvr>
+                                        <p:cTn id="10" dur="1" fill="hold">
+                                          <p:stCondLst>
+                                            <p:cond delay="0"/>
+                                          </p:stCondLst>
+                                        </p:cTn>
+                                        <p:tgtEl>
+                                          <p:spTgt spid="28"/>
+                                        </p:tgtEl>
+                                        <p:attrNameLst>
+                                          <p:attrName>style.visibility</p:attrName>
+                                        </p:attrNameLst>
+                                      </p:cBhvr>
+                                      <p:to>
+                                        <p:strVal val="visible"/>
+                                      </p:to>
+                                    </p:set>
+                                  </p:childTnLst>
+                                </p:cTn>
+                              </p:par>
+                            </p:childTnLst>
+                          </p:cTn>
+                        </p:par>
+                      </p:childTnLst>
+                    </p:cTn>
+                  </p:par>
+                  <p:par>
+                    <p:cTn id="11" fill="hold">
+                      <p:stCondLst>
+                        <p:cond delay="indefinite"/>
+                      </p:stCondLst>
+                      <p:childTnLst>
+                        <p:par>
+                          <p:cTn id="12" fill="hold">
+                            <p:stCondLst>
+                              <p:cond delay="0"/>
+                            </p:stCondLst>
+                            <p:childTnLst>
+                              <p:par>
+                                <p:cTn id="13" presetID="1" presetClass="entr" presetSubtype="0" fill="hold" nodeType="clickEffect">
+                                  <p:stCondLst>
+                                    <p:cond delay="0"/>
+                                  </p:stCondLst>
+                                  <p:childTnLst>
+                                    <p:set>
+                                      <p:cBhvr>
+                                        <p:cTn id="14" dur="1" fill="hold">
+                                          <p:stCondLst>
+                                            <p:cond delay="0"/>
+                                          </p:stCondLst>
+                                        </p:cTn>
+                                        <p:tgtEl>
+                                          <p:spTgt spid="41"/>
+                                        </p:tgtEl>
+                                        <p:attrNameLst>
+                                          <p:attrName>style.visibility</p:attrName>
+                                        </p:attrNameLst>
+                                      </p:cBhvr>
+                                      <p:to>
+                                        <p:strVal val="visible"/>
+                                      </p:to>
+                                    </p:set>
+                                  </p:childTnLst>
+                                </p:cTn>
+                              </p:par>
+                            </p:childTnLst>
+                          </p:cTn>
+                        </p:par>
+                      </p:childTnLst>
+                    </p:cTn>
+                  </p:par>
+                  <p:par>
+                    <p:cTn id="15" fill="hold">
+                      <p:stCondLst>
+                        <p:cond delay="indefinite"/>
+                      </p:stCondLst>
+                      <p:childTnLst>
+                        <p:par>
+                          <p:cTn id="16" fill="hold">
+                            <p:stCondLst>
+                              <p:cond delay="0"/>
+                            </p:stCondLst>
+                            <p:childTnLst>
+                              <p:par>
+                                <p:cTn id="17" presetID="1" presetClass="entr" presetSubtype="0" fill="hold" nodeType="clickEffect">
+                                  <p:stCondLst>
+                                    <p:cond delay="0"/>
+                                  </p:stCondLst>
+                                  <p:childTnLst>
+                                    <p:set>
+                                      <p:cBhvr>
+                                        <p:cTn id="18" dur="1" fill="hold">
+                                          <p:stCondLst>
+                                            <p:cond delay="0"/>
+                                          </p:stCondLst>
+                                        </p:cTn>
+                                        <p:tgtEl>
+                                          <p:spTgt spid="44"/>
+                                        </p:tgtEl>
+                                        <p:attrNameLst>
+                                          <p:attrName>style.visibility</p:attrName>
+                                        </p:attrNameLst>
+                                      </p:cBhvr>
+                                      <p:to>
+                                        <p:strVal val="visible"/>
+                                      </p:to>
+                                    </p:set>
+                                  </p:childTnLst>
+                                </p:cTn>
+                              </p:par>
+                            </p:childTnLst>
+                          </p:cTn>
+                        </p:par>
+                      </p:childTnLst>
+                    </p:cTn>
+                  </p:par>
+                  <p:par>
+                    <p:cTn id="19" fill="hold">
+                      <p:stCondLst>
+                        <p:cond delay="indefinite"/>
+                      </p:stCondLst>
+                      <p:childTnLst>
+                        <p:par>
+                          <p:cTn id="20" fill="hold">
+                            <p:stCondLst>
+                              <p:cond delay="0"/>
+                            </p:stCondLst>
+                            <p:childTnLst>
+                              <p:par>
+                                <p:cTn id="21" presetID="1" presetClass="entr" presetSubtype="0" fill="hold" nodeType="clickEffect">
+                                  <p:stCondLst>
+                                    <p:cond delay="0"/>
+                                  </p:stCondLst>
+                                  <p:childTnLst>
+                                    <p:set>
+                                      <p:cBhvr>
+                                        <p:cTn id="22" dur="1" fill="hold">
+                                          <p:stCondLst>
+                                            <p:cond delay="0"/>
+                                          </p:stCondLst>
+                                        </p:cTn>
+                                        <p:tgtEl>
+                                          <p:spTgt spid="47"/>
+                                        </p:tgtEl>
+                                        <p:attrNameLst>
+                                          <p:attrName>style.visibility</p:attrName>
+                                        </p:attrNameLst>
+                                      </p:cBhvr>
+                                      <p:to>
+                                        <p:strVal val="visible"/>
+                                      </p:to>
+                                    </p:set>
+                                  </p:childTnLst>
+                                </p:cTn>
+                              </p:par>
+                            </p:childTnLst>
+                          </p:cTn>
+                        </p:par>
+                      </p:childTnLst>
+                    </p:cTn>
+                  </p:par>
+                  <p:par>
+                    <p:cTn id="23" fill="hold">
+                      <p:stCondLst>
+                        <p:cond delay="indefinite"/>
+                      </p:stCondLst>
+                      <p:childTnLst>
+                        <p:par>
+                          <p:cTn id="24" fill="hold">
+                            <p:stCondLst>
+                              <p:cond delay="0"/>
+                            </p:stCondLst>
+                            <p:childTnLst>
+                              <p:par>
+                                <p:cTn id="25" presetID="1" presetClass="entr" presetSubtype="0" fill="hold" nodeType="clickEffect">
+                                  <p:stCondLst>
+                                    <p:cond delay="0"/>
+                                  </p:stCondLst>
+                                  <p:childTnLst>
+                                    <p:set>
+                                      <p:cBhvr>
+                                        <p:cTn id="26" dur="1" fill="hold">
+                                          <p:stCondLst>
+                                            <p:cond delay="0"/>
+                                          </p:stCondLst>
+                                        </p:cTn>
+                                        <p:tgtEl>
+                                          <p:spTgt spid="38"/>
+                                        </p:tgtEl>
+                                        <p:attrNameLst>
+                                          <p:attrName>style.visibility</p:attrName>
+                                        </p:attrNameLst>
+                                      </p:cBhvr>
+                                      <p:to>
+                                        <p:strVal val="visible"/>
+                                      </p:to>
+                                    </p:set>
+                                  </p:childTnLst>
+                                </p:cTn>
+                              </p:par>
+                            </p:childTnLst>
+                          </p:cTn>
+                        </p:par>
+                      </p:childTnLst>
+                    </p:cTn>
+                  </p:par>
+                </p:childTnLst>
+              </p:cTn>
+              <p:prevCondLst>
+                <p:cond evt="onPrev" delay="0">
+                  <p:tgtEl>
+                    <p:sldTgt/>
+                  </p:tgtEl>
+                </p:cond>
+              </p:prevCondLst>
+              <p:nextCondLst>
+                <p:cond evt="onNext" delay="0">
+                  <p:tgtEl>
+                    <p:sldTgt/>
+                  </p:tgtEl>
+                </p:cond>
+              </p:nextCondLst>
+            </p:seq>
+          </p:childTnLst>
+        </p:cTn>
+      </p:par>
+    </p:tnLst>
+  </p:timing>
+</p:sld>
+</file>
+
+<file path=ppt/slides/slide8.xml><?xml version="1.0" encoding="utf-8"?>
+<p:sld xmlns:a="http://schemas.openxmlformats.org/drawingml/2006/main" xmlns:r="http://schemas.openxmlformats.org/officeDocument/2006/relationships" xmlns:p="http://schemas.openxmlformats.org/presentationml/2006/main">
+  <p:cSld>
+    <p:spTree>
+      <p:nvGrpSpPr>
+        <p:cNvPr id="1" name=""/>
+        <p:cNvGrpSpPr/>
+        <p:nvPr/>
+      </p:nvGrpSpPr>
+      <p:grpSpPr>
+        <a:xfrm>
+          <a:off x="0" y="0"/>
+          <a:ext cx="0" cy="0"/>
+          <a:chOff x="0" y="0"/>
+          <a:chExt cx="0" cy="0"/>
+        </a:xfrm>
+      </p:grpSpPr>
+      <p:pic>
+        <p:nvPicPr>
+          <p:cNvPr id="5" name="Content Placeholder 4"/>
+          <p:cNvPicPr>
+            <a:picLocks noGrp="1" noChangeAspect="1"/>
+          </p:cNvPicPr>
+          <p:nvPr>
+            <p:ph sz="half" idx="1"/>
+          </p:nvPr>
+        </p:nvPicPr>
+        <p:blipFill>
+          <a:blip r:embed="rId2">
+            <a:extLst>
+              <a:ext uri="{28A0092B-C50C-407E-A947-70E740481C1C}">
+                <a14:useLocalDpi xmlns:a14="http://schemas.microsoft.com/office/drawing/2010/main" val="0"/>
+              </a:ext>
+            </a:extLst>
+          </a:blip>
+          <a:stretch>
+            <a:fillRect/>
+          </a:stretch>
+        </p:blipFill>
+        <p:spPr>
+          <a:xfrm>
+            <a:off x="561891" y="1501254"/>
+            <a:ext cx="4860760" cy="3855492"/>
+          </a:xfrm>
+        </p:spPr>
+      </p:pic>
+      <p:pic>
+        <p:nvPicPr>
+          <p:cNvPr id="6" name="Content Placeholder 5"/>
+          <p:cNvPicPr>
+            <a:picLocks noGrp="1" noChangeAspect="1"/>
+          </p:cNvPicPr>
+          <p:nvPr>
+            <p:ph sz="half" idx="2"/>
+          </p:nvPr>
+        </p:nvPicPr>
+        <p:blipFill>
+          <a:blip r:embed="rId3">
+            <a:extLst>
+              <a:ext uri="{28A0092B-C50C-407E-A947-70E740481C1C}">
+                <a14:useLocalDpi xmlns:a14="http://schemas.microsoft.com/office/drawing/2010/main" val="0"/>
+              </a:ext>
+            </a:extLst>
+          </a:blip>
+          <a:stretch>
+            <a:fillRect/>
+          </a:stretch>
+        </p:blipFill>
+        <p:spPr>
+          <a:xfrm>
+            <a:off x="6782996" y="1501254"/>
+            <a:ext cx="4860760" cy="3855492"/>
+          </a:xfrm>
+        </p:spPr>
+      </p:pic>
+      <p:cxnSp>
+        <p:nvCxnSpPr>
+          <p:cNvPr id="8" name="Straight Arrow Connector 7"/>
+          <p:cNvCxnSpPr/>
+          <p:nvPr/>
+        </p:nvCxnSpPr>
+        <p:spPr>
+          <a:xfrm>
+            <a:off x="5486400" y="3429000"/>
+            <a:ext cx="1240403" cy="0"/>
+          </a:xfrm>
+          <a:prstGeom prst="straightConnector1">
+            <a:avLst/>
+          </a:prstGeom>
+          <a:ln>
+            <a:tailEnd type="triangle"/>
+          </a:ln>
+        </p:spPr>
+        <p:style>
+          <a:lnRef idx="3">
+            <a:schemeClr val="dk1"/>
+          </a:lnRef>
+          <a:fillRef idx="0">
+            <a:schemeClr val="dk1"/>
+          </a:fillRef>
+          <a:effectRef idx="2">
+            <a:schemeClr val="dk1"/>
+          </a:effectRef>
+          <a:fontRef idx="minor">
+            <a:schemeClr val="tx1"/>
+          </a:fontRef>
+        </p:style>
+      </p:cxnSp>
+    </p:spTree>
+    <p:extLst>
+      <p:ext uri="{BB962C8B-B14F-4D97-AF65-F5344CB8AC3E}">
+        <p14:creationId xmlns:p14="http://schemas.microsoft.com/office/powerpoint/2010/main" val="3645689163"/>
+      </p:ext>
+    </p:extLst>
+  </p:cSld>
+  <p:clrMapOvr>
+    <a:masterClrMapping/>
+  </p:clrMapOvr>
+  <p:timing>
+    <p:tnLst>
+      <p:par>
+        <p:cTn id="1" dur="indefinite" restart="never" nodeType="tmRoot"/>
+      </p:par>
+    </p:tnLst>
+  </p:timing>
+</p:sld>
+</file>
+
 <file path=ppt/theme/theme1.xml><?xml version="1.0" encoding="utf-8"?>
 <a:theme xmlns:a="http://schemas.openxmlformats.org/drawingml/2006/main" name="Office Theme">
   <a:themeElements>

</xml_diff>

<commit_message>
Added border clear slides
</commit_message>
<xml_diff>
--- a/Images/Presentation/Matt_Slides.pptx
+++ b/Images/Presentation/Matt_Slides.pptx
@@ -13,6 +13,8 @@
     <p:sldId id="262" r:id="rId7"/>
     <p:sldId id="263" r:id="rId8"/>
     <p:sldId id="264" r:id="rId9"/>
+    <p:sldId id="265" r:id="rId10"/>
+    <p:sldId id="266" r:id="rId11"/>
   </p:sldIdLst>
   <p:sldSz cx="12192000" cy="6858000"/>
   <p:notesSz cx="6858000" cy="9144000"/>
@@ -111,6 +113,27 @@
       </a:defRPr>
     </a:lvl9pPr>
   </p:defaultTextStyle>
+  <p:extLst>
+    <p:ext uri="{EFAFB233-063F-42B5-8137-9DF3F51BA10A}">
+      <p15:sldGuideLst xmlns:p15="http://schemas.microsoft.com/office/powerpoint/2012/main">
+        <p15:guide id="1" orient="horz" pos="2256" userDrawn="1">
+          <p15:clr>
+            <a:srgbClr val="A4A3A4"/>
+          </p15:clr>
+        </p15:guide>
+        <p15:guide id="2" pos="4488" userDrawn="1">
+          <p15:clr>
+            <a:srgbClr val="A4A3A4"/>
+          </p15:clr>
+        </p15:guide>
+        <p15:guide id="3" pos="3192" userDrawn="1">
+          <p15:clr>
+            <a:srgbClr val="A4A3A4"/>
+          </p15:clr>
+        </p15:guide>
+      </p15:sldGuideLst>
+    </p:ext>
+  </p:extLst>
 </p:presentation>
 </file>
 
@@ -4625,6 +4648,640 @@
     <p:bldLst>
       <p:bldP spid="8" grpId="0"/>
     </p:bldLst>
+  </p:timing>
+</p:sld>
+</file>
+
+<file path=ppt/slides/slide10.xml><?xml version="1.0" encoding="utf-8"?>
+<p:sld xmlns:a="http://schemas.openxmlformats.org/drawingml/2006/main" xmlns:r="http://schemas.openxmlformats.org/officeDocument/2006/relationships" xmlns:p="http://schemas.openxmlformats.org/presentationml/2006/main">
+  <p:cSld>
+    <p:spTree>
+      <p:nvGrpSpPr>
+        <p:cNvPr id="1" name=""/>
+        <p:cNvGrpSpPr/>
+        <p:nvPr/>
+      </p:nvGrpSpPr>
+      <p:grpSpPr>
+        <a:xfrm>
+          <a:off x="0" y="0"/>
+          <a:ext cx="0" cy="0"/>
+          <a:chOff x="0" y="0"/>
+          <a:chExt cx="0" cy="0"/>
+        </a:xfrm>
+      </p:grpSpPr>
+      <p:pic>
+        <p:nvPicPr>
+          <p:cNvPr id="2" name="Picture 1"/>
+          <p:cNvPicPr>
+            <a:picLocks noChangeAspect="1"/>
+          </p:cNvPicPr>
+          <p:nvPr/>
+        </p:nvPicPr>
+        <p:blipFill>
+          <a:blip r:embed="rId2">
+            <a:extLst>
+              <a:ext uri="{28A0092B-C50C-407E-A947-70E740481C1C}">
+                <a14:useLocalDpi xmlns:a14="http://schemas.microsoft.com/office/drawing/2010/main" val="0"/>
+              </a:ext>
+            </a:extLst>
+          </a:blip>
+          <a:stretch>
+            <a:fillRect/>
+          </a:stretch>
+        </p:blipFill>
+        <p:spPr>
+          <a:xfrm>
+            <a:off x="4138613" y="293222"/>
+            <a:ext cx="3914775" cy="3105150"/>
+          </a:xfrm>
+          <a:prstGeom prst="rect">
+            <a:avLst/>
+          </a:prstGeom>
+        </p:spPr>
+      </p:pic>
+      <p:grpSp>
+        <p:nvGrpSpPr>
+          <p:cNvPr id="27" name="Group 26"/>
+          <p:cNvGrpSpPr/>
+          <p:nvPr/>
+        </p:nvGrpSpPr>
+        <p:grpSpPr>
+          <a:xfrm>
+            <a:off x="1134136" y="1938657"/>
+            <a:ext cx="3914775" cy="4762536"/>
+            <a:chOff x="1134136" y="1938657"/>
+            <a:chExt cx="3914775" cy="4762536"/>
+          </a:xfrm>
+        </p:grpSpPr>
+        <p:pic>
+          <p:nvPicPr>
+            <p:cNvPr id="3" name="Picture 2"/>
+            <p:cNvPicPr>
+              <a:picLocks noChangeAspect="1"/>
+            </p:cNvPicPr>
+            <p:nvPr/>
+          </p:nvPicPr>
+          <p:blipFill>
+            <a:blip r:embed="rId3">
+              <a:extLst>
+                <a:ext uri="{28A0092B-C50C-407E-A947-70E740481C1C}">
+                  <a14:useLocalDpi xmlns:a14="http://schemas.microsoft.com/office/drawing/2010/main" val="0"/>
+                </a:ext>
+              </a:extLst>
+            </a:blip>
+            <a:stretch>
+              <a:fillRect/>
+            </a:stretch>
+          </p:blipFill>
+          <p:spPr>
+            <a:xfrm>
+              <a:off x="1134136" y="3596043"/>
+              <a:ext cx="3914775" cy="3105150"/>
+            </a:xfrm>
+            <a:prstGeom prst="rect">
+              <a:avLst/>
+            </a:prstGeom>
+          </p:spPr>
+        </p:pic>
+        <p:grpSp>
+          <p:nvGrpSpPr>
+            <p:cNvPr id="26" name="Group 25"/>
+            <p:cNvGrpSpPr/>
+            <p:nvPr/>
+          </p:nvGrpSpPr>
+          <p:grpSpPr>
+            <a:xfrm>
+              <a:off x="1555241" y="1938657"/>
+              <a:ext cx="2499924" cy="1619218"/>
+              <a:chOff x="1555241" y="1938657"/>
+              <a:chExt cx="2499924" cy="1619218"/>
+            </a:xfrm>
+          </p:grpSpPr>
+          <p:cxnSp>
+            <p:nvCxnSpPr>
+              <p:cNvPr id="9" name="Elbow Connector 8"/>
+              <p:cNvCxnSpPr/>
+              <p:nvPr/>
+            </p:nvCxnSpPr>
+            <p:spPr>
+              <a:xfrm rot="5400000">
+                <a:off x="2518012" y="2020722"/>
+                <a:ext cx="1619218" cy="1455088"/>
+              </a:xfrm>
+              <a:prstGeom prst="bentConnector3">
+                <a:avLst>
+                  <a:gd name="adj1" fmla="val -579"/>
+                </a:avLst>
+              </a:prstGeom>
+              <a:ln>
+                <a:tailEnd type="triangle"/>
+              </a:ln>
+            </p:spPr>
+            <p:style>
+              <a:lnRef idx="3">
+                <a:schemeClr val="dk1"/>
+              </a:lnRef>
+              <a:fillRef idx="0">
+                <a:schemeClr val="dk1"/>
+              </a:fillRef>
+              <a:effectRef idx="2">
+                <a:schemeClr val="dk1"/>
+              </a:effectRef>
+              <a:fontRef idx="minor">
+                <a:schemeClr val="tx1"/>
+              </a:fontRef>
+            </p:style>
+          </p:cxnSp>
+          <mc:AlternateContent xmlns:mc="http://schemas.openxmlformats.org/markup-compatibility/2006">
+            <mc:Choice xmlns:a14="http://schemas.microsoft.com/office/drawing/2010/main" Requires="a14">
+              <p:sp>
+                <p:nvSpPr>
+                  <p:cNvPr id="14" name="TextBox 13"/>
+                  <p:cNvSpPr txBox="1"/>
+                  <p:nvPr/>
+                </p:nvSpPr>
+                <p:spPr>
+                  <a:xfrm>
+                    <a:off x="1555241" y="2514740"/>
+                    <a:ext cx="961388" cy="467051"/>
+                  </a:xfrm>
+                  <a:prstGeom prst="rect">
+                    <a:avLst/>
+                  </a:prstGeom>
+                  <a:noFill/>
+                </p:spPr>
+                <p:txBody>
+                  <a:bodyPr wrap="square" rtlCol="0">
+                    <a:spAutoFit/>
+                  </a:bodyPr>
+                  <a:lstStyle/>
+                  <a:p>
+                    <a14:m>
+                      <m:oMathPara xmlns:m="http://schemas.openxmlformats.org/officeDocument/2006/math">
+                        <m:oMathParaPr>
+                          <m:jc m:val="centerGroup"/>
+                        </m:oMathParaPr>
+                        <m:oMath xmlns:m="http://schemas.openxmlformats.org/officeDocument/2006/math">
+                          <m:sSubSup>
+                            <m:sSubSupPr>
+                              <m:ctrlPr>
+                                <a:rPr lang="en-US" sz="2400" i="1" smtClean="0">
+                                  <a:latin typeface="Cambria Math" panose="02040503050406030204" pitchFamily="18" charset="0"/>
+                                </a:rPr>
+                              </m:ctrlPr>
+                            </m:sSubSupPr>
+                            <m:e>
+                              <m:r>
+                                <a:rPr lang="en-US" sz="2400" b="0" i="1" smtClean="0">
+                                  <a:latin typeface="Cambria Math" panose="02040503050406030204" pitchFamily="18" charset="0"/>
+                                </a:rPr>
+                                <m:t>𝑅</m:t>
+                              </m:r>
+                            </m:e>
+                            <m:sub>
+                              <m:r>
+                                <a:rPr lang="en-US" sz="2400" b="0" i="1" smtClean="0">
+                                  <a:latin typeface="Cambria Math" panose="02040503050406030204" pitchFamily="18" charset="0"/>
+                                </a:rPr>
+                                <m:t>𝐼</m:t>
+                              </m:r>
+                            </m:sub>
+                            <m:sup>
+                              <m:r>
+                                <a:rPr lang="en-US" sz="2400" b="0" i="1" smtClean="0">
+                                  <a:latin typeface="Cambria Math" panose="02040503050406030204" pitchFamily="18" charset="0"/>
+                                </a:rPr>
+                                <m:t>𝐷</m:t>
+                              </m:r>
+                            </m:sup>
+                          </m:sSubSup>
+                          <m:d>
+                            <m:dPr>
+                              <m:ctrlPr>
+                                <a:rPr lang="en-US" sz="2400" i="1" smtClean="0">
+                                  <a:latin typeface="Cambria Math" panose="02040503050406030204" pitchFamily="18" charset="0"/>
+                                </a:rPr>
+                              </m:ctrlPr>
+                            </m:dPr>
+                            <m:e>
+                              <m:r>
+                                <a:rPr lang="en-US" sz="2400" b="0" i="1" smtClean="0">
+                                  <a:latin typeface="Cambria Math" panose="02040503050406030204" pitchFamily="18" charset="0"/>
+                                </a:rPr>
+                                <m:t>𝐹</m:t>
+                              </m:r>
+                            </m:e>
+                          </m:d>
+                        </m:oMath>
+                      </m:oMathPara>
+                    </a14:m>
+                    <a:endParaRPr lang="en-US" sz="2400" dirty="0"/>
+                  </a:p>
+                </p:txBody>
+              </p:sp>
+            </mc:Choice>
+            <mc:Fallback>
+              <p:sp>
+                <p:nvSpPr>
+                  <p:cNvPr id="14" name="TextBox 13"/>
+                  <p:cNvSpPr txBox="1">
+                    <a:spLocks noRot="1" noChangeAspect="1" noMove="1" noResize="1" noEditPoints="1" noAdjustHandles="1" noChangeArrowheads="1" noChangeShapeType="1" noTextEdit="1"/>
+                  </p:cNvSpPr>
+                  <p:nvPr/>
+                </p:nvSpPr>
+                <p:spPr>
+                  <a:xfrm>
+                    <a:off x="1555241" y="2514740"/>
+                    <a:ext cx="961388" cy="467051"/>
+                  </a:xfrm>
+                  <a:prstGeom prst="rect">
+                    <a:avLst/>
+                  </a:prstGeom>
+                  <a:blipFill rotWithShape="0">
+                    <a:blip r:embed="rId4"/>
+                    <a:stretch>
+                      <a:fillRect l="-1266" b="-2632"/>
+                    </a:stretch>
+                  </a:blipFill>
+                </p:spPr>
+                <p:txBody>
+                  <a:bodyPr/>
+                  <a:lstStyle/>
+                  <a:p>
+                    <a:r>
+                      <a:rPr lang="en-US">
+                        <a:noFill/>
+                      </a:rPr>
+                      <a:t> </a:t>
+                    </a:r>
+                  </a:p>
+                </p:txBody>
+              </p:sp>
+            </mc:Fallback>
+          </mc:AlternateContent>
+        </p:grpSp>
+      </p:grpSp>
+      <p:grpSp>
+        <p:nvGrpSpPr>
+          <p:cNvPr id="29" name="Group 28"/>
+          <p:cNvGrpSpPr/>
+          <p:nvPr/>
+        </p:nvGrpSpPr>
+        <p:grpSpPr>
+          <a:xfrm>
+            <a:off x="5067300" y="3595145"/>
+            <a:ext cx="5987913" cy="3105150"/>
+            <a:chOff x="5067300" y="3595145"/>
+            <a:chExt cx="5987913" cy="3105150"/>
+          </a:xfrm>
+        </p:grpSpPr>
+        <p:pic>
+          <p:nvPicPr>
+            <p:cNvPr id="4" name="Picture 3"/>
+            <p:cNvPicPr>
+              <a:picLocks noChangeAspect="1"/>
+            </p:cNvPicPr>
+            <p:nvPr/>
+          </p:nvPicPr>
+          <p:blipFill>
+            <a:blip r:embed="rId5">
+              <a:extLst>
+                <a:ext uri="{28A0092B-C50C-407E-A947-70E740481C1C}">
+                  <a14:useLocalDpi xmlns:a14="http://schemas.microsoft.com/office/drawing/2010/main" val="0"/>
+                </a:ext>
+              </a:extLst>
+            </a:blip>
+            <a:stretch>
+              <a:fillRect/>
+            </a:stretch>
+          </p:blipFill>
+          <p:spPr>
+            <a:xfrm>
+              <a:off x="7140438" y="3595145"/>
+              <a:ext cx="3914775" cy="3105150"/>
+            </a:xfrm>
+            <a:prstGeom prst="rect">
+              <a:avLst/>
+            </a:prstGeom>
+          </p:spPr>
+        </p:pic>
+        <p:grpSp>
+          <p:nvGrpSpPr>
+            <p:cNvPr id="28" name="Group 27"/>
+            <p:cNvGrpSpPr/>
+            <p:nvPr/>
+          </p:nvGrpSpPr>
+          <p:grpSpPr>
+            <a:xfrm>
+              <a:off x="5067300" y="4651513"/>
+              <a:ext cx="2057399" cy="496207"/>
+              <a:chOff x="5067300" y="4651513"/>
+              <a:chExt cx="2057399" cy="496207"/>
+            </a:xfrm>
+          </p:grpSpPr>
+          <p:cxnSp>
+            <p:nvCxnSpPr>
+              <p:cNvPr id="16" name="Straight Arrow Connector 15"/>
+              <p:cNvCxnSpPr/>
+              <p:nvPr/>
+            </p:nvCxnSpPr>
+            <p:spPr>
+              <a:xfrm>
+                <a:off x="5128591" y="5147720"/>
+                <a:ext cx="1932167" cy="0"/>
+              </a:xfrm>
+              <a:prstGeom prst="straightConnector1">
+                <a:avLst/>
+              </a:prstGeom>
+              <a:ln>
+                <a:tailEnd type="triangle"/>
+              </a:ln>
+            </p:spPr>
+            <p:style>
+              <a:lnRef idx="3">
+                <a:schemeClr val="dk1"/>
+              </a:lnRef>
+              <a:fillRef idx="0">
+                <a:schemeClr val="dk1"/>
+              </a:fillRef>
+              <a:effectRef idx="2">
+                <a:schemeClr val="dk1"/>
+              </a:effectRef>
+              <a:fontRef idx="minor">
+                <a:schemeClr val="tx1"/>
+              </a:fontRef>
+            </p:style>
+          </p:cxnSp>
+          <mc:AlternateContent xmlns:mc="http://schemas.openxmlformats.org/markup-compatibility/2006">
+            <mc:Choice xmlns:a14="http://schemas.microsoft.com/office/drawing/2010/main" Requires="a14">
+              <p:sp>
+                <p:nvSpPr>
+                  <p:cNvPr id="21" name="TextBox 20"/>
+                  <p:cNvSpPr txBox="1"/>
+                  <p:nvPr/>
+                </p:nvSpPr>
+                <p:spPr>
+                  <a:xfrm>
+                    <a:off x="5067300" y="4651513"/>
+                    <a:ext cx="2057399" cy="467051"/>
+                  </a:xfrm>
+                  <a:prstGeom prst="rect">
+                    <a:avLst/>
+                  </a:prstGeom>
+                  <a:noFill/>
+                </p:spPr>
+                <p:txBody>
+                  <a:bodyPr wrap="square" rtlCol="0">
+                    <a:spAutoFit/>
+                  </a:bodyPr>
+                  <a:lstStyle/>
+                  <a:p>
+                    <a14:m>
+                      <m:oMathPara xmlns:m="http://schemas.openxmlformats.org/officeDocument/2006/math">
+                        <m:oMathParaPr>
+                          <m:jc m:val="centerGroup"/>
+                        </m:oMathParaPr>
+                        <m:oMath xmlns:m="http://schemas.openxmlformats.org/officeDocument/2006/math">
+                          <m:r>
+                            <a:rPr lang="en-US" sz="2400" b="0" i="1" smtClean="0">
+                              <a:latin typeface="Cambria Math" panose="02040503050406030204" pitchFamily="18" charset="0"/>
+                            </a:rPr>
+                            <m:t>𝐼</m:t>
+                          </m:r>
+                          <m:r>
+                            <a:rPr lang="en-US" sz="2400" b="0" i="1" smtClean="0">
+                              <a:latin typeface="Cambria Math" panose="02040503050406030204" pitchFamily="18" charset="0"/>
+                            </a:rPr>
+                            <m:t>−</m:t>
+                          </m:r>
+                          <m:sSubSup>
+                            <m:sSubSupPr>
+                              <m:ctrlPr>
+                                <a:rPr lang="en-US" sz="2400" i="1" smtClean="0">
+                                  <a:latin typeface="Cambria Math" panose="02040503050406030204" pitchFamily="18" charset="0"/>
+                                </a:rPr>
+                              </m:ctrlPr>
+                            </m:sSubSupPr>
+                            <m:e>
+                              <m:r>
+                                <a:rPr lang="en-US" sz="2400" b="0" i="1" smtClean="0">
+                                  <a:latin typeface="Cambria Math" panose="02040503050406030204" pitchFamily="18" charset="0"/>
+                                </a:rPr>
+                                <m:t>𝑅</m:t>
+                              </m:r>
+                            </m:e>
+                            <m:sub>
+                              <m:r>
+                                <a:rPr lang="en-US" sz="2400" b="0" i="1" smtClean="0">
+                                  <a:latin typeface="Cambria Math" panose="02040503050406030204" pitchFamily="18" charset="0"/>
+                                </a:rPr>
+                                <m:t>𝐼</m:t>
+                              </m:r>
+                            </m:sub>
+                            <m:sup>
+                              <m:r>
+                                <a:rPr lang="en-US" sz="2400" b="0" i="1" smtClean="0">
+                                  <a:latin typeface="Cambria Math" panose="02040503050406030204" pitchFamily="18" charset="0"/>
+                                </a:rPr>
+                                <m:t>𝐷</m:t>
+                              </m:r>
+                            </m:sup>
+                          </m:sSubSup>
+                          <m:d>
+                            <m:dPr>
+                              <m:ctrlPr>
+                                <a:rPr lang="en-US" sz="2400" i="1" smtClean="0">
+                                  <a:latin typeface="Cambria Math" panose="02040503050406030204" pitchFamily="18" charset="0"/>
+                                </a:rPr>
+                              </m:ctrlPr>
+                            </m:dPr>
+                            <m:e>
+                              <m:r>
+                                <a:rPr lang="en-US" sz="2400" b="0" i="1" smtClean="0">
+                                  <a:latin typeface="Cambria Math" panose="02040503050406030204" pitchFamily="18" charset="0"/>
+                                </a:rPr>
+                                <m:t>𝐹</m:t>
+                              </m:r>
+                            </m:e>
+                          </m:d>
+                        </m:oMath>
+                      </m:oMathPara>
+                    </a14:m>
+                    <a:endParaRPr lang="en-US" sz="2400" dirty="0"/>
+                  </a:p>
+                </p:txBody>
+              </p:sp>
+            </mc:Choice>
+            <mc:Fallback>
+              <p:sp>
+                <p:nvSpPr>
+                  <p:cNvPr id="21" name="TextBox 20"/>
+                  <p:cNvSpPr txBox="1">
+                    <a:spLocks noRot="1" noChangeAspect="1" noMove="1" noResize="1" noEditPoints="1" noAdjustHandles="1" noChangeArrowheads="1" noChangeShapeType="1" noTextEdit="1"/>
+                  </p:cNvSpPr>
+                  <p:nvPr/>
+                </p:nvSpPr>
+                <p:spPr>
+                  <a:xfrm>
+                    <a:off x="5067300" y="4651513"/>
+                    <a:ext cx="2057399" cy="467051"/>
+                  </a:xfrm>
+                  <a:prstGeom prst="rect">
+                    <a:avLst/>
+                  </a:prstGeom>
+                  <a:blipFill rotWithShape="0">
+                    <a:blip r:embed="rId6"/>
+                    <a:stretch>
+                      <a:fillRect b="-2597"/>
+                    </a:stretch>
+                  </a:blipFill>
+                </p:spPr>
+                <p:txBody>
+                  <a:bodyPr/>
+                  <a:lstStyle/>
+                  <a:p>
+                    <a:r>
+                      <a:rPr lang="en-US">
+                        <a:noFill/>
+                      </a:rPr>
+                      <a:t> </a:t>
+                    </a:r>
+                  </a:p>
+                </p:txBody>
+              </p:sp>
+            </mc:Fallback>
+          </mc:AlternateContent>
+        </p:grpSp>
+      </p:grpSp>
+    </p:spTree>
+    <p:extLst>
+      <p:ext uri="{BB962C8B-B14F-4D97-AF65-F5344CB8AC3E}">
+        <p14:creationId xmlns:p14="http://schemas.microsoft.com/office/powerpoint/2010/main" val="3395135579"/>
+      </p:ext>
+    </p:extLst>
+  </p:cSld>
+  <p:clrMapOvr>
+    <a:masterClrMapping/>
+  </p:clrMapOvr>
+  <p:timing>
+    <p:tnLst>
+      <p:par>
+        <p:cTn id="1" dur="indefinite" restart="never" nodeType="tmRoot">
+          <p:childTnLst>
+            <p:seq concurrent="1" nextAc="seek">
+              <p:cTn id="2" dur="indefinite" nodeType="mainSeq">
+                <p:childTnLst>
+                  <p:par>
+                    <p:cTn id="3" fill="hold">
+                      <p:stCondLst>
+                        <p:cond delay="indefinite"/>
+                      </p:stCondLst>
+                      <p:childTnLst>
+                        <p:par>
+                          <p:cTn id="4" fill="hold">
+                            <p:stCondLst>
+                              <p:cond delay="0"/>
+                            </p:stCondLst>
+                            <p:childTnLst>
+                              <p:par>
+                                <p:cTn id="5" presetID="1" presetClass="entr" presetSubtype="0" fill="hold" nodeType="clickEffect">
+                                  <p:stCondLst>
+                                    <p:cond delay="0"/>
+                                  </p:stCondLst>
+                                  <p:childTnLst>
+                                    <p:set>
+                                      <p:cBhvr>
+                                        <p:cTn id="6" dur="1" fill="hold">
+                                          <p:stCondLst>
+                                            <p:cond delay="0"/>
+                                          </p:stCondLst>
+                                        </p:cTn>
+                                        <p:tgtEl>
+                                          <p:spTgt spid="27"/>
+                                        </p:tgtEl>
+                                        <p:attrNameLst>
+                                          <p:attrName>style.visibility</p:attrName>
+                                        </p:attrNameLst>
+                                      </p:cBhvr>
+                                      <p:to>
+                                        <p:strVal val="visible"/>
+                                      </p:to>
+                                    </p:set>
+                                  </p:childTnLst>
+                                </p:cTn>
+                              </p:par>
+                            </p:childTnLst>
+                          </p:cTn>
+                        </p:par>
+                      </p:childTnLst>
+                    </p:cTn>
+                  </p:par>
+                  <p:par>
+                    <p:cTn id="7" fill="hold">
+                      <p:stCondLst>
+                        <p:cond delay="indefinite"/>
+                      </p:stCondLst>
+                      <p:childTnLst>
+                        <p:par>
+                          <p:cTn id="8" fill="hold">
+                            <p:stCondLst>
+                              <p:cond delay="0"/>
+                            </p:stCondLst>
+                            <p:childTnLst>
+                              <p:par>
+                                <p:cTn id="9" presetID="1" presetClass="entr" presetSubtype="0" fill="hold" nodeType="clickEffect">
+                                  <p:stCondLst>
+                                    <p:cond delay="0"/>
+                                  </p:stCondLst>
+                                  <p:childTnLst>
+                                    <p:set>
+                                      <p:cBhvr>
+                                        <p:cTn id="10" dur="1" fill="hold">
+                                          <p:stCondLst>
+                                            <p:cond delay="0"/>
+                                          </p:stCondLst>
+                                        </p:cTn>
+                                        <p:tgtEl>
+                                          <p:spTgt spid="29"/>
+                                        </p:tgtEl>
+                                        <p:attrNameLst>
+                                          <p:attrName>style.visibility</p:attrName>
+                                        </p:attrNameLst>
+                                      </p:cBhvr>
+                                      <p:to>
+                                        <p:strVal val="visible"/>
+                                      </p:to>
+                                    </p:set>
+                                  </p:childTnLst>
+                                </p:cTn>
+                              </p:par>
+                            </p:childTnLst>
+                          </p:cTn>
+                        </p:par>
+                      </p:childTnLst>
+                    </p:cTn>
+                  </p:par>
+                </p:childTnLst>
+              </p:cTn>
+              <p:prevCondLst>
+                <p:cond evt="onPrev" delay="0">
+                  <p:tgtEl>
+                    <p:sldTgt/>
+                  </p:tgtEl>
+                </p:cond>
+              </p:prevCondLst>
+              <p:nextCondLst>
+                <p:cond evt="onNext" delay="0">
+                  <p:tgtEl>
+                    <p:sldTgt/>
+                  </p:tgtEl>
+                </p:cond>
+              </p:nextCondLst>
+            </p:seq>
+          </p:childTnLst>
+        </p:cTn>
+      </p:par>
+    </p:tnLst>
   </p:timing>
 </p:sld>
 </file>
@@ -10529,7 +11186,7 @@
                 </a:r>
                 <a:r>
                   <a:rPr lang="en-US" dirty="0" smtClean="0"/>
-                  <a:t>be an image with a hole in it. Then</a:t>
+                  <a:t>be a binary image with a hole in it. Then</a:t>
                 </a:r>
               </a:p>
               <a:p>
@@ -12082,6 +12739,434 @@
 </p:sld>
 </file>
 
+<file path=ppt/slides/slide9.xml><?xml version="1.0" encoding="utf-8"?>
+<p:sld xmlns:a="http://schemas.openxmlformats.org/drawingml/2006/main" xmlns:r="http://schemas.openxmlformats.org/officeDocument/2006/relationships" xmlns:p="http://schemas.openxmlformats.org/presentationml/2006/main">
+  <p:cSld>
+    <p:spTree>
+      <p:nvGrpSpPr>
+        <p:cNvPr id="1" name=""/>
+        <p:cNvGrpSpPr/>
+        <p:nvPr/>
+      </p:nvGrpSpPr>
+      <p:grpSpPr>
+        <a:xfrm>
+          <a:off x="0" y="0"/>
+          <a:ext cx="0" cy="0"/>
+          <a:chOff x="0" y="0"/>
+          <a:chExt cx="0" cy="0"/>
+        </a:xfrm>
+      </p:grpSpPr>
+      <p:sp>
+        <p:nvSpPr>
+          <p:cNvPr id="2" name="Title 1"/>
+          <p:cNvSpPr>
+            <a:spLocks noGrp="1"/>
+          </p:cNvSpPr>
+          <p:nvPr>
+            <p:ph type="title"/>
+          </p:nvPr>
+        </p:nvSpPr>
+        <p:spPr/>
+        <p:txBody>
+          <a:bodyPr/>
+          <a:lstStyle/>
+          <a:p>
+            <a:r>
+              <a:rPr lang="en-US" dirty="0" smtClean="0"/>
+              <a:t>Boundary Clearing</a:t>
+            </a:r>
+            <a:endParaRPr lang="en-US" dirty="0"/>
+          </a:p>
+        </p:txBody>
+      </p:sp>
+      <mc:AlternateContent xmlns:mc="http://schemas.openxmlformats.org/markup-compatibility/2006">
+        <mc:Choice xmlns:a14="http://schemas.microsoft.com/office/drawing/2010/main" Requires="a14">
+          <p:sp>
+            <p:nvSpPr>
+              <p:cNvPr id="24" name="Content Placeholder 23"/>
+              <p:cNvSpPr>
+                <a:spLocks noGrp="1"/>
+              </p:cNvSpPr>
+              <p:nvPr>
+                <p:ph idx="1"/>
+              </p:nvPr>
+            </p:nvSpPr>
+            <p:spPr/>
+            <p:txBody>
+              <a:bodyPr/>
+              <a:lstStyle/>
+              <a:p>
+                <a:pPr>
+                  <a:spcAft>
+                    <a:spcPts val="1200"/>
+                  </a:spcAft>
+                </a:pPr>
+                <a:r>
+                  <a:rPr lang="en-US" dirty="0" smtClean="0"/>
+                  <a:t>Let </a:t>
+                </a:r>
+                <a:r>
+                  <a:rPr lang="en-US" i="1" dirty="0" smtClean="0"/>
+                  <a:t>I </a:t>
+                </a:r>
+                <a:r>
+                  <a:rPr lang="en-US" dirty="0" smtClean="0"/>
+                  <a:t>be a binary image. Then</a:t>
+                </a:r>
+              </a:p>
+              <a:p>
+                <a:pPr marL="0" indent="0">
+                  <a:buNone/>
+                </a:pPr>
+                <a14:m>
+                  <m:oMathPara xmlns:m="http://schemas.openxmlformats.org/officeDocument/2006/math">
+                    <m:oMathParaPr>
+                      <m:jc m:val="centerGroup"/>
+                    </m:oMathParaPr>
+                    <m:oMath xmlns:m="http://schemas.openxmlformats.org/officeDocument/2006/math">
+                      <m:r>
+                        <a:rPr lang="en-US" b="0" i="1" smtClean="0">
+                          <a:latin typeface="Cambria Math" panose="02040503050406030204" pitchFamily="18" charset="0"/>
+                        </a:rPr>
+                        <m:t>𝐹</m:t>
+                      </m:r>
+                      <m:d>
+                        <m:dPr>
+                          <m:ctrlPr>
+                            <a:rPr lang="en-US" b="0" i="1" smtClean="0">
+                              <a:latin typeface="Cambria Math" panose="02040503050406030204" pitchFamily="18" charset="0"/>
+                            </a:rPr>
+                          </m:ctrlPr>
+                        </m:dPr>
+                        <m:e>
+                          <m:r>
+                            <a:rPr lang="en-US" b="0" i="1" smtClean="0">
+                              <a:latin typeface="Cambria Math" panose="02040503050406030204" pitchFamily="18" charset="0"/>
+                            </a:rPr>
+                            <m:t>𝑥</m:t>
+                          </m:r>
+                          <m:r>
+                            <a:rPr lang="en-US" b="0" i="1" smtClean="0">
+                              <a:latin typeface="Cambria Math" panose="02040503050406030204" pitchFamily="18" charset="0"/>
+                            </a:rPr>
+                            <m:t>,</m:t>
+                          </m:r>
+                          <m:r>
+                            <a:rPr lang="en-US" b="0" i="1" smtClean="0">
+                              <a:latin typeface="Cambria Math" panose="02040503050406030204" pitchFamily="18" charset="0"/>
+                            </a:rPr>
+                            <m:t>𝑦</m:t>
+                          </m:r>
+                        </m:e>
+                      </m:d>
+                      <m:r>
+                        <a:rPr lang="en-US" b="0" i="1" smtClean="0">
+                          <a:latin typeface="Cambria Math" panose="02040503050406030204" pitchFamily="18" charset="0"/>
+                        </a:rPr>
+                        <m:t>=</m:t>
+                      </m:r>
+                      <m:d>
+                        <m:dPr>
+                          <m:begChr m:val="{"/>
+                          <m:endChr m:val=""/>
+                          <m:ctrlPr>
+                            <a:rPr lang="en-US" b="0" i="1" smtClean="0">
+                              <a:latin typeface="Cambria Math" panose="02040503050406030204" pitchFamily="18" charset="0"/>
+                            </a:rPr>
+                          </m:ctrlPr>
+                        </m:dPr>
+                        <m:e>
+                          <m:eqArr>
+                            <m:eqArrPr>
+                              <m:ctrlPr>
+                                <a:rPr lang="en-US" b="0" i="1" smtClean="0">
+                                  <a:latin typeface="Cambria Math" panose="02040503050406030204" pitchFamily="18" charset="0"/>
+                                </a:rPr>
+                              </m:ctrlPr>
+                            </m:eqArrPr>
+                            <m:e>
+                              <m:r>
+                                <a:rPr lang="en-US" b="0" i="1" smtClean="0">
+                                  <a:latin typeface="Cambria Math" panose="02040503050406030204" pitchFamily="18" charset="0"/>
+                                </a:rPr>
+                                <m:t>𝐼</m:t>
+                              </m:r>
+                              <m:d>
+                                <m:dPr>
+                                  <m:ctrlPr>
+                                    <a:rPr lang="en-US" b="0" i="1" smtClean="0">
+                                      <a:latin typeface="Cambria Math" panose="02040503050406030204" pitchFamily="18" charset="0"/>
+                                    </a:rPr>
+                                  </m:ctrlPr>
+                                </m:dPr>
+                                <m:e>
+                                  <m:r>
+                                    <a:rPr lang="en-US" b="0" i="1" smtClean="0">
+                                      <a:latin typeface="Cambria Math" panose="02040503050406030204" pitchFamily="18" charset="0"/>
+                                    </a:rPr>
+                                    <m:t>𝑥</m:t>
+                                  </m:r>
+                                  <m:r>
+                                    <a:rPr lang="en-US" b="0" i="1" smtClean="0">
+                                      <a:latin typeface="Cambria Math" panose="02040503050406030204" pitchFamily="18" charset="0"/>
+                                    </a:rPr>
+                                    <m:t>,</m:t>
+                                  </m:r>
+                                  <m:r>
+                                    <a:rPr lang="en-US" b="0" i="1" smtClean="0">
+                                      <a:latin typeface="Cambria Math" panose="02040503050406030204" pitchFamily="18" charset="0"/>
+                                    </a:rPr>
+                                    <m:t>𝑦</m:t>
+                                  </m:r>
+                                </m:e>
+                              </m:d>
+                              <m:r>
+                                <a:rPr lang="en-US" b="0" i="1" smtClean="0">
+                                  <a:latin typeface="Cambria Math" panose="02040503050406030204" pitchFamily="18" charset="0"/>
+                                </a:rPr>
+                                <m:t> </m:t>
+                              </m:r>
+                              <m:r>
+                                <m:rPr>
+                                  <m:nor/>
+                                </m:rPr>
+                                <a:rPr lang="en-US" b="0" i="0" smtClean="0">
+                                  <a:latin typeface="Cambria Math" panose="02040503050406030204" pitchFamily="18" charset="0"/>
+                                </a:rPr>
+                                <m:t>      </m:t>
+                              </m:r>
+                              <m:r>
+                                <m:rPr>
+                                  <m:nor/>
+                                </m:rPr>
+                                <a:rPr lang="en-US" b="0" i="0" smtClean="0">
+                                  <a:latin typeface="Cambria Math" panose="02040503050406030204" pitchFamily="18" charset="0"/>
+                                </a:rPr>
+                                <m:t>if</m:t>
+                              </m:r>
+                              <m:r>
+                                <m:rPr>
+                                  <m:nor/>
+                                </m:rPr>
+                                <a:rPr lang="en-US" b="0" i="0" smtClean="0">
+                                  <a:latin typeface="Cambria Math" panose="02040503050406030204" pitchFamily="18" charset="0"/>
+                                </a:rPr>
+                                <m:t> </m:t>
+                              </m:r>
+                              <m:r>
+                                <m:rPr>
+                                  <m:nor/>
+                                </m:rPr>
+                                <a:rPr lang="en-US" b="0" i="0" smtClean="0">
+                                  <a:latin typeface="Cambria Math" panose="02040503050406030204" pitchFamily="18" charset="0"/>
+                                </a:rPr>
+                                <m:t>on</m:t>
+                              </m:r>
+                              <m:r>
+                                <m:rPr>
+                                  <m:nor/>
+                                </m:rPr>
+                                <a:rPr lang="en-US" b="0" i="0" smtClean="0">
+                                  <a:latin typeface="Cambria Math" panose="02040503050406030204" pitchFamily="18" charset="0"/>
+                                </a:rPr>
+                                <m:t> </m:t>
+                              </m:r>
+                              <m:r>
+                                <m:rPr>
+                                  <m:nor/>
+                                </m:rPr>
+                                <a:rPr lang="en-US" b="0" i="0" smtClean="0">
+                                  <a:latin typeface="Cambria Math" panose="02040503050406030204" pitchFamily="18" charset="0"/>
+                                </a:rPr>
+                                <m:t>border</m:t>
+                              </m:r>
+                            </m:e>
+                            <m:e>
+                              <m:r>
+                                <a:rPr lang="en-US" b="0" i="1" smtClean="0">
+                                  <a:latin typeface="Cambria Math" panose="02040503050406030204" pitchFamily="18" charset="0"/>
+                                </a:rPr>
+                                <m:t>0                 </m:t>
+                              </m:r>
+                              <m:r>
+                                <m:rPr>
+                                  <m:nor/>
+                                </m:rPr>
+                                <a:rPr lang="en-US" b="0" i="0" smtClean="0">
+                                  <a:latin typeface="Cambria Math" panose="02040503050406030204" pitchFamily="18" charset="0"/>
+                                </a:rPr>
+                                <m:t>otherwise</m:t>
+                              </m:r>
+                              <m:r>
+                                <m:rPr>
+                                  <m:nor/>
+                                </m:rPr>
+                                <a:rPr lang="en-US" b="0" i="0" smtClean="0">
+                                  <a:latin typeface="Cambria Math" panose="02040503050406030204" pitchFamily="18" charset="0"/>
+                                </a:rPr>
+                                <m:t>   </m:t>
+                              </m:r>
+                            </m:e>
+                          </m:eqArr>
+                        </m:e>
+                      </m:d>
+                    </m:oMath>
+                  </m:oMathPara>
+                </a14:m>
+                <a:endParaRPr lang="en-US" b="0" i="1" dirty="0" smtClean="0">
+                  <a:latin typeface="Cambria Math" panose="02040503050406030204" pitchFamily="18" charset="0"/>
+                </a:endParaRPr>
+              </a:p>
+              <a:p>
+                <a:pPr marL="0" indent="0">
+                  <a:buNone/>
+                </a:pPr>
+                <a:endParaRPr lang="en-US" b="0" i="1" dirty="0" smtClean="0">
+                  <a:latin typeface="Cambria Math" panose="02040503050406030204" pitchFamily="18" charset="0"/>
+                </a:endParaRPr>
+              </a:p>
+              <a:p>
+                <a:r>
+                  <a:rPr lang="en-US" b="0" dirty="0" smtClean="0"/>
+                  <a:t>The result image with the border cleared will be </a:t>
+                </a:r>
+                <a14:m>
+                  <m:oMath xmlns:m="http://schemas.openxmlformats.org/officeDocument/2006/math">
+                    <m:r>
+                      <a:rPr lang="en-US" b="0" i="1" smtClean="0">
+                        <a:latin typeface="Cambria Math" panose="02040503050406030204" pitchFamily="18" charset="0"/>
+                      </a:rPr>
+                      <m:t>𝑋</m:t>
+                    </m:r>
+                    <m:r>
+                      <a:rPr lang="en-US" b="0" i="1" smtClean="0">
+                        <a:latin typeface="Cambria Math" panose="02040503050406030204" pitchFamily="18" charset="0"/>
+                      </a:rPr>
+                      <m:t>=</m:t>
+                    </m:r>
+                    <m:r>
+                      <a:rPr lang="en-US" b="0" i="1" smtClean="0">
+                        <a:latin typeface="Cambria Math" panose="02040503050406030204" pitchFamily="18" charset="0"/>
+                      </a:rPr>
+                      <m:t>𝐼</m:t>
+                    </m:r>
+                    <m:r>
+                      <a:rPr lang="en-US" b="0" i="1" smtClean="0">
+                        <a:latin typeface="Cambria Math" panose="02040503050406030204" pitchFamily="18" charset="0"/>
+                      </a:rPr>
+                      <m:t> − </m:t>
+                    </m:r>
+                    <m:sSubSup>
+                      <m:sSubSupPr>
+                        <m:ctrlPr>
+                          <a:rPr lang="en-US" b="0" i="1" smtClean="0">
+                            <a:latin typeface="Cambria Math" panose="02040503050406030204" pitchFamily="18" charset="0"/>
+                          </a:rPr>
+                        </m:ctrlPr>
+                      </m:sSubSupPr>
+                      <m:e>
+                        <m:r>
+                          <a:rPr lang="en-US" b="0" i="1" smtClean="0">
+                            <a:latin typeface="Cambria Math" panose="02040503050406030204" pitchFamily="18" charset="0"/>
+                          </a:rPr>
+                          <m:t>𝑅</m:t>
+                        </m:r>
+                      </m:e>
+                      <m:sub>
+                        <m:r>
+                          <a:rPr lang="en-US" b="0" i="1" smtClean="0">
+                            <a:latin typeface="Cambria Math" panose="02040503050406030204" pitchFamily="18" charset="0"/>
+                          </a:rPr>
+                          <m:t>𝐼</m:t>
+                        </m:r>
+                      </m:sub>
+                      <m:sup>
+                        <m:r>
+                          <a:rPr lang="en-US" b="0" i="1" smtClean="0">
+                            <a:latin typeface="Cambria Math" panose="02040503050406030204" pitchFamily="18" charset="0"/>
+                          </a:rPr>
+                          <m:t>𝐷</m:t>
+                        </m:r>
+                      </m:sup>
+                    </m:sSubSup>
+                    <m:d>
+                      <m:dPr>
+                        <m:ctrlPr>
+                          <a:rPr lang="en-US" b="0" i="1" smtClean="0">
+                            <a:latin typeface="Cambria Math" panose="02040503050406030204" pitchFamily="18" charset="0"/>
+                          </a:rPr>
+                        </m:ctrlPr>
+                      </m:dPr>
+                      <m:e>
+                        <m:r>
+                          <a:rPr lang="en-US" b="0" i="1" smtClean="0">
+                            <a:latin typeface="Cambria Math" panose="02040503050406030204" pitchFamily="18" charset="0"/>
+                          </a:rPr>
+                          <m:t>𝐹</m:t>
+                        </m:r>
+                      </m:e>
+                    </m:d>
+                  </m:oMath>
+                </a14:m>
+                <a:endParaRPr lang="en-US" dirty="0"/>
+              </a:p>
+            </p:txBody>
+          </p:sp>
+        </mc:Choice>
+        <mc:Fallback>
+          <p:sp>
+            <p:nvSpPr>
+              <p:cNvPr id="24" name="Content Placeholder 23"/>
+              <p:cNvSpPr>
+                <a:spLocks noGrp="1" noRot="1" noChangeAspect="1" noMove="1" noResize="1" noEditPoints="1" noAdjustHandles="1" noChangeArrowheads="1" noChangeShapeType="1" noTextEdit="1"/>
+              </p:cNvSpPr>
+              <p:nvPr>
+                <p:ph idx="1"/>
+              </p:nvPr>
+            </p:nvSpPr>
+            <p:spPr>
+              <a:blipFill rotWithShape="0">
+                <a:blip r:embed="rId2"/>
+                <a:stretch>
+                  <a:fillRect l="-1043" t="-2381"/>
+                </a:stretch>
+              </a:blipFill>
+            </p:spPr>
+            <p:txBody>
+              <a:bodyPr/>
+              <a:lstStyle/>
+              <a:p>
+                <a:r>
+                  <a:rPr lang="en-US">
+                    <a:noFill/>
+                  </a:rPr>
+                  <a:t> </a:t>
+                </a:r>
+              </a:p>
+            </p:txBody>
+          </p:sp>
+        </mc:Fallback>
+      </mc:AlternateContent>
+    </p:spTree>
+    <p:extLst>
+      <p:ext uri="{BB962C8B-B14F-4D97-AF65-F5344CB8AC3E}">
+        <p14:creationId xmlns:p14="http://schemas.microsoft.com/office/powerpoint/2010/main" val="3279421046"/>
+      </p:ext>
+    </p:extLst>
+  </p:cSld>
+  <p:clrMapOvr>
+    <a:masterClrMapping/>
+  </p:clrMapOvr>
+  <p:timing>
+    <p:tnLst>
+      <p:par>
+        <p:cTn id="1" dur="indefinite" restart="never" nodeType="tmRoot"/>
+      </p:par>
+    </p:tnLst>
+  </p:timing>
+</p:sld>
+</file>
+
 <file path=ppt/theme/theme1.xml><?xml version="1.0" encoding="utf-8"?>
 <a:theme xmlns:a="http://schemas.openxmlformats.org/drawingml/2006/main" name="Office Theme">
   <a:themeElements>

</xml_diff>